<commit_message>
module 2 -> COMPLETED (add What is Gradle, reformat AVD manager)
</commit_message>
<xml_diff>
--- a/slides/02 - Android Studio.pptx
+++ b/slides/02 - Android Studio.pptx
@@ -13,14 +13,19 @@
     <p:sldId id="264" r:id="rId7"/>
     <p:sldId id="265" r:id="rId8"/>
     <p:sldId id="266" r:id="rId9"/>
-    <p:sldId id="268" r:id="rId10"/>
-    <p:sldId id="267" r:id="rId11"/>
-    <p:sldId id="269" r:id="rId12"/>
-    <p:sldId id="270" r:id="rId13"/>
-    <p:sldId id="271" r:id="rId14"/>
-    <p:sldId id="274" r:id="rId15"/>
-    <p:sldId id="272" r:id="rId16"/>
-    <p:sldId id="273" r:id="rId17"/>
+    <p:sldId id="276" r:id="rId10"/>
+    <p:sldId id="277" r:id="rId11"/>
+    <p:sldId id="278" r:id="rId12"/>
+    <p:sldId id="279" r:id="rId13"/>
+    <p:sldId id="268" r:id="rId14"/>
+    <p:sldId id="267" r:id="rId15"/>
+    <p:sldId id="269" r:id="rId16"/>
+    <p:sldId id="270" r:id="rId17"/>
+    <p:sldId id="271" r:id="rId18"/>
+    <p:sldId id="274" r:id="rId19"/>
+    <p:sldId id="272" r:id="rId20"/>
+    <p:sldId id="273" r:id="rId21"/>
+    <p:sldId id="275" r:id="rId22"/>
   </p:sldIdLst>
   <p:sldSz cx="12192000" cy="6858000"/>
   <p:notesSz cx="6858000" cy="9144000"/>
@@ -341,7 +346,7 @@
           <a:p>
             <a:fld id="{E8D60466-74B7-40A2-BA8B-04EDC83C4333}" type="datetimeFigureOut">
               <a:rPr lang="it-IT" smtClean="0"/>
-              <a:t>20/11/2021</a:t>
+              <a:t>27/11/2021</a:t>
             </a:fld>
             <a:endParaRPr lang="it-IT"/>
           </a:p>
@@ -539,7 +544,7 @@
           <a:p>
             <a:fld id="{E8D60466-74B7-40A2-BA8B-04EDC83C4333}" type="datetimeFigureOut">
               <a:rPr lang="it-IT" smtClean="0"/>
-              <a:t>20/11/2021</a:t>
+              <a:t>27/11/2021</a:t>
             </a:fld>
             <a:endParaRPr lang="it-IT"/>
           </a:p>
@@ -747,7 +752,7 @@
           <a:p>
             <a:fld id="{E8D60466-74B7-40A2-BA8B-04EDC83C4333}" type="datetimeFigureOut">
               <a:rPr lang="it-IT" smtClean="0"/>
-              <a:t>20/11/2021</a:t>
+              <a:t>27/11/2021</a:t>
             </a:fld>
             <a:endParaRPr lang="it-IT"/>
           </a:p>
@@ -2812,7 +2817,7 @@
           <a:p>
             <a:fld id="{E8D60466-74B7-40A2-BA8B-04EDC83C4333}" type="datetimeFigureOut">
               <a:rPr lang="it-IT" smtClean="0"/>
-              <a:t>20/11/2021</a:t>
+              <a:t>27/11/2021</a:t>
             </a:fld>
             <a:endParaRPr lang="it-IT"/>
           </a:p>
@@ -3927,7 +3932,7 @@
           <a:p>
             <a:fld id="{E8D60466-74B7-40A2-BA8B-04EDC83C4333}" type="datetimeFigureOut">
               <a:rPr lang="it-IT" smtClean="0"/>
-              <a:t>20/11/2021</a:t>
+              <a:t>27/11/2021</a:t>
             </a:fld>
             <a:endParaRPr lang="it-IT"/>
           </a:p>
@@ -4192,7 +4197,7 @@
           <a:p>
             <a:fld id="{E8D60466-74B7-40A2-BA8B-04EDC83C4333}" type="datetimeFigureOut">
               <a:rPr lang="it-IT" smtClean="0"/>
-              <a:t>20/11/2021</a:t>
+              <a:t>27/11/2021</a:t>
             </a:fld>
             <a:endParaRPr lang="it-IT"/>
           </a:p>
@@ -4604,7 +4609,7 @@
           <a:p>
             <a:fld id="{E8D60466-74B7-40A2-BA8B-04EDC83C4333}" type="datetimeFigureOut">
               <a:rPr lang="it-IT" smtClean="0"/>
-              <a:t>20/11/2021</a:t>
+              <a:t>27/11/2021</a:t>
             </a:fld>
             <a:endParaRPr lang="it-IT"/>
           </a:p>
@@ -4745,7 +4750,7 @@
           <a:p>
             <a:fld id="{E8D60466-74B7-40A2-BA8B-04EDC83C4333}" type="datetimeFigureOut">
               <a:rPr lang="it-IT" smtClean="0"/>
-              <a:t>20/11/2021</a:t>
+              <a:t>27/11/2021</a:t>
             </a:fld>
             <a:endParaRPr lang="it-IT"/>
           </a:p>
@@ -4858,7 +4863,7 @@
           <a:p>
             <a:fld id="{E8D60466-74B7-40A2-BA8B-04EDC83C4333}" type="datetimeFigureOut">
               <a:rPr lang="it-IT" smtClean="0"/>
-              <a:t>20/11/2021</a:t>
+              <a:t>27/11/2021</a:t>
             </a:fld>
             <a:endParaRPr lang="it-IT"/>
           </a:p>
@@ -5169,7 +5174,7 @@
           <a:p>
             <a:fld id="{E8D60466-74B7-40A2-BA8B-04EDC83C4333}" type="datetimeFigureOut">
               <a:rPr lang="it-IT" smtClean="0"/>
-              <a:t>20/11/2021</a:t>
+              <a:t>27/11/2021</a:t>
             </a:fld>
             <a:endParaRPr lang="it-IT"/>
           </a:p>
@@ -5457,7 +5462,7 @@
           <a:p>
             <a:fld id="{E8D60466-74B7-40A2-BA8B-04EDC83C4333}" type="datetimeFigureOut">
               <a:rPr lang="it-IT" smtClean="0"/>
-              <a:t>20/11/2021</a:t>
+              <a:t>27/11/2021</a:t>
             </a:fld>
             <a:endParaRPr lang="it-IT"/>
           </a:p>
@@ -5698,7 +5703,7 @@
           <a:p>
             <a:fld id="{E8D60466-74B7-40A2-BA8B-04EDC83C4333}" type="datetimeFigureOut">
               <a:rPr lang="it-IT" smtClean="0"/>
-              <a:t>20/11/2021</a:t>
+              <a:t>27/11/2021</a:t>
             </a:fld>
             <a:endParaRPr lang="it-IT"/>
           </a:p>
@@ -6682,7 +6687,7 @@
           <p:cNvPr id="2" name="Titolo 1">
             <a:extLst>
               <a:ext uri="{FF2B5EF4-FFF2-40B4-BE49-F238E27FC236}">
-                <a16:creationId xmlns:a16="http://schemas.microsoft.com/office/drawing/2014/main" id="{4A8F1979-42A0-45A5-B3FF-E873E2E24620}"/>
+                <a16:creationId xmlns:a16="http://schemas.microsoft.com/office/drawing/2014/main" id="{24FB8000-0918-4653-B2B9-944C31602BA6}"/>
               </a:ext>
             </a:extLst>
           </p:cNvPr>
@@ -6699,18 +6704,71 @@
           <a:lstStyle/>
           <a:p>
             <a:r>
+              <a:rPr lang="en-US" dirty="0"/>
+              <a:t>AVD Initialization (3)</a:t>
+            </a:r>
+            <a:endParaRPr lang="it-IT" dirty="0"/>
+          </a:p>
+        </p:txBody>
+      </p:sp>
+      <p:sp>
+        <p:nvSpPr>
+          <p:cNvPr id="4" name="Segnaposto contenuto 3">
+            <a:extLst>
+              <a:ext uri="{FF2B5EF4-FFF2-40B4-BE49-F238E27FC236}">
+                <a16:creationId xmlns:a16="http://schemas.microsoft.com/office/drawing/2014/main" id="{897F845C-7D6A-411F-8FA6-42CD50D1392D}"/>
+              </a:ext>
+            </a:extLst>
+          </p:cNvPr>
+          <p:cNvSpPr>
+            <a:spLocks noGrp="1"/>
+          </p:cNvSpPr>
+          <p:nvPr>
+            <p:ph sz="half" idx="2"/>
+          </p:nvPr>
+        </p:nvSpPr>
+        <p:spPr/>
+        <p:txBody>
+          <a:bodyPr/>
+          <a:lstStyle/>
+          <a:p>
+            <a:r>
+              <a:rPr lang="it-IT" dirty="0">
+                <a:solidFill>
+                  <a:srgbClr val="FF0000"/>
+                </a:solidFill>
+              </a:rPr>
+              <a:t>API Level </a:t>
+            </a:r>
+            <a:r>
               <a:rPr lang="it-IT" dirty="0"/>
-              <a:t>GitHub tools</a:t>
-            </a:r>
-          </a:p>
-        </p:txBody>
-      </p:sp>
-      <p:sp>
-        <p:nvSpPr>
-          <p:cNvPr id="4" name="Segnaposto numero diapositiva 3">
-            <a:extLst>
-              <a:ext uri="{FF2B5EF4-FFF2-40B4-BE49-F238E27FC236}">
-                <a16:creationId xmlns:a16="http://schemas.microsoft.com/office/drawing/2014/main" id="{4AEB25EF-CB47-4915-89D1-A5845A3D72EB}"/>
+              <a:t>(with </a:t>
+            </a:r>
+            <a:r>
+              <a:rPr lang="it-IT" dirty="0" err="1"/>
+              <a:t>related</a:t>
+            </a:r>
+            <a:r>
+              <a:rPr lang="it-IT" dirty="0"/>
+              <a:t> Android OS </a:t>
+            </a:r>
+            <a:r>
+              <a:rPr lang="it-IT" dirty="0" err="1"/>
+              <a:t>version</a:t>
+            </a:r>
+            <a:r>
+              <a:rPr lang="it-IT" dirty="0"/>
+              <a:t>)</a:t>
+            </a:r>
+          </a:p>
+        </p:txBody>
+      </p:sp>
+      <p:sp>
+        <p:nvSpPr>
+          <p:cNvPr id="5" name="Segnaposto numero diapositiva 4">
+            <a:extLst>
+              <a:ext uri="{FF2B5EF4-FFF2-40B4-BE49-F238E27FC236}">
+                <a16:creationId xmlns:a16="http://schemas.microsoft.com/office/drawing/2014/main" id="{5AB514FA-0475-483D-AEC7-C8FC586A278C}"/>
               </a:ext>
             </a:extLst>
           </p:cNvPr>
@@ -6737,10 +6795,10 @@
       </p:sp>
       <p:pic>
         <p:nvPicPr>
-          <p:cNvPr id="5" name="Segnaposto contenuto 4">
-            <a:extLst>
-              <a:ext uri="{FF2B5EF4-FFF2-40B4-BE49-F238E27FC236}">
-                <a16:creationId xmlns:a16="http://schemas.microsoft.com/office/drawing/2014/main" id="{B6D3546A-E625-4B16-9649-1A3A25E15EFF}"/>
+          <p:cNvPr id="6" name="Segnaposto contenuto 5">
+            <a:extLst>
+              <a:ext uri="{FF2B5EF4-FFF2-40B4-BE49-F238E27FC236}">
+                <a16:creationId xmlns:a16="http://schemas.microsoft.com/office/drawing/2014/main" id="{9AFE46B0-744C-46EB-95FB-2E5B7D4D7922}"/>
               </a:ext>
             </a:extLst>
           </p:cNvPr>
@@ -6748,212 +6806,29 @@
             <a:picLocks noGrp="1" noChangeAspect="1"/>
           </p:cNvPicPr>
           <p:nvPr>
-            <p:ph idx="1"/>
+            <p:ph sz="half" idx="1"/>
           </p:nvPr>
         </p:nvPicPr>
-        <p:blipFill rotWithShape="1">
+        <p:blipFill>
           <a:blip r:embed="rId2"/>
-          <a:srcRect l="-1" r="-1"/>
-          <a:stretch/>
+          <a:stretch>
+            <a:fillRect/>
+          </a:stretch>
         </p:blipFill>
         <p:spPr>
           <a:xfrm>
-            <a:off x="1466126" y="1433887"/>
-            <a:ext cx="9259747" cy="4953239"/>
+            <a:off x="609600" y="1730438"/>
+            <a:ext cx="5384800" cy="4265487"/>
           </a:xfrm>
           <a:prstGeom prst="rect">
             <a:avLst/>
           </a:prstGeom>
         </p:spPr>
       </p:pic>
-      <p:sp>
-        <p:nvSpPr>
-          <p:cNvPr id="8" name="Freccia a destra 7">
-            <a:extLst>
-              <a:ext uri="{FF2B5EF4-FFF2-40B4-BE49-F238E27FC236}">
-                <a16:creationId xmlns:a16="http://schemas.microsoft.com/office/drawing/2014/main" id="{8815035C-7AC3-4546-A16A-FF185C71C239}"/>
-              </a:ext>
-            </a:extLst>
-          </p:cNvPr>
-          <p:cNvSpPr/>
-          <p:nvPr/>
-        </p:nvSpPr>
-        <p:spPr>
-          <a:xfrm rot="16200000">
-            <a:off x="8712845" y="1976456"/>
-            <a:ext cx="636608" cy="549800"/>
-          </a:xfrm>
-          <a:prstGeom prst="rightArrow">
-            <a:avLst/>
-          </a:prstGeom>
-          <a:noFill/>
-          <a:ln w="28575"/>
-        </p:spPr>
-        <p:style>
-          <a:lnRef idx="1">
-            <a:schemeClr val="accent1"/>
-          </a:lnRef>
-          <a:fillRef idx="3">
-            <a:schemeClr val="accent1"/>
-          </a:fillRef>
-          <a:effectRef idx="2">
-            <a:schemeClr val="accent1"/>
-          </a:effectRef>
-          <a:fontRef idx="minor">
-            <a:schemeClr val="lt1"/>
-          </a:fontRef>
-        </p:style>
-        <p:txBody>
-          <a:bodyPr rtlCol="0" anchor="ctr"/>
-          <a:lstStyle/>
-          <a:p>
-            <a:pPr algn="ctr"/>
-            <a:endParaRPr lang="it-IT"/>
-          </a:p>
-        </p:txBody>
-      </p:sp>
-      <p:sp>
-        <p:nvSpPr>
-          <p:cNvPr id="9" name="Freccia a destra 8">
-            <a:extLst>
-              <a:ext uri="{FF2B5EF4-FFF2-40B4-BE49-F238E27FC236}">
-                <a16:creationId xmlns:a16="http://schemas.microsoft.com/office/drawing/2014/main" id="{12E6E2CA-0D2B-4843-926E-88A4BACF3690}"/>
-              </a:ext>
-            </a:extLst>
-          </p:cNvPr>
-          <p:cNvSpPr/>
-          <p:nvPr/>
-        </p:nvSpPr>
-        <p:spPr>
-          <a:xfrm rot="10800000">
-            <a:off x="1694731" y="2367904"/>
-            <a:ext cx="636608" cy="549800"/>
-          </a:xfrm>
-          <a:prstGeom prst="rightArrow">
-            <a:avLst/>
-          </a:prstGeom>
-          <a:noFill/>
-          <a:ln w="28575"/>
-        </p:spPr>
-        <p:style>
-          <a:lnRef idx="1">
-            <a:schemeClr val="accent1"/>
-          </a:lnRef>
-          <a:fillRef idx="3">
-            <a:schemeClr val="accent1"/>
-          </a:fillRef>
-          <a:effectRef idx="2">
-            <a:schemeClr val="accent1"/>
-          </a:effectRef>
-          <a:fontRef idx="minor">
-            <a:schemeClr val="lt1"/>
-          </a:fontRef>
-        </p:style>
-        <p:txBody>
-          <a:bodyPr rtlCol="0" anchor="ctr"/>
-          <a:lstStyle/>
-          <a:p>
-            <a:pPr algn="ctr"/>
-            <a:endParaRPr lang="it-IT"/>
-          </a:p>
-        </p:txBody>
-      </p:sp>
-      <p:sp>
-        <p:nvSpPr>
-          <p:cNvPr id="10" name="Freccia a destra 9">
-            <a:extLst>
-              <a:ext uri="{FF2B5EF4-FFF2-40B4-BE49-F238E27FC236}">
-                <a16:creationId xmlns:a16="http://schemas.microsoft.com/office/drawing/2014/main" id="{BA8054ED-0A22-4074-817A-05180BFE574B}"/>
-              </a:ext>
-            </a:extLst>
-          </p:cNvPr>
-          <p:cNvSpPr/>
-          <p:nvPr/>
-        </p:nvSpPr>
-        <p:spPr>
-          <a:xfrm rot="5400000">
-            <a:off x="2276882" y="5312338"/>
-            <a:ext cx="645207" cy="536293"/>
-          </a:xfrm>
-          <a:prstGeom prst="rightArrow">
-            <a:avLst/>
-          </a:prstGeom>
-          <a:noFill/>
-          <a:ln w="28575"/>
-        </p:spPr>
-        <p:style>
-          <a:lnRef idx="1">
-            <a:schemeClr val="accent1"/>
-          </a:lnRef>
-          <a:fillRef idx="3">
-            <a:schemeClr val="accent1"/>
-          </a:fillRef>
-          <a:effectRef idx="2">
-            <a:schemeClr val="accent1"/>
-          </a:effectRef>
-          <a:fontRef idx="minor">
-            <a:schemeClr val="lt1"/>
-          </a:fontRef>
-        </p:style>
-        <p:txBody>
-          <a:bodyPr rtlCol="0" anchor="ctr"/>
-          <a:lstStyle/>
-          <a:p>
-            <a:pPr algn="ctr"/>
-            <a:endParaRPr lang="it-IT"/>
-          </a:p>
-        </p:txBody>
-      </p:sp>
-      <p:sp>
-        <p:nvSpPr>
-          <p:cNvPr id="11" name="Freccia a destra 10">
-            <a:extLst>
-              <a:ext uri="{FF2B5EF4-FFF2-40B4-BE49-F238E27FC236}">
-                <a16:creationId xmlns:a16="http://schemas.microsoft.com/office/drawing/2014/main" id="{EFBA0B79-7816-4286-AD9D-CE531B455D8F}"/>
-              </a:ext>
-            </a:extLst>
-          </p:cNvPr>
-          <p:cNvSpPr/>
-          <p:nvPr/>
-        </p:nvSpPr>
-        <p:spPr>
-          <a:xfrm rot="16200000">
-            <a:off x="3980728" y="1701559"/>
-            <a:ext cx="636608" cy="549800"/>
-          </a:xfrm>
-          <a:prstGeom prst="rightArrow">
-            <a:avLst/>
-          </a:prstGeom>
-          <a:noFill/>
-          <a:ln w="28575"/>
-        </p:spPr>
-        <p:style>
-          <a:lnRef idx="1">
-            <a:schemeClr val="accent1"/>
-          </a:lnRef>
-          <a:fillRef idx="3">
-            <a:schemeClr val="accent1"/>
-          </a:fillRef>
-          <a:effectRef idx="2">
-            <a:schemeClr val="accent1"/>
-          </a:effectRef>
-          <a:fontRef idx="minor">
-            <a:schemeClr val="lt1"/>
-          </a:fontRef>
-        </p:style>
-        <p:txBody>
-          <a:bodyPr rtlCol="0" anchor="ctr"/>
-          <a:lstStyle/>
-          <a:p>
-            <a:pPr algn="ctr"/>
-            <a:endParaRPr lang="it-IT"/>
-          </a:p>
-        </p:txBody>
-      </p:sp>
     </p:spTree>
     <p:extLst>
       <p:ext uri="{BB962C8B-B14F-4D97-AF65-F5344CB8AC3E}">
-        <p14:creationId xmlns:p14="http://schemas.microsoft.com/office/powerpoint/2010/main" val="4112021029"/>
+        <p14:creationId xmlns:p14="http://schemas.microsoft.com/office/powerpoint/2010/main" val="1180649231"/>
       </p:ext>
     </p:extLst>
   </p:cSld>
@@ -6985,7 +6860,7 @@
           <p:cNvPr id="2" name="Titolo 1">
             <a:extLst>
               <a:ext uri="{FF2B5EF4-FFF2-40B4-BE49-F238E27FC236}">
-                <a16:creationId xmlns:a16="http://schemas.microsoft.com/office/drawing/2014/main" id="{5096FFE2-A2EC-42E3-BF7F-16D855D7DB33}"/>
+                <a16:creationId xmlns:a16="http://schemas.microsoft.com/office/drawing/2014/main" id="{11CEB84F-D9F4-41D7-80F0-507288F03961}"/>
               </a:ext>
             </a:extLst>
           </p:cNvPr>
@@ -7002,206 +6877,102 @@
           <a:lstStyle/>
           <a:p>
             <a:r>
+              <a:rPr lang="en-US" dirty="0"/>
+              <a:t>AVD Initialization (4)</a:t>
+            </a:r>
+            <a:endParaRPr lang="it-IT" dirty="0"/>
+          </a:p>
+        </p:txBody>
+      </p:sp>
+      <p:sp>
+        <p:nvSpPr>
+          <p:cNvPr id="4" name="Segnaposto contenuto 3">
+            <a:extLst>
+              <a:ext uri="{FF2B5EF4-FFF2-40B4-BE49-F238E27FC236}">
+                <a16:creationId xmlns:a16="http://schemas.microsoft.com/office/drawing/2014/main" id="{101437C4-8014-4941-BA0E-AC0A3D42098F}"/>
+              </a:ext>
+            </a:extLst>
+          </p:cNvPr>
+          <p:cNvSpPr>
+            <a:spLocks noGrp="1"/>
+          </p:cNvSpPr>
+          <p:nvPr>
+            <p:ph sz="half" idx="2"/>
+          </p:nvPr>
+        </p:nvSpPr>
+        <p:spPr/>
+        <p:txBody>
+          <a:bodyPr/>
+          <a:lstStyle/>
+          <a:p>
+            <a:r>
+              <a:rPr lang="it-IT" dirty="0">
+                <a:solidFill>
+                  <a:srgbClr val="FF0000"/>
+                </a:solidFill>
+              </a:rPr>
+              <a:t>Name of AVD</a:t>
+            </a:r>
+          </a:p>
+          <a:p>
+            <a:r>
+              <a:rPr lang="it-IT" dirty="0" err="1">
+                <a:solidFill>
+                  <a:srgbClr val="FF0000"/>
+                </a:solidFill>
+              </a:rPr>
+              <a:t>Other</a:t>
+            </a:r>
+            <a:r>
+              <a:rPr lang="it-IT" dirty="0">
+                <a:solidFill>
+                  <a:srgbClr val="FF0000"/>
+                </a:solidFill>
+              </a:rPr>
+              <a:t>  technical </a:t>
+            </a:r>
+            <a:r>
+              <a:rPr lang="it-IT" dirty="0" err="1">
+                <a:solidFill>
+                  <a:srgbClr val="FF0000"/>
+                </a:solidFill>
+              </a:rPr>
+              <a:t>specifications</a:t>
+            </a:r>
+            <a:r>
+              <a:rPr lang="it-IT" dirty="0">
+                <a:solidFill>
+                  <a:srgbClr val="FF0000"/>
+                </a:solidFill>
+              </a:rPr>
+              <a:t> </a:t>
+            </a:r>
+            <a:r>
               <a:rPr lang="it-IT" dirty="0"/>
-              <a:t>Device file </a:t>
+              <a:t>(display </a:t>
             </a:r>
             <a:r>
               <a:rPr lang="it-IT" dirty="0" err="1"/>
-              <a:t>explorer</a:t>
-            </a:r>
-            <a:endParaRPr lang="it-IT" dirty="0"/>
-          </a:p>
-        </p:txBody>
-      </p:sp>
-      <p:sp>
-        <p:nvSpPr>
-          <p:cNvPr id="3" name="Segnaposto contenuto 2">
-            <a:extLst>
-              <a:ext uri="{FF2B5EF4-FFF2-40B4-BE49-F238E27FC236}">
-                <a16:creationId xmlns:a16="http://schemas.microsoft.com/office/drawing/2014/main" id="{6C4A981F-7833-469D-AA38-1E965AB19C81}"/>
-              </a:ext>
-            </a:extLst>
-          </p:cNvPr>
-          <p:cNvSpPr>
-            <a:spLocks noGrp="1"/>
-          </p:cNvSpPr>
-          <p:nvPr>
-            <p:ph idx="1"/>
-          </p:nvPr>
-        </p:nvSpPr>
-        <p:spPr/>
-        <p:txBody>
-          <a:bodyPr/>
-          <a:lstStyle/>
-          <a:p>
-            <a:r>
-              <a:rPr lang="it-IT" dirty="0" err="1"/>
-              <a:t>You</a:t>
+              <a:t>resolution</a:t>
             </a:r>
             <a:r>
               <a:rPr lang="it-IT" dirty="0"/>
-              <a:t> can </a:t>
-            </a:r>
-            <a:r>
-              <a:rPr lang="it-IT" dirty="0" err="1"/>
-              <a:t>also</a:t>
-            </a:r>
-            <a:r>
-              <a:rPr lang="it-IT" dirty="0"/>
-              <a:t> </a:t>
-            </a:r>
-            <a:r>
-              <a:rPr lang="it-IT" dirty="0" err="1"/>
-              <a:t>explore</a:t>
-            </a:r>
-            <a:r>
-              <a:rPr lang="it-IT" dirty="0"/>
-              <a:t> storage device </a:t>
-            </a:r>
-          </a:p>
-          <a:p>
-            <a:pPr lvl="1"/>
-            <a:r>
-              <a:rPr lang="it-IT" dirty="0" err="1"/>
-              <a:t>If</a:t>
-            </a:r>
-            <a:r>
-              <a:rPr lang="it-IT" dirty="0"/>
-              <a:t> </a:t>
-            </a:r>
-            <a:r>
-              <a:rPr lang="it-IT" dirty="0" err="1"/>
-              <a:t>you</a:t>
-            </a:r>
-            <a:r>
-              <a:rPr lang="it-IT" dirty="0"/>
-              <a:t> use AVD, storage </a:t>
-            </a:r>
-            <a:r>
-              <a:rPr lang="it-IT" dirty="0" err="1"/>
-              <a:t>is</a:t>
-            </a:r>
-            <a:r>
-              <a:rPr lang="it-IT" dirty="0"/>
-              <a:t> a </a:t>
-            </a:r>
-            <a:r>
-              <a:rPr lang="it-IT" dirty="0" err="1"/>
-              <a:t>direactory</a:t>
-            </a:r>
-            <a:r>
-              <a:rPr lang="it-IT" dirty="0"/>
-              <a:t> in </a:t>
-            </a:r>
-            <a:r>
-              <a:rPr lang="it-IT" dirty="0" err="1"/>
-              <a:t>your</a:t>
-            </a:r>
-            <a:r>
-              <a:rPr lang="it-IT" dirty="0"/>
-              <a:t> PC</a:t>
-            </a:r>
-          </a:p>
-          <a:p>
-            <a:pPr lvl="1"/>
-            <a:r>
-              <a:rPr lang="it-IT" dirty="0" err="1"/>
-              <a:t>If</a:t>
-            </a:r>
-            <a:r>
-              <a:rPr lang="it-IT" dirty="0"/>
-              <a:t> </a:t>
-            </a:r>
-            <a:r>
-              <a:rPr lang="it-IT" dirty="0" err="1"/>
-              <a:t>you</a:t>
-            </a:r>
-            <a:r>
-              <a:rPr lang="it-IT" dirty="0"/>
-              <a:t> use Real device </a:t>
-            </a:r>
-            <a:r>
-              <a:rPr lang="it-IT" dirty="0" err="1"/>
-              <a:t>is</a:t>
-            </a:r>
-            <a:r>
-              <a:rPr lang="it-IT" dirty="0"/>
-              <a:t> the </a:t>
-            </a:r>
-            <a:r>
-              <a:rPr lang="it-IT" dirty="0" err="1"/>
-              <a:t>real</a:t>
-            </a:r>
-            <a:r>
-              <a:rPr lang="it-IT" dirty="0"/>
-              <a:t> file system</a:t>
-            </a:r>
-          </a:p>
-          <a:p>
-            <a:r>
-              <a:rPr lang="it-IT" dirty="0"/>
-              <a:t>To </a:t>
-            </a:r>
-            <a:r>
-              <a:rPr lang="it-IT" dirty="0" err="1"/>
-              <a:t>see</a:t>
-            </a:r>
-            <a:r>
-              <a:rPr lang="it-IT" dirty="0"/>
-              <a:t> </a:t>
-            </a:r>
-            <a:r>
-              <a:rPr lang="it-IT" dirty="0" err="1"/>
-              <a:t>your</a:t>
-            </a:r>
-            <a:r>
-              <a:rPr lang="it-IT" dirty="0"/>
-              <a:t> app directory in storage</a:t>
-            </a:r>
-          </a:p>
-          <a:p>
-            <a:pPr lvl="1"/>
-            <a:r>
-              <a:rPr lang="it-IT" i="1" dirty="0"/>
-              <a:t>File </a:t>
-            </a:r>
-            <a:r>
-              <a:rPr lang="it-IT" i="1" dirty="0" err="1"/>
-              <a:t>explorer</a:t>
-            </a:r>
-            <a:r>
-              <a:rPr lang="it-IT" i="1" dirty="0"/>
-              <a:t> -&gt; Data -&gt; Data </a:t>
-            </a:r>
-            <a:r>
-              <a:rPr lang="it-IT" dirty="0"/>
-              <a:t>-&gt; </a:t>
-            </a:r>
-            <a:r>
-              <a:rPr lang="it-IT" dirty="0" err="1"/>
-              <a:t>your</a:t>
-            </a:r>
-            <a:r>
-              <a:rPr lang="it-IT" dirty="0"/>
-              <a:t> app package (e.g. </a:t>
-            </a:r>
-            <a:r>
-              <a:rPr lang="it-IT" dirty="0" err="1"/>
-              <a:t>com.example.MyApplication</a:t>
-            </a:r>
-            <a:r>
-              <a:rPr lang="it-IT" dirty="0"/>
-              <a:t>)</a:t>
-            </a:r>
-          </a:p>
-        </p:txBody>
-      </p:sp>
-      <p:sp>
-        <p:nvSpPr>
-          <p:cNvPr id="4" name="Segnaposto numero diapositiva 3">
-            <a:extLst>
-              <a:ext uri="{FF2B5EF4-FFF2-40B4-BE49-F238E27FC236}">
-                <a16:creationId xmlns:a16="http://schemas.microsoft.com/office/drawing/2014/main" id="{5FC0766B-D598-41BE-8FAF-8FA15D241746}"/>
+              <a:t>…)</a:t>
+            </a:r>
+            <a:endParaRPr lang="it-IT" dirty="0">
+              <a:solidFill>
+                <a:srgbClr val="FF0000"/>
+              </a:solidFill>
+            </a:endParaRPr>
+          </a:p>
+        </p:txBody>
+      </p:sp>
+      <p:sp>
+        <p:nvSpPr>
+          <p:cNvPr id="5" name="Segnaposto numero diapositiva 4">
+            <a:extLst>
+              <a:ext uri="{FF2B5EF4-FFF2-40B4-BE49-F238E27FC236}">
+                <a16:creationId xmlns:a16="http://schemas.microsoft.com/office/drawing/2014/main" id="{A6F1F0DF-3A57-462E-8C2A-2AB0FD0252AC}"/>
               </a:ext>
             </a:extLst>
           </p:cNvPr>
@@ -7226,10 +6997,42 @@
           </a:p>
         </p:txBody>
       </p:sp>
+      <p:pic>
+        <p:nvPicPr>
+          <p:cNvPr id="6" name="Segnaposto contenuto 5">
+            <a:extLst>
+              <a:ext uri="{FF2B5EF4-FFF2-40B4-BE49-F238E27FC236}">
+                <a16:creationId xmlns:a16="http://schemas.microsoft.com/office/drawing/2014/main" id="{A64D34A7-3957-4795-857C-A11F2BD8D947}"/>
+              </a:ext>
+            </a:extLst>
+          </p:cNvPr>
+          <p:cNvPicPr>
+            <a:picLocks noGrp="1" noChangeAspect="1"/>
+          </p:cNvPicPr>
+          <p:nvPr>
+            <p:ph sz="half" idx="1"/>
+          </p:nvPr>
+        </p:nvPicPr>
+        <p:blipFill>
+          <a:blip r:embed="rId2"/>
+          <a:stretch>
+            <a:fillRect/>
+          </a:stretch>
+        </p:blipFill>
+        <p:spPr>
+          <a:xfrm>
+            <a:off x="609600" y="1738170"/>
+            <a:ext cx="5384800" cy="4250022"/>
+          </a:xfrm>
+          <a:prstGeom prst="rect">
+            <a:avLst/>
+          </a:prstGeom>
+        </p:spPr>
+      </p:pic>
     </p:spTree>
     <p:extLst>
       <p:ext uri="{BB962C8B-B14F-4D97-AF65-F5344CB8AC3E}">
-        <p14:creationId xmlns:p14="http://schemas.microsoft.com/office/powerpoint/2010/main" val="1563645607"/>
+        <p14:creationId xmlns:p14="http://schemas.microsoft.com/office/powerpoint/2010/main" val="335998119"/>
       </p:ext>
     </p:extLst>
   </p:cSld>
@@ -7261,7 +7064,7 @@
           <p:cNvPr id="2" name="Titolo 1">
             <a:extLst>
               <a:ext uri="{FF2B5EF4-FFF2-40B4-BE49-F238E27FC236}">
-                <a16:creationId xmlns:a16="http://schemas.microsoft.com/office/drawing/2014/main" id="{44DE2770-9318-4303-8FE3-A9A7AF94817E}"/>
+                <a16:creationId xmlns:a16="http://schemas.microsoft.com/office/drawing/2014/main" id="{97DD1A6E-48A6-4A64-9701-0CA9448B1108}"/>
               </a:ext>
             </a:extLst>
           </p:cNvPr>
@@ -7278,9 +7081,149 @@
           <a:lstStyle/>
           <a:p>
             <a:r>
+              <a:rPr lang="it-IT" dirty="0" err="1"/>
+              <a:t>Run</a:t>
+            </a:r>
+            <a:r>
               <a:rPr lang="it-IT" dirty="0"/>
-              <a:t>Layout design tool</a:t>
-            </a:r>
+              <a:t>/Debug in </a:t>
+            </a:r>
+            <a:r>
+              <a:rPr lang="it-IT" dirty="0" err="1"/>
+              <a:t>real</a:t>
+            </a:r>
+            <a:r>
+              <a:rPr lang="it-IT" dirty="0"/>
+              <a:t> device</a:t>
+            </a:r>
+          </a:p>
+        </p:txBody>
+      </p:sp>
+      <p:sp>
+        <p:nvSpPr>
+          <p:cNvPr id="3" name="Segnaposto contenuto 2">
+            <a:extLst>
+              <a:ext uri="{FF2B5EF4-FFF2-40B4-BE49-F238E27FC236}">
+                <a16:creationId xmlns:a16="http://schemas.microsoft.com/office/drawing/2014/main" id="{3CE613F0-FD57-4722-90F9-11098F329BD1}"/>
+              </a:ext>
+            </a:extLst>
+          </p:cNvPr>
+          <p:cNvSpPr>
+            <a:spLocks noGrp="1"/>
+          </p:cNvSpPr>
+          <p:nvPr>
+            <p:ph idx="1"/>
+          </p:nvPr>
+        </p:nvSpPr>
+        <p:spPr/>
+        <p:txBody>
+          <a:bodyPr/>
+          <a:lstStyle/>
+          <a:p>
+            <a:r>
+              <a:rPr lang="it-IT" sz="2800" dirty="0" err="1"/>
+              <a:t>Activate</a:t>
+            </a:r>
+            <a:r>
+              <a:rPr lang="it-IT" sz="2800" dirty="0"/>
+              <a:t> ADB (Android Debug Bridge) on target device (</a:t>
+            </a:r>
+            <a:r>
+              <a:rPr lang="it-IT" sz="2800" dirty="0" err="1"/>
+              <a:t>only</a:t>
+            </a:r>
+            <a:r>
+              <a:rPr lang="it-IT" sz="2800" dirty="0"/>
+              <a:t> on Android 6.0 or </a:t>
+            </a:r>
+            <a:r>
+              <a:rPr lang="it-IT" sz="2800" dirty="0" err="1"/>
+              <a:t>higher</a:t>
+            </a:r>
+            <a:r>
+              <a:rPr lang="it-IT" sz="2800" dirty="0"/>
+              <a:t>)</a:t>
+            </a:r>
+          </a:p>
+          <a:p>
+            <a:pPr lvl="1"/>
+            <a:r>
+              <a:rPr lang="en-US" sz="2400" i="1" dirty="0"/>
+              <a:t>Settings -&gt; About Phone/Tablet -&gt; Software Information</a:t>
+            </a:r>
+          </a:p>
+          <a:p>
+            <a:pPr lvl="1"/>
+            <a:r>
+              <a:rPr lang="en-US" sz="2400" dirty="0"/>
+              <a:t>Tap on </a:t>
+            </a:r>
+            <a:r>
+              <a:rPr lang="en-US" sz="2400" i="1" dirty="0"/>
+              <a:t>Build number </a:t>
+            </a:r>
+            <a:r>
+              <a:rPr lang="en-US" sz="2400" dirty="0"/>
+              <a:t>field seven times (a message appears indicating that developer mode has been enabled)</a:t>
+            </a:r>
+          </a:p>
+          <a:p>
+            <a:pPr lvl="1"/>
+            <a:r>
+              <a:rPr lang="en-US" sz="2400" dirty="0"/>
+              <a:t>Go to </a:t>
+            </a:r>
+            <a:r>
+              <a:rPr lang="en-US" sz="2400" i="1" dirty="0"/>
+              <a:t>Settings</a:t>
+            </a:r>
+            <a:r>
+              <a:rPr lang="en-US" sz="2400" dirty="0"/>
+              <a:t> page and now appears </a:t>
+            </a:r>
+            <a:r>
+              <a:rPr lang="en-US" sz="2400" i="1" dirty="0"/>
+              <a:t>Developer options</a:t>
+            </a:r>
+          </a:p>
+          <a:p>
+            <a:pPr lvl="1"/>
+            <a:r>
+              <a:rPr lang="en-US" sz="2400" dirty="0"/>
+              <a:t>Switch on </a:t>
+            </a:r>
+            <a:r>
+              <a:rPr lang="en-US" sz="2400" i="1" dirty="0"/>
+              <a:t>USB debugging </a:t>
+            </a:r>
+            <a:r>
+              <a:rPr lang="en-US" sz="2400" dirty="0"/>
+              <a:t>option</a:t>
+            </a:r>
+            <a:endParaRPr lang="it-IT" sz="2400" dirty="0"/>
+          </a:p>
+          <a:p>
+            <a:r>
+              <a:rPr lang="it-IT" sz="2800" dirty="0"/>
+              <a:t>Connect to PC with USB, device </a:t>
+            </a:r>
+            <a:r>
+              <a:rPr lang="it-IT" sz="2800" dirty="0" err="1"/>
+              <a:t>will</a:t>
+            </a:r>
+            <a:r>
+              <a:rPr lang="it-IT" sz="2800" dirty="0"/>
+              <a:t> </a:t>
+            </a:r>
+            <a:r>
+              <a:rPr lang="it-IT" sz="2800" dirty="0" err="1"/>
+              <a:t>appear</a:t>
+            </a:r>
+            <a:r>
+              <a:rPr lang="it-IT" sz="2800" dirty="0"/>
+              <a:t> in Android Studio devices list</a:t>
+            </a:r>
+            <a:endParaRPr lang="en-US" sz="2800" dirty="0"/>
           </a:p>
         </p:txBody>
       </p:sp>
@@ -7289,7 +7232,7 @@
           <p:cNvPr id="4" name="Segnaposto numero diapositiva 3">
             <a:extLst>
               <a:ext uri="{FF2B5EF4-FFF2-40B4-BE49-F238E27FC236}">
-                <a16:creationId xmlns:a16="http://schemas.microsoft.com/office/drawing/2014/main" id="{9FE6EA8C-7277-41B2-B77B-C309CBD1C996}"/>
+                <a16:creationId xmlns:a16="http://schemas.microsoft.com/office/drawing/2014/main" id="{D76CDC0E-8C87-4D48-93CC-B2186DF0CC16}"/>
               </a:ext>
             </a:extLst>
           </p:cNvPr>
@@ -7314,163 +7257,10 @@
           </a:p>
         </p:txBody>
       </p:sp>
-      <p:sp>
-        <p:nvSpPr>
-          <p:cNvPr id="10" name="Segnaposto contenuto 9">
-            <a:extLst>
-              <a:ext uri="{FF2B5EF4-FFF2-40B4-BE49-F238E27FC236}">
-                <a16:creationId xmlns:a16="http://schemas.microsoft.com/office/drawing/2014/main" id="{144596D0-68FC-4242-81F9-2B69BCB9EFB9}"/>
-              </a:ext>
-            </a:extLst>
-          </p:cNvPr>
-          <p:cNvSpPr>
-            <a:spLocks noGrp="1"/>
-          </p:cNvSpPr>
-          <p:nvPr>
-            <p:ph idx="1"/>
-          </p:nvPr>
-        </p:nvSpPr>
-        <p:spPr/>
-        <p:txBody>
-          <a:bodyPr/>
-          <a:lstStyle/>
-          <a:p>
-            <a:pPr marL="0" indent="0">
-              <a:buNone/>
-            </a:pPr>
-            <a:r>
-              <a:rPr lang="it-IT" dirty="0"/>
-              <a:t>Android Studio </a:t>
-            </a:r>
-            <a:r>
-              <a:rPr lang="it-IT" dirty="0" err="1"/>
-              <a:t>offers</a:t>
-            </a:r>
-            <a:r>
-              <a:rPr lang="it-IT" dirty="0"/>
-              <a:t> 3 mode to </a:t>
-            </a:r>
-            <a:r>
-              <a:rPr lang="it-IT" dirty="0" err="1"/>
-              <a:t>manipulate</a:t>
-            </a:r>
-            <a:r>
-              <a:rPr lang="it-IT" dirty="0"/>
-              <a:t> graphic </a:t>
-            </a:r>
-            <a:r>
-              <a:rPr lang="it-IT" dirty="0" err="1"/>
-              <a:t>element</a:t>
-            </a:r>
-            <a:r>
-              <a:rPr lang="it-IT" dirty="0"/>
-              <a:t> (Layout, </a:t>
-            </a:r>
-            <a:r>
-              <a:rPr lang="it-IT" dirty="0" err="1"/>
-              <a:t>Drawable</a:t>
-            </a:r>
-            <a:r>
-              <a:rPr lang="it-IT" dirty="0"/>
-              <a:t>, ecc.), </a:t>
-            </a:r>
-            <a:r>
-              <a:rPr lang="it-IT" dirty="0" err="1"/>
-              <a:t>you</a:t>
-            </a:r>
-            <a:r>
-              <a:rPr lang="it-IT" dirty="0"/>
-              <a:t> can </a:t>
-            </a:r>
-            <a:r>
-              <a:rPr lang="it-IT" dirty="0" err="1"/>
-              <a:t>choose</a:t>
-            </a:r>
-            <a:r>
-              <a:rPr lang="it-IT" dirty="0"/>
-              <a:t> </a:t>
-            </a:r>
-            <a:r>
-              <a:rPr lang="it-IT" dirty="0" err="1"/>
-              <a:t>when</a:t>
-            </a:r>
-            <a:r>
-              <a:rPr lang="it-IT" dirty="0"/>
-              <a:t> </a:t>
-            </a:r>
-            <a:r>
-              <a:rPr lang="it-IT" dirty="0" err="1"/>
-              <a:t>you</a:t>
-            </a:r>
-            <a:r>
-              <a:rPr lang="it-IT" dirty="0"/>
-              <a:t> open an xml file</a:t>
-            </a:r>
-          </a:p>
-          <a:p>
-            <a:r>
-              <a:rPr lang="it-IT" dirty="0">
-                <a:solidFill>
-                  <a:srgbClr val="FF0000"/>
-                </a:solidFill>
-              </a:rPr>
-              <a:t>Code mode: </a:t>
-            </a:r>
-            <a:r>
-              <a:rPr lang="it-IT" dirty="0"/>
-              <a:t>use </a:t>
-            </a:r>
-            <a:r>
-              <a:rPr lang="it-IT" dirty="0" err="1"/>
-              <a:t>only</a:t>
-            </a:r>
-            <a:r>
-              <a:rPr lang="it-IT" dirty="0"/>
-              <a:t> xml</a:t>
-            </a:r>
-          </a:p>
-          <a:p>
-            <a:r>
-              <a:rPr lang="it-IT" dirty="0">
-                <a:solidFill>
-                  <a:srgbClr val="FF0000"/>
-                </a:solidFill>
-              </a:rPr>
-              <a:t>Split mode: </a:t>
-            </a:r>
-            <a:r>
-              <a:rPr lang="it-IT" dirty="0"/>
-              <a:t>use xml and graphic tool</a:t>
-            </a:r>
-          </a:p>
-          <a:p>
-            <a:r>
-              <a:rPr lang="it-IT" dirty="0">
-                <a:solidFill>
-                  <a:srgbClr val="FF0000"/>
-                </a:solidFill>
-              </a:rPr>
-              <a:t>Design mode: </a:t>
-            </a:r>
-            <a:r>
-              <a:rPr lang="it-IT" dirty="0"/>
-              <a:t>use </a:t>
-            </a:r>
-            <a:r>
-              <a:rPr lang="it-IT" dirty="0" err="1"/>
-              <a:t>only</a:t>
-            </a:r>
-            <a:r>
-              <a:rPr lang="it-IT" dirty="0"/>
-              <a:t> drag and drop graphic tool</a:t>
-            </a:r>
-          </a:p>
-        </p:txBody>
-      </p:sp>
     </p:spTree>
     <p:extLst>
       <p:ext uri="{BB962C8B-B14F-4D97-AF65-F5344CB8AC3E}">
-        <p14:creationId xmlns:p14="http://schemas.microsoft.com/office/powerpoint/2010/main" val="4070693851"/>
+        <p14:creationId xmlns:p14="http://schemas.microsoft.com/office/powerpoint/2010/main" val="2217072517"/>
       </p:ext>
     </p:extLst>
   </p:cSld>
@@ -7502,7 +7292,7 @@
           <p:cNvPr id="2" name="Titolo 1">
             <a:extLst>
               <a:ext uri="{FF2B5EF4-FFF2-40B4-BE49-F238E27FC236}">
-                <a16:creationId xmlns:a16="http://schemas.microsoft.com/office/drawing/2014/main" id="{1D4F5280-7690-45DA-B68F-F5D01416A756}"/>
+                <a16:creationId xmlns:a16="http://schemas.microsoft.com/office/drawing/2014/main" id="{845908A6-95BF-4881-AB3C-D754E8EAD6EA}"/>
               </a:ext>
             </a:extLst>
           </p:cNvPr>
@@ -7520,8 +7310,90 @@
           <a:p>
             <a:r>
               <a:rPr lang="it-IT" dirty="0"/>
-              <a:t>Code Mode</a:t>
-            </a:r>
+              <a:t>Import from VCS</a:t>
+            </a:r>
+          </a:p>
+        </p:txBody>
+      </p:sp>
+      <p:sp>
+        <p:nvSpPr>
+          <p:cNvPr id="3" name="Segnaposto contenuto 2">
+            <a:extLst>
+              <a:ext uri="{FF2B5EF4-FFF2-40B4-BE49-F238E27FC236}">
+                <a16:creationId xmlns:a16="http://schemas.microsoft.com/office/drawing/2014/main" id="{17D6AED0-3C26-4E11-A37C-C299F9B4A582}"/>
+              </a:ext>
+            </a:extLst>
+          </p:cNvPr>
+          <p:cNvSpPr>
+            <a:spLocks noGrp="1"/>
+          </p:cNvSpPr>
+          <p:nvPr>
+            <p:ph idx="1"/>
+          </p:nvPr>
+        </p:nvSpPr>
+        <p:spPr/>
+        <p:txBody>
+          <a:bodyPr/>
+          <a:lstStyle/>
+          <a:p>
+            <a:r>
+              <a:rPr lang="it-IT" dirty="0"/>
+              <a:t>Android Studio </a:t>
+            </a:r>
+            <a:r>
+              <a:rPr lang="it-IT" dirty="0" err="1"/>
+              <a:t>has</a:t>
+            </a:r>
+            <a:r>
+              <a:rPr lang="it-IT" dirty="0"/>
+              <a:t> GitHub plugin</a:t>
+            </a:r>
+          </a:p>
+          <a:p>
+            <a:r>
+              <a:rPr lang="it-IT" dirty="0"/>
+              <a:t>Clone repository on </a:t>
+            </a:r>
+            <a:r>
+              <a:rPr lang="it-IT" dirty="0" err="1"/>
+              <a:t>your</a:t>
+            </a:r>
+            <a:r>
+              <a:rPr lang="it-IT" dirty="0"/>
+              <a:t> PC</a:t>
+            </a:r>
+          </a:p>
+          <a:p>
+            <a:r>
+              <a:rPr lang="it-IT" dirty="0"/>
+              <a:t>Open code project directory from Android Studio</a:t>
+            </a:r>
+          </a:p>
+          <a:p>
+            <a:r>
+              <a:rPr lang="it-IT" dirty="0"/>
+              <a:t>GitHub tools </a:t>
+            </a:r>
+            <a:r>
+              <a:rPr lang="it-IT" dirty="0" err="1"/>
+              <a:t>appear</a:t>
+            </a:r>
+            <a:r>
+              <a:rPr lang="it-IT" dirty="0"/>
+              <a:t> in Android Studio</a:t>
+            </a:r>
+          </a:p>
+          <a:p>
+            <a:pPr marL="0" indent="0">
+              <a:buNone/>
+            </a:pPr>
+            <a:endParaRPr lang="it-IT" dirty="0"/>
+          </a:p>
+          <a:p>
+            <a:pPr marL="0" indent="0">
+              <a:buNone/>
+            </a:pPr>
+            <a:endParaRPr lang="it-IT" dirty="0"/>
           </a:p>
         </p:txBody>
       </p:sp>
@@ -7530,7 +7402,7 @@
           <p:cNvPr id="4" name="Segnaposto numero diapositiva 3">
             <a:extLst>
               <a:ext uri="{FF2B5EF4-FFF2-40B4-BE49-F238E27FC236}">
-                <a16:creationId xmlns:a16="http://schemas.microsoft.com/office/drawing/2014/main" id="{C314C115-6581-47A8-A6E5-7AB7FF040860}"/>
+                <a16:creationId xmlns:a16="http://schemas.microsoft.com/office/drawing/2014/main" id="{03697B47-D532-4C3A-837A-D2652252243F}"/>
               </a:ext>
             </a:extLst>
           </p:cNvPr>
@@ -7555,40 +7427,10 @@
           </a:p>
         </p:txBody>
       </p:sp>
-      <p:pic>
-        <p:nvPicPr>
-          <p:cNvPr id="9" name="Segnaposto contenuto 5">
-            <a:extLst>
-              <a:ext uri="{FF2B5EF4-FFF2-40B4-BE49-F238E27FC236}">
-                <a16:creationId xmlns:a16="http://schemas.microsoft.com/office/drawing/2014/main" id="{649F5E30-606B-4521-8080-539B1F7EEBA5}"/>
-              </a:ext>
-            </a:extLst>
-          </p:cNvPr>
-          <p:cNvPicPr>
-            <a:picLocks noChangeAspect="1"/>
-          </p:cNvPicPr>
-          <p:nvPr/>
-        </p:nvPicPr>
-        <p:blipFill>
-          <a:blip r:embed="rId2"/>
-          <a:stretch>
-            <a:fillRect/>
-          </a:stretch>
-        </p:blipFill>
-        <p:spPr>
-          <a:xfrm>
-            <a:off x="1284593" y="1600200"/>
-            <a:ext cx="9622814" cy="4525963"/>
-          </a:xfrm>
-          <a:prstGeom prst="rect">
-            <a:avLst/>
-          </a:prstGeom>
-        </p:spPr>
-      </p:pic>
     </p:spTree>
     <p:extLst>
       <p:ext uri="{BB962C8B-B14F-4D97-AF65-F5344CB8AC3E}">
-        <p14:creationId xmlns:p14="http://schemas.microsoft.com/office/powerpoint/2010/main" val="822980987"/>
+        <p14:creationId xmlns:p14="http://schemas.microsoft.com/office/powerpoint/2010/main" val="2130891845"/>
       </p:ext>
     </p:extLst>
   </p:cSld>
@@ -7620,7 +7462,7 @@
           <p:cNvPr id="2" name="Titolo 1">
             <a:extLst>
               <a:ext uri="{FF2B5EF4-FFF2-40B4-BE49-F238E27FC236}">
-                <a16:creationId xmlns:a16="http://schemas.microsoft.com/office/drawing/2014/main" id="{99B084B2-7AF1-4D51-BE34-884C0B3A1336}"/>
+                <a16:creationId xmlns:a16="http://schemas.microsoft.com/office/drawing/2014/main" id="{4A8F1979-42A0-45A5-B3FF-E873E2E24620}"/>
               </a:ext>
             </a:extLst>
           </p:cNvPr>
@@ -7638,46 +7480,17 @@
           <a:p>
             <a:r>
               <a:rPr lang="it-IT" dirty="0"/>
-              <a:t>Split Mode</a:t>
-            </a:r>
-          </a:p>
-        </p:txBody>
-      </p:sp>
-      <p:pic>
-        <p:nvPicPr>
-          <p:cNvPr id="6" name="Segnaposto contenuto 5">
-            <a:extLst>
-              <a:ext uri="{FF2B5EF4-FFF2-40B4-BE49-F238E27FC236}">
-                <a16:creationId xmlns:a16="http://schemas.microsoft.com/office/drawing/2014/main" id="{44232BFD-CEB8-4111-B9D4-2DFC08F16D84}"/>
-              </a:ext>
-            </a:extLst>
-          </p:cNvPr>
-          <p:cNvPicPr>
-            <a:picLocks noGrp="1" noChangeAspect="1"/>
-          </p:cNvPicPr>
-          <p:nvPr>
-            <p:ph idx="1"/>
-          </p:nvPr>
-        </p:nvPicPr>
-        <p:blipFill>
-          <a:blip r:embed="rId2"/>
-          <a:stretch>
-            <a:fillRect/>
-          </a:stretch>
-        </p:blipFill>
-        <p:spPr>
-          <a:xfrm>
-            <a:off x="1202499" y="1600200"/>
-            <a:ext cx="9787001" cy="4525963"/>
-          </a:xfrm>
-        </p:spPr>
-      </p:pic>
+              <a:t>GitHub tools</a:t>
+            </a:r>
+          </a:p>
+        </p:txBody>
+      </p:sp>
       <p:sp>
         <p:nvSpPr>
           <p:cNvPr id="4" name="Segnaposto numero diapositiva 3">
             <a:extLst>
               <a:ext uri="{FF2B5EF4-FFF2-40B4-BE49-F238E27FC236}">
-                <a16:creationId xmlns:a16="http://schemas.microsoft.com/office/drawing/2014/main" id="{488A6574-AA9E-43C0-AF88-902D2C34E1BB}"/>
+                <a16:creationId xmlns:a16="http://schemas.microsoft.com/office/drawing/2014/main" id="{4AEB25EF-CB47-4915-89D1-A5845A3D72EB}"/>
               </a:ext>
             </a:extLst>
           </p:cNvPr>
@@ -7702,10 +7515,225 @@
           </a:p>
         </p:txBody>
       </p:sp>
+      <p:pic>
+        <p:nvPicPr>
+          <p:cNvPr id="5" name="Segnaposto contenuto 4">
+            <a:extLst>
+              <a:ext uri="{FF2B5EF4-FFF2-40B4-BE49-F238E27FC236}">
+                <a16:creationId xmlns:a16="http://schemas.microsoft.com/office/drawing/2014/main" id="{B6D3546A-E625-4B16-9649-1A3A25E15EFF}"/>
+              </a:ext>
+            </a:extLst>
+          </p:cNvPr>
+          <p:cNvPicPr>
+            <a:picLocks noGrp="1" noChangeAspect="1"/>
+          </p:cNvPicPr>
+          <p:nvPr>
+            <p:ph idx="1"/>
+          </p:nvPr>
+        </p:nvPicPr>
+        <p:blipFill rotWithShape="1">
+          <a:blip r:embed="rId2"/>
+          <a:srcRect l="-1" r="-1"/>
+          <a:stretch/>
+        </p:blipFill>
+        <p:spPr>
+          <a:xfrm>
+            <a:off x="1466126" y="1433887"/>
+            <a:ext cx="9259747" cy="4953239"/>
+          </a:xfrm>
+          <a:prstGeom prst="rect">
+            <a:avLst/>
+          </a:prstGeom>
+        </p:spPr>
+      </p:pic>
+      <p:sp>
+        <p:nvSpPr>
+          <p:cNvPr id="8" name="Freccia a destra 7">
+            <a:extLst>
+              <a:ext uri="{FF2B5EF4-FFF2-40B4-BE49-F238E27FC236}">
+                <a16:creationId xmlns:a16="http://schemas.microsoft.com/office/drawing/2014/main" id="{8815035C-7AC3-4546-A16A-FF185C71C239}"/>
+              </a:ext>
+            </a:extLst>
+          </p:cNvPr>
+          <p:cNvSpPr/>
+          <p:nvPr/>
+        </p:nvSpPr>
+        <p:spPr>
+          <a:xfrm rot="16200000">
+            <a:off x="8712845" y="1976456"/>
+            <a:ext cx="636608" cy="549800"/>
+          </a:xfrm>
+          <a:prstGeom prst="rightArrow">
+            <a:avLst/>
+          </a:prstGeom>
+          <a:noFill/>
+          <a:ln w="28575"/>
+        </p:spPr>
+        <p:style>
+          <a:lnRef idx="1">
+            <a:schemeClr val="accent1"/>
+          </a:lnRef>
+          <a:fillRef idx="3">
+            <a:schemeClr val="accent1"/>
+          </a:fillRef>
+          <a:effectRef idx="2">
+            <a:schemeClr val="accent1"/>
+          </a:effectRef>
+          <a:fontRef idx="minor">
+            <a:schemeClr val="lt1"/>
+          </a:fontRef>
+        </p:style>
+        <p:txBody>
+          <a:bodyPr rtlCol="0" anchor="ctr"/>
+          <a:lstStyle/>
+          <a:p>
+            <a:pPr algn="ctr"/>
+            <a:endParaRPr lang="it-IT"/>
+          </a:p>
+        </p:txBody>
+      </p:sp>
+      <p:sp>
+        <p:nvSpPr>
+          <p:cNvPr id="9" name="Freccia a destra 8">
+            <a:extLst>
+              <a:ext uri="{FF2B5EF4-FFF2-40B4-BE49-F238E27FC236}">
+                <a16:creationId xmlns:a16="http://schemas.microsoft.com/office/drawing/2014/main" id="{12E6E2CA-0D2B-4843-926E-88A4BACF3690}"/>
+              </a:ext>
+            </a:extLst>
+          </p:cNvPr>
+          <p:cNvSpPr/>
+          <p:nvPr/>
+        </p:nvSpPr>
+        <p:spPr>
+          <a:xfrm rot="10800000">
+            <a:off x="1694731" y="2367904"/>
+            <a:ext cx="636608" cy="549800"/>
+          </a:xfrm>
+          <a:prstGeom prst="rightArrow">
+            <a:avLst/>
+          </a:prstGeom>
+          <a:noFill/>
+          <a:ln w="28575"/>
+        </p:spPr>
+        <p:style>
+          <a:lnRef idx="1">
+            <a:schemeClr val="accent1"/>
+          </a:lnRef>
+          <a:fillRef idx="3">
+            <a:schemeClr val="accent1"/>
+          </a:fillRef>
+          <a:effectRef idx="2">
+            <a:schemeClr val="accent1"/>
+          </a:effectRef>
+          <a:fontRef idx="minor">
+            <a:schemeClr val="lt1"/>
+          </a:fontRef>
+        </p:style>
+        <p:txBody>
+          <a:bodyPr rtlCol="0" anchor="ctr"/>
+          <a:lstStyle/>
+          <a:p>
+            <a:pPr algn="ctr"/>
+            <a:endParaRPr lang="it-IT"/>
+          </a:p>
+        </p:txBody>
+      </p:sp>
+      <p:sp>
+        <p:nvSpPr>
+          <p:cNvPr id="10" name="Freccia a destra 9">
+            <a:extLst>
+              <a:ext uri="{FF2B5EF4-FFF2-40B4-BE49-F238E27FC236}">
+                <a16:creationId xmlns:a16="http://schemas.microsoft.com/office/drawing/2014/main" id="{BA8054ED-0A22-4074-817A-05180BFE574B}"/>
+              </a:ext>
+            </a:extLst>
+          </p:cNvPr>
+          <p:cNvSpPr/>
+          <p:nvPr/>
+        </p:nvSpPr>
+        <p:spPr>
+          <a:xfrm rot="5400000">
+            <a:off x="2276882" y="5312338"/>
+            <a:ext cx="645207" cy="536293"/>
+          </a:xfrm>
+          <a:prstGeom prst="rightArrow">
+            <a:avLst/>
+          </a:prstGeom>
+          <a:noFill/>
+          <a:ln w="28575"/>
+        </p:spPr>
+        <p:style>
+          <a:lnRef idx="1">
+            <a:schemeClr val="accent1"/>
+          </a:lnRef>
+          <a:fillRef idx="3">
+            <a:schemeClr val="accent1"/>
+          </a:fillRef>
+          <a:effectRef idx="2">
+            <a:schemeClr val="accent1"/>
+          </a:effectRef>
+          <a:fontRef idx="minor">
+            <a:schemeClr val="lt1"/>
+          </a:fontRef>
+        </p:style>
+        <p:txBody>
+          <a:bodyPr rtlCol="0" anchor="ctr"/>
+          <a:lstStyle/>
+          <a:p>
+            <a:pPr algn="ctr"/>
+            <a:endParaRPr lang="it-IT"/>
+          </a:p>
+        </p:txBody>
+      </p:sp>
+      <p:sp>
+        <p:nvSpPr>
+          <p:cNvPr id="11" name="Freccia a destra 10">
+            <a:extLst>
+              <a:ext uri="{FF2B5EF4-FFF2-40B4-BE49-F238E27FC236}">
+                <a16:creationId xmlns:a16="http://schemas.microsoft.com/office/drawing/2014/main" id="{EFBA0B79-7816-4286-AD9D-CE531B455D8F}"/>
+              </a:ext>
+            </a:extLst>
+          </p:cNvPr>
+          <p:cNvSpPr/>
+          <p:nvPr/>
+        </p:nvSpPr>
+        <p:spPr>
+          <a:xfrm rot="16200000">
+            <a:off x="3980728" y="1701559"/>
+            <a:ext cx="636608" cy="549800"/>
+          </a:xfrm>
+          <a:prstGeom prst="rightArrow">
+            <a:avLst/>
+          </a:prstGeom>
+          <a:noFill/>
+          <a:ln w="28575"/>
+        </p:spPr>
+        <p:style>
+          <a:lnRef idx="1">
+            <a:schemeClr val="accent1"/>
+          </a:lnRef>
+          <a:fillRef idx="3">
+            <a:schemeClr val="accent1"/>
+          </a:fillRef>
+          <a:effectRef idx="2">
+            <a:schemeClr val="accent1"/>
+          </a:effectRef>
+          <a:fontRef idx="minor">
+            <a:schemeClr val="lt1"/>
+          </a:fontRef>
+        </p:style>
+        <p:txBody>
+          <a:bodyPr rtlCol="0" anchor="ctr"/>
+          <a:lstStyle/>
+          <a:p>
+            <a:pPr algn="ctr"/>
+            <a:endParaRPr lang="it-IT"/>
+          </a:p>
+        </p:txBody>
+      </p:sp>
     </p:spTree>
     <p:extLst>
       <p:ext uri="{BB962C8B-B14F-4D97-AF65-F5344CB8AC3E}">
-        <p14:creationId xmlns:p14="http://schemas.microsoft.com/office/powerpoint/2010/main" val="3398143378"/>
+        <p14:creationId xmlns:p14="http://schemas.microsoft.com/office/powerpoint/2010/main" val="4112021029"/>
       </p:ext>
     </p:extLst>
   </p:cSld>
@@ -7737,7 +7765,7 @@
           <p:cNvPr id="2" name="Titolo 1">
             <a:extLst>
               <a:ext uri="{FF2B5EF4-FFF2-40B4-BE49-F238E27FC236}">
-                <a16:creationId xmlns:a16="http://schemas.microsoft.com/office/drawing/2014/main" id="{097B2E1A-3022-4B3E-887F-5C2404A30221}"/>
+                <a16:creationId xmlns:a16="http://schemas.microsoft.com/office/drawing/2014/main" id="{5096FFE2-A2EC-42E3-BF7F-16D855D7DB33}"/>
               </a:ext>
             </a:extLst>
           </p:cNvPr>
@@ -7755,26 +7783,571 @@
           <a:p>
             <a:r>
               <a:rPr lang="it-IT" dirty="0"/>
-              <a:t>Design Mode</a:t>
-            </a:r>
+              <a:t>Device file </a:t>
+            </a:r>
+            <a:r>
+              <a:rPr lang="it-IT" dirty="0" err="1"/>
+              <a:t>explorer</a:t>
+            </a:r>
+            <a:endParaRPr lang="it-IT" dirty="0"/>
+          </a:p>
+        </p:txBody>
+      </p:sp>
+      <p:sp>
+        <p:nvSpPr>
+          <p:cNvPr id="3" name="Segnaposto contenuto 2">
+            <a:extLst>
+              <a:ext uri="{FF2B5EF4-FFF2-40B4-BE49-F238E27FC236}">
+                <a16:creationId xmlns:a16="http://schemas.microsoft.com/office/drawing/2014/main" id="{6C4A981F-7833-469D-AA38-1E965AB19C81}"/>
+              </a:ext>
+            </a:extLst>
+          </p:cNvPr>
+          <p:cNvSpPr>
+            <a:spLocks noGrp="1"/>
+          </p:cNvSpPr>
+          <p:nvPr>
+            <p:ph idx="1"/>
+          </p:nvPr>
+        </p:nvSpPr>
+        <p:spPr/>
+        <p:txBody>
+          <a:bodyPr/>
+          <a:lstStyle/>
+          <a:p>
+            <a:r>
+              <a:rPr lang="it-IT" dirty="0" err="1"/>
+              <a:t>You</a:t>
+            </a:r>
+            <a:r>
+              <a:rPr lang="it-IT" dirty="0"/>
+              <a:t> can </a:t>
+            </a:r>
+            <a:r>
+              <a:rPr lang="it-IT" dirty="0" err="1"/>
+              <a:t>also</a:t>
+            </a:r>
+            <a:r>
+              <a:rPr lang="it-IT" dirty="0"/>
+              <a:t> </a:t>
+            </a:r>
+            <a:r>
+              <a:rPr lang="it-IT" dirty="0" err="1"/>
+              <a:t>explore</a:t>
+            </a:r>
+            <a:r>
+              <a:rPr lang="it-IT" dirty="0"/>
+              <a:t> storage device </a:t>
+            </a:r>
+          </a:p>
+          <a:p>
+            <a:pPr lvl="1"/>
+            <a:r>
+              <a:rPr lang="it-IT" dirty="0" err="1"/>
+              <a:t>If</a:t>
+            </a:r>
+            <a:r>
+              <a:rPr lang="it-IT" dirty="0"/>
+              <a:t> </a:t>
+            </a:r>
+            <a:r>
+              <a:rPr lang="it-IT" dirty="0" err="1"/>
+              <a:t>you</a:t>
+            </a:r>
+            <a:r>
+              <a:rPr lang="it-IT" dirty="0"/>
+              <a:t> use AVD, storage </a:t>
+            </a:r>
+            <a:r>
+              <a:rPr lang="it-IT" dirty="0" err="1"/>
+              <a:t>is</a:t>
+            </a:r>
+            <a:r>
+              <a:rPr lang="it-IT" dirty="0"/>
+              <a:t> a </a:t>
+            </a:r>
+            <a:r>
+              <a:rPr lang="it-IT" dirty="0" err="1"/>
+              <a:t>direactory</a:t>
+            </a:r>
+            <a:r>
+              <a:rPr lang="it-IT" dirty="0"/>
+              <a:t> in </a:t>
+            </a:r>
+            <a:r>
+              <a:rPr lang="it-IT" dirty="0" err="1"/>
+              <a:t>your</a:t>
+            </a:r>
+            <a:r>
+              <a:rPr lang="it-IT" dirty="0"/>
+              <a:t> PC</a:t>
+            </a:r>
+          </a:p>
+          <a:p>
+            <a:pPr lvl="1"/>
+            <a:r>
+              <a:rPr lang="it-IT" dirty="0" err="1"/>
+              <a:t>If</a:t>
+            </a:r>
+            <a:r>
+              <a:rPr lang="it-IT" dirty="0"/>
+              <a:t> </a:t>
+            </a:r>
+            <a:r>
+              <a:rPr lang="it-IT" dirty="0" err="1"/>
+              <a:t>you</a:t>
+            </a:r>
+            <a:r>
+              <a:rPr lang="it-IT" dirty="0"/>
+              <a:t> use Real device </a:t>
+            </a:r>
+            <a:r>
+              <a:rPr lang="it-IT" dirty="0" err="1"/>
+              <a:t>is</a:t>
+            </a:r>
+            <a:r>
+              <a:rPr lang="it-IT" dirty="0"/>
+              <a:t> the </a:t>
+            </a:r>
+            <a:r>
+              <a:rPr lang="it-IT" dirty="0" err="1"/>
+              <a:t>real</a:t>
+            </a:r>
+            <a:r>
+              <a:rPr lang="it-IT" dirty="0"/>
+              <a:t> file system</a:t>
+            </a:r>
+          </a:p>
+          <a:p>
+            <a:r>
+              <a:rPr lang="it-IT" dirty="0"/>
+              <a:t>To </a:t>
+            </a:r>
+            <a:r>
+              <a:rPr lang="it-IT" dirty="0" err="1"/>
+              <a:t>see</a:t>
+            </a:r>
+            <a:r>
+              <a:rPr lang="it-IT" dirty="0"/>
+              <a:t> </a:t>
+            </a:r>
+            <a:r>
+              <a:rPr lang="it-IT" dirty="0" err="1"/>
+              <a:t>your</a:t>
+            </a:r>
+            <a:r>
+              <a:rPr lang="it-IT" dirty="0"/>
+              <a:t> app directory in storage</a:t>
+            </a:r>
+          </a:p>
+          <a:p>
+            <a:pPr lvl="1"/>
+            <a:r>
+              <a:rPr lang="it-IT" i="1" dirty="0"/>
+              <a:t>File </a:t>
+            </a:r>
+            <a:r>
+              <a:rPr lang="it-IT" i="1" dirty="0" err="1"/>
+              <a:t>explorer</a:t>
+            </a:r>
+            <a:r>
+              <a:rPr lang="it-IT" i="1" dirty="0"/>
+              <a:t> -&gt; Data -&gt; Data </a:t>
+            </a:r>
+            <a:r>
+              <a:rPr lang="it-IT" dirty="0"/>
+              <a:t>-&gt; </a:t>
+            </a:r>
+            <a:r>
+              <a:rPr lang="it-IT" dirty="0" err="1"/>
+              <a:t>your</a:t>
+            </a:r>
+            <a:r>
+              <a:rPr lang="it-IT" dirty="0"/>
+              <a:t> app package (e.g. </a:t>
+            </a:r>
+            <a:r>
+              <a:rPr lang="it-IT" dirty="0" err="1"/>
+              <a:t>com.example.MyApplication</a:t>
+            </a:r>
+            <a:r>
+              <a:rPr lang="it-IT" dirty="0"/>
+              <a:t>)</a:t>
+            </a:r>
+          </a:p>
+        </p:txBody>
+      </p:sp>
+      <p:sp>
+        <p:nvSpPr>
+          <p:cNvPr id="4" name="Segnaposto numero diapositiva 3">
+            <a:extLst>
+              <a:ext uri="{FF2B5EF4-FFF2-40B4-BE49-F238E27FC236}">
+                <a16:creationId xmlns:a16="http://schemas.microsoft.com/office/drawing/2014/main" id="{5FC0766B-D598-41BE-8FAF-8FA15D241746}"/>
+              </a:ext>
+            </a:extLst>
+          </p:cNvPr>
+          <p:cNvSpPr>
+            <a:spLocks noGrp="1"/>
+          </p:cNvSpPr>
+          <p:nvPr>
+            <p:ph type="sldNum" sz="quarter" idx="12"/>
+          </p:nvPr>
+        </p:nvSpPr>
+        <p:spPr/>
+        <p:txBody>
+          <a:bodyPr/>
+          <a:lstStyle/>
+          <a:p>
+            <a:fld id="{D2040F39-7941-49A4-B48D-F201B18B6351}" type="slidenum">
+              <a:rPr lang="it-IT" smtClean="0"/>
+              <a:pPr/>
+              <a:t>15</a:t>
+            </a:fld>
+            <a:endParaRPr lang="it-IT" dirty="0"/>
+          </a:p>
+        </p:txBody>
+      </p:sp>
+    </p:spTree>
+    <p:extLst>
+      <p:ext uri="{BB962C8B-B14F-4D97-AF65-F5344CB8AC3E}">
+        <p14:creationId xmlns:p14="http://schemas.microsoft.com/office/powerpoint/2010/main" val="1563645607"/>
+      </p:ext>
+    </p:extLst>
+  </p:cSld>
+  <p:clrMapOvr>
+    <a:masterClrMapping/>
+  </p:clrMapOvr>
+</p:sld>
+</file>
+
+<file path=ppt/slides/slide16.xml><?xml version="1.0" encoding="utf-8"?>
+<p:sld xmlns:a="http://schemas.openxmlformats.org/drawingml/2006/main" xmlns:r="http://schemas.openxmlformats.org/officeDocument/2006/relationships" xmlns:p="http://schemas.openxmlformats.org/presentationml/2006/main">
+  <p:cSld>
+    <p:spTree>
+      <p:nvGrpSpPr>
+        <p:cNvPr id="1" name=""/>
+        <p:cNvGrpSpPr/>
+        <p:nvPr/>
+      </p:nvGrpSpPr>
+      <p:grpSpPr>
+        <a:xfrm>
+          <a:off x="0" y="0"/>
+          <a:ext cx="0" cy="0"/>
+          <a:chOff x="0" y="0"/>
+          <a:chExt cx="0" cy="0"/>
+        </a:xfrm>
+      </p:grpSpPr>
+      <p:sp>
+        <p:nvSpPr>
+          <p:cNvPr id="2" name="Titolo 1">
+            <a:extLst>
+              <a:ext uri="{FF2B5EF4-FFF2-40B4-BE49-F238E27FC236}">
+                <a16:creationId xmlns:a16="http://schemas.microsoft.com/office/drawing/2014/main" id="{44DE2770-9318-4303-8FE3-A9A7AF94817E}"/>
+              </a:ext>
+            </a:extLst>
+          </p:cNvPr>
+          <p:cNvSpPr>
+            <a:spLocks noGrp="1"/>
+          </p:cNvSpPr>
+          <p:nvPr>
+            <p:ph type="title"/>
+          </p:nvPr>
+        </p:nvSpPr>
+        <p:spPr/>
+        <p:txBody>
+          <a:bodyPr/>
+          <a:lstStyle/>
+          <a:p>
+            <a:r>
+              <a:rPr lang="it-IT" dirty="0"/>
+              <a:t>Layout design tool</a:t>
+            </a:r>
+          </a:p>
+        </p:txBody>
+      </p:sp>
+      <p:sp>
+        <p:nvSpPr>
+          <p:cNvPr id="4" name="Segnaposto numero diapositiva 3">
+            <a:extLst>
+              <a:ext uri="{FF2B5EF4-FFF2-40B4-BE49-F238E27FC236}">
+                <a16:creationId xmlns:a16="http://schemas.microsoft.com/office/drawing/2014/main" id="{9FE6EA8C-7277-41B2-B77B-C309CBD1C996}"/>
+              </a:ext>
+            </a:extLst>
+          </p:cNvPr>
+          <p:cNvSpPr>
+            <a:spLocks noGrp="1"/>
+          </p:cNvSpPr>
+          <p:nvPr>
+            <p:ph type="sldNum" sz="quarter" idx="12"/>
+          </p:nvPr>
+        </p:nvSpPr>
+        <p:spPr/>
+        <p:txBody>
+          <a:bodyPr/>
+          <a:lstStyle/>
+          <a:p>
+            <a:fld id="{D2040F39-7941-49A4-B48D-F201B18B6351}" type="slidenum">
+              <a:rPr lang="it-IT" smtClean="0"/>
+              <a:pPr/>
+              <a:t>16</a:t>
+            </a:fld>
+            <a:endParaRPr lang="it-IT" dirty="0"/>
+          </a:p>
+        </p:txBody>
+      </p:sp>
+      <p:sp>
+        <p:nvSpPr>
+          <p:cNvPr id="10" name="Segnaposto contenuto 9">
+            <a:extLst>
+              <a:ext uri="{FF2B5EF4-FFF2-40B4-BE49-F238E27FC236}">
+                <a16:creationId xmlns:a16="http://schemas.microsoft.com/office/drawing/2014/main" id="{144596D0-68FC-4242-81F9-2B69BCB9EFB9}"/>
+              </a:ext>
+            </a:extLst>
+          </p:cNvPr>
+          <p:cNvSpPr>
+            <a:spLocks noGrp="1"/>
+          </p:cNvSpPr>
+          <p:nvPr>
+            <p:ph idx="1"/>
+          </p:nvPr>
+        </p:nvSpPr>
+        <p:spPr/>
+        <p:txBody>
+          <a:bodyPr/>
+          <a:lstStyle/>
+          <a:p>
+            <a:pPr marL="0" indent="0">
+              <a:buNone/>
+            </a:pPr>
+            <a:r>
+              <a:rPr lang="it-IT" dirty="0"/>
+              <a:t>Android Studio </a:t>
+            </a:r>
+            <a:r>
+              <a:rPr lang="it-IT" dirty="0" err="1"/>
+              <a:t>offers</a:t>
+            </a:r>
+            <a:r>
+              <a:rPr lang="it-IT" dirty="0"/>
+              <a:t> 3 mode to </a:t>
+            </a:r>
+            <a:r>
+              <a:rPr lang="it-IT" dirty="0" err="1"/>
+              <a:t>manipulate</a:t>
+            </a:r>
+            <a:r>
+              <a:rPr lang="it-IT" dirty="0"/>
+              <a:t> graphic </a:t>
+            </a:r>
+            <a:r>
+              <a:rPr lang="it-IT" dirty="0" err="1"/>
+              <a:t>element</a:t>
+            </a:r>
+            <a:r>
+              <a:rPr lang="it-IT" dirty="0"/>
+              <a:t> (Layout, </a:t>
+            </a:r>
+            <a:r>
+              <a:rPr lang="it-IT" dirty="0" err="1"/>
+              <a:t>Drawable</a:t>
+            </a:r>
+            <a:r>
+              <a:rPr lang="it-IT" dirty="0"/>
+              <a:t>, ecc.), </a:t>
+            </a:r>
+            <a:r>
+              <a:rPr lang="it-IT" dirty="0" err="1"/>
+              <a:t>you</a:t>
+            </a:r>
+            <a:r>
+              <a:rPr lang="it-IT" dirty="0"/>
+              <a:t> can </a:t>
+            </a:r>
+            <a:r>
+              <a:rPr lang="it-IT" dirty="0" err="1"/>
+              <a:t>choose</a:t>
+            </a:r>
+            <a:r>
+              <a:rPr lang="it-IT" dirty="0"/>
+              <a:t> </a:t>
+            </a:r>
+            <a:r>
+              <a:rPr lang="it-IT" dirty="0" err="1"/>
+              <a:t>when</a:t>
+            </a:r>
+            <a:r>
+              <a:rPr lang="it-IT" dirty="0"/>
+              <a:t> </a:t>
+            </a:r>
+            <a:r>
+              <a:rPr lang="it-IT" dirty="0" err="1"/>
+              <a:t>you</a:t>
+            </a:r>
+            <a:r>
+              <a:rPr lang="it-IT" dirty="0"/>
+              <a:t> open an xml file</a:t>
+            </a:r>
+          </a:p>
+          <a:p>
+            <a:r>
+              <a:rPr lang="it-IT" dirty="0">
+                <a:solidFill>
+                  <a:srgbClr val="FF0000"/>
+                </a:solidFill>
+              </a:rPr>
+              <a:t>Code mode: </a:t>
+            </a:r>
+            <a:r>
+              <a:rPr lang="it-IT" dirty="0"/>
+              <a:t>use </a:t>
+            </a:r>
+            <a:r>
+              <a:rPr lang="it-IT" dirty="0" err="1"/>
+              <a:t>only</a:t>
+            </a:r>
+            <a:r>
+              <a:rPr lang="it-IT" dirty="0"/>
+              <a:t> xml</a:t>
+            </a:r>
+          </a:p>
+          <a:p>
+            <a:r>
+              <a:rPr lang="it-IT" dirty="0">
+                <a:solidFill>
+                  <a:srgbClr val="FF0000"/>
+                </a:solidFill>
+              </a:rPr>
+              <a:t>Split mode: </a:t>
+            </a:r>
+            <a:r>
+              <a:rPr lang="it-IT" dirty="0"/>
+              <a:t>use xml and graphic tool</a:t>
+            </a:r>
+          </a:p>
+          <a:p>
+            <a:r>
+              <a:rPr lang="it-IT" dirty="0">
+                <a:solidFill>
+                  <a:srgbClr val="FF0000"/>
+                </a:solidFill>
+              </a:rPr>
+              <a:t>Design mode: </a:t>
+            </a:r>
+            <a:r>
+              <a:rPr lang="it-IT" dirty="0"/>
+              <a:t>use </a:t>
+            </a:r>
+            <a:r>
+              <a:rPr lang="it-IT" dirty="0" err="1"/>
+              <a:t>only</a:t>
+            </a:r>
+            <a:r>
+              <a:rPr lang="it-IT" dirty="0"/>
+              <a:t> drag and drop graphic tool</a:t>
+            </a:r>
+          </a:p>
+        </p:txBody>
+      </p:sp>
+    </p:spTree>
+    <p:extLst>
+      <p:ext uri="{BB962C8B-B14F-4D97-AF65-F5344CB8AC3E}">
+        <p14:creationId xmlns:p14="http://schemas.microsoft.com/office/powerpoint/2010/main" val="4070693851"/>
+      </p:ext>
+    </p:extLst>
+  </p:cSld>
+  <p:clrMapOvr>
+    <a:masterClrMapping/>
+  </p:clrMapOvr>
+</p:sld>
+</file>
+
+<file path=ppt/slides/slide17.xml><?xml version="1.0" encoding="utf-8"?>
+<p:sld xmlns:a="http://schemas.openxmlformats.org/drawingml/2006/main" xmlns:r="http://schemas.openxmlformats.org/officeDocument/2006/relationships" xmlns:p="http://schemas.openxmlformats.org/presentationml/2006/main">
+  <p:cSld>
+    <p:spTree>
+      <p:nvGrpSpPr>
+        <p:cNvPr id="1" name=""/>
+        <p:cNvGrpSpPr/>
+        <p:nvPr/>
+      </p:nvGrpSpPr>
+      <p:grpSpPr>
+        <a:xfrm>
+          <a:off x="0" y="0"/>
+          <a:ext cx="0" cy="0"/>
+          <a:chOff x="0" y="0"/>
+          <a:chExt cx="0" cy="0"/>
+        </a:xfrm>
+      </p:grpSpPr>
+      <p:sp>
+        <p:nvSpPr>
+          <p:cNvPr id="2" name="Titolo 1">
+            <a:extLst>
+              <a:ext uri="{FF2B5EF4-FFF2-40B4-BE49-F238E27FC236}">
+                <a16:creationId xmlns:a16="http://schemas.microsoft.com/office/drawing/2014/main" id="{1D4F5280-7690-45DA-B68F-F5D01416A756}"/>
+              </a:ext>
+            </a:extLst>
+          </p:cNvPr>
+          <p:cNvSpPr>
+            <a:spLocks noGrp="1"/>
+          </p:cNvSpPr>
+          <p:nvPr>
+            <p:ph type="title"/>
+          </p:nvPr>
+        </p:nvSpPr>
+        <p:spPr/>
+        <p:txBody>
+          <a:bodyPr/>
+          <a:lstStyle/>
+          <a:p>
+            <a:r>
+              <a:rPr lang="it-IT" dirty="0"/>
+              <a:t>Code Mode</a:t>
+            </a:r>
+          </a:p>
+        </p:txBody>
+      </p:sp>
+      <p:sp>
+        <p:nvSpPr>
+          <p:cNvPr id="4" name="Segnaposto numero diapositiva 3">
+            <a:extLst>
+              <a:ext uri="{FF2B5EF4-FFF2-40B4-BE49-F238E27FC236}">
+                <a16:creationId xmlns:a16="http://schemas.microsoft.com/office/drawing/2014/main" id="{C314C115-6581-47A8-A6E5-7AB7FF040860}"/>
+              </a:ext>
+            </a:extLst>
+          </p:cNvPr>
+          <p:cNvSpPr>
+            <a:spLocks noGrp="1"/>
+          </p:cNvSpPr>
+          <p:nvPr>
+            <p:ph type="sldNum" sz="quarter" idx="12"/>
+          </p:nvPr>
+        </p:nvSpPr>
+        <p:spPr/>
+        <p:txBody>
+          <a:bodyPr/>
+          <a:lstStyle/>
+          <a:p>
+            <a:fld id="{D2040F39-7941-49A4-B48D-F201B18B6351}" type="slidenum">
+              <a:rPr lang="it-IT" smtClean="0"/>
+              <a:pPr/>
+              <a:t>17</a:t>
+            </a:fld>
+            <a:endParaRPr lang="it-IT" dirty="0"/>
           </a:p>
         </p:txBody>
       </p:sp>
       <p:pic>
         <p:nvPicPr>
-          <p:cNvPr id="6" name="Segnaposto contenuto 5">
-            <a:extLst>
-              <a:ext uri="{FF2B5EF4-FFF2-40B4-BE49-F238E27FC236}">
-                <a16:creationId xmlns:a16="http://schemas.microsoft.com/office/drawing/2014/main" id="{6F2B7F70-A1CC-426D-B349-1BE79A42D9B4}"/>
+          <p:cNvPr id="9" name="Segnaposto contenuto 5">
+            <a:extLst>
+              <a:ext uri="{FF2B5EF4-FFF2-40B4-BE49-F238E27FC236}">
+                <a16:creationId xmlns:a16="http://schemas.microsoft.com/office/drawing/2014/main" id="{649F5E30-606B-4521-8080-539B1F7EEBA5}"/>
               </a:ext>
             </a:extLst>
           </p:cNvPr>
           <p:cNvPicPr>
-            <a:picLocks noGrp="1" noChangeAspect="1"/>
+            <a:picLocks noChangeAspect="1"/>
           </p:cNvPicPr>
-          <p:nvPr>
-            <p:ph idx="1"/>
-          </p:nvPr>
+          <p:nvPr/>
         </p:nvPicPr>
         <p:blipFill>
           <a:blip r:embed="rId2"/>
@@ -7784,17 +8357,107 @@
         </p:blipFill>
         <p:spPr>
           <a:xfrm>
-            <a:off x="1248605" y="1600200"/>
-            <a:ext cx="9694789" cy="4525963"/>
-          </a:xfrm>
+            <a:off x="1284593" y="1600200"/>
+            <a:ext cx="9622814" cy="4525963"/>
+          </a:xfrm>
+          <a:prstGeom prst="rect">
+            <a:avLst/>
+          </a:prstGeom>
         </p:spPr>
       </p:pic>
+    </p:spTree>
+    <p:extLst>
+      <p:ext uri="{BB962C8B-B14F-4D97-AF65-F5344CB8AC3E}">
+        <p14:creationId xmlns:p14="http://schemas.microsoft.com/office/powerpoint/2010/main" val="822980987"/>
+      </p:ext>
+    </p:extLst>
+  </p:cSld>
+  <p:clrMapOvr>
+    <a:masterClrMapping/>
+  </p:clrMapOvr>
+</p:sld>
+</file>
+
+<file path=ppt/slides/slide18.xml><?xml version="1.0" encoding="utf-8"?>
+<p:sld xmlns:a="http://schemas.openxmlformats.org/drawingml/2006/main" xmlns:r="http://schemas.openxmlformats.org/officeDocument/2006/relationships" xmlns:p="http://schemas.openxmlformats.org/presentationml/2006/main">
+  <p:cSld>
+    <p:spTree>
+      <p:nvGrpSpPr>
+        <p:cNvPr id="1" name=""/>
+        <p:cNvGrpSpPr/>
+        <p:nvPr/>
+      </p:nvGrpSpPr>
+      <p:grpSpPr>
+        <a:xfrm>
+          <a:off x="0" y="0"/>
+          <a:ext cx="0" cy="0"/>
+          <a:chOff x="0" y="0"/>
+          <a:chExt cx="0" cy="0"/>
+        </a:xfrm>
+      </p:grpSpPr>
+      <p:sp>
+        <p:nvSpPr>
+          <p:cNvPr id="2" name="Titolo 1">
+            <a:extLst>
+              <a:ext uri="{FF2B5EF4-FFF2-40B4-BE49-F238E27FC236}">
+                <a16:creationId xmlns:a16="http://schemas.microsoft.com/office/drawing/2014/main" id="{99B084B2-7AF1-4D51-BE34-884C0B3A1336}"/>
+              </a:ext>
+            </a:extLst>
+          </p:cNvPr>
+          <p:cNvSpPr>
+            <a:spLocks noGrp="1"/>
+          </p:cNvSpPr>
+          <p:nvPr>
+            <p:ph type="title"/>
+          </p:nvPr>
+        </p:nvSpPr>
+        <p:spPr/>
+        <p:txBody>
+          <a:bodyPr/>
+          <a:lstStyle/>
+          <a:p>
+            <a:r>
+              <a:rPr lang="it-IT" dirty="0"/>
+              <a:t>Split Mode</a:t>
+            </a:r>
+          </a:p>
+        </p:txBody>
+      </p:sp>
+      <p:pic>
+        <p:nvPicPr>
+          <p:cNvPr id="6" name="Segnaposto contenuto 5">
+            <a:extLst>
+              <a:ext uri="{FF2B5EF4-FFF2-40B4-BE49-F238E27FC236}">
+                <a16:creationId xmlns:a16="http://schemas.microsoft.com/office/drawing/2014/main" id="{44232BFD-CEB8-4111-B9D4-2DFC08F16D84}"/>
+              </a:ext>
+            </a:extLst>
+          </p:cNvPr>
+          <p:cNvPicPr>
+            <a:picLocks noGrp="1" noChangeAspect="1"/>
+          </p:cNvPicPr>
+          <p:nvPr>
+            <p:ph idx="1"/>
+          </p:nvPr>
+        </p:nvPicPr>
+        <p:blipFill>
+          <a:blip r:embed="rId2"/>
+          <a:stretch>
+            <a:fillRect/>
+          </a:stretch>
+        </p:blipFill>
+        <p:spPr>
+          <a:xfrm>
+            <a:off x="1202499" y="1600200"/>
+            <a:ext cx="9787001" cy="4525963"/>
+          </a:xfrm>
+        </p:spPr>
+      </p:pic>
       <p:sp>
         <p:nvSpPr>
           <p:cNvPr id="4" name="Segnaposto numero diapositiva 3">
             <a:extLst>
               <a:ext uri="{FF2B5EF4-FFF2-40B4-BE49-F238E27FC236}">
-                <a16:creationId xmlns:a16="http://schemas.microsoft.com/office/drawing/2014/main" id="{3A7B6A2A-AAA0-4F0A-B3B6-2C225CB4BFCC}"/>
+                <a16:creationId xmlns:a16="http://schemas.microsoft.com/office/drawing/2014/main" id="{488A6574-AA9E-43C0-AF88-902D2C34E1BB}"/>
               </a:ext>
             </a:extLst>
           </p:cNvPr>
@@ -7813,7 +8476,124 @@
             <a:fld id="{D2040F39-7941-49A4-B48D-F201B18B6351}" type="slidenum">
               <a:rPr lang="it-IT" smtClean="0"/>
               <a:pPr/>
-              <a:t>15</a:t>
+              <a:t>18</a:t>
+            </a:fld>
+            <a:endParaRPr lang="it-IT" dirty="0"/>
+          </a:p>
+        </p:txBody>
+      </p:sp>
+    </p:spTree>
+    <p:extLst>
+      <p:ext uri="{BB962C8B-B14F-4D97-AF65-F5344CB8AC3E}">
+        <p14:creationId xmlns:p14="http://schemas.microsoft.com/office/powerpoint/2010/main" val="3398143378"/>
+      </p:ext>
+    </p:extLst>
+  </p:cSld>
+  <p:clrMapOvr>
+    <a:masterClrMapping/>
+  </p:clrMapOvr>
+</p:sld>
+</file>
+
+<file path=ppt/slides/slide19.xml><?xml version="1.0" encoding="utf-8"?>
+<p:sld xmlns:a="http://schemas.openxmlformats.org/drawingml/2006/main" xmlns:r="http://schemas.openxmlformats.org/officeDocument/2006/relationships" xmlns:p="http://schemas.openxmlformats.org/presentationml/2006/main">
+  <p:cSld>
+    <p:spTree>
+      <p:nvGrpSpPr>
+        <p:cNvPr id="1" name=""/>
+        <p:cNvGrpSpPr/>
+        <p:nvPr/>
+      </p:nvGrpSpPr>
+      <p:grpSpPr>
+        <a:xfrm>
+          <a:off x="0" y="0"/>
+          <a:ext cx="0" cy="0"/>
+          <a:chOff x="0" y="0"/>
+          <a:chExt cx="0" cy="0"/>
+        </a:xfrm>
+      </p:grpSpPr>
+      <p:sp>
+        <p:nvSpPr>
+          <p:cNvPr id="2" name="Titolo 1">
+            <a:extLst>
+              <a:ext uri="{FF2B5EF4-FFF2-40B4-BE49-F238E27FC236}">
+                <a16:creationId xmlns:a16="http://schemas.microsoft.com/office/drawing/2014/main" id="{097B2E1A-3022-4B3E-887F-5C2404A30221}"/>
+              </a:ext>
+            </a:extLst>
+          </p:cNvPr>
+          <p:cNvSpPr>
+            <a:spLocks noGrp="1"/>
+          </p:cNvSpPr>
+          <p:nvPr>
+            <p:ph type="title"/>
+          </p:nvPr>
+        </p:nvSpPr>
+        <p:spPr/>
+        <p:txBody>
+          <a:bodyPr/>
+          <a:lstStyle/>
+          <a:p>
+            <a:r>
+              <a:rPr lang="it-IT" dirty="0"/>
+              <a:t>Design Mode</a:t>
+            </a:r>
+          </a:p>
+        </p:txBody>
+      </p:sp>
+      <p:pic>
+        <p:nvPicPr>
+          <p:cNvPr id="6" name="Segnaposto contenuto 5">
+            <a:extLst>
+              <a:ext uri="{FF2B5EF4-FFF2-40B4-BE49-F238E27FC236}">
+                <a16:creationId xmlns:a16="http://schemas.microsoft.com/office/drawing/2014/main" id="{6F2B7F70-A1CC-426D-B349-1BE79A42D9B4}"/>
+              </a:ext>
+            </a:extLst>
+          </p:cNvPr>
+          <p:cNvPicPr>
+            <a:picLocks noGrp="1" noChangeAspect="1"/>
+          </p:cNvPicPr>
+          <p:nvPr>
+            <p:ph idx="1"/>
+          </p:nvPr>
+        </p:nvPicPr>
+        <p:blipFill>
+          <a:blip r:embed="rId2"/>
+          <a:stretch>
+            <a:fillRect/>
+          </a:stretch>
+        </p:blipFill>
+        <p:spPr>
+          <a:xfrm>
+            <a:off x="1248605" y="1600200"/>
+            <a:ext cx="9694789" cy="4525963"/>
+          </a:xfrm>
+        </p:spPr>
+      </p:pic>
+      <p:sp>
+        <p:nvSpPr>
+          <p:cNvPr id="4" name="Segnaposto numero diapositiva 3">
+            <a:extLst>
+              <a:ext uri="{FF2B5EF4-FFF2-40B4-BE49-F238E27FC236}">
+                <a16:creationId xmlns:a16="http://schemas.microsoft.com/office/drawing/2014/main" id="{3A7B6A2A-AAA0-4F0A-B3B6-2C225CB4BFCC}"/>
+              </a:ext>
+            </a:extLst>
+          </p:cNvPr>
+          <p:cNvSpPr>
+            <a:spLocks noGrp="1"/>
+          </p:cNvSpPr>
+          <p:nvPr>
+            <p:ph type="sldNum" sz="quarter" idx="12"/>
+          </p:nvPr>
+        </p:nvSpPr>
+        <p:spPr/>
+        <p:txBody>
+          <a:bodyPr/>
+          <a:lstStyle/>
+          <a:p>
+            <a:fld id="{D2040F39-7941-49A4-B48D-F201B18B6351}" type="slidenum">
+              <a:rPr lang="it-IT" smtClean="0"/>
+              <a:pPr/>
+              <a:t>19</a:t>
             </a:fld>
             <a:endParaRPr lang="it-IT" dirty="0"/>
           </a:p>
@@ -7964,6 +8744,219 @@
 </p:sld>
 </file>
 
+<file path=ppt/slides/slide20.xml><?xml version="1.0" encoding="utf-8"?>
+<p:sld xmlns:a="http://schemas.openxmlformats.org/drawingml/2006/main" xmlns:r="http://schemas.openxmlformats.org/officeDocument/2006/relationships" xmlns:p="http://schemas.openxmlformats.org/presentationml/2006/main">
+  <p:cSld>
+    <p:spTree>
+      <p:nvGrpSpPr>
+        <p:cNvPr id="1" name=""/>
+        <p:cNvGrpSpPr/>
+        <p:nvPr/>
+      </p:nvGrpSpPr>
+      <p:grpSpPr>
+        <a:xfrm>
+          <a:off x="0" y="0"/>
+          <a:ext cx="0" cy="0"/>
+          <a:chOff x="0" y="0"/>
+          <a:chExt cx="0" cy="0"/>
+        </a:xfrm>
+      </p:grpSpPr>
+      <p:sp>
+        <p:nvSpPr>
+          <p:cNvPr id="2" name="Titolo 1">
+            <a:extLst>
+              <a:ext uri="{FF2B5EF4-FFF2-40B4-BE49-F238E27FC236}">
+                <a16:creationId xmlns:a16="http://schemas.microsoft.com/office/drawing/2014/main" id="{4366B46B-75A9-46D6-90F9-25C66A9BF085}"/>
+              </a:ext>
+            </a:extLst>
+          </p:cNvPr>
+          <p:cNvSpPr>
+            <a:spLocks noGrp="1"/>
+          </p:cNvSpPr>
+          <p:nvPr>
+            <p:ph type="title"/>
+          </p:nvPr>
+        </p:nvSpPr>
+        <p:spPr/>
+        <p:txBody>
+          <a:bodyPr/>
+          <a:lstStyle/>
+          <a:p>
+            <a:r>
+              <a:rPr lang="it-IT" dirty="0" err="1"/>
+              <a:t>What</a:t>
+            </a:r>
+            <a:r>
+              <a:rPr lang="it-IT" dirty="0"/>
+              <a:t> </a:t>
+            </a:r>
+            <a:r>
+              <a:rPr lang="it-IT" dirty="0" err="1"/>
+              <a:t>is</a:t>
+            </a:r>
+            <a:r>
+              <a:rPr lang="it-IT" dirty="0"/>
+              <a:t> </a:t>
+            </a:r>
+            <a:r>
+              <a:rPr lang="it-IT" dirty="0" err="1"/>
+              <a:t>Gradle</a:t>
+            </a:r>
+            <a:r>
+              <a:rPr lang="it-IT" dirty="0"/>
+              <a:t>?</a:t>
+            </a:r>
+          </a:p>
+        </p:txBody>
+      </p:sp>
+      <p:sp>
+        <p:nvSpPr>
+          <p:cNvPr id="3" name="Segnaposto contenuto 2">
+            <a:extLst>
+              <a:ext uri="{FF2B5EF4-FFF2-40B4-BE49-F238E27FC236}">
+                <a16:creationId xmlns:a16="http://schemas.microsoft.com/office/drawing/2014/main" id="{D153291F-A597-472D-BFC2-593BBB1E0ABD}"/>
+              </a:ext>
+            </a:extLst>
+          </p:cNvPr>
+          <p:cNvSpPr>
+            <a:spLocks noGrp="1"/>
+          </p:cNvSpPr>
+          <p:nvPr>
+            <p:ph idx="1"/>
+          </p:nvPr>
+        </p:nvSpPr>
+        <p:spPr/>
+        <p:txBody>
+          <a:bodyPr>
+            <a:normAutofit fontScale="85000" lnSpcReduction="20000"/>
+          </a:bodyPr>
+          <a:lstStyle/>
+          <a:p>
+            <a:pPr marL="0" indent="0">
+              <a:buNone/>
+            </a:pPr>
+            <a:r>
+              <a:rPr lang="en-US" dirty="0"/>
+              <a:t>Gradle is an open-source and general-purpose build automation tool that is designed to be flexible enough to build almost any type of software.</a:t>
+            </a:r>
+          </a:p>
+          <a:p>
+            <a:pPr marL="0" indent="0">
+              <a:buNone/>
+            </a:pPr>
+            <a:endParaRPr lang="en-US" dirty="0"/>
+          </a:p>
+          <a:p>
+            <a:pPr marL="0" indent="0">
+              <a:buNone/>
+            </a:pPr>
+            <a:r>
+              <a:rPr lang="en-US" dirty="0"/>
+              <a:t>Gradle manage your android project build, dependencies, versions, resources…</a:t>
+            </a:r>
+          </a:p>
+          <a:p>
+            <a:pPr marL="0" indent="0">
+              <a:buNone/>
+            </a:pPr>
+            <a:endParaRPr lang="en-US" dirty="0"/>
+          </a:p>
+          <a:p>
+            <a:pPr marL="0" indent="0">
+              <a:buNone/>
+            </a:pPr>
+            <a:r>
+              <a:rPr lang="en-US" dirty="0"/>
+              <a:t>Is based on Groovy or Kotlin scripts</a:t>
+            </a:r>
+          </a:p>
+          <a:p>
+            <a:pPr marL="0" indent="0">
+              <a:buNone/>
+            </a:pPr>
+            <a:endParaRPr lang="en-US" dirty="0"/>
+          </a:p>
+          <a:p>
+            <a:pPr marL="0" indent="0">
+              <a:buNone/>
+            </a:pPr>
+            <a:r>
+              <a:rPr lang="en-US" dirty="0"/>
+              <a:t>Is available in many IDE</a:t>
+            </a:r>
+          </a:p>
+          <a:p>
+            <a:pPr marL="0" indent="0">
+              <a:buNone/>
+            </a:pPr>
+            <a:endParaRPr lang="en-US" dirty="0"/>
+          </a:p>
+          <a:p>
+            <a:pPr marL="0" indent="0">
+              <a:buNone/>
+            </a:pPr>
+            <a:r>
+              <a:rPr lang="en-US" dirty="0"/>
+              <a:t>Run on JVM (to use it you must install JDK)</a:t>
+            </a:r>
+          </a:p>
+          <a:p>
+            <a:pPr marL="0" indent="0">
+              <a:buNone/>
+            </a:pPr>
+            <a:endParaRPr lang="en-US" dirty="0"/>
+          </a:p>
+          <a:p>
+            <a:pPr marL="0" indent="0">
+              <a:buNone/>
+            </a:pPr>
+            <a:endParaRPr lang="it-IT" dirty="0"/>
+          </a:p>
+        </p:txBody>
+      </p:sp>
+      <p:sp>
+        <p:nvSpPr>
+          <p:cNvPr id="4" name="Segnaposto numero diapositiva 3">
+            <a:extLst>
+              <a:ext uri="{FF2B5EF4-FFF2-40B4-BE49-F238E27FC236}">
+                <a16:creationId xmlns:a16="http://schemas.microsoft.com/office/drawing/2014/main" id="{968FFE9A-039C-417D-8904-521AA37A4D07}"/>
+              </a:ext>
+            </a:extLst>
+          </p:cNvPr>
+          <p:cNvSpPr>
+            <a:spLocks noGrp="1"/>
+          </p:cNvSpPr>
+          <p:nvPr>
+            <p:ph type="sldNum" sz="quarter" idx="12"/>
+          </p:nvPr>
+        </p:nvSpPr>
+        <p:spPr/>
+        <p:txBody>
+          <a:bodyPr/>
+          <a:lstStyle/>
+          <a:p>
+            <a:fld id="{D2040F39-7941-49A4-B48D-F201B18B6351}" type="slidenum">
+              <a:rPr lang="it-IT" smtClean="0"/>
+              <a:pPr/>
+              <a:t>20</a:t>
+            </a:fld>
+            <a:endParaRPr lang="it-IT" dirty="0"/>
+          </a:p>
+        </p:txBody>
+      </p:sp>
+    </p:spTree>
+    <p:extLst>
+      <p:ext uri="{BB962C8B-B14F-4D97-AF65-F5344CB8AC3E}">
+        <p14:creationId xmlns:p14="http://schemas.microsoft.com/office/powerpoint/2010/main" val="921164557"/>
+      </p:ext>
+    </p:extLst>
+  </p:cSld>
+  <p:clrMapOvr>
+    <a:masterClrMapping/>
+  </p:clrMapOvr>
+</p:sld>
+</file>
+
 <file path=ppt/slides/slide3.xml><?xml version="1.0" encoding="utf-8"?>
 <p:sld xmlns:a="http://schemas.openxmlformats.org/drawingml/2006/main" xmlns:r="http://schemas.openxmlformats.org/officeDocument/2006/relationships" xmlns:p="http://schemas.openxmlformats.org/presentationml/2006/main">
   <p:cSld>
@@ -8075,8 +9068,8 @@
           </a:p>
         </p:txBody>
       </p:sp>
-      <mc:AlternateContent xmlns:mc="http://schemas.openxmlformats.org/markup-compatibility/2006">
-        <mc:Choice xmlns:p14="http://schemas.microsoft.com/office/powerpoint/2010/main" Requires="p14">
+      <mc:AlternateContent xmlns:mc="http://schemas.openxmlformats.org/markup-compatibility/2006" xmlns:p14="http://schemas.microsoft.com/office/powerpoint/2010/main">
+        <mc:Choice Requires="p14">
           <p:contentPart p14:bwMode="auto" r:id="rId3">
             <p14:nvContentPartPr>
               <p14:cNvPr id="7" name="Input penna 6">
@@ -8095,7 +9088,7 @@
             </p14:xfrm>
           </p:contentPart>
         </mc:Choice>
-        <mc:Fallback>
+        <mc:Fallback xmlns="">
           <p:pic>
             <p:nvPicPr>
               <p:cNvPr id="7" name="Input penna 6">
@@ -8126,8 +9119,8 @@
           </p:pic>
         </mc:Fallback>
       </mc:AlternateContent>
-      <mc:AlternateContent xmlns:mc="http://schemas.openxmlformats.org/markup-compatibility/2006">
-        <mc:Choice xmlns:p14="http://schemas.microsoft.com/office/powerpoint/2010/main" Requires="p14">
+      <mc:AlternateContent xmlns:mc="http://schemas.openxmlformats.org/markup-compatibility/2006" xmlns:p14="http://schemas.microsoft.com/office/powerpoint/2010/main">
+        <mc:Choice Requires="p14">
           <p:contentPart p14:bwMode="auto" r:id="rId5">
             <p14:nvContentPartPr>
               <p14:cNvPr id="8" name="Input penna 7">
@@ -8146,7 +9139,7 @@
             </p14:xfrm>
           </p:contentPart>
         </mc:Choice>
-        <mc:Fallback>
+        <mc:Fallback xmlns="">
           <p:pic>
             <p:nvPicPr>
               <p:cNvPr id="8" name="Input penna 7">
@@ -10292,9 +11285,16 @@
             <p:ph type="title"/>
           </p:nvPr>
         </p:nvSpPr>
-        <p:spPr/>
-        <p:txBody>
-          <a:bodyPr/>
+        <p:spPr>
+          <a:xfrm>
+            <a:off x="609600" y="274638"/>
+            <a:ext cx="10972800" cy="1143000"/>
+          </a:xfrm>
+        </p:spPr>
+        <p:txBody>
+          <a:bodyPr vert="horz" lIns="91440" tIns="45720" rIns="91440" bIns="45720" rtlCol="0" anchor="ctr">
+            <a:normAutofit/>
+          </a:bodyPr>
           <a:lstStyle/>
           <a:p>
             <a:r>
@@ -10306,36 +11306,6 @@
       </p:sp>
       <p:sp>
         <p:nvSpPr>
-          <p:cNvPr id="4" name="Segnaposto numero diapositiva 3">
-            <a:extLst>
-              <a:ext uri="{FF2B5EF4-FFF2-40B4-BE49-F238E27FC236}">
-                <a16:creationId xmlns:a16="http://schemas.microsoft.com/office/drawing/2014/main" id="{18ADE28F-C35D-4E6F-9A6D-3A952C3F0099}"/>
-              </a:ext>
-            </a:extLst>
-          </p:cNvPr>
-          <p:cNvSpPr>
-            <a:spLocks noGrp="1"/>
-          </p:cNvSpPr>
-          <p:nvPr>
-            <p:ph type="sldNum" sz="quarter" idx="12"/>
-          </p:nvPr>
-        </p:nvSpPr>
-        <p:spPr/>
-        <p:txBody>
-          <a:bodyPr/>
-          <a:lstStyle/>
-          <a:p>
-            <a:fld id="{D2040F39-7941-49A4-B48D-F201B18B6351}" type="slidenum">
-              <a:rPr lang="it-IT" smtClean="0"/>
-              <a:pPr/>
-              <a:t>7</a:t>
-            </a:fld>
-            <a:endParaRPr lang="it-IT" dirty="0"/>
-          </a:p>
-        </p:txBody>
-      </p:sp>
-      <p:sp>
-        <p:nvSpPr>
           <p:cNvPr id="6" name="CasellaDiTesto 5">
             <a:extLst>
               <a:ext uri="{FF2B5EF4-FFF2-40B4-BE49-F238E27FC236}">
@@ -10348,195 +11318,214 @@
         </p:nvSpPr>
         <p:spPr>
           <a:xfrm>
-            <a:off x="373625" y="1582994"/>
-            <a:ext cx="9812593" cy="369332"/>
+            <a:off x="609600" y="1600201"/>
+            <a:ext cx="10972800" cy="4525963"/>
           </a:xfrm>
           <a:prstGeom prst="rect">
             <a:avLst/>
           </a:prstGeom>
-          <a:noFill/>
-        </p:spPr>
-        <p:txBody>
-          <a:bodyPr wrap="square" rtlCol="0">
-            <a:spAutoFit/>
+        </p:spPr>
+        <p:txBody>
+          <a:bodyPr vert="horz" lIns="91440" tIns="45720" rIns="91440" bIns="45720" rtlCol="0">
+            <a:normAutofit/>
           </a:bodyPr>
           <a:lstStyle/>
           <a:p>
-            <a:r>
-              <a:rPr lang="it-IT" dirty="0"/>
+            <a:pPr defTabSz="457200">
+              <a:spcBef>
+                <a:spcPct val="20000"/>
+              </a:spcBef>
+              <a:buFont typeface="Arial"/>
+            </a:pPr>
+            <a:r>
+              <a:rPr lang="it-IT" sz="3200" dirty="0"/>
               <a:t>In Android Studio </a:t>
             </a:r>
             <a:r>
-              <a:rPr lang="it-IT" dirty="0" err="1"/>
+              <a:rPr lang="it-IT" sz="3200" dirty="0" err="1"/>
               <a:t>you</a:t>
             </a:r>
             <a:r>
-              <a:rPr lang="it-IT" dirty="0"/>
-              <a:t> can create Android Virtual Devices</a:t>
-            </a:r>
-          </a:p>
-        </p:txBody>
-      </p:sp>
-      <p:pic>
-        <p:nvPicPr>
-          <p:cNvPr id="8" name="Immagine 7">
-            <a:extLst>
-              <a:ext uri="{FF2B5EF4-FFF2-40B4-BE49-F238E27FC236}">
-                <a16:creationId xmlns:a16="http://schemas.microsoft.com/office/drawing/2014/main" id="{EF1A2A52-B31F-46AD-AF66-05CF9093EE46}"/>
-              </a:ext>
-            </a:extLst>
-          </p:cNvPr>
-          <p:cNvPicPr>
-            <a:picLocks noChangeAspect="1"/>
-          </p:cNvPicPr>
-          <p:nvPr/>
-        </p:nvPicPr>
-        <p:blipFill>
-          <a:blip r:embed="rId2"/>
-          <a:stretch>
-            <a:fillRect/>
-          </a:stretch>
-        </p:blipFill>
+              <a:rPr lang="it-IT" sz="3200" dirty="0"/>
+              <a:t> can create a AVD (Android Virtual Device) an emulator </a:t>
+            </a:r>
+            <a:r>
+              <a:rPr lang="it-IT" sz="3200" dirty="0" err="1"/>
+              <a:t>where</a:t>
+            </a:r>
+            <a:r>
+              <a:rPr lang="it-IT" sz="3200" dirty="0"/>
+              <a:t> </a:t>
+            </a:r>
+            <a:r>
+              <a:rPr lang="it-IT" sz="3200" dirty="0" err="1"/>
+              <a:t>you</a:t>
+            </a:r>
+            <a:r>
+              <a:rPr lang="it-IT" sz="3200" dirty="0"/>
+              <a:t> can </a:t>
+            </a:r>
+            <a:r>
+              <a:rPr lang="it-IT" sz="3200" dirty="0" err="1"/>
+              <a:t>install</a:t>
+            </a:r>
+            <a:r>
+              <a:rPr lang="it-IT" sz="3200" dirty="0"/>
+              <a:t> and  </a:t>
+            </a:r>
+            <a:r>
+              <a:rPr lang="it-IT" sz="3200" dirty="0" err="1"/>
+              <a:t>run</a:t>
+            </a:r>
+            <a:r>
+              <a:rPr lang="it-IT" sz="3200" dirty="0"/>
+              <a:t> </a:t>
+            </a:r>
+            <a:r>
+              <a:rPr lang="it-IT" sz="3200" dirty="0" err="1"/>
+              <a:t>your</a:t>
+            </a:r>
+            <a:r>
+              <a:rPr lang="it-IT" sz="3200" dirty="0"/>
+              <a:t> </a:t>
+            </a:r>
+            <a:r>
+              <a:rPr lang="it-IT" sz="3200" dirty="0" err="1"/>
+              <a:t>application</a:t>
+            </a:r>
+            <a:r>
+              <a:rPr lang="it-IT" sz="3200" dirty="0"/>
+              <a:t>.</a:t>
+            </a:r>
+          </a:p>
+          <a:p>
+            <a:pPr defTabSz="457200">
+              <a:spcBef>
+                <a:spcPct val="20000"/>
+              </a:spcBef>
+              <a:buFont typeface="Arial"/>
+            </a:pPr>
+            <a:r>
+              <a:rPr lang="it-IT" sz="3200" dirty="0"/>
+              <a:t>AVD Manager </a:t>
+            </a:r>
+            <a:r>
+              <a:rPr lang="it-IT" sz="3200" dirty="0" err="1"/>
+              <a:t>is</a:t>
+            </a:r>
+            <a:r>
+              <a:rPr lang="it-IT" sz="3200" dirty="0"/>
+              <a:t> the tool </a:t>
+            </a:r>
+            <a:r>
+              <a:rPr lang="it-IT" sz="3200" dirty="0" err="1"/>
+              <a:t>that</a:t>
+            </a:r>
+            <a:r>
+              <a:rPr lang="it-IT" sz="3200" dirty="0"/>
+              <a:t> help </a:t>
+            </a:r>
+            <a:r>
+              <a:rPr lang="it-IT" sz="3200" dirty="0" err="1"/>
+              <a:t>you</a:t>
+            </a:r>
+            <a:r>
+              <a:rPr lang="it-IT" sz="3200" dirty="0"/>
+              <a:t> to create and </a:t>
+            </a:r>
+            <a:r>
+              <a:rPr lang="it-IT" sz="3200" dirty="0" err="1"/>
+              <a:t>manage</a:t>
+            </a:r>
+            <a:r>
+              <a:rPr lang="it-IT" sz="3200" dirty="0"/>
+              <a:t> </a:t>
+            </a:r>
+            <a:r>
+              <a:rPr lang="it-IT" sz="3200" dirty="0" err="1"/>
+              <a:t>your</a:t>
+            </a:r>
+            <a:r>
+              <a:rPr lang="it-IT" sz="3200" dirty="0"/>
+              <a:t> AVD.</a:t>
+            </a:r>
+          </a:p>
+          <a:p>
+            <a:pPr defTabSz="457200">
+              <a:spcBef>
+                <a:spcPct val="20000"/>
+              </a:spcBef>
+              <a:buFont typeface="Arial"/>
+            </a:pPr>
+            <a:endParaRPr lang="it-IT" sz="3200" dirty="0"/>
+          </a:p>
+          <a:p>
+            <a:pPr defTabSz="457200">
+              <a:spcBef>
+                <a:spcPct val="20000"/>
+              </a:spcBef>
+              <a:buFont typeface="Arial"/>
+            </a:pPr>
+            <a:r>
+              <a:rPr lang="it-IT" sz="3200" dirty="0" err="1"/>
+              <a:t>You</a:t>
+            </a:r>
+            <a:r>
+              <a:rPr lang="it-IT" sz="3200" dirty="0"/>
+              <a:t> can open AVD Manager from the toolbar.</a:t>
+            </a:r>
+          </a:p>
+        </p:txBody>
+      </p:sp>
+      <p:sp>
+        <p:nvSpPr>
+          <p:cNvPr id="4" name="Segnaposto numero diapositiva 3">
+            <a:extLst>
+              <a:ext uri="{FF2B5EF4-FFF2-40B4-BE49-F238E27FC236}">
+                <a16:creationId xmlns:a16="http://schemas.microsoft.com/office/drawing/2014/main" id="{18ADE28F-C35D-4E6F-9A6D-3A952C3F0099}"/>
+              </a:ext>
+            </a:extLst>
+          </p:cNvPr>
+          <p:cNvSpPr>
+            <a:spLocks noGrp="1"/>
+          </p:cNvSpPr>
+          <p:nvPr>
+            <p:ph type="sldNum" sz="quarter" idx="12"/>
+          </p:nvPr>
+        </p:nvSpPr>
         <p:spPr>
           <a:xfrm>
-            <a:off x="373625" y="1952326"/>
-            <a:ext cx="4119771" cy="1951080"/>
-          </a:xfrm>
-          <a:prstGeom prst="rect">
-            <a:avLst/>
-          </a:prstGeom>
-        </p:spPr>
-      </p:pic>
-      <p:pic>
-        <p:nvPicPr>
-          <p:cNvPr id="10" name="Immagine 9">
-            <a:extLst>
-              <a:ext uri="{FF2B5EF4-FFF2-40B4-BE49-F238E27FC236}">
-                <a16:creationId xmlns:a16="http://schemas.microsoft.com/office/drawing/2014/main" id="{37FF3D3F-EC40-4B50-A475-7FAA3CD58D7B}"/>
-              </a:ext>
-            </a:extLst>
-          </p:cNvPr>
-          <p:cNvPicPr>
-            <a:picLocks noChangeAspect="1"/>
-          </p:cNvPicPr>
-          <p:nvPr/>
-        </p:nvPicPr>
-        <p:blipFill>
-          <a:blip r:embed="rId3"/>
-          <a:stretch>
-            <a:fillRect/>
-          </a:stretch>
-        </p:blipFill>
-        <p:spPr>
-          <a:xfrm>
-            <a:off x="1861920" y="3225997"/>
-            <a:ext cx="4234080" cy="3359355"/>
-          </a:xfrm>
-          <a:prstGeom prst="rect">
-            <a:avLst/>
-          </a:prstGeom>
-        </p:spPr>
-      </p:pic>
-      <p:pic>
-        <p:nvPicPr>
-          <p:cNvPr id="12" name="Immagine 11">
-            <a:extLst>
-              <a:ext uri="{FF2B5EF4-FFF2-40B4-BE49-F238E27FC236}">
-                <a16:creationId xmlns:a16="http://schemas.microsoft.com/office/drawing/2014/main" id="{704DEB0F-2281-4DAE-87A1-55DA9A0DC871}"/>
-              </a:ext>
-            </a:extLst>
-          </p:cNvPr>
-          <p:cNvPicPr>
-            <a:picLocks noChangeAspect="1"/>
-          </p:cNvPicPr>
-          <p:nvPr/>
-        </p:nvPicPr>
-        <p:blipFill>
-          <a:blip r:embed="rId4"/>
-          <a:stretch>
-            <a:fillRect/>
-          </a:stretch>
-        </p:blipFill>
-        <p:spPr>
-          <a:xfrm>
-            <a:off x="6096000" y="1496412"/>
-            <a:ext cx="3657600" cy="2897312"/>
-          </a:xfrm>
-          <a:prstGeom prst="rect">
-            <a:avLst/>
-          </a:prstGeom>
-        </p:spPr>
-      </p:pic>
-      <p:pic>
-        <p:nvPicPr>
-          <p:cNvPr id="14" name="Immagine 13">
-            <a:extLst>
-              <a:ext uri="{FF2B5EF4-FFF2-40B4-BE49-F238E27FC236}">
-                <a16:creationId xmlns:a16="http://schemas.microsoft.com/office/drawing/2014/main" id="{E7531160-6E37-49FF-9F0B-F2A30EAA5A5E}"/>
-              </a:ext>
-            </a:extLst>
-          </p:cNvPr>
-          <p:cNvPicPr>
-            <a:picLocks noChangeAspect="1"/>
-          </p:cNvPicPr>
-          <p:nvPr/>
-        </p:nvPicPr>
-        <p:blipFill>
-          <a:blip r:embed="rId5"/>
-          <a:stretch>
-            <a:fillRect/>
-          </a:stretch>
-        </p:blipFill>
-        <p:spPr>
-          <a:xfrm>
-            <a:off x="8240730" y="3949737"/>
-            <a:ext cx="3577645" cy="2823702"/>
-          </a:xfrm>
-          <a:prstGeom prst="rect">
-            <a:avLst/>
-          </a:prstGeom>
-        </p:spPr>
-      </p:pic>
-      <p:sp>
-        <p:nvSpPr>
-          <p:cNvPr id="17" name="CasellaDiTesto 16">
-            <a:extLst>
-              <a:ext uri="{FF2B5EF4-FFF2-40B4-BE49-F238E27FC236}">
-                <a16:creationId xmlns:a16="http://schemas.microsoft.com/office/drawing/2014/main" id="{84972E34-C30F-49C8-8EAD-15B70361F971}"/>
-              </a:ext>
-            </a:extLst>
-          </p:cNvPr>
-          <p:cNvSpPr txBox="1"/>
-          <p:nvPr/>
-        </p:nvSpPr>
-        <p:spPr>
-          <a:xfrm>
-            <a:off x="6096000" y="4856096"/>
-            <a:ext cx="1435509" cy="1200329"/>
-          </a:xfrm>
-          <a:prstGeom prst="rect">
-            <a:avLst/>
-          </a:prstGeom>
-          <a:noFill/>
-        </p:spPr>
-        <p:txBody>
-          <a:bodyPr wrap="square" rtlCol="0">
-            <a:spAutoFit/>
+            <a:off x="5115480" y="6362701"/>
+            <a:ext cx="6466921" cy="365125"/>
+          </a:xfrm>
+        </p:spPr>
+        <p:txBody>
+          <a:bodyPr>
+            <a:normAutofit/>
           </a:bodyPr>
           <a:lstStyle/>
           <a:p>
-            <a:r>
-              <a:rPr lang="it-IT" dirty="0"/>
-              <a:t>ADVICE: </a:t>
-            </a:r>
-            <a:r>
-              <a:rPr lang="it-IT" dirty="0" err="1"/>
-              <a:t>choose</a:t>
-            </a:r>
-            <a:r>
-              <a:rPr lang="it-IT" dirty="0"/>
-              <a:t> Device with Play Store</a:t>
-            </a:r>
+            <a:pPr>
+              <a:lnSpc>
+                <a:spcPct val="90000"/>
+              </a:lnSpc>
+              <a:spcAft>
+                <a:spcPts val="600"/>
+              </a:spcAft>
+            </a:pPr>
+            <a:fld id="{D2040F39-7941-49A4-B48D-F201B18B6351}" type="slidenum">
+              <a:rPr lang="it-IT" smtClean="0"/>
+              <a:pPr>
+                <a:lnSpc>
+                  <a:spcPct val="90000"/>
+                </a:lnSpc>
+                <a:spcAft>
+                  <a:spcPts val="600"/>
+                </a:spcAft>
+              </a:pPr>
+              <a:t>7</a:t>
+            </a:fld>
+            <a:endParaRPr lang="it-IT"/>
           </a:p>
         </p:txBody>
       </p:sp>
@@ -10572,10 +11561,10 @@
       </p:grpSpPr>
       <p:sp>
         <p:nvSpPr>
-          <p:cNvPr id="2" name="Titolo 1">
-            <a:extLst>
-              <a:ext uri="{FF2B5EF4-FFF2-40B4-BE49-F238E27FC236}">
-                <a16:creationId xmlns:a16="http://schemas.microsoft.com/office/drawing/2014/main" id="{97DD1A6E-48A6-4A64-9701-0CA9448B1108}"/>
+          <p:cNvPr id="10" name="Title 1">
+            <a:extLst>
+              <a:ext uri="{FF2B5EF4-FFF2-40B4-BE49-F238E27FC236}">
+                <a16:creationId xmlns:a16="http://schemas.microsoft.com/office/drawing/2014/main" id="{67FAD29A-C6BA-4353-9A90-B9130B45F71E}"/>
               </a:ext>
             </a:extLst>
           </p:cNvPr>
@@ -10586,155 +11575,84 @@
             <p:ph type="title"/>
           </p:nvPr>
         </p:nvSpPr>
-        <p:spPr/>
+        <p:spPr>
+          <a:xfrm>
+            <a:off x="609600" y="274638"/>
+            <a:ext cx="10972800" cy="1143000"/>
+          </a:xfrm>
+        </p:spPr>
         <p:txBody>
           <a:bodyPr/>
           <a:lstStyle/>
           <a:p>
             <a:r>
-              <a:rPr lang="it-IT" dirty="0" err="1"/>
-              <a:t>Run</a:t>
-            </a:r>
-            <a:r>
-              <a:rPr lang="it-IT" dirty="0"/>
-              <a:t>/Debug in </a:t>
-            </a:r>
-            <a:r>
-              <a:rPr lang="it-IT" dirty="0" err="1"/>
-              <a:t>real</a:t>
-            </a:r>
-            <a:r>
-              <a:rPr lang="it-IT" dirty="0"/>
-              <a:t> device</a:t>
-            </a:r>
-          </a:p>
-        </p:txBody>
-      </p:sp>
-      <p:sp>
-        <p:nvSpPr>
-          <p:cNvPr id="3" name="Segnaposto contenuto 2">
-            <a:extLst>
-              <a:ext uri="{FF2B5EF4-FFF2-40B4-BE49-F238E27FC236}">
-                <a16:creationId xmlns:a16="http://schemas.microsoft.com/office/drawing/2014/main" id="{3CE613F0-FD57-4722-90F9-11098F329BD1}"/>
-              </a:ext>
-            </a:extLst>
-          </p:cNvPr>
-          <p:cNvSpPr>
-            <a:spLocks noGrp="1"/>
-          </p:cNvSpPr>
-          <p:nvPr>
-            <p:ph idx="1"/>
-          </p:nvPr>
-        </p:nvSpPr>
-        <p:spPr/>
+              <a:rPr lang="en-US" dirty="0"/>
+              <a:t>AVD Initialization (1)</a:t>
+            </a:r>
+          </a:p>
+        </p:txBody>
+      </p:sp>
+      <p:pic>
+        <p:nvPicPr>
+          <p:cNvPr id="5" name="Immagine 4">
+            <a:extLst>
+              <a:ext uri="{FF2B5EF4-FFF2-40B4-BE49-F238E27FC236}">
+                <a16:creationId xmlns:a16="http://schemas.microsoft.com/office/drawing/2014/main" id="{2D5096E9-F824-470F-91AE-B68BD0280445}"/>
+              </a:ext>
+            </a:extLst>
+          </p:cNvPr>
+          <p:cNvPicPr>
+            <a:picLocks noChangeAspect="1"/>
+          </p:cNvPicPr>
+          <p:nvPr/>
+        </p:nvPicPr>
+        <p:blipFill>
+          <a:blip r:embed="rId2"/>
+          <a:stretch>
+            <a:fillRect/>
+          </a:stretch>
+        </p:blipFill>
+        <p:spPr>
+          <a:xfrm>
+            <a:off x="609600" y="2591024"/>
+            <a:ext cx="5384800" cy="2544317"/>
+          </a:xfrm>
+          <a:prstGeom prst="rect">
+            <a:avLst/>
+          </a:prstGeom>
+          <a:noFill/>
+        </p:spPr>
+      </p:pic>
+      <p:sp>
+        <p:nvSpPr>
+          <p:cNvPr id="12" name="Content Placeholder 3">
+            <a:extLst>
+              <a:ext uri="{FF2B5EF4-FFF2-40B4-BE49-F238E27FC236}">
+                <a16:creationId xmlns:a16="http://schemas.microsoft.com/office/drawing/2014/main" id="{9B9313F3-B1EF-46BA-B168-71D78A528A2B}"/>
+              </a:ext>
+            </a:extLst>
+          </p:cNvPr>
+          <p:cNvSpPr>
+            <a:spLocks noGrp="1"/>
+          </p:cNvSpPr>
+          <p:nvPr>
+            <p:ph sz="half" idx="2"/>
+          </p:nvPr>
+        </p:nvSpPr>
+        <p:spPr>
+          <a:xfrm>
+            <a:off x="6197600" y="1600201"/>
+            <a:ext cx="5384800" cy="4525963"/>
+          </a:xfrm>
+        </p:spPr>
         <p:txBody>
           <a:bodyPr/>
           <a:lstStyle/>
           <a:p>
             <a:r>
-              <a:rPr lang="it-IT" sz="2800" dirty="0" err="1"/>
-              <a:t>Activate</a:t>
-            </a:r>
-            <a:r>
-              <a:rPr lang="it-IT" sz="2800" dirty="0"/>
-              <a:t> ADB (Android Debug Bridge) on target device (</a:t>
-            </a:r>
-            <a:r>
-              <a:rPr lang="it-IT" sz="2800" dirty="0" err="1"/>
-              <a:t>only</a:t>
-            </a:r>
-            <a:r>
-              <a:rPr lang="it-IT" sz="2800" dirty="0"/>
-              <a:t> on Android 6.0 or </a:t>
-            </a:r>
-            <a:r>
-              <a:rPr lang="it-IT" sz="2800" dirty="0" err="1"/>
-              <a:t>higher</a:t>
-            </a:r>
-            <a:r>
-              <a:rPr lang="it-IT" sz="2800" dirty="0"/>
-              <a:t>)</a:t>
-            </a:r>
-          </a:p>
-          <a:p>
-            <a:pPr lvl="1"/>
-            <a:r>
-              <a:rPr lang="en-US" sz="2400" i="1" dirty="0"/>
-              <a:t>Settings -&gt; About Phone/Tablet -&gt; Software Information</a:t>
-            </a:r>
-          </a:p>
-          <a:p>
-            <a:pPr lvl="1"/>
-            <a:r>
-              <a:rPr lang="en-US" sz="2400" dirty="0"/>
-              <a:t>Tap on </a:t>
-            </a:r>
-            <a:r>
-              <a:rPr lang="en-US" sz="2400" i="1" dirty="0"/>
-              <a:t>Build number </a:t>
-            </a:r>
-            <a:r>
-              <a:rPr lang="en-US" sz="2400" dirty="0"/>
-              <a:t>field seven times (a message appears indicating that developer mode has been enabled)</a:t>
-            </a:r>
-          </a:p>
-          <a:p>
-            <a:pPr lvl="1"/>
-            <a:r>
-              <a:rPr lang="en-US" sz="2400" dirty="0"/>
-              <a:t>Go to </a:t>
-            </a:r>
-            <a:r>
-              <a:rPr lang="en-US" sz="2400" i="1" dirty="0"/>
-              <a:t>Settings</a:t>
-            </a:r>
-            <a:r>
-              <a:rPr lang="en-US" sz="2400" dirty="0"/>
-              <a:t> page and now appears </a:t>
-            </a:r>
-            <a:r>
-              <a:rPr lang="en-US" sz="2400" i="1" dirty="0"/>
-              <a:t>Developer options</a:t>
-            </a:r>
-          </a:p>
-          <a:p>
-            <a:pPr lvl="1"/>
-            <a:r>
-              <a:rPr lang="en-US" sz="2400" dirty="0"/>
-              <a:t>Switch on </a:t>
-            </a:r>
-            <a:r>
-              <a:rPr lang="en-US" sz="2400" i="1" dirty="0"/>
-              <a:t>USB debugging </a:t>
-            </a:r>
-            <a:r>
-              <a:rPr lang="en-US" sz="2400" dirty="0"/>
-              <a:t>option</a:t>
-            </a:r>
-            <a:endParaRPr lang="it-IT" sz="2400" dirty="0"/>
-          </a:p>
-          <a:p>
-            <a:r>
-              <a:rPr lang="it-IT" sz="2800" dirty="0"/>
-              <a:t>Connect to PC with USB, device </a:t>
-            </a:r>
-            <a:r>
-              <a:rPr lang="it-IT" sz="2800" dirty="0" err="1"/>
-              <a:t>will</a:t>
-            </a:r>
-            <a:r>
-              <a:rPr lang="it-IT" sz="2800" dirty="0"/>
-              <a:t> </a:t>
-            </a:r>
-            <a:r>
-              <a:rPr lang="it-IT" sz="2800" dirty="0" err="1"/>
-              <a:t>appear</a:t>
-            </a:r>
-            <a:r>
-              <a:rPr lang="it-IT" sz="2800" dirty="0"/>
-              <a:t> in Android Studio devices list</a:t>
-            </a:r>
-            <a:endParaRPr lang="en-US" sz="2800" dirty="0"/>
+              <a:rPr lang="en-US" dirty="0"/>
+              <a:t>In this page you create new AVD and manage AVD already existing</a:t>
+            </a:r>
           </a:p>
         </p:txBody>
       </p:sp>
@@ -10743,7 +11661,7 @@
           <p:cNvPr id="4" name="Segnaposto numero diapositiva 3">
             <a:extLst>
               <a:ext uri="{FF2B5EF4-FFF2-40B4-BE49-F238E27FC236}">
-                <a16:creationId xmlns:a16="http://schemas.microsoft.com/office/drawing/2014/main" id="{D76CDC0E-8C87-4D48-93CC-B2186DF0CC16}"/>
+                <a16:creationId xmlns:a16="http://schemas.microsoft.com/office/drawing/2014/main" id="{4333FAA8-2F62-487D-AE61-5446775C389F}"/>
               </a:ext>
             </a:extLst>
           </p:cNvPr>
@@ -10754,24 +11672,46 @@
             <p:ph type="sldNum" sz="quarter" idx="12"/>
           </p:nvPr>
         </p:nvSpPr>
-        <p:spPr/>
-        <p:txBody>
-          <a:bodyPr/>
-          <a:lstStyle/>
-          <a:p>
+        <p:spPr>
+          <a:xfrm>
+            <a:off x="5115480" y="6362701"/>
+            <a:ext cx="6466921" cy="365125"/>
+          </a:xfrm>
+        </p:spPr>
+        <p:txBody>
+          <a:bodyPr>
+            <a:normAutofit/>
+          </a:bodyPr>
+          <a:lstStyle/>
+          <a:p>
+            <a:pPr>
+              <a:lnSpc>
+                <a:spcPct val="90000"/>
+              </a:lnSpc>
+              <a:spcAft>
+                <a:spcPts val="600"/>
+              </a:spcAft>
+            </a:pPr>
             <a:fld id="{D2040F39-7941-49A4-B48D-F201B18B6351}" type="slidenum">
               <a:rPr lang="it-IT" smtClean="0"/>
-              <a:pPr/>
+              <a:pPr>
+                <a:lnSpc>
+                  <a:spcPct val="90000"/>
+                </a:lnSpc>
+                <a:spcAft>
+                  <a:spcPts val="600"/>
+                </a:spcAft>
+              </a:pPr>
               <a:t>8</a:t>
             </a:fld>
-            <a:endParaRPr lang="it-IT" dirty="0"/>
+            <a:endParaRPr lang="it-IT"/>
           </a:p>
         </p:txBody>
       </p:sp>
     </p:spTree>
     <p:extLst>
       <p:ext uri="{BB962C8B-B14F-4D97-AF65-F5344CB8AC3E}">
-        <p14:creationId xmlns:p14="http://schemas.microsoft.com/office/powerpoint/2010/main" val="2217072517"/>
+        <p14:creationId xmlns:p14="http://schemas.microsoft.com/office/powerpoint/2010/main" val="1148573461"/>
       </p:ext>
     </p:extLst>
   </p:cSld>
@@ -10800,10 +11740,10 @@
       </p:grpSpPr>
       <p:sp>
         <p:nvSpPr>
-          <p:cNvPr id="2" name="Titolo 1">
-            <a:extLst>
-              <a:ext uri="{FF2B5EF4-FFF2-40B4-BE49-F238E27FC236}">
-                <a16:creationId xmlns:a16="http://schemas.microsoft.com/office/drawing/2014/main" id="{845908A6-95BF-4881-AB3C-D754E8EAD6EA}"/>
+          <p:cNvPr id="10" name="Title 1">
+            <a:extLst>
+              <a:ext uri="{FF2B5EF4-FFF2-40B4-BE49-F238E27FC236}">
+                <a16:creationId xmlns:a16="http://schemas.microsoft.com/office/drawing/2014/main" id="{D22F39D5-63AA-47E8-882D-D9C86BB1F7B4}"/>
               </a:ext>
             </a:extLst>
           </p:cNvPr>
@@ -10814,134 +11754,191 @@
             <p:ph type="title"/>
           </p:nvPr>
         </p:nvSpPr>
-        <p:spPr/>
+        <p:spPr>
+          <a:xfrm>
+            <a:off x="609600" y="274638"/>
+            <a:ext cx="10972800" cy="1143000"/>
+          </a:xfrm>
+        </p:spPr>
         <p:txBody>
           <a:bodyPr/>
           <a:lstStyle/>
           <a:p>
             <a:r>
-              <a:rPr lang="it-IT" dirty="0"/>
-              <a:t>Import from VCS</a:t>
-            </a:r>
-          </a:p>
-        </p:txBody>
-      </p:sp>
-      <p:sp>
-        <p:nvSpPr>
-          <p:cNvPr id="3" name="Segnaposto contenuto 2">
-            <a:extLst>
-              <a:ext uri="{FF2B5EF4-FFF2-40B4-BE49-F238E27FC236}">
-                <a16:creationId xmlns:a16="http://schemas.microsoft.com/office/drawing/2014/main" id="{17D6AED0-3C26-4E11-A37C-C299F9B4A582}"/>
-              </a:ext>
-            </a:extLst>
-          </p:cNvPr>
-          <p:cNvSpPr>
-            <a:spLocks noGrp="1"/>
-          </p:cNvSpPr>
-          <p:nvPr>
-            <p:ph idx="1"/>
-          </p:nvPr>
-        </p:nvSpPr>
-        <p:spPr/>
+              <a:rPr lang="en-US" dirty="0"/>
+              <a:t>AVD Initialization (2)</a:t>
+            </a:r>
+          </a:p>
+        </p:txBody>
+      </p:sp>
+      <p:pic>
+        <p:nvPicPr>
+          <p:cNvPr id="5" name="Immagine 4">
+            <a:extLst>
+              <a:ext uri="{FF2B5EF4-FFF2-40B4-BE49-F238E27FC236}">
+                <a16:creationId xmlns:a16="http://schemas.microsoft.com/office/drawing/2014/main" id="{65BC8B0A-53ED-4890-85D2-7851A4AA3A6D}"/>
+              </a:ext>
+            </a:extLst>
+          </p:cNvPr>
+          <p:cNvPicPr>
+            <a:picLocks noChangeAspect="1"/>
+          </p:cNvPicPr>
+          <p:nvPr/>
+        </p:nvPicPr>
+        <p:blipFill>
+          <a:blip r:embed="rId2"/>
+          <a:stretch>
+            <a:fillRect/>
+          </a:stretch>
+        </p:blipFill>
+        <p:spPr>
+          <a:xfrm>
+            <a:off x="609600" y="1729456"/>
+            <a:ext cx="5384800" cy="4267453"/>
+          </a:xfrm>
+          <a:prstGeom prst="rect">
+            <a:avLst/>
+          </a:prstGeom>
+          <a:noFill/>
+        </p:spPr>
+      </p:pic>
+      <p:sp>
+        <p:nvSpPr>
+          <p:cNvPr id="12" name="Content Placeholder 3">
+            <a:extLst>
+              <a:ext uri="{FF2B5EF4-FFF2-40B4-BE49-F238E27FC236}">
+                <a16:creationId xmlns:a16="http://schemas.microsoft.com/office/drawing/2014/main" id="{B4B4DB28-9573-449E-977F-BE9445BB6892}"/>
+              </a:ext>
+            </a:extLst>
+          </p:cNvPr>
+          <p:cNvSpPr>
+            <a:spLocks noGrp="1"/>
+          </p:cNvSpPr>
+          <p:nvPr>
+            <p:ph sz="half" idx="2"/>
+          </p:nvPr>
+        </p:nvSpPr>
+        <p:spPr>
+          <a:xfrm>
+            <a:off x="6197600" y="1600201"/>
+            <a:ext cx="5384800" cy="4525963"/>
+          </a:xfrm>
+        </p:spPr>
         <p:txBody>
           <a:bodyPr/>
           <a:lstStyle/>
           <a:p>
-            <a:r>
-              <a:rPr lang="it-IT" dirty="0"/>
-              <a:t>Android Studio </a:t>
-            </a:r>
-            <a:r>
-              <a:rPr lang="it-IT" dirty="0" err="1"/>
-              <a:t>has</a:t>
-            </a:r>
-            <a:r>
-              <a:rPr lang="it-IT" dirty="0"/>
-              <a:t> GitHub plugin</a:t>
-            </a:r>
-          </a:p>
-          <a:p>
-            <a:r>
-              <a:rPr lang="it-IT" dirty="0"/>
-              <a:t>Clone repository on </a:t>
-            </a:r>
-            <a:r>
-              <a:rPr lang="it-IT" dirty="0" err="1"/>
-              <a:t>your</a:t>
-            </a:r>
-            <a:r>
-              <a:rPr lang="it-IT" dirty="0"/>
-              <a:t> PC</a:t>
-            </a:r>
-          </a:p>
-          <a:p>
-            <a:r>
-              <a:rPr lang="it-IT" dirty="0"/>
-              <a:t>Open code project directory from Android Studio</a:t>
-            </a:r>
-          </a:p>
-          <a:p>
-            <a:r>
-              <a:rPr lang="it-IT" dirty="0"/>
-              <a:t>GitHub tools </a:t>
-            </a:r>
-            <a:r>
-              <a:rPr lang="it-IT" dirty="0" err="1"/>
-              <a:t>appear</a:t>
-            </a:r>
-            <a:r>
-              <a:rPr lang="it-IT" dirty="0"/>
-              <a:t> in Android Studio</a:t>
-            </a:r>
-          </a:p>
-          <a:p>
             <a:pPr marL="0" indent="0">
               <a:buNone/>
             </a:pPr>
-            <a:endParaRPr lang="it-IT" dirty="0"/>
-          </a:p>
-          <a:p>
-            <a:pPr marL="0" indent="0">
-              <a:buNone/>
+            <a:r>
+              <a:rPr lang="en-US" dirty="0"/>
+              <a:t>You can choose </a:t>
+            </a:r>
+          </a:p>
+          <a:p>
+            <a:r>
+              <a:rPr lang="en-US" dirty="0">
+                <a:solidFill>
+                  <a:srgbClr val="FF0000"/>
+                </a:solidFill>
+              </a:rPr>
+              <a:t>Type of AVD </a:t>
+            </a:r>
+            <a:r>
+              <a:rPr lang="en-US" dirty="0"/>
+              <a:t>(Wear, </a:t>
+            </a:r>
+            <a:r>
+              <a:rPr lang="en-US" dirty="0" err="1"/>
+              <a:t>Smarthphone</a:t>
+            </a:r>
+            <a:r>
+              <a:rPr lang="en-US" dirty="0"/>
+              <a:t>, Tablet, Tv and Automotive)</a:t>
+            </a:r>
+          </a:p>
+          <a:p>
+            <a:r>
+              <a:rPr lang="en-US" dirty="0">
+                <a:solidFill>
+                  <a:srgbClr val="FF0000"/>
+                </a:solidFill>
+              </a:rPr>
+              <a:t>Specific AVD </a:t>
+            </a:r>
+            <a:r>
+              <a:rPr lang="en-US" dirty="0"/>
+              <a:t>(e.g. from Google devices list) (is better choose  Play Store integrated AVD)</a:t>
+            </a:r>
+          </a:p>
+          <a:p>
+            <a:endParaRPr lang="en-US" dirty="0"/>
+          </a:p>
+          <a:p>
+            <a:endParaRPr lang="en-US" dirty="0"/>
+          </a:p>
+          <a:p>
+            <a:endParaRPr lang="en-US" dirty="0"/>
+          </a:p>
+        </p:txBody>
+      </p:sp>
+      <p:sp>
+        <p:nvSpPr>
+          <p:cNvPr id="4" name="Segnaposto numero diapositiva 3">
+            <a:extLst>
+              <a:ext uri="{FF2B5EF4-FFF2-40B4-BE49-F238E27FC236}">
+                <a16:creationId xmlns:a16="http://schemas.microsoft.com/office/drawing/2014/main" id="{3AC8F005-BD9B-4079-8221-323247795B72}"/>
+              </a:ext>
+            </a:extLst>
+          </p:cNvPr>
+          <p:cNvSpPr>
+            <a:spLocks noGrp="1"/>
+          </p:cNvSpPr>
+          <p:nvPr>
+            <p:ph type="sldNum" sz="quarter" idx="12"/>
+          </p:nvPr>
+        </p:nvSpPr>
+        <p:spPr>
+          <a:xfrm>
+            <a:off x="5115480" y="6362701"/>
+            <a:ext cx="6466921" cy="365125"/>
+          </a:xfrm>
+        </p:spPr>
+        <p:txBody>
+          <a:bodyPr>
+            <a:normAutofit/>
+          </a:bodyPr>
+          <a:lstStyle/>
+          <a:p>
+            <a:pPr>
+              <a:lnSpc>
+                <a:spcPct val="90000"/>
+              </a:lnSpc>
+              <a:spcAft>
+                <a:spcPts val="600"/>
+              </a:spcAft>
             </a:pPr>
-            <a:endParaRPr lang="it-IT" dirty="0"/>
-          </a:p>
-        </p:txBody>
-      </p:sp>
-      <p:sp>
-        <p:nvSpPr>
-          <p:cNvPr id="4" name="Segnaposto numero diapositiva 3">
-            <a:extLst>
-              <a:ext uri="{FF2B5EF4-FFF2-40B4-BE49-F238E27FC236}">
-                <a16:creationId xmlns:a16="http://schemas.microsoft.com/office/drawing/2014/main" id="{03697B47-D532-4C3A-837A-D2652252243F}"/>
-              </a:ext>
-            </a:extLst>
-          </p:cNvPr>
-          <p:cNvSpPr>
-            <a:spLocks noGrp="1"/>
-          </p:cNvSpPr>
-          <p:nvPr>
-            <p:ph type="sldNum" sz="quarter" idx="12"/>
-          </p:nvPr>
-        </p:nvSpPr>
-        <p:spPr/>
-        <p:txBody>
-          <a:bodyPr/>
-          <a:lstStyle/>
-          <a:p>
             <a:fld id="{D2040F39-7941-49A4-B48D-F201B18B6351}" type="slidenum">
               <a:rPr lang="it-IT" smtClean="0"/>
-              <a:pPr/>
+              <a:pPr>
+                <a:lnSpc>
+                  <a:spcPct val="90000"/>
+                </a:lnSpc>
+                <a:spcAft>
+                  <a:spcPts val="600"/>
+                </a:spcAft>
+              </a:pPr>
               <a:t>9</a:t>
             </a:fld>
-            <a:endParaRPr lang="it-IT" dirty="0"/>
+            <a:endParaRPr lang="it-IT"/>
           </a:p>
         </p:txBody>
       </p:sp>
     </p:spTree>
     <p:extLst>
       <p:ext uri="{BB962C8B-B14F-4D97-AF65-F5344CB8AC3E}">
-        <p14:creationId xmlns:p14="http://schemas.microsoft.com/office/powerpoint/2010/main" val="2130891845"/>
+        <p14:creationId xmlns:p14="http://schemas.microsoft.com/office/powerpoint/2010/main" val="1555829831"/>
       </p:ext>
     </p:extLst>
   </p:cSld>

</xml_diff>

<commit_message>
M2 -> FINISHED (updrage intro page, add SDK Manager page)
</commit_message>
<xml_diff>
--- a/slides/02 - Android Studio.pptx
+++ b/slides/02 - Android Studio.pptx
@@ -12,20 +12,21 @@
     <p:sldId id="263" r:id="rId6"/>
     <p:sldId id="264" r:id="rId7"/>
     <p:sldId id="265" r:id="rId8"/>
-    <p:sldId id="266" r:id="rId9"/>
-    <p:sldId id="276" r:id="rId10"/>
-    <p:sldId id="277" r:id="rId11"/>
-    <p:sldId id="278" r:id="rId12"/>
-    <p:sldId id="279" r:id="rId13"/>
-    <p:sldId id="268" r:id="rId14"/>
-    <p:sldId id="267" r:id="rId15"/>
-    <p:sldId id="269" r:id="rId16"/>
-    <p:sldId id="270" r:id="rId17"/>
-    <p:sldId id="271" r:id="rId18"/>
-    <p:sldId id="274" r:id="rId19"/>
-    <p:sldId id="272" r:id="rId20"/>
-    <p:sldId id="273" r:id="rId21"/>
-    <p:sldId id="275" r:id="rId22"/>
+    <p:sldId id="280" r:id="rId9"/>
+    <p:sldId id="266" r:id="rId10"/>
+    <p:sldId id="276" r:id="rId11"/>
+    <p:sldId id="277" r:id="rId12"/>
+    <p:sldId id="278" r:id="rId13"/>
+    <p:sldId id="279" r:id="rId14"/>
+    <p:sldId id="268" r:id="rId15"/>
+    <p:sldId id="267" r:id="rId16"/>
+    <p:sldId id="269" r:id="rId17"/>
+    <p:sldId id="270" r:id="rId18"/>
+    <p:sldId id="271" r:id="rId19"/>
+    <p:sldId id="274" r:id="rId20"/>
+    <p:sldId id="272" r:id="rId21"/>
+    <p:sldId id="273" r:id="rId22"/>
+    <p:sldId id="275" r:id="rId23"/>
   </p:sldIdLst>
   <p:sldSz cx="12192000" cy="6858000"/>
   <p:notesSz cx="6858000" cy="9144000"/>
@@ -346,7 +347,7 @@
           <a:p>
             <a:fld id="{E8D60466-74B7-40A2-BA8B-04EDC83C4333}" type="datetimeFigureOut">
               <a:rPr lang="it-IT" smtClean="0"/>
-              <a:t>27/11/2021</a:t>
+              <a:t>18/12/2021</a:t>
             </a:fld>
             <a:endParaRPr lang="it-IT"/>
           </a:p>
@@ -544,7 +545,7 @@
           <a:p>
             <a:fld id="{E8D60466-74B7-40A2-BA8B-04EDC83C4333}" type="datetimeFigureOut">
               <a:rPr lang="it-IT" smtClean="0"/>
-              <a:t>27/11/2021</a:t>
+              <a:t>18/12/2021</a:t>
             </a:fld>
             <a:endParaRPr lang="it-IT"/>
           </a:p>
@@ -752,7 +753,7 @@
           <a:p>
             <a:fld id="{E8D60466-74B7-40A2-BA8B-04EDC83C4333}" type="datetimeFigureOut">
               <a:rPr lang="it-IT" smtClean="0"/>
-              <a:t>27/11/2021</a:t>
+              <a:t>18/12/2021</a:t>
             </a:fld>
             <a:endParaRPr lang="it-IT"/>
           </a:p>
@@ -2817,7 +2818,7 @@
           <a:p>
             <a:fld id="{E8D60466-74B7-40A2-BA8B-04EDC83C4333}" type="datetimeFigureOut">
               <a:rPr lang="it-IT" smtClean="0"/>
-              <a:t>27/11/2021</a:t>
+              <a:t>18/12/2021</a:t>
             </a:fld>
             <a:endParaRPr lang="it-IT"/>
           </a:p>
@@ -3932,7 +3933,7 @@
           <a:p>
             <a:fld id="{E8D60466-74B7-40A2-BA8B-04EDC83C4333}" type="datetimeFigureOut">
               <a:rPr lang="it-IT" smtClean="0"/>
-              <a:t>27/11/2021</a:t>
+              <a:t>18/12/2021</a:t>
             </a:fld>
             <a:endParaRPr lang="it-IT"/>
           </a:p>
@@ -4197,7 +4198,7 @@
           <a:p>
             <a:fld id="{E8D60466-74B7-40A2-BA8B-04EDC83C4333}" type="datetimeFigureOut">
               <a:rPr lang="it-IT" smtClean="0"/>
-              <a:t>27/11/2021</a:t>
+              <a:t>18/12/2021</a:t>
             </a:fld>
             <a:endParaRPr lang="it-IT"/>
           </a:p>
@@ -4609,7 +4610,7 @@
           <a:p>
             <a:fld id="{E8D60466-74B7-40A2-BA8B-04EDC83C4333}" type="datetimeFigureOut">
               <a:rPr lang="it-IT" smtClean="0"/>
-              <a:t>27/11/2021</a:t>
+              <a:t>18/12/2021</a:t>
             </a:fld>
             <a:endParaRPr lang="it-IT"/>
           </a:p>
@@ -4750,7 +4751,7 @@
           <a:p>
             <a:fld id="{E8D60466-74B7-40A2-BA8B-04EDC83C4333}" type="datetimeFigureOut">
               <a:rPr lang="it-IT" smtClean="0"/>
-              <a:t>27/11/2021</a:t>
+              <a:t>18/12/2021</a:t>
             </a:fld>
             <a:endParaRPr lang="it-IT"/>
           </a:p>
@@ -4863,7 +4864,7 @@
           <a:p>
             <a:fld id="{E8D60466-74B7-40A2-BA8B-04EDC83C4333}" type="datetimeFigureOut">
               <a:rPr lang="it-IT" smtClean="0"/>
-              <a:t>27/11/2021</a:t>
+              <a:t>18/12/2021</a:t>
             </a:fld>
             <a:endParaRPr lang="it-IT"/>
           </a:p>
@@ -5174,7 +5175,7 @@
           <a:p>
             <a:fld id="{E8D60466-74B7-40A2-BA8B-04EDC83C4333}" type="datetimeFigureOut">
               <a:rPr lang="it-IT" smtClean="0"/>
-              <a:t>27/11/2021</a:t>
+              <a:t>18/12/2021</a:t>
             </a:fld>
             <a:endParaRPr lang="it-IT"/>
           </a:p>
@@ -5462,7 +5463,7 @@
           <a:p>
             <a:fld id="{E8D60466-74B7-40A2-BA8B-04EDC83C4333}" type="datetimeFigureOut">
               <a:rPr lang="it-IT" smtClean="0"/>
-              <a:t>27/11/2021</a:t>
+              <a:t>18/12/2021</a:t>
             </a:fld>
             <a:endParaRPr lang="it-IT"/>
           </a:p>
@@ -5703,7 +5704,7 @@
           <a:p>
             <a:fld id="{E8D60466-74B7-40A2-BA8B-04EDC83C4333}" type="datetimeFigureOut">
               <a:rPr lang="it-IT" smtClean="0"/>
-              <a:t>27/11/2021</a:t>
+              <a:t>18/12/2021</a:t>
             </a:fld>
             <a:endParaRPr lang="it-IT"/>
           </a:p>
@@ -6684,10 +6685,10 @@
       </p:grpSpPr>
       <p:sp>
         <p:nvSpPr>
-          <p:cNvPr id="2" name="Titolo 1">
-            <a:extLst>
-              <a:ext uri="{FF2B5EF4-FFF2-40B4-BE49-F238E27FC236}">
-                <a16:creationId xmlns:a16="http://schemas.microsoft.com/office/drawing/2014/main" id="{24FB8000-0918-4653-B2B9-944C31602BA6}"/>
+          <p:cNvPr id="10" name="Title 1">
+            <a:extLst>
+              <a:ext uri="{FF2B5EF4-FFF2-40B4-BE49-F238E27FC236}">
+                <a16:creationId xmlns:a16="http://schemas.microsoft.com/office/drawing/2014/main" id="{D22F39D5-63AA-47E8-882D-D9C86BB1F7B4}"/>
               </a:ext>
             </a:extLst>
           </p:cNvPr>
@@ -6698,116 +6699,36 @@
             <p:ph type="title"/>
           </p:nvPr>
         </p:nvSpPr>
-        <p:spPr/>
+        <p:spPr>
+          <a:xfrm>
+            <a:off x="609600" y="274638"/>
+            <a:ext cx="10972800" cy="1143000"/>
+          </a:xfrm>
+        </p:spPr>
         <p:txBody>
           <a:bodyPr/>
           <a:lstStyle/>
           <a:p>
             <a:r>
               <a:rPr lang="en-US" dirty="0"/>
-              <a:t>AVD Initialization (3)</a:t>
-            </a:r>
-            <a:endParaRPr lang="it-IT" dirty="0"/>
-          </a:p>
-        </p:txBody>
-      </p:sp>
-      <p:sp>
-        <p:nvSpPr>
-          <p:cNvPr id="4" name="Segnaposto contenuto 3">
-            <a:extLst>
-              <a:ext uri="{FF2B5EF4-FFF2-40B4-BE49-F238E27FC236}">
-                <a16:creationId xmlns:a16="http://schemas.microsoft.com/office/drawing/2014/main" id="{897F845C-7D6A-411F-8FA6-42CD50D1392D}"/>
-              </a:ext>
-            </a:extLst>
-          </p:cNvPr>
-          <p:cNvSpPr>
-            <a:spLocks noGrp="1"/>
-          </p:cNvSpPr>
-          <p:nvPr>
-            <p:ph sz="half" idx="2"/>
-          </p:nvPr>
-        </p:nvSpPr>
-        <p:spPr/>
-        <p:txBody>
-          <a:bodyPr/>
-          <a:lstStyle/>
-          <a:p>
-            <a:r>
-              <a:rPr lang="it-IT" dirty="0">
-                <a:solidFill>
-                  <a:srgbClr val="FF0000"/>
-                </a:solidFill>
-              </a:rPr>
-              <a:t>API Level </a:t>
-            </a:r>
-            <a:r>
-              <a:rPr lang="it-IT" dirty="0"/>
-              <a:t>(with </a:t>
-            </a:r>
-            <a:r>
-              <a:rPr lang="it-IT" dirty="0" err="1"/>
-              <a:t>related</a:t>
-            </a:r>
-            <a:r>
-              <a:rPr lang="it-IT" dirty="0"/>
-              <a:t> Android OS </a:t>
-            </a:r>
-            <a:r>
-              <a:rPr lang="it-IT" dirty="0" err="1"/>
-              <a:t>version</a:t>
-            </a:r>
-            <a:r>
-              <a:rPr lang="it-IT" dirty="0"/>
-              <a:t>)</a:t>
-            </a:r>
-          </a:p>
-        </p:txBody>
-      </p:sp>
-      <p:sp>
-        <p:nvSpPr>
-          <p:cNvPr id="5" name="Segnaposto numero diapositiva 4">
-            <a:extLst>
-              <a:ext uri="{FF2B5EF4-FFF2-40B4-BE49-F238E27FC236}">
-                <a16:creationId xmlns:a16="http://schemas.microsoft.com/office/drawing/2014/main" id="{5AB514FA-0475-483D-AEC7-C8FC586A278C}"/>
-              </a:ext>
-            </a:extLst>
-          </p:cNvPr>
-          <p:cNvSpPr>
-            <a:spLocks noGrp="1"/>
-          </p:cNvSpPr>
-          <p:nvPr>
-            <p:ph type="sldNum" sz="quarter" idx="12"/>
-          </p:nvPr>
-        </p:nvSpPr>
-        <p:spPr/>
-        <p:txBody>
-          <a:bodyPr/>
-          <a:lstStyle/>
-          <a:p>
-            <a:fld id="{D2040F39-7941-49A4-B48D-F201B18B6351}" type="slidenum">
-              <a:rPr lang="it-IT" smtClean="0"/>
-              <a:pPr/>
-              <a:t>10</a:t>
-            </a:fld>
-            <a:endParaRPr lang="it-IT" dirty="0"/>
+              <a:t>AVD Initialization (2)</a:t>
+            </a:r>
           </a:p>
         </p:txBody>
       </p:sp>
       <p:pic>
         <p:nvPicPr>
-          <p:cNvPr id="6" name="Segnaposto contenuto 5">
-            <a:extLst>
-              <a:ext uri="{FF2B5EF4-FFF2-40B4-BE49-F238E27FC236}">
-                <a16:creationId xmlns:a16="http://schemas.microsoft.com/office/drawing/2014/main" id="{9AFE46B0-744C-46EB-95FB-2E5B7D4D7922}"/>
+          <p:cNvPr id="5" name="Immagine 4">
+            <a:extLst>
+              <a:ext uri="{FF2B5EF4-FFF2-40B4-BE49-F238E27FC236}">
+                <a16:creationId xmlns:a16="http://schemas.microsoft.com/office/drawing/2014/main" id="{65BC8B0A-53ED-4890-85D2-7851A4AA3A6D}"/>
               </a:ext>
             </a:extLst>
           </p:cNvPr>
           <p:cNvPicPr>
-            <a:picLocks noGrp="1" noChangeAspect="1"/>
+            <a:picLocks noChangeAspect="1"/>
           </p:cNvPicPr>
-          <p:nvPr>
-            <p:ph sz="half" idx="1"/>
-          </p:nvPr>
+          <p:nvPr/>
         </p:nvPicPr>
         <p:blipFill>
           <a:blip r:embed="rId2"/>
@@ -6817,18 +6738,152 @@
         </p:blipFill>
         <p:spPr>
           <a:xfrm>
-            <a:off x="609600" y="1730438"/>
-            <a:ext cx="5384800" cy="4265487"/>
+            <a:off x="609600" y="1729456"/>
+            <a:ext cx="5384800" cy="4267453"/>
           </a:xfrm>
           <a:prstGeom prst="rect">
             <a:avLst/>
           </a:prstGeom>
+          <a:noFill/>
         </p:spPr>
       </p:pic>
+      <p:sp>
+        <p:nvSpPr>
+          <p:cNvPr id="12" name="Content Placeholder 3">
+            <a:extLst>
+              <a:ext uri="{FF2B5EF4-FFF2-40B4-BE49-F238E27FC236}">
+                <a16:creationId xmlns:a16="http://schemas.microsoft.com/office/drawing/2014/main" id="{B4B4DB28-9573-449E-977F-BE9445BB6892}"/>
+              </a:ext>
+            </a:extLst>
+          </p:cNvPr>
+          <p:cNvSpPr>
+            <a:spLocks noGrp="1"/>
+          </p:cNvSpPr>
+          <p:nvPr>
+            <p:ph sz="half" idx="2"/>
+          </p:nvPr>
+        </p:nvSpPr>
+        <p:spPr>
+          <a:xfrm>
+            <a:off x="6197600" y="1600201"/>
+            <a:ext cx="5384800" cy="4525963"/>
+          </a:xfrm>
+        </p:spPr>
+        <p:txBody>
+          <a:bodyPr/>
+          <a:lstStyle/>
+          <a:p>
+            <a:pPr marL="0" indent="0">
+              <a:buNone/>
+            </a:pPr>
+            <a:r>
+              <a:rPr lang="en-US" dirty="0"/>
+              <a:t>You can choose </a:t>
+            </a:r>
+          </a:p>
+          <a:p>
+            <a:r>
+              <a:rPr lang="en-US" dirty="0">
+                <a:solidFill>
+                  <a:srgbClr val="FF0000"/>
+                </a:solidFill>
+              </a:rPr>
+              <a:t>Type of AVD </a:t>
+            </a:r>
+            <a:r>
+              <a:rPr lang="en-US" dirty="0"/>
+              <a:t>(Wear, </a:t>
+            </a:r>
+            <a:r>
+              <a:rPr lang="en-US" dirty="0" err="1"/>
+              <a:t>Smarthphone</a:t>
+            </a:r>
+            <a:r>
+              <a:rPr lang="en-US" dirty="0"/>
+              <a:t>, Tablet, Tv and Automotive)</a:t>
+            </a:r>
+          </a:p>
+          <a:p>
+            <a:r>
+              <a:rPr lang="en-US" dirty="0">
+                <a:solidFill>
+                  <a:srgbClr val="FF0000"/>
+                </a:solidFill>
+              </a:rPr>
+              <a:t>Specific AVD </a:t>
+            </a:r>
+            <a:r>
+              <a:rPr lang="en-US" dirty="0"/>
+              <a:t>(e.g. from Google devices list) (is better choose  Play Store integrated AVD)</a:t>
+            </a:r>
+          </a:p>
+          <a:p>
+            <a:endParaRPr lang="en-US" dirty="0"/>
+          </a:p>
+          <a:p>
+            <a:endParaRPr lang="en-US" dirty="0"/>
+          </a:p>
+          <a:p>
+            <a:endParaRPr lang="en-US" dirty="0"/>
+          </a:p>
+        </p:txBody>
+      </p:sp>
+      <p:sp>
+        <p:nvSpPr>
+          <p:cNvPr id="4" name="Segnaposto numero diapositiva 3">
+            <a:extLst>
+              <a:ext uri="{FF2B5EF4-FFF2-40B4-BE49-F238E27FC236}">
+                <a16:creationId xmlns:a16="http://schemas.microsoft.com/office/drawing/2014/main" id="{3AC8F005-BD9B-4079-8221-323247795B72}"/>
+              </a:ext>
+            </a:extLst>
+          </p:cNvPr>
+          <p:cNvSpPr>
+            <a:spLocks noGrp="1"/>
+          </p:cNvSpPr>
+          <p:nvPr>
+            <p:ph type="sldNum" sz="quarter" idx="12"/>
+          </p:nvPr>
+        </p:nvSpPr>
+        <p:spPr>
+          <a:xfrm>
+            <a:off x="5115480" y="6362701"/>
+            <a:ext cx="6466921" cy="365125"/>
+          </a:xfrm>
+        </p:spPr>
+        <p:txBody>
+          <a:bodyPr>
+            <a:normAutofit/>
+          </a:bodyPr>
+          <a:lstStyle/>
+          <a:p>
+            <a:pPr>
+              <a:lnSpc>
+                <a:spcPct val="90000"/>
+              </a:lnSpc>
+              <a:spcAft>
+                <a:spcPts val="600"/>
+              </a:spcAft>
+            </a:pPr>
+            <a:fld id="{D2040F39-7941-49A4-B48D-F201B18B6351}" type="slidenum">
+              <a:rPr lang="it-IT" smtClean="0"/>
+              <a:pPr>
+                <a:lnSpc>
+                  <a:spcPct val="90000"/>
+                </a:lnSpc>
+                <a:spcAft>
+                  <a:spcPts val="600"/>
+                </a:spcAft>
+              </a:pPr>
+              <a:t>10</a:t>
+            </a:fld>
+            <a:endParaRPr lang="it-IT"/>
+          </a:p>
+        </p:txBody>
+      </p:sp>
     </p:spTree>
     <p:extLst>
       <p:ext uri="{BB962C8B-B14F-4D97-AF65-F5344CB8AC3E}">
-        <p14:creationId xmlns:p14="http://schemas.microsoft.com/office/powerpoint/2010/main" val="1180649231"/>
+        <p14:creationId xmlns:p14="http://schemas.microsoft.com/office/powerpoint/2010/main" val="1555829831"/>
       </p:ext>
     </p:extLst>
   </p:cSld>
@@ -6860,7 +6915,7 @@
           <p:cNvPr id="2" name="Titolo 1">
             <a:extLst>
               <a:ext uri="{FF2B5EF4-FFF2-40B4-BE49-F238E27FC236}">
-                <a16:creationId xmlns:a16="http://schemas.microsoft.com/office/drawing/2014/main" id="{11CEB84F-D9F4-41D7-80F0-507288F03961}"/>
+                <a16:creationId xmlns:a16="http://schemas.microsoft.com/office/drawing/2014/main" id="{24FB8000-0918-4653-B2B9-944C31602BA6}"/>
               </a:ext>
             </a:extLst>
           </p:cNvPr>
@@ -6878,7 +6933,7 @@
           <a:p>
             <a:r>
               <a:rPr lang="en-US" dirty="0"/>
-              <a:t>AVD Initialization (4)</a:t>
+              <a:t>AVD Initialization (3)</a:t>
             </a:r>
             <a:endParaRPr lang="it-IT" dirty="0"/>
           </a:p>
@@ -6889,7 +6944,7 @@
           <p:cNvPr id="4" name="Segnaposto contenuto 3">
             <a:extLst>
               <a:ext uri="{FF2B5EF4-FFF2-40B4-BE49-F238E27FC236}">
-                <a16:creationId xmlns:a16="http://schemas.microsoft.com/office/drawing/2014/main" id="{101437C4-8014-4941-BA0E-AC0A3D42098F}"/>
+                <a16:creationId xmlns:a16="http://schemas.microsoft.com/office/drawing/2014/main" id="{897F845C-7D6A-411F-8FA6-42CD50D1392D}"/>
               </a:ext>
             </a:extLst>
           </p:cNvPr>
@@ -6911,59 +6966,28 @@
                   <a:srgbClr val="FF0000"/>
                 </a:solidFill>
               </a:rPr>
-              <a:t>Name of AVD</a:t>
-            </a:r>
-          </a:p>
-          <a:p>
-            <a:r>
-              <a:rPr lang="it-IT" dirty="0" err="1">
-                <a:solidFill>
-                  <a:srgbClr val="FF0000"/>
-                </a:solidFill>
-              </a:rPr>
-              <a:t>Other</a:t>
-            </a:r>
-            <a:r>
-              <a:rPr lang="it-IT" dirty="0">
-                <a:solidFill>
-                  <a:srgbClr val="FF0000"/>
-                </a:solidFill>
-              </a:rPr>
-              <a:t>  technical </a:t>
-            </a:r>
-            <a:r>
-              <a:rPr lang="it-IT" dirty="0" err="1">
-                <a:solidFill>
-                  <a:srgbClr val="FF0000"/>
-                </a:solidFill>
-              </a:rPr>
-              <a:t>specifications</a:t>
-            </a:r>
-            <a:r>
-              <a:rPr lang="it-IT" dirty="0">
-                <a:solidFill>
-                  <a:srgbClr val="FF0000"/>
-                </a:solidFill>
-              </a:rPr>
-              <a:t> </a:t>
+              <a:t>API Level </a:t>
             </a:r>
             <a:r>
               <a:rPr lang="it-IT" dirty="0"/>
-              <a:t>(display </a:t>
+              <a:t>(with </a:t>
             </a:r>
             <a:r>
               <a:rPr lang="it-IT" dirty="0" err="1"/>
-              <a:t>resolution</a:t>
+              <a:t>related</a:t>
             </a:r>
             <a:r>
               <a:rPr lang="it-IT" dirty="0"/>
-              <a:t>…)</a:t>
-            </a:r>
-            <a:endParaRPr lang="it-IT" dirty="0">
-              <a:solidFill>
-                <a:srgbClr val="FF0000"/>
-              </a:solidFill>
-            </a:endParaRPr>
+              <a:t> Android OS </a:t>
+            </a:r>
+            <a:r>
+              <a:rPr lang="it-IT" dirty="0" err="1"/>
+              <a:t>version</a:t>
+            </a:r>
+            <a:r>
+              <a:rPr lang="it-IT" dirty="0"/>
+              <a:t>)</a:t>
+            </a:r>
           </a:p>
         </p:txBody>
       </p:sp>
@@ -6972,7 +6996,7 @@
           <p:cNvPr id="5" name="Segnaposto numero diapositiva 4">
             <a:extLst>
               <a:ext uri="{FF2B5EF4-FFF2-40B4-BE49-F238E27FC236}">
-                <a16:creationId xmlns:a16="http://schemas.microsoft.com/office/drawing/2014/main" id="{A6F1F0DF-3A57-462E-8C2A-2AB0FD0252AC}"/>
+                <a16:creationId xmlns:a16="http://schemas.microsoft.com/office/drawing/2014/main" id="{5AB514FA-0475-483D-AEC7-C8FC586A278C}"/>
               </a:ext>
             </a:extLst>
           </p:cNvPr>
@@ -7002,7 +7026,7 @@
           <p:cNvPr id="6" name="Segnaposto contenuto 5">
             <a:extLst>
               <a:ext uri="{FF2B5EF4-FFF2-40B4-BE49-F238E27FC236}">
-                <a16:creationId xmlns:a16="http://schemas.microsoft.com/office/drawing/2014/main" id="{A64D34A7-3957-4795-857C-A11F2BD8D947}"/>
+                <a16:creationId xmlns:a16="http://schemas.microsoft.com/office/drawing/2014/main" id="{9AFE46B0-744C-46EB-95FB-2E5B7D4D7922}"/>
               </a:ext>
             </a:extLst>
           </p:cNvPr>
@@ -7021,8 +7045,8 @@
         </p:blipFill>
         <p:spPr>
           <a:xfrm>
-            <a:off x="609600" y="1738170"/>
-            <a:ext cx="5384800" cy="4250022"/>
+            <a:off x="609600" y="1730438"/>
+            <a:ext cx="5384800" cy="4265487"/>
           </a:xfrm>
           <a:prstGeom prst="rect">
             <a:avLst/>
@@ -7032,7 +7056,7 @@
     </p:spTree>
     <p:extLst>
       <p:ext uri="{BB962C8B-B14F-4D97-AF65-F5344CB8AC3E}">
-        <p14:creationId xmlns:p14="http://schemas.microsoft.com/office/powerpoint/2010/main" val="335998119"/>
+        <p14:creationId xmlns:p14="http://schemas.microsoft.com/office/powerpoint/2010/main" val="1180649231"/>
       </p:ext>
     </p:extLst>
   </p:cSld>
@@ -7064,7 +7088,7 @@
           <p:cNvPr id="2" name="Titolo 1">
             <a:extLst>
               <a:ext uri="{FF2B5EF4-FFF2-40B4-BE49-F238E27FC236}">
-                <a16:creationId xmlns:a16="http://schemas.microsoft.com/office/drawing/2014/main" id="{97DD1A6E-48A6-4A64-9701-0CA9448B1108}"/>
+                <a16:creationId xmlns:a16="http://schemas.microsoft.com/office/drawing/2014/main" id="{11CEB84F-D9F4-41D7-80F0-507288F03961}"/>
               </a:ext>
             </a:extLst>
           </p:cNvPr>
@@ -7081,158 +7105,102 @@
           <a:lstStyle/>
           <a:p>
             <a:r>
+              <a:rPr lang="en-US" dirty="0"/>
+              <a:t>AVD Initialization (4)</a:t>
+            </a:r>
+            <a:endParaRPr lang="it-IT" dirty="0"/>
+          </a:p>
+        </p:txBody>
+      </p:sp>
+      <p:sp>
+        <p:nvSpPr>
+          <p:cNvPr id="4" name="Segnaposto contenuto 3">
+            <a:extLst>
+              <a:ext uri="{FF2B5EF4-FFF2-40B4-BE49-F238E27FC236}">
+                <a16:creationId xmlns:a16="http://schemas.microsoft.com/office/drawing/2014/main" id="{101437C4-8014-4941-BA0E-AC0A3D42098F}"/>
+              </a:ext>
+            </a:extLst>
+          </p:cNvPr>
+          <p:cNvSpPr>
+            <a:spLocks noGrp="1"/>
+          </p:cNvSpPr>
+          <p:nvPr>
+            <p:ph sz="half" idx="2"/>
+          </p:nvPr>
+        </p:nvSpPr>
+        <p:spPr/>
+        <p:txBody>
+          <a:bodyPr/>
+          <a:lstStyle/>
+          <a:p>
+            <a:r>
+              <a:rPr lang="it-IT" dirty="0">
+                <a:solidFill>
+                  <a:srgbClr val="FF0000"/>
+                </a:solidFill>
+              </a:rPr>
+              <a:t>Name of AVD</a:t>
+            </a:r>
+          </a:p>
+          <a:p>
+            <a:r>
+              <a:rPr lang="it-IT" dirty="0" err="1">
+                <a:solidFill>
+                  <a:srgbClr val="FF0000"/>
+                </a:solidFill>
+              </a:rPr>
+              <a:t>Other</a:t>
+            </a:r>
+            <a:r>
+              <a:rPr lang="it-IT" dirty="0">
+                <a:solidFill>
+                  <a:srgbClr val="FF0000"/>
+                </a:solidFill>
+              </a:rPr>
+              <a:t>  technical </a:t>
+            </a:r>
+            <a:r>
+              <a:rPr lang="it-IT" dirty="0" err="1">
+                <a:solidFill>
+                  <a:srgbClr val="FF0000"/>
+                </a:solidFill>
+              </a:rPr>
+              <a:t>specifications</a:t>
+            </a:r>
+            <a:r>
+              <a:rPr lang="it-IT" dirty="0">
+                <a:solidFill>
+                  <a:srgbClr val="FF0000"/>
+                </a:solidFill>
+              </a:rPr>
+              <a:t> </a:t>
+            </a:r>
+            <a:r>
+              <a:rPr lang="it-IT" dirty="0"/>
+              <a:t>(display </a:t>
+            </a:r>
+            <a:r>
               <a:rPr lang="it-IT" dirty="0" err="1"/>
-              <a:t>Run</a:t>
+              <a:t>resolution</a:t>
             </a:r>
             <a:r>
               <a:rPr lang="it-IT" dirty="0"/>
-              <a:t>/Debug in </a:t>
-            </a:r>
-            <a:r>
-              <a:rPr lang="it-IT" dirty="0" err="1"/>
-              <a:t>real</a:t>
-            </a:r>
-            <a:r>
-              <a:rPr lang="it-IT" dirty="0"/>
-              <a:t> device</a:t>
-            </a:r>
-          </a:p>
-        </p:txBody>
-      </p:sp>
-      <p:sp>
-        <p:nvSpPr>
-          <p:cNvPr id="3" name="Segnaposto contenuto 2">
-            <a:extLst>
-              <a:ext uri="{FF2B5EF4-FFF2-40B4-BE49-F238E27FC236}">
-                <a16:creationId xmlns:a16="http://schemas.microsoft.com/office/drawing/2014/main" id="{3CE613F0-FD57-4722-90F9-11098F329BD1}"/>
-              </a:ext>
-            </a:extLst>
-          </p:cNvPr>
-          <p:cNvSpPr>
-            <a:spLocks noGrp="1"/>
-          </p:cNvSpPr>
-          <p:nvPr>
-            <p:ph idx="1"/>
-          </p:nvPr>
-        </p:nvSpPr>
-        <p:spPr/>
-        <p:txBody>
-          <a:bodyPr/>
-          <a:lstStyle/>
-          <a:p>
-            <a:r>
-              <a:rPr lang="it-IT" sz="2800" dirty="0" err="1"/>
-              <a:t>Activate</a:t>
-            </a:r>
-            <a:r>
-              <a:rPr lang="it-IT" sz="2800" dirty="0"/>
-              <a:t> ADB (Android Debug Bridge) on target device (</a:t>
-            </a:r>
-            <a:r>
-              <a:rPr lang="it-IT" sz="2800" dirty="0" err="1"/>
-              <a:t>only</a:t>
-            </a:r>
-            <a:r>
-              <a:rPr lang="it-IT" sz="2800" dirty="0"/>
-              <a:t> on Android 6.0 or </a:t>
-            </a:r>
-            <a:r>
-              <a:rPr lang="it-IT" sz="2800" dirty="0" err="1"/>
-              <a:t>higher</a:t>
-            </a:r>
-            <a:r>
-              <a:rPr lang="it-IT" sz="2800" dirty="0"/>
-              <a:t>)</a:t>
-            </a:r>
-          </a:p>
-          <a:p>
-            <a:pPr lvl="1"/>
-            <a:r>
-              <a:rPr lang="en-US" sz="2400" i="1" dirty="0"/>
-              <a:t>Settings -&gt; About Phone/Tablet -&gt; Software Information</a:t>
-            </a:r>
-          </a:p>
-          <a:p>
-            <a:pPr lvl="1"/>
-            <a:r>
-              <a:rPr lang="en-US" sz="2400" dirty="0"/>
-              <a:t>Tap on </a:t>
-            </a:r>
-            <a:r>
-              <a:rPr lang="en-US" sz="2400" i="1" dirty="0"/>
-              <a:t>Build number </a:t>
-            </a:r>
-            <a:r>
-              <a:rPr lang="en-US" sz="2400" dirty="0"/>
-              <a:t>field seven times (a message appears indicating that developer mode has been enabled)</a:t>
-            </a:r>
-          </a:p>
-          <a:p>
-            <a:pPr lvl="1"/>
-            <a:r>
-              <a:rPr lang="en-US" sz="2400" dirty="0"/>
-              <a:t>Go to </a:t>
-            </a:r>
-            <a:r>
-              <a:rPr lang="en-US" sz="2400" i="1" dirty="0"/>
-              <a:t>Settings</a:t>
-            </a:r>
-            <a:r>
-              <a:rPr lang="en-US" sz="2400" dirty="0"/>
-              <a:t> page and now appears </a:t>
-            </a:r>
-            <a:r>
-              <a:rPr lang="en-US" sz="2400" i="1" dirty="0"/>
-              <a:t>Developer options</a:t>
-            </a:r>
-          </a:p>
-          <a:p>
-            <a:pPr lvl="1"/>
-            <a:r>
-              <a:rPr lang="en-US" sz="2400" dirty="0"/>
-              <a:t>Switch on </a:t>
-            </a:r>
-            <a:r>
-              <a:rPr lang="en-US" sz="2400" i="1" dirty="0"/>
-              <a:t>USB debugging </a:t>
-            </a:r>
-            <a:r>
-              <a:rPr lang="en-US" sz="2400" dirty="0"/>
-              <a:t>option</a:t>
-            </a:r>
-            <a:endParaRPr lang="it-IT" sz="2400" dirty="0"/>
-          </a:p>
-          <a:p>
-            <a:r>
-              <a:rPr lang="it-IT" sz="2800" dirty="0"/>
-              <a:t>Connect to PC with USB, device </a:t>
-            </a:r>
-            <a:r>
-              <a:rPr lang="it-IT" sz="2800" dirty="0" err="1"/>
-              <a:t>will</a:t>
-            </a:r>
-            <a:r>
-              <a:rPr lang="it-IT" sz="2800" dirty="0"/>
-              <a:t> </a:t>
-            </a:r>
-            <a:r>
-              <a:rPr lang="it-IT" sz="2800" dirty="0" err="1"/>
-              <a:t>appear</a:t>
-            </a:r>
-            <a:r>
-              <a:rPr lang="it-IT" sz="2800" dirty="0"/>
-              <a:t> in Android Studio devices list</a:t>
-            </a:r>
-            <a:endParaRPr lang="en-US" sz="2800" dirty="0"/>
-          </a:p>
-        </p:txBody>
-      </p:sp>
-      <p:sp>
-        <p:nvSpPr>
-          <p:cNvPr id="4" name="Segnaposto numero diapositiva 3">
-            <a:extLst>
-              <a:ext uri="{FF2B5EF4-FFF2-40B4-BE49-F238E27FC236}">
-                <a16:creationId xmlns:a16="http://schemas.microsoft.com/office/drawing/2014/main" id="{D76CDC0E-8C87-4D48-93CC-B2186DF0CC16}"/>
+              <a:t>…)</a:t>
+            </a:r>
+            <a:endParaRPr lang="it-IT" dirty="0">
+              <a:solidFill>
+                <a:srgbClr val="FF0000"/>
+              </a:solidFill>
+            </a:endParaRPr>
+          </a:p>
+        </p:txBody>
+      </p:sp>
+      <p:sp>
+        <p:nvSpPr>
+          <p:cNvPr id="5" name="Segnaposto numero diapositiva 4">
+            <a:extLst>
+              <a:ext uri="{FF2B5EF4-FFF2-40B4-BE49-F238E27FC236}">
+                <a16:creationId xmlns:a16="http://schemas.microsoft.com/office/drawing/2014/main" id="{A6F1F0DF-3A57-462E-8C2A-2AB0FD0252AC}"/>
               </a:ext>
             </a:extLst>
           </p:cNvPr>
@@ -7257,10 +7225,42 @@
           </a:p>
         </p:txBody>
       </p:sp>
+      <p:pic>
+        <p:nvPicPr>
+          <p:cNvPr id="6" name="Segnaposto contenuto 5">
+            <a:extLst>
+              <a:ext uri="{FF2B5EF4-FFF2-40B4-BE49-F238E27FC236}">
+                <a16:creationId xmlns:a16="http://schemas.microsoft.com/office/drawing/2014/main" id="{A64D34A7-3957-4795-857C-A11F2BD8D947}"/>
+              </a:ext>
+            </a:extLst>
+          </p:cNvPr>
+          <p:cNvPicPr>
+            <a:picLocks noGrp="1" noChangeAspect="1"/>
+          </p:cNvPicPr>
+          <p:nvPr>
+            <p:ph sz="half" idx="1"/>
+          </p:nvPr>
+        </p:nvPicPr>
+        <p:blipFill>
+          <a:blip r:embed="rId2"/>
+          <a:stretch>
+            <a:fillRect/>
+          </a:stretch>
+        </p:blipFill>
+        <p:spPr>
+          <a:xfrm>
+            <a:off x="609600" y="1738170"/>
+            <a:ext cx="5384800" cy="4250022"/>
+          </a:xfrm>
+          <a:prstGeom prst="rect">
+            <a:avLst/>
+          </a:prstGeom>
+        </p:spPr>
+      </p:pic>
     </p:spTree>
     <p:extLst>
       <p:ext uri="{BB962C8B-B14F-4D97-AF65-F5344CB8AC3E}">
-        <p14:creationId xmlns:p14="http://schemas.microsoft.com/office/powerpoint/2010/main" val="2217072517"/>
+        <p14:creationId xmlns:p14="http://schemas.microsoft.com/office/powerpoint/2010/main" val="335998119"/>
       </p:ext>
     </p:extLst>
   </p:cSld>
@@ -7292,7 +7292,7 @@
           <p:cNvPr id="2" name="Titolo 1">
             <a:extLst>
               <a:ext uri="{FF2B5EF4-FFF2-40B4-BE49-F238E27FC236}">
-                <a16:creationId xmlns:a16="http://schemas.microsoft.com/office/drawing/2014/main" id="{845908A6-95BF-4881-AB3C-D754E8EAD6EA}"/>
+                <a16:creationId xmlns:a16="http://schemas.microsoft.com/office/drawing/2014/main" id="{97DD1A6E-48A6-4A64-9701-0CA9448B1108}"/>
               </a:ext>
             </a:extLst>
           </p:cNvPr>
@@ -7309,8 +7309,20 @@
           <a:lstStyle/>
           <a:p>
             <a:r>
+              <a:rPr lang="it-IT" dirty="0" err="1"/>
+              <a:t>Run</a:t>
+            </a:r>
+            <a:r>
               <a:rPr lang="it-IT" dirty="0"/>
-              <a:t>Import from VCS</a:t>
+              <a:t>/Debug in </a:t>
+            </a:r>
+            <a:r>
+              <a:rPr lang="it-IT" dirty="0" err="1"/>
+              <a:t>real</a:t>
+            </a:r>
+            <a:r>
+              <a:rPr lang="it-IT" dirty="0"/>
+              <a:t> device</a:t>
             </a:r>
           </a:p>
         </p:txBody>
@@ -7320,7 +7332,7 @@
           <p:cNvPr id="3" name="Segnaposto contenuto 2">
             <a:extLst>
               <a:ext uri="{FF2B5EF4-FFF2-40B4-BE49-F238E27FC236}">
-                <a16:creationId xmlns:a16="http://schemas.microsoft.com/office/drawing/2014/main" id="{17D6AED0-3C26-4E11-A37C-C299F9B4A582}"/>
+                <a16:creationId xmlns:a16="http://schemas.microsoft.com/office/drawing/2014/main" id="{3CE613F0-FD57-4722-90F9-11098F329BD1}"/>
               </a:ext>
             </a:extLst>
           </p:cNvPr>
@@ -7337,63 +7349,129 @@
           <a:lstStyle/>
           <a:p>
             <a:r>
-              <a:rPr lang="it-IT" dirty="0"/>
-              <a:t>Android Studio </a:t>
-            </a:r>
-            <a:r>
-              <a:rPr lang="it-IT" dirty="0" err="1"/>
-              <a:t>has</a:t>
-            </a:r>
-            <a:r>
-              <a:rPr lang="it-IT" dirty="0"/>
-              <a:t> GitHub plugin</a:t>
-            </a:r>
-          </a:p>
-          <a:p>
-            <a:r>
-              <a:rPr lang="it-IT" dirty="0"/>
-              <a:t>Clone repository on </a:t>
-            </a:r>
-            <a:r>
-              <a:rPr lang="it-IT" dirty="0" err="1"/>
-              <a:t>your</a:t>
-            </a:r>
-            <a:r>
-              <a:rPr lang="it-IT" dirty="0"/>
-              <a:t> PC</a:t>
-            </a:r>
-          </a:p>
-          <a:p>
-            <a:r>
-              <a:rPr lang="it-IT" dirty="0"/>
-              <a:t>Open code project directory from Android Studio</a:t>
-            </a:r>
-          </a:p>
-          <a:p>
-            <a:r>
-              <a:rPr lang="it-IT" dirty="0"/>
-              <a:t>GitHub tools </a:t>
-            </a:r>
-            <a:r>
-              <a:rPr lang="it-IT" dirty="0" err="1"/>
+              <a:rPr lang="it-IT" sz="2800" dirty="0" err="1"/>
+              <a:t>Activate</a:t>
+            </a:r>
+            <a:r>
+              <a:rPr lang="it-IT" sz="2800" dirty="0"/>
+              <a:t> ADB (Android Debug Bridge) on target device (</a:t>
+            </a:r>
+            <a:r>
+              <a:rPr lang="it-IT" sz="2800" dirty="0" err="1"/>
+              <a:t>only</a:t>
+            </a:r>
+            <a:r>
+              <a:rPr lang="it-IT" sz="2800" dirty="0"/>
+              <a:t> on Android 6.0 or </a:t>
+            </a:r>
+            <a:r>
+              <a:rPr lang="it-IT" sz="2800" dirty="0" err="1"/>
+              <a:t>higher</a:t>
+            </a:r>
+            <a:r>
+              <a:rPr lang="it-IT" sz="2800" dirty="0"/>
+              <a:t>)</a:t>
+            </a:r>
+          </a:p>
+          <a:p>
+            <a:pPr lvl="1"/>
+            <a:r>
+              <a:rPr lang="en-US" sz="2400" i="1" dirty="0"/>
+              <a:t>Settings </a:t>
+            </a:r>
+            <a:r>
+              <a:rPr lang="en-US" sz="2400" i="1" dirty="0">
+                <a:sym typeface="Wingdings" panose="05000000000000000000" pitchFamily="2" charset="2"/>
+              </a:rPr>
+              <a:t></a:t>
+            </a:r>
+            <a:r>
+              <a:rPr lang="en-US" sz="2400" i="1" dirty="0"/>
+              <a:t> About Phone/Tablet </a:t>
+            </a:r>
+            <a:r>
+              <a:rPr lang="en-US" sz="2400" i="1" dirty="0">
+                <a:sym typeface="Wingdings" panose="05000000000000000000" pitchFamily="2" charset="2"/>
+              </a:rPr>
+              <a:t></a:t>
+            </a:r>
+            <a:r>
+              <a:rPr lang="en-US" sz="2400" i="1" dirty="0"/>
+              <a:t> Software Information</a:t>
+            </a:r>
+          </a:p>
+          <a:p>
+            <a:pPr lvl="1"/>
+            <a:r>
+              <a:rPr lang="en-US" sz="2400" dirty="0"/>
+              <a:t>Tap on </a:t>
+            </a:r>
+            <a:r>
+              <a:rPr lang="en-US" sz="2400" i="1" dirty="0"/>
+              <a:t>Build number </a:t>
+            </a:r>
+            <a:r>
+              <a:rPr lang="en-US" sz="2400" dirty="0"/>
+              <a:t>field seven times (a message appears indicating that developer mode has been enabled)</a:t>
+            </a:r>
+          </a:p>
+          <a:p>
+            <a:pPr lvl="1"/>
+            <a:r>
+              <a:rPr lang="en-US" sz="2400" dirty="0"/>
+              <a:t>Go to </a:t>
+            </a:r>
+            <a:r>
+              <a:rPr lang="en-US" sz="2400" i="1" dirty="0"/>
+              <a:t>Settings</a:t>
+            </a:r>
+            <a:r>
+              <a:rPr lang="en-US" sz="2400" dirty="0"/>
+              <a:t> page and now appears </a:t>
+            </a:r>
+            <a:r>
+              <a:rPr lang="en-US" sz="2400" i="1" dirty="0"/>
+              <a:t>Developer options</a:t>
+            </a:r>
+          </a:p>
+          <a:p>
+            <a:pPr lvl="1"/>
+            <a:r>
+              <a:rPr lang="en-US" sz="2400" dirty="0"/>
+              <a:t>Switch on </a:t>
+            </a:r>
+            <a:r>
+              <a:rPr lang="en-US" sz="2400" i="1" dirty="0"/>
+              <a:t>USB debugging </a:t>
+            </a:r>
+            <a:r>
+              <a:rPr lang="en-US" sz="2400" dirty="0"/>
+              <a:t>option</a:t>
+            </a:r>
+            <a:endParaRPr lang="it-IT" sz="2400" dirty="0"/>
+          </a:p>
+          <a:p>
+            <a:r>
+              <a:rPr lang="it-IT" sz="2800" dirty="0"/>
+              <a:t>Connect to PC with USB, device </a:t>
+            </a:r>
+            <a:r>
+              <a:rPr lang="it-IT" sz="2800" dirty="0" err="1"/>
+              <a:t>will</a:t>
+            </a:r>
+            <a:r>
+              <a:rPr lang="it-IT" sz="2800" dirty="0"/>
+              <a:t> </a:t>
+            </a:r>
+            <a:r>
+              <a:rPr lang="it-IT" sz="2800" dirty="0" err="1"/>
               <a:t>appear</a:t>
             </a:r>
             <a:r>
-              <a:rPr lang="it-IT" dirty="0"/>
-              <a:t> in Android Studio</a:t>
-            </a:r>
-          </a:p>
-          <a:p>
-            <a:pPr marL="0" indent="0">
-              <a:buNone/>
-            </a:pPr>
-            <a:endParaRPr lang="it-IT" dirty="0"/>
-          </a:p>
-          <a:p>
-            <a:pPr marL="0" indent="0">
-              <a:buNone/>
-            </a:pPr>
-            <a:endParaRPr lang="it-IT" dirty="0"/>
+              <a:rPr lang="it-IT" sz="2800" dirty="0"/>
+              <a:t> in Android Studio devices list</a:t>
+            </a:r>
+            <a:endParaRPr lang="en-US" sz="2800" dirty="0"/>
           </a:p>
         </p:txBody>
       </p:sp>
@@ -7402,7 +7480,7 @@
           <p:cNvPr id="4" name="Segnaposto numero diapositiva 3">
             <a:extLst>
               <a:ext uri="{FF2B5EF4-FFF2-40B4-BE49-F238E27FC236}">
-                <a16:creationId xmlns:a16="http://schemas.microsoft.com/office/drawing/2014/main" id="{03697B47-D532-4C3A-837A-D2652252243F}"/>
+                <a16:creationId xmlns:a16="http://schemas.microsoft.com/office/drawing/2014/main" id="{D76CDC0E-8C87-4D48-93CC-B2186DF0CC16}"/>
               </a:ext>
             </a:extLst>
           </p:cNvPr>
@@ -7430,7 +7508,7 @@
     </p:spTree>
     <p:extLst>
       <p:ext uri="{BB962C8B-B14F-4D97-AF65-F5344CB8AC3E}">
-        <p14:creationId xmlns:p14="http://schemas.microsoft.com/office/powerpoint/2010/main" val="2130891845"/>
+        <p14:creationId xmlns:p14="http://schemas.microsoft.com/office/powerpoint/2010/main" val="2217072517"/>
       </p:ext>
     </p:extLst>
   </p:cSld>
@@ -7462,7 +7540,7 @@
           <p:cNvPr id="2" name="Titolo 1">
             <a:extLst>
               <a:ext uri="{FF2B5EF4-FFF2-40B4-BE49-F238E27FC236}">
-                <a16:creationId xmlns:a16="http://schemas.microsoft.com/office/drawing/2014/main" id="{4A8F1979-42A0-45A5-B3FF-E873E2E24620}"/>
+                <a16:creationId xmlns:a16="http://schemas.microsoft.com/office/drawing/2014/main" id="{845908A6-95BF-4881-AB3C-D754E8EAD6EA}"/>
               </a:ext>
             </a:extLst>
           </p:cNvPr>
@@ -7480,8 +7558,90 @@
           <a:p>
             <a:r>
               <a:rPr lang="it-IT" dirty="0"/>
-              <a:t>GitHub tools</a:t>
-            </a:r>
+              <a:t>Import from VCS</a:t>
+            </a:r>
+          </a:p>
+        </p:txBody>
+      </p:sp>
+      <p:sp>
+        <p:nvSpPr>
+          <p:cNvPr id="3" name="Segnaposto contenuto 2">
+            <a:extLst>
+              <a:ext uri="{FF2B5EF4-FFF2-40B4-BE49-F238E27FC236}">
+                <a16:creationId xmlns:a16="http://schemas.microsoft.com/office/drawing/2014/main" id="{17D6AED0-3C26-4E11-A37C-C299F9B4A582}"/>
+              </a:ext>
+            </a:extLst>
+          </p:cNvPr>
+          <p:cNvSpPr>
+            <a:spLocks noGrp="1"/>
+          </p:cNvSpPr>
+          <p:nvPr>
+            <p:ph idx="1"/>
+          </p:nvPr>
+        </p:nvSpPr>
+        <p:spPr/>
+        <p:txBody>
+          <a:bodyPr/>
+          <a:lstStyle/>
+          <a:p>
+            <a:r>
+              <a:rPr lang="it-IT" dirty="0"/>
+              <a:t>Android Studio </a:t>
+            </a:r>
+            <a:r>
+              <a:rPr lang="it-IT" dirty="0" err="1"/>
+              <a:t>has</a:t>
+            </a:r>
+            <a:r>
+              <a:rPr lang="it-IT" dirty="0"/>
+              <a:t> GitHub plugin</a:t>
+            </a:r>
+          </a:p>
+          <a:p>
+            <a:r>
+              <a:rPr lang="it-IT" dirty="0"/>
+              <a:t>Clone repository on </a:t>
+            </a:r>
+            <a:r>
+              <a:rPr lang="it-IT" dirty="0" err="1"/>
+              <a:t>your</a:t>
+            </a:r>
+            <a:r>
+              <a:rPr lang="it-IT" dirty="0"/>
+              <a:t> PC</a:t>
+            </a:r>
+          </a:p>
+          <a:p>
+            <a:r>
+              <a:rPr lang="it-IT" dirty="0"/>
+              <a:t>Open code project directory from Android Studio</a:t>
+            </a:r>
+          </a:p>
+          <a:p>
+            <a:r>
+              <a:rPr lang="it-IT" dirty="0"/>
+              <a:t>GitHub tools </a:t>
+            </a:r>
+            <a:r>
+              <a:rPr lang="it-IT" dirty="0" err="1"/>
+              <a:t>appear</a:t>
+            </a:r>
+            <a:r>
+              <a:rPr lang="it-IT" dirty="0"/>
+              <a:t> in Android Studio</a:t>
+            </a:r>
+          </a:p>
+          <a:p>
+            <a:pPr marL="0" indent="0">
+              <a:buNone/>
+            </a:pPr>
+            <a:endParaRPr lang="it-IT" dirty="0"/>
+          </a:p>
+          <a:p>
+            <a:pPr marL="0" indent="0">
+              <a:buNone/>
+            </a:pPr>
+            <a:endParaRPr lang="it-IT" dirty="0"/>
           </a:p>
         </p:txBody>
       </p:sp>
@@ -7490,7 +7650,7 @@
           <p:cNvPr id="4" name="Segnaposto numero diapositiva 3">
             <a:extLst>
               <a:ext uri="{FF2B5EF4-FFF2-40B4-BE49-F238E27FC236}">
-                <a16:creationId xmlns:a16="http://schemas.microsoft.com/office/drawing/2014/main" id="{4AEB25EF-CB47-4915-89D1-A5845A3D72EB}"/>
+                <a16:creationId xmlns:a16="http://schemas.microsoft.com/office/drawing/2014/main" id="{03697B47-D532-4C3A-837A-D2652252243F}"/>
               </a:ext>
             </a:extLst>
           </p:cNvPr>
@@ -7515,225 +7675,10 @@
           </a:p>
         </p:txBody>
       </p:sp>
-      <p:pic>
-        <p:nvPicPr>
-          <p:cNvPr id="5" name="Segnaposto contenuto 4">
-            <a:extLst>
-              <a:ext uri="{FF2B5EF4-FFF2-40B4-BE49-F238E27FC236}">
-                <a16:creationId xmlns:a16="http://schemas.microsoft.com/office/drawing/2014/main" id="{B6D3546A-E625-4B16-9649-1A3A25E15EFF}"/>
-              </a:ext>
-            </a:extLst>
-          </p:cNvPr>
-          <p:cNvPicPr>
-            <a:picLocks noGrp="1" noChangeAspect="1"/>
-          </p:cNvPicPr>
-          <p:nvPr>
-            <p:ph idx="1"/>
-          </p:nvPr>
-        </p:nvPicPr>
-        <p:blipFill rotWithShape="1">
-          <a:blip r:embed="rId2"/>
-          <a:srcRect l="-1" r="-1"/>
-          <a:stretch/>
-        </p:blipFill>
-        <p:spPr>
-          <a:xfrm>
-            <a:off x="1466126" y="1433887"/>
-            <a:ext cx="9259747" cy="4953239"/>
-          </a:xfrm>
-          <a:prstGeom prst="rect">
-            <a:avLst/>
-          </a:prstGeom>
-        </p:spPr>
-      </p:pic>
-      <p:sp>
-        <p:nvSpPr>
-          <p:cNvPr id="8" name="Freccia a destra 7">
-            <a:extLst>
-              <a:ext uri="{FF2B5EF4-FFF2-40B4-BE49-F238E27FC236}">
-                <a16:creationId xmlns:a16="http://schemas.microsoft.com/office/drawing/2014/main" id="{8815035C-7AC3-4546-A16A-FF185C71C239}"/>
-              </a:ext>
-            </a:extLst>
-          </p:cNvPr>
-          <p:cNvSpPr/>
-          <p:nvPr/>
-        </p:nvSpPr>
-        <p:spPr>
-          <a:xfrm rot="16200000">
-            <a:off x="8712845" y="1976456"/>
-            <a:ext cx="636608" cy="549800"/>
-          </a:xfrm>
-          <a:prstGeom prst="rightArrow">
-            <a:avLst/>
-          </a:prstGeom>
-          <a:noFill/>
-          <a:ln w="28575"/>
-        </p:spPr>
-        <p:style>
-          <a:lnRef idx="1">
-            <a:schemeClr val="accent1"/>
-          </a:lnRef>
-          <a:fillRef idx="3">
-            <a:schemeClr val="accent1"/>
-          </a:fillRef>
-          <a:effectRef idx="2">
-            <a:schemeClr val="accent1"/>
-          </a:effectRef>
-          <a:fontRef idx="minor">
-            <a:schemeClr val="lt1"/>
-          </a:fontRef>
-        </p:style>
-        <p:txBody>
-          <a:bodyPr rtlCol="0" anchor="ctr"/>
-          <a:lstStyle/>
-          <a:p>
-            <a:pPr algn="ctr"/>
-            <a:endParaRPr lang="it-IT"/>
-          </a:p>
-        </p:txBody>
-      </p:sp>
-      <p:sp>
-        <p:nvSpPr>
-          <p:cNvPr id="9" name="Freccia a destra 8">
-            <a:extLst>
-              <a:ext uri="{FF2B5EF4-FFF2-40B4-BE49-F238E27FC236}">
-                <a16:creationId xmlns:a16="http://schemas.microsoft.com/office/drawing/2014/main" id="{12E6E2CA-0D2B-4843-926E-88A4BACF3690}"/>
-              </a:ext>
-            </a:extLst>
-          </p:cNvPr>
-          <p:cNvSpPr/>
-          <p:nvPr/>
-        </p:nvSpPr>
-        <p:spPr>
-          <a:xfrm rot="10800000">
-            <a:off x="1694731" y="2367904"/>
-            <a:ext cx="636608" cy="549800"/>
-          </a:xfrm>
-          <a:prstGeom prst="rightArrow">
-            <a:avLst/>
-          </a:prstGeom>
-          <a:noFill/>
-          <a:ln w="28575"/>
-        </p:spPr>
-        <p:style>
-          <a:lnRef idx="1">
-            <a:schemeClr val="accent1"/>
-          </a:lnRef>
-          <a:fillRef idx="3">
-            <a:schemeClr val="accent1"/>
-          </a:fillRef>
-          <a:effectRef idx="2">
-            <a:schemeClr val="accent1"/>
-          </a:effectRef>
-          <a:fontRef idx="minor">
-            <a:schemeClr val="lt1"/>
-          </a:fontRef>
-        </p:style>
-        <p:txBody>
-          <a:bodyPr rtlCol="0" anchor="ctr"/>
-          <a:lstStyle/>
-          <a:p>
-            <a:pPr algn="ctr"/>
-            <a:endParaRPr lang="it-IT"/>
-          </a:p>
-        </p:txBody>
-      </p:sp>
-      <p:sp>
-        <p:nvSpPr>
-          <p:cNvPr id="10" name="Freccia a destra 9">
-            <a:extLst>
-              <a:ext uri="{FF2B5EF4-FFF2-40B4-BE49-F238E27FC236}">
-                <a16:creationId xmlns:a16="http://schemas.microsoft.com/office/drawing/2014/main" id="{BA8054ED-0A22-4074-817A-05180BFE574B}"/>
-              </a:ext>
-            </a:extLst>
-          </p:cNvPr>
-          <p:cNvSpPr/>
-          <p:nvPr/>
-        </p:nvSpPr>
-        <p:spPr>
-          <a:xfrm rot="5400000">
-            <a:off x="2276882" y="5312338"/>
-            <a:ext cx="645207" cy="536293"/>
-          </a:xfrm>
-          <a:prstGeom prst="rightArrow">
-            <a:avLst/>
-          </a:prstGeom>
-          <a:noFill/>
-          <a:ln w="28575"/>
-        </p:spPr>
-        <p:style>
-          <a:lnRef idx="1">
-            <a:schemeClr val="accent1"/>
-          </a:lnRef>
-          <a:fillRef idx="3">
-            <a:schemeClr val="accent1"/>
-          </a:fillRef>
-          <a:effectRef idx="2">
-            <a:schemeClr val="accent1"/>
-          </a:effectRef>
-          <a:fontRef idx="minor">
-            <a:schemeClr val="lt1"/>
-          </a:fontRef>
-        </p:style>
-        <p:txBody>
-          <a:bodyPr rtlCol="0" anchor="ctr"/>
-          <a:lstStyle/>
-          <a:p>
-            <a:pPr algn="ctr"/>
-            <a:endParaRPr lang="it-IT"/>
-          </a:p>
-        </p:txBody>
-      </p:sp>
-      <p:sp>
-        <p:nvSpPr>
-          <p:cNvPr id="11" name="Freccia a destra 10">
-            <a:extLst>
-              <a:ext uri="{FF2B5EF4-FFF2-40B4-BE49-F238E27FC236}">
-                <a16:creationId xmlns:a16="http://schemas.microsoft.com/office/drawing/2014/main" id="{EFBA0B79-7816-4286-AD9D-CE531B455D8F}"/>
-              </a:ext>
-            </a:extLst>
-          </p:cNvPr>
-          <p:cNvSpPr/>
-          <p:nvPr/>
-        </p:nvSpPr>
-        <p:spPr>
-          <a:xfrm rot="16200000">
-            <a:off x="3980728" y="1701559"/>
-            <a:ext cx="636608" cy="549800"/>
-          </a:xfrm>
-          <a:prstGeom prst="rightArrow">
-            <a:avLst/>
-          </a:prstGeom>
-          <a:noFill/>
-          <a:ln w="28575"/>
-        </p:spPr>
-        <p:style>
-          <a:lnRef idx="1">
-            <a:schemeClr val="accent1"/>
-          </a:lnRef>
-          <a:fillRef idx="3">
-            <a:schemeClr val="accent1"/>
-          </a:fillRef>
-          <a:effectRef idx="2">
-            <a:schemeClr val="accent1"/>
-          </a:effectRef>
-          <a:fontRef idx="minor">
-            <a:schemeClr val="lt1"/>
-          </a:fontRef>
-        </p:style>
-        <p:txBody>
-          <a:bodyPr rtlCol="0" anchor="ctr"/>
-          <a:lstStyle/>
-          <a:p>
-            <a:pPr algn="ctr"/>
-            <a:endParaRPr lang="it-IT"/>
-          </a:p>
-        </p:txBody>
-      </p:sp>
     </p:spTree>
     <p:extLst>
       <p:ext uri="{BB962C8B-B14F-4D97-AF65-F5344CB8AC3E}">
-        <p14:creationId xmlns:p14="http://schemas.microsoft.com/office/powerpoint/2010/main" val="4112021029"/>
+        <p14:creationId xmlns:p14="http://schemas.microsoft.com/office/powerpoint/2010/main" val="2130891845"/>
       </p:ext>
     </p:extLst>
   </p:cSld>
@@ -7765,7 +7710,7 @@
           <p:cNvPr id="2" name="Titolo 1">
             <a:extLst>
               <a:ext uri="{FF2B5EF4-FFF2-40B4-BE49-F238E27FC236}">
-                <a16:creationId xmlns:a16="http://schemas.microsoft.com/office/drawing/2014/main" id="{5096FFE2-A2EC-42E3-BF7F-16D855D7DB33}"/>
+                <a16:creationId xmlns:a16="http://schemas.microsoft.com/office/drawing/2014/main" id="{4A8F1979-42A0-45A5-B3FF-E873E2E24620}"/>
               </a:ext>
             </a:extLst>
           </p:cNvPr>
@@ -7783,195 +7728,7 @@
           <a:p>
             <a:r>
               <a:rPr lang="it-IT" dirty="0"/>
-              <a:t>Device file </a:t>
-            </a:r>
-            <a:r>
-              <a:rPr lang="it-IT" dirty="0" err="1"/>
-              <a:t>explorer</a:t>
-            </a:r>
-            <a:endParaRPr lang="it-IT" dirty="0"/>
-          </a:p>
-        </p:txBody>
-      </p:sp>
-      <p:sp>
-        <p:nvSpPr>
-          <p:cNvPr id="3" name="Segnaposto contenuto 2">
-            <a:extLst>
-              <a:ext uri="{FF2B5EF4-FFF2-40B4-BE49-F238E27FC236}">
-                <a16:creationId xmlns:a16="http://schemas.microsoft.com/office/drawing/2014/main" id="{6C4A981F-7833-469D-AA38-1E965AB19C81}"/>
-              </a:ext>
-            </a:extLst>
-          </p:cNvPr>
-          <p:cNvSpPr>
-            <a:spLocks noGrp="1"/>
-          </p:cNvSpPr>
-          <p:nvPr>
-            <p:ph idx="1"/>
-          </p:nvPr>
-        </p:nvSpPr>
-        <p:spPr/>
-        <p:txBody>
-          <a:bodyPr/>
-          <a:lstStyle/>
-          <a:p>
-            <a:r>
-              <a:rPr lang="it-IT" dirty="0" err="1"/>
-              <a:t>You</a:t>
-            </a:r>
-            <a:r>
-              <a:rPr lang="it-IT" dirty="0"/>
-              <a:t> can </a:t>
-            </a:r>
-            <a:r>
-              <a:rPr lang="it-IT" dirty="0" err="1"/>
-              <a:t>also</a:t>
-            </a:r>
-            <a:r>
-              <a:rPr lang="it-IT" dirty="0"/>
-              <a:t> </a:t>
-            </a:r>
-            <a:r>
-              <a:rPr lang="it-IT" dirty="0" err="1"/>
-              <a:t>explore</a:t>
-            </a:r>
-            <a:r>
-              <a:rPr lang="it-IT" dirty="0"/>
-              <a:t> storage device </a:t>
-            </a:r>
-          </a:p>
-          <a:p>
-            <a:pPr lvl="1"/>
-            <a:r>
-              <a:rPr lang="it-IT" dirty="0" err="1"/>
-              <a:t>If</a:t>
-            </a:r>
-            <a:r>
-              <a:rPr lang="it-IT" dirty="0"/>
-              <a:t> </a:t>
-            </a:r>
-            <a:r>
-              <a:rPr lang="it-IT" dirty="0" err="1"/>
-              <a:t>you</a:t>
-            </a:r>
-            <a:r>
-              <a:rPr lang="it-IT" dirty="0"/>
-              <a:t> use AVD, storage </a:t>
-            </a:r>
-            <a:r>
-              <a:rPr lang="it-IT" dirty="0" err="1"/>
-              <a:t>is</a:t>
-            </a:r>
-            <a:r>
-              <a:rPr lang="it-IT" dirty="0"/>
-              <a:t> a </a:t>
-            </a:r>
-            <a:r>
-              <a:rPr lang="it-IT" dirty="0" err="1"/>
-              <a:t>direactory</a:t>
-            </a:r>
-            <a:r>
-              <a:rPr lang="it-IT" dirty="0"/>
-              <a:t> in </a:t>
-            </a:r>
-            <a:r>
-              <a:rPr lang="it-IT" dirty="0" err="1"/>
-              <a:t>your</a:t>
-            </a:r>
-            <a:r>
-              <a:rPr lang="it-IT" dirty="0"/>
-              <a:t> PC</a:t>
-            </a:r>
-          </a:p>
-          <a:p>
-            <a:pPr lvl="1"/>
-            <a:r>
-              <a:rPr lang="it-IT" dirty="0" err="1"/>
-              <a:t>If</a:t>
-            </a:r>
-            <a:r>
-              <a:rPr lang="it-IT" dirty="0"/>
-              <a:t> </a:t>
-            </a:r>
-            <a:r>
-              <a:rPr lang="it-IT" dirty="0" err="1"/>
-              <a:t>you</a:t>
-            </a:r>
-            <a:r>
-              <a:rPr lang="it-IT" dirty="0"/>
-              <a:t> use Real device </a:t>
-            </a:r>
-            <a:r>
-              <a:rPr lang="it-IT" dirty="0" err="1"/>
-              <a:t>is</a:t>
-            </a:r>
-            <a:r>
-              <a:rPr lang="it-IT" dirty="0"/>
-              <a:t> the </a:t>
-            </a:r>
-            <a:r>
-              <a:rPr lang="it-IT" dirty="0" err="1"/>
-              <a:t>real</a:t>
-            </a:r>
-            <a:r>
-              <a:rPr lang="it-IT" dirty="0"/>
-              <a:t> file system</a:t>
-            </a:r>
-          </a:p>
-          <a:p>
-            <a:r>
-              <a:rPr lang="it-IT" dirty="0"/>
-              <a:t>To </a:t>
-            </a:r>
-            <a:r>
-              <a:rPr lang="it-IT" dirty="0" err="1"/>
-              <a:t>see</a:t>
-            </a:r>
-            <a:r>
-              <a:rPr lang="it-IT" dirty="0"/>
-              <a:t> </a:t>
-            </a:r>
-            <a:r>
-              <a:rPr lang="it-IT" dirty="0" err="1"/>
-              <a:t>your</a:t>
-            </a:r>
-            <a:r>
-              <a:rPr lang="it-IT" dirty="0"/>
-              <a:t> app directory in storage</a:t>
-            </a:r>
-          </a:p>
-          <a:p>
-            <a:pPr lvl="1"/>
-            <a:r>
-              <a:rPr lang="it-IT" i="1" dirty="0"/>
-              <a:t>File </a:t>
-            </a:r>
-            <a:r>
-              <a:rPr lang="it-IT" i="1" dirty="0" err="1"/>
-              <a:t>explorer</a:t>
-            </a:r>
-            <a:r>
-              <a:rPr lang="it-IT" i="1" dirty="0"/>
-              <a:t> -&gt; Data -&gt; Data </a:t>
-            </a:r>
-            <a:r>
-              <a:rPr lang="it-IT" dirty="0"/>
-              <a:t>-&gt; </a:t>
-            </a:r>
-            <a:r>
-              <a:rPr lang="it-IT" dirty="0" err="1"/>
-              <a:t>your</a:t>
-            </a:r>
-            <a:r>
-              <a:rPr lang="it-IT" dirty="0"/>
-              <a:t> app package (e.g. </a:t>
-            </a:r>
-            <a:r>
-              <a:rPr lang="it-IT" dirty="0" err="1"/>
-              <a:t>com.example.MyApplication</a:t>
-            </a:r>
-            <a:r>
-              <a:rPr lang="it-IT" dirty="0"/>
-              <a:t>)</a:t>
+              <a:t>GitHub tools</a:t>
             </a:r>
           </a:p>
         </p:txBody>
@@ -7981,7 +7738,7 @@
           <p:cNvPr id="4" name="Segnaposto numero diapositiva 3">
             <a:extLst>
               <a:ext uri="{FF2B5EF4-FFF2-40B4-BE49-F238E27FC236}">
-                <a16:creationId xmlns:a16="http://schemas.microsoft.com/office/drawing/2014/main" id="{5FC0766B-D598-41BE-8FAF-8FA15D241746}"/>
+                <a16:creationId xmlns:a16="http://schemas.microsoft.com/office/drawing/2014/main" id="{4AEB25EF-CB47-4915-89D1-A5845A3D72EB}"/>
               </a:ext>
             </a:extLst>
           </p:cNvPr>
@@ -8006,10 +7763,225 @@
           </a:p>
         </p:txBody>
       </p:sp>
+      <p:pic>
+        <p:nvPicPr>
+          <p:cNvPr id="5" name="Segnaposto contenuto 4">
+            <a:extLst>
+              <a:ext uri="{FF2B5EF4-FFF2-40B4-BE49-F238E27FC236}">
+                <a16:creationId xmlns:a16="http://schemas.microsoft.com/office/drawing/2014/main" id="{B6D3546A-E625-4B16-9649-1A3A25E15EFF}"/>
+              </a:ext>
+            </a:extLst>
+          </p:cNvPr>
+          <p:cNvPicPr>
+            <a:picLocks noGrp="1" noChangeAspect="1"/>
+          </p:cNvPicPr>
+          <p:nvPr>
+            <p:ph idx="1"/>
+          </p:nvPr>
+        </p:nvPicPr>
+        <p:blipFill rotWithShape="1">
+          <a:blip r:embed="rId2"/>
+          <a:srcRect l="-1" r="-1"/>
+          <a:stretch/>
+        </p:blipFill>
+        <p:spPr>
+          <a:xfrm>
+            <a:off x="1466126" y="1433887"/>
+            <a:ext cx="9259747" cy="4953239"/>
+          </a:xfrm>
+          <a:prstGeom prst="rect">
+            <a:avLst/>
+          </a:prstGeom>
+        </p:spPr>
+      </p:pic>
+      <p:sp>
+        <p:nvSpPr>
+          <p:cNvPr id="8" name="Freccia a destra 7">
+            <a:extLst>
+              <a:ext uri="{FF2B5EF4-FFF2-40B4-BE49-F238E27FC236}">
+                <a16:creationId xmlns:a16="http://schemas.microsoft.com/office/drawing/2014/main" id="{8815035C-7AC3-4546-A16A-FF185C71C239}"/>
+              </a:ext>
+            </a:extLst>
+          </p:cNvPr>
+          <p:cNvSpPr/>
+          <p:nvPr/>
+        </p:nvSpPr>
+        <p:spPr>
+          <a:xfrm rot="16200000">
+            <a:off x="8712845" y="1976456"/>
+            <a:ext cx="636608" cy="549800"/>
+          </a:xfrm>
+          <a:prstGeom prst="rightArrow">
+            <a:avLst/>
+          </a:prstGeom>
+          <a:noFill/>
+          <a:ln w="28575"/>
+        </p:spPr>
+        <p:style>
+          <a:lnRef idx="1">
+            <a:schemeClr val="accent1"/>
+          </a:lnRef>
+          <a:fillRef idx="3">
+            <a:schemeClr val="accent1"/>
+          </a:fillRef>
+          <a:effectRef idx="2">
+            <a:schemeClr val="accent1"/>
+          </a:effectRef>
+          <a:fontRef idx="minor">
+            <a:schemeClr val="lt1"/>
+          </a:fontRef>
+        </p:style>
+        <p:txBody>
+          <a:bodyPr rtlCol="0" anchor="ctr"/>
+          <a:lstStyle/>
+          <a:p>
+            <a:pPr algn="ctr"/>
+            <a:endParaRPr lang="it-IT"/>
+          </a:p>
+        </p:txBody>
+      </p:sp>
+      <p:sp>
+        <p:nvSpPr>
+          <p:cNvPr id="9" name="Freccia a destra 8">
+            <a:extLst>
+              <a:ext uri="{FF2B5EF4-FFF2-40B4-BE49-F238E27FC236}">
+                <a16:creationId xmlns:a16="http://schemas.microsoft.com/office/drawing/2014/main" id="{12E6E2CA-0D2B-4843-926E-88A4BACF3690}"/>
+              </a:ext>
+            </a:extLst>
+          </p:cNvPr>
+          <p:cNvSpPr/>
+          <p:nvPr/>
+        </p:nvSpPr>
+        <p:spPr>
+          <a:xfrm rot="10800000">
+            <a:off x="1694731" y="2367904"/>
+            <a:ext cx="636608" cy="549800"/>
+          </a:xfrm>
+          <a:prstGeom prst="rightArrow">
+            <a:avLst/>
+          </a:prstGeom>
+          <a:noFill/>
+          <a:ln w="28575"/>
+        </p:spPr>
+        <p:style>
+          <a:lnRef idx="1">
+            <a:schemeClr val="accent1"/>
+          </a:lnRef>
+          <a:fillRef idx="3">
+            <a:schemeClr val="accent1"/>
+          </a:fillRef>
+          <a:effectRef idx="2">
+            <a:schemeClr val="accent1"/>
+          </a:effectRef>
+          <a:fontRef idx="minor">
+            <a:schemeClr val="lt1"/>
+          </a:fontRef>
+        </p:style>
+        <p:txBody>
+          <a:bodyPr rtlCol="0" anchor="ctr"/>
+          <a:lstStyle/>
+          <a:p>
+            <a:pPr algn="ctr"/>
+            <a:endParaRPr lang="it-IT"/>
+          </a:p>
+        </p:txBody>
+      </p:sp>
+      <p:sp>
+        <p:nvSpPr>
+          <p:cNvPr id="10" name="Freccia a destra 9">
+            <a:extLst>
+              <a:ext uri="{FF2B5EF4-FFF2-40B4-BE49-F238E27FC236}">
+                <a16:creationId xmlns:a16="http://schemas.microsoft.com/office/drawing/2014/main" id="{BA8054ED-0A22-4074-817A-05180BFE574B}"/>
+              </a:ext>
+            </a:extLst>
+          </p:cNvPr>
+          <p:cNvSpPr/>
+          <p:nvPr/>
+        </p:nvSpPr>
+        <p:spPr>
+          <a:xfrm rot="5400000">
+            <a:off x="2276882" y="5312338"/>
+            <a:ext cx="645207" cy="536293"/>
+          </a:xfrm>
+          <a:prstGeom prst="rightArrow">
+            <a:avLst/>
+          </a:prstGeom>
+          <a:noFill/>
+          <a:ln w="28575"/>
+        </p:spPr>
+        <p:style>
+          <a:lnRef idx="1">
+            <a:schemeClr val="accent1"/>
+          </a:lnRef>
+          <a:fillRef idx="3">
+            <a:schemeClr val="accent1"/>
+          </a:fillRef>
+          <a:effectRef idx="2">
+            <a:schemeClr val="accent1"/>
+          </a:effectRef>
+          <a:fontRef idx="minor">
+            <a:schemeClr val="lt1"/>
+          </a:fontRef>
+        </p:style>
+        <p:txBody>
+          <a:bodyPr rtlCol="0" anchor="ctr"/>
+          <a:lstStyle/>
+          <a:p>
+            <a:pPr algn="ctr"/>
+            <a:endParaRPr lang="it-IT"/>
+          </a:p>
+        </p:txBody>
+      </p:sp>
+      <p:sp>
+        <p:nvSpPr>
+          <p:cNvPr id="11" name="Freccia a destra 10">
+            <a:extLst>
+              <a:ext uri="{FF2B5EF4-FFF2-40B4-BE49-F238E27FC236}">
+                <a16:creationId xmlns:a16="http://schemas.microsoft.com/office/drawing/2014/main" id="{EFBA0B79-7816-4286-AD9D-CE531B455D8F}"/>
+              </a:ext>
+            </a:extLst>
+          </p:cNvPr>
+          <p:cNvSpPr/>
+          <p:nvPr/>
+        </p:nvSpPr>
+        <p:spPr>
+          <a:xfrm rot="16200000">
+            <a:off x="3980728" y="1701559"/>
+            <a:ext cx="636608" cy="549800"/>
+          </a:xfrm>
+          <a:prstGeom prst="rightArrow">
+            <a:avLst/>
+          </a:prstGeom>
+          <a:noFill/>
+          <a:ln w="28575"/>
+        </p:spPr>
+        <p:style>
+          <a:lnRef idx="1">
+            <a:schemeClr val="accent1"/>
+          </a:lnRef>
+          <a:fillRef idx="3">
+            <a:schemeClr val="accent1"/>
+          </a:fillRef>
+          <a:effectRef idx="2">
+            <a:schemeClr val="accent1"/>
+          </a:effectRef>
+          <a:fontRef idx="minor">
+            <a:schemeClr val="lt1"/>
+          </a:fontRef>
+        </p:style>
+        <p:txBody>
+          <a:bodyPr rtlCol="0" anchor="ctr"/>
+          <a:lstStyle/>
+          <a:p>
+            <a:pPr algn="ctr"/>
+            <a:endParaRPr lang="it-IT"/>
+          </a:p>
+        </p:txBody>
+      </p:sp>
     </p:spTree>
     <p:extLst>
       <p:ext uri="{BB962C8B-B14F-4D97-AF65-F5344CB8AC3E}">
-        <p14:creationId xmlns:p14="http://schemas.microsoft.com/office/powerpoint/2010/main" val="1563645607"/>
+        <p14:creationId xmlns:p14="http://schemas.microsoft.com/office/powerpoint/2010/main" val="4112021029"/>
       </p:ext>
     </p:extLst>
   </p:cSld>
@@ -8041,7 +8013,7 @@
           <p:cNvPr id="2" name="Titolo 1">
             <a:extLst>
               <a:ext uri="{FF2B5EF4-FFF2-40B4-BE49-F238E27FC236}">
-                <a16:creationId xmlns:a16="http://schemas.microsoft.com/office/drawing/2014/main" id="{44DE2770-9318-4303-8FE3-A9A7AF94817E}"/>
+                <a16:creationId xmlns:a16="http://schemas.microsoft.com/office/drawing/2014/main" id="{5096FFE2-A2EC-42E3-BF7F-16D855D7DB33}"/>
               </a:ext>
             </a:extLst>
           </p:cNvPr>
@@ -8052,14 +8024,216 @@
             <p:ph type="title"/>
           </p:nvPr>
         </p:nvSpPr>
-        <p:spPr/>
-        <p:txBody>
-          <a:bodyPr/>
+        <p:spPr>
+          <a:xfrm>
+            <a:off x="609600" y="274638"/>
+            <a:ext cx="10972800" cy="1143000"/>
+          </a:xfrm>
+        </p:spPr>
+        <p:txBody>
+          <a:bodyPr anchor="ctr">
+            <a:normAutofit/>
+          </a:bodyPr>
           <a:lstStyle/>
           <a:p>
             <a:r>
               <a:rPr lang="it-IT" dirty="0"/>
-              <a:t>Layout design tool</a:t>
+              <a:t>Device file </a:t>
+            </a:r>
+            <a:r>
+              <a:rPr lang="it-IT" dirty="0" err="1"/>
+              <a:t>explorer</a:t>
+            </a:r>
+            <a:endParaRPr lang="it-IT" dirty="0"/>
+          </a:p>
+        </p:txBody>
+      </p:sp>
+      <p:sp>
+        <p:nvSpPr>
+          <p:cNvPr id="3" name="Segnaposto contenuto 2">
+            <a:extLst>
+              <a:ext uri="{FF2B5EF4-FFF2-40B4-BE49-F238E27FC236}">
+                <a16:creationId xmlns:a16="http://schemas.microsoft.com/office/drawing/2014/main" id="{6C4A981F-7833-469D-AA38-1E965AB19C81}"/>
+              </a:ext>
+            </a:extLst>
+          </p:cNvPr>
+          <p:cNvSpPr>
+            <a:spLocks noGrp="1"/>
+          </p:cNvSpPr>
+          <p:nvPr>
+            <p:ph sz="half" idx="1"/>
+          </p:nvPr>
+        </p:nvSpPr>
+        <p:spPr>
+          <a:xfrm>
+            <a:off x="609600" y="1600201"/>
+            <a:ext cx="5384800" cy="4525963"/>
+          </a:xfrm>
+        </p:spPr>
+        <p:txBody>
+          <a:bodyPr>
+            <a:normAutofit/>
+          </a:bodyPr>
+          <a:lstStyle/>
+          <a:p>
+            <a:r>
+              <a:rPr lang="it-IT" sz="2600" dirty="0" err="1"/>
+              <a:t>You</a:t>
+            </a:r>
+            <a:r>
+              <a:rPr lang="it-IT" sz="2600" dirty="0"/>
+              <a:t> can </a:t>
+            </a:r>
+            <a:r>
+              <a:rPr lang="it-IT" sz="2600" dirty="0" err="1"/>
+              <a:t>also</a:t>
+            </a:r>
+            <a:r>
+              <a:rPr lang="it-IT" sz="2600" dirty="0"/>
+              <a:t> </a:t>
+            </a:r>
+            <a:r>
+              <a:rPr lang="it-IT" sz="2600" dirty="0" err="1"/>
+              <a:t>explore</a:t>
+            </a:r>
+            <a:r>
+              <a:rPr lang="it-IT" sz="2600" dirty="0"/>
+              <a:t> storage device </a:t>
+            </a:r>
+          </a:p>
+          <a:p>
+            <a:pPr lvl="1"/>
+            <a:r>
+              <a:rPr lang="it-IT" sz="2600" dirty="0" err="1"/>
+              <a:t>If</a:t>
+            </a:r>
+            <a:r>
+              <a:rPr lang="it-IT" sz="2600" dirty="0"/>
+              <a:t> </a:t>
+            </a:r>
+            <a:r>
+              <a:rPr lang="it-IT" sz="2600" dirty="0" err="1"/>
+              <a:t>you</a:t>
+            </a:r>
+            <a:r>
+              <a:rPr lang="it-IT" sz="2600" dirty="0"/>
+              <a:t> use AVD, storage </a:t>
+            </a:r>
+            <a:r>
+              <a:rPr lang="it-IT" sz="2600" dirty="0" err="1"/>
+              <a:t>is</a:t>
+            </a:r>
+            <a:r>
+              <a:rPr lang="it-IT" sz="2600" dirty="0"/>
+              <a:t> a </a:t>
+            </a:r>
+            <a:r>
+              <a:rPr lang="it-IT" sz="2600" dirty="0" err="1"/>
+              <a:t>direactory</a:t>
+            </a:r>
+            <a:r>
+              <a:rPr lang="it-IT" sz="2600" dirty="0"/>
+              <a:t> in </a:t>
+            </a:r>
+            <a:r>
+              <a:rPr lang="it-IT" sz="2600" dirty="0" err="1"/>
+              <a:t>your</a:t>
+            </a:r>
+            <a:r>
+              <a:rPr lang="it-IT" sz="2600" dirty="0"/>
+              <a:t> PC</a:t>
+            </a:r>
+          </a:p>
+          <a:p>
+            <a:pPr lvl="1"/>
+            <a:r>
+              <a:rPr lang="it-IT" sz="2600" dirty="0" err="1"/>
+              <a:t>If</a:t>
+            </a:r>
+            <a:r>
+              <a:rPr lang="it-IT" sz="2600" dirty="0"/>
+              <a:t> </a:t>
+            </a:r>
+            <a:r>
+              <a:rPr lang="it-IT" sz="2600" dirty="0" err="1"/>
+              <a:t>you</a:t>
+            </a:r>
+            <a:r>
+              <a:rPr lang="it-IT" sz="2600" dirty="0"/>
+              <a:t> use Real device </a:t>
+            </a:r>
+            <a:r>
+              <a:rPr lang="it-IT" sz="2600" dirty="0" err="1"/>
+              <a:t>is</a:t>
+            </a:r>
+            <a:r>
+              <a:rPr lang="it-IT" sz="2600" dirty="0"/>
+              <a:t> the </a:t>
+            </a:r>
+            <a:r>
+              <a:rPr lang="it-IT" sz="2600" dirty="0" err="1"/>
+              <a:t>real</a:t>
+            </a:r>
+            <a:r>
+              <a:rPr lang="it-IT" sz="2600" dirty="0"/>
+              <a:t> file system</a:t>
+            </a:r>
+          </a:p>
+          <a:p>
+            <a:r>
+              <a:rPr lang="it-IT" sz="2600" dirty="0"/>
+              <a:t>To </a:t>
+            </a:r>
+            <a:r>
+              <a:rPr lang="it-IT" sz="2600" dirty="0" err="1"/>
+              <a:t>see</a:t>
+            </a:r>
+            <a:r>
+              <a:rPr lang="it-IT" sz="2600" dirty="0"/>
+              <a:t> </a:t>
+            </a:r>
+            <a:r>
+              <a:rPr lang="it-IT" sz="2600" dirty="0" err="1"/>
+              <a:t>your</a:t>
+            </a:r>
+            <a:r>
+              <a:rPr lang="it-IT" sz="2600" dirty="0"/>
+              <a:t> app directory in storage</a:t>
+            </a:r>
+          </a:p>
+          <a:p>
+            <a:pPr lvl="1"/>
+            <a:r>
+              <a:rPr lang="it-IT" sz="2600" i="1" dirty="0"/>
+              <a:t>File </a:t>
+            </a:r>
+            <a:r>
+              <a:rPr lang="it-IT" sz="2600" i="1" dirty="0" err="1"/>
+              <a:t>explorer</a:t>
+            </a:r>
+            <a:r>
+              <a:rPr lang="it-IT" sz="2600" i="1" dirty="0"/>
+              <a:t> -&gt; Data -&gt; Data </a:t>
+            </a:r>
+            <a:r>
+              <a:rPr lang="it-IT" sz="2600" dirty="0"/>
+              <a:t>-&gt; </a:t>
+            </a:r>
+            <a:r>
+              <a:rPr lang="it-IT" sz="2600" dirty="0" err="1"/>
+              <a:t>your</a:t>
+            </a:r>
+            <a:r>
+              <a:rPr lang="it-IT" sz="2600" dirty="0"/>
+              <a:t> app package (e.g. </a:t>
+            </a:r>
+            <a:r>
+              <a:rPr lang="it-IT" sz="2600" dirty="0" err="1"/>
+              <a:t>com.example.MyApplication</a:t>
+            </a:r>
+            <a:r>
+              <a:rPr lang="it-IT" sz="2600" dirty="0"/>
+              <a:t>)</a:t>
             </a:r>
           </a:p>
         </p:txBody>
@@ -8069,7 +8243,7 @@
           <p:cNvPr id="4" name="Segnaposto numero diapositiva 3">
             <a:extLst>
               <a:ext uri="{FF2B5EF4-FFF2-40B4-BE49-F238E27FC236}">
-                <a16:creationId xmlns:a16="http://schemas.microsoft.com/office/drawing/2014/main" id="{9FE6EA8C-7277-41B2-B77B-C309CBD1C996}"/>
+                <a16:creationId xmlns:a16="http://schemas.microsoft.com/office/drawing/2014/main" id="{5FC0766B-D598-41BE-8FAF-8FA15D241746}"/>
               </a:ext>
             </a:extLst>
           </p:cNvPr>
@@ -8080,177 +8254,77 @@
             <p:ph type="sldNum" sz="quarter" idx="12"/>
           </p:nvPr>
         </p:nvSpPr>
-        <p:spPr/>
-        <p:txBody>
-          <a:bodyPr/>
-          <a:lstStyle/>
-          <a:p>
+        <p:spPr>
+          <a:xfrm>
+            <a:off x="5115480" y="6362701"/>
+            <a:ext cx="6466921" cy="365125"/>
+          </a:xfrm>
+        </p:spPr>
+        <p:txBody>
+          <a:bodyPr>
+            <a:normAutofit/>
+          </a:bodyPr>
+          <a:lstStyle/>
+          <a:p>
+            <a:pPr>
+              <a:lnSpc>
+                <a:spcPct val="90000"/>
+              </a:lnSpc>
+              <a:spcAft>
+                <a:spcPts val="600"/>
+              </a:spcAft>
+            </a:pPr>
             <a:fld id="{D2040F39-7941-49A4-B48D-F201B18B6351}" type="slidenum">
               <a:rPr lang="it-IT" smtClean="0"/>
-              <a:pPr/>
+              <a:pPr>
+                <a:lnSpc>
+                  <a:spcPct val="90000"/>
+                </a:lnSpc>
+                <a:spcAft>
+                  <a:spcPts val="600"/>
+                </a:spcAft>
+              </a:pPr>
               <a:t>16</a:t>
             </a:fld>
-            <a:endParaRPr lang="it-IT" dirty="0"/>
-          </a:p>
-        </p:txBody>
-      </p:sp>
-      <p:sp>
-        <p:nvSpPr>
-          <p:cNvPr id="10" name="Segnaposto contenuto 9">
-            <a:extLst>
-              <a:ext uri="{FF2B5EF4-FFF2-40B4-BE49-F238E27FC236}">
-                <a16:creationId xmlns:a16="http://schemas.microsoft.com/office/drawing/2014/main" id="{144596D0-68FC-4242-81F9-2B69BCB9EFB9}"/>
-              </a:ext>
-            </a:extLst>
-          </p:cNvPr>
-          <p:cNvSpPr>
-            <a:spLocks noGrp="1"/>
-          </p:cNvSpPr>
-          <p:nvPr>
-            <p:ph idx="1"/>
-          </p:nvPr>
-        </p:nvSpPr>
-        <p:spPr/>
-        <p:txBody>
-          <a:bodyPr/>
-          <a:lstStyle/>
-          <a:p>
-            <a:pPr marL="0" indent="0">
-              <a:buNone/>
-            </a:pPr>
-            <a:r>
-              <a:rPr lang="it-IT" dirty="0"/>
-              <a:t>Android Studio </a:t>
-            </a:r>
-            <a:r>
-              <a:rPr lang="it-IT" dirty="0" err="1"/>
-              <a:t>offers</a:t>
-            </a:r>
-            <a:r>
-              <a:rPr lang="it-IT" dirty="0"/>
-              <a:t> 3 mode to </a:t>
-            </a:r>
-            <a:r>
-              <a:rPr lang="it-IT" dirty="0" err="1"/>
-              <a:t>manipulate</a:t>
-            </a:r>
-            <a:r>
-              <a:rPr lang="it-IT" dirty="0"/>
-              <a:t> graphic </a:t>
-            </a:r>
-            <a:r>
-              <a:rPr lang="it-IT" dirty="0" err="1"/>
-              <a:t>element</a:t>
-            </a:r>
-            <a:r>
-              <a:rPr lang="it-IT" dirty="0"/>
-              <a:t> (Layout, </a:t>
-            </a:r>
-            <a:r>
-              <a:rPr lang="it-IT" dirty="0" err="1"/>
-              <a:t>Drawable</a:t>
-            </a:r>
-            <a:r>
-              <a:rPr lang="it-IT" dirty="0"/>
-              <a:t>, ecc.), </a:t>
-            </a:r>
-            <a:r>
-              <a:rPr lang="it-IT" dirty="0" err="1"/>
-              <a:t>you</a:t>
-            </a:r>
-            <a:r>
-              <a:rPr lang="it-IT" dirty="0"/>
-              <a:t> can </a:t>
-            </a:r>
-            <a:r>
-              <a:rPr lang="it-IT" dirty="0" err="1"/>
-              <a:t>choose</a:t>
-            </a:r>
-            <a:r>
-              <a:rPr lang="it-IT" dirty="0"/>
-              <a:t> </a:t>
-            </a:r>
-            <a:r>
-              <a:rPr lang="it-IT" dirty="0" err="1"/>
-              <a:t>when</a:t>
-            </a:r>
-            <a:r>
-              <a:rPr lang="it-IT" dirty="0"/>
-              <a:t> </a:t>
-            </a:r>
-            <a:r>
-              <a:rPr lang="it-IT" dirty="0" err="1"/>
-              <a:t>you</a:t>
-            </a:r>
-            <a:r>
-              <a:rPr lang="it-IT" dirty="0"/>
-              <a:t> open an xml file</a:t>
-            </a:r>
-          </a:p>
-          <a:p>
-            <a:r>
-              <a:rPr lang="it-IT" dirty="0">
-                <a:solidFill>
-                  <a:srgbClr val="FF0000"/>
-                </a:solidFill>
-              </a:rPr>
-              <a:t>Code mode: </a:t>
-            </a:r>
-            <a:r>
-              <a:rPr lang="it-IT" dirty="0"/>
-              <a:t>use </a:t>
-            </a:r>
-            <a:r>
-              <a:rPr lang="it-IT" dirty="0" err="1"/>
-              <a:t>only</a:t>
-            </a:r>
-            <a:r>
-              <a:rPr lang="it-IT" dirty="0"/>
-              <a:t> xml</a:t>
-            </a:r>
-          </a:p>
-          <a:p>
-            <a:r>
-              <a:rPr lang="it-IT" dirty="0">
-                <a:solidFill>
-                  <a:srgbClr val="FF0000"/>
-                </a:solidFill>
-              </a:rPr>
-              <a:t>Split mode: </a:t>
-            </a:r>
-            <a:r>
-              <a:rPr lang="it-IT" dirty="0"/>
-              <a:t>use xml and graphic tool</a:t>
-            </a:r>
-          </a:p>
-          <a:p>
-            <a:r>
-              <a:rPr lang="it-IT" dirty="0">
-                <a:solidFill>
-                  <a:srgbClr val="FF0000"/>
-                </a:solidFill>
-              </a:rPr>
-              <a:t>Design mode: </a:t>
-            </a:r>
-            <a:r>
-              <a:rPr lang="it-IT" dirty="0"/>
-              <a:t>use </a:t>
-            </a:r>
-            <a:r>
-              <a:rPr lang="it-IT" dirty="0" err="1"/>
-              <a:t>only</a:t>
-            </a:r>
-            <a:r>
-              <a:rPr lang="it-IT" dirty="0"/>
-              <a:t> drag and drop graphic tool</a:t>
-            </a:r>
-          </a:p>
-        </p:txBody>
-      </p:sp>
+            <a:endParaRPr lang="it-IT"/>
+          </a:p>
+        </p:txBody>
+      </p:sp>
+      <p:pic>
+        <p:nvPicPr>
+          <p:cNvPr id="9" name="Segnaposto contenuto 4">
+            <a:extLst>
+              <a:ext uri="{FF2B5EF4-FFF2-40B4-BE49-F238E27FC236}">
+                <a16:creationId xmlns:a16="http://schemas.microsoft.com/office/drawing/2014/main" id="{D98786AA-EAB5-4FA5-949E-CCC96C50EED7}"/>
+              </a:ext>
+            </a:extLst>
+          </p:cNvPr>
+          <p:cNvPicPr>
+            <a:picLocks noGrp="1" noChangeAspect="1"/>
+          </p:cNvPicPr>
+          <p:nvPr>
+            <p:ph sz="half" idx="2"/>
+          </p:nvPr>
+        </p:nvPicPr>
+        <p:blipFill rotWithShape="1">
+          <a:blip r:embed="rId2"/>
+          <a:srcRect l="69835" t="64543" r="-1"/>
+          <a:stretch/>
+        </p:blipFill>
+        <p:spPr>
+          <a:xfrm>
+            <a:off x="6380977" y="2496351"/>
+            <a:ext cx="5293111" cy="3328106"/>
+          </a:xfrm>
+          <a:prstGeom prst="rect">
+            <a:avLst/>
+          </a:prstGeom>
+        </p:spPr>
+      </p:pic>
     </p:spTree>
     <p:extLst>
       <p:ext uri="{BB962C8B-B14F-4D97-AF65-F5344CB8AC3E}">
-        <p14:creationId xmlns:p14="http://schemas.microsoft.com/office/powerpoint/2010/main" val="4070693851"/>
+        <p14:creationId xmlns:p14="http://schemas.microsoft.com/office/powerpoint/2010/main" val="1563645607"/>
       </p:ext>
     </p:extLst>
   </p:cSld>
@@ -8282,7 +8356,7 @@
           <p:cNvPr id="2" name="Titolo 1">
             <a:extLst>
               <a:ext uri="{FF2B5EF4-FFF2-40B4-BE49-F238E27FC236}">
-                <a16:creationId xmlns:a16="http://schemas.microsoft.com/office/drawing/2014/main" id="{1D4F5280-7690-45DA-B68F-F5D01416A756}"/>
+                <a16:creationId xmlns:a16="http://schemas.microsoft.com/office/drawing/2014/main" id="{44DE2770-9318-4303-8FE3-A9A7AF94817E}"/>
               </a:ext>
             </a:extLst>
           </p:cNvPr>
@@ -8300,7 +8374,7 @@
           <a:p>
             <a:r>
               <a:rPr lang="it-IT" dirty="0"/>
-              <a:t>Code Mode</a:t>
+              <a:t>Layout design tool</a:t>
             </a:r>
           </a:p>
         </p:txBody>
@@ -8310,7 +8384,7 @@
           <p:cNvPr id="4" name="Segnaposto numero diapositiva 3">
             <a:extLst>
               <a:ext uri="{FF2B5EF4-FFF2-40B4-BE49-F238E27FC236}">
-                <a16:creationId xmlns:a16="http://schemas.microsoft.com/office/drawing/2014/main" id="{C314C115-6581-47A8-A6E5-7AB7FF040860}"/>
+                <a16:creationId xmlns:a16="http://schemas.microsoft.com/office/drawing/2014/main" id="{9FE6EA8C-7277-41B2-B77B-C309CBD1C996}"/>
               </a:ext>
             </a:extLst>
           </p:cNvPr>
@@ -8335,40 +8409,163 @@
           </a:p>
         </p:txBody>
       </p:sp>
-      <p:pic>
-        <p:nvPicPr>
-          <p:cNvPr id="9" name="Segnaposto contenuto 5">
-            <a:extLst>
-              <a:ext uri="{FF2B5EF4-FFF2-40B4-BE49-F238E27FC236}">
-                <a16:creationId xmlns:a16="http://schemas.microsoft.com/office/drawing/2014/main" id="{649F5E30-606B-4521-8080-539B1F7EEBA5}"/>
-              </a:ext>
-            </a:extLst>
-          </p:cNvPr>
-          <p:cNvPicPr>
-            <a:picLocks noChangeAspect="1"/>
-          </p:cNvPicPr>
-          <p:nvPr/>
-        </p:nvPicPr>
-        <p:blipFill>
-          <a:blip r:embed="rId2"/>
-          <a:stretch>
-            <a:fillRect/>
-          </a:stretch>
-        </p:blipFill>
-        <p:spPr>
-          <a:xfrm>
-            <a:off x="1284593" y="1600200"/>
-            <a:ext cx="9622814" cy="4525963"/>
-          </a:xfrm>
-          <a:prstGeom prst="rect">
-            <a:avLst/>
-          </a:prstGeom>
-        </p:spPr>
-      </p:pic>
+      <p:sp>
+        <p:nvSpPr>
+          <p:cNvPr id="10" name="Segnaposto contenuto 9">
+            <a:extLst>
+              <a:ext uri="{FF2B5EF4-FFF2-40B4-BE49-F238E27FC236}">
+                <a16:creationId xmlns:a16="http://schemas.microsoft.com/office/drawing/2014/main" id="{144596D0-68FC-4242-81F9-2B69BCB9EFB9}"/>
+              </a:ext>
+            </a:extLst>
+          </p:cNvPr>
+          <p:cNvSpPr>
+            <a:spLocks noGrp="1"/>
+          </p:cNvSpPr>
+          <p:nvPr>
+            <p:ph idx="1"/>
+          </p:nvPr>
+        </p:nvSpPr>
+        <p:spPr/>
+        <p:txBody>
+          <a:bodyPr/>
+          <a:lstStyle/>
+          <a:p>
+            <a:pPr marL="0" indent="0">
+              <a:buNone/>
+            </a:pPr>
+            <a:r>
+              <a:rPr lang="it-IT" dirty="0"/>
+              <a:t>Android Studio </a:t>
+            </a:r>
+            <a:r>
+              <a:rPr lang="it-IT" dirty="0" err="1"/>
+              <a:t>offers</a:t>
+            </a:r>
+            <a:r>
+              <a:rPr lang="it-IT" dirty="0"/>
+              <a:t> 3 mode to </a:t>
+            </a:r>
+            <a:r>
+              <a:rPr lang="it-IT" dirty="0" err="1"/>
+              <a:t>manipulate</a:t>
+            </a:r>
+            <a:r>
+              <a:rPr lang="it-IT" dirty="0"/>
+              <a:t> graphic </a:t>
+            </a:r>
+            <a:r>
+              <a:rPr lang="it-IT" dirty="0" err="1"/>
+              <a:t>element</a:t>
+            </a:r>
+            <a:r>
+              <a:rPr lang="it-IT" dirty="0"/>
+              <a:t> (Layout, </a:t>
+            </a:r>
+            <a:r>
+              <a:rPr lang="it-IT" dirty="0" err="1"/>
+              <a:t>Drawable</a:t>
+            </a:r>
+            <a:r>
+              <a:rPr lang="it-IT" dirty="0"/>
+              <a:t>, ecc.), </a:t>
+            </a:r>
+            <a:r>
+              <a:rPr lang="it-IT" dirty="0" err="1"/>
+              <a:t>you</a:t>
+            </a:r>
+            <a:r>
+              <a:rPr lang="it-IT" dirty="0"/>
+              <a:t> can </a:t>
+            </a:r>
+            <a:r>
+              <a:rPr lang="it-IT" dirty="0" err="1"/>
+              <a:t>choose</a:t>
+            </a:r>
+            <a:r>
+              <a:rPr lang="it-IT" dirty="0"/>
+              <a:t> </a:t>
+            </a:r>
+            <a:r>
+              <a:rPr lang="it-IT" dirty="0" err="1"/>
+              <a:t>when</a:t>
+            </a:r>
+            <a:r>
+              <a:rPr lang="it-IT" dirty="0"/>
+              <a:t> </a:t>
+            </a:r>
+            <a:r>
+              <a:rPr lang="it-IT" dirty="0" err="1"/>
+              <a:t>you</a:t>
+            </a:r>
+            <a:r>
+              <a:rPr lang="it-IT" dirty="0"/>
+              <a:t> open an xml file</a:t>
+            </a:r>
+          </a:p>
+          <a:p>
+            <a:r>
+              <a:rPr lang="it-IT" dirty="0">
+                <a:solidFill>
+                  <a:srgbClr val="FF0000"/>
+                </a:solidFill>
+              </a:rPr>
+              <a:t>Code mode: </a:t>
+            </a:r>
+            <a:r>
+              <a:rPr lang="it-IT" dirty="0"/>
+              <a:t>use </a:t>
+            </a:r>
+            <a:r>
+              <a:rPr lang="it-IT" dirty="0" err="1"/>
+              <a:t>only</a:t>
+            </a:r>
+            <a:r>
+              <a:rPr lang="it-IT" dirty="0"/>
+              <a:t> xml</a:t>
+            </a:r>
+          </a:p>
+          <a:p>
+            <a:r>
+              <a:rPr lang="it-IT" dirty="0">
+                <a:solidFill>
+                  <a:srgbClr val="FF0000"/>
+                </a:solidFill>
+              </a:rPr>
+              <a:t>Split mode: </a:t>
+            </a:r>
+            <a:r>
+              <a:rPr lang="it-IT" dirty="0"/>
+              <a:t>use xml and graphic tool</a:t>
+            </a:r>
+          </a:p>
+          <a:p>
+            <a:r>
+              <a:rPr lang="it-IT" dirty="0">
+                <a:solidFill>
+                  <a:srgbClr val="FF0000"/>
+                </a:solidFill>
+              </a:rPr>
+              <a:t>Design mode: </a:t>
+            </a:r>
+            <a:r>
+              <a:rPr lang="it-IT" dirty="0"/>
+              <a:t>use </a:t>
+            </a:r>
+            <a:r>
+              <a:rPr lang="it-IT" dirty="0" err="1"/>
+              <a:t>only</a:t>
+            </a:r>
+            <a:r>
+              <a:rPr lang="it-IT" dirty="0"/>
+              <a:t> drag and drop graphic tool</a:t>
+            </a:r>
+          </a:p>
+        </p:txBody>
+      </p:sp>
     </p:spTree>
     <p:extLst>
       <p:ext uri="{BB962C8B-B14F-4D97-AF65-F5344CB8AC3E}">
-        <p14:creationId xmlns:p14="http://schemas.microsoft.com/office/powerpoint/2010/main" val="822980987"/>
+        <p14:creationId xmlns:p14="http://schemas.microsoft.com/office/powerpoint/2010/main" val="4070693851"/>
       </p:ext>
     </p:extLst>
   </p:cSld>
@@ -8400,7 +8597,7 @@
           <p:cNvPr id="2" name="Titolo 1">
             <a:extLst>
               <a:ext uri="{FF2B5EF4-FFF2-40B4-BE49-F238E27FC236}">
-                <a16:creationId xmlns:a16="http://schemas.microsoft.com/office/drawing/2014/main" id="{99B084B2-7AF1-4D51-BE34-884C0B3A1336}"/>
+                <a16:creationId xmlns:a16="http://schemas.microsoft.com/office/drawing/2014/main" id="{1D4F5280-7690-45DA-B68F-F5D01416A756}"/>
               </a:ext>
             </a:extLst>
           </p:cNvPr>
@@ -8418,26 +8615,54 @@
           <a:p>
             <a:r>
               <a:rPr lang="it-IT" dirty="0"/>
-              <a:t>Split Mode</a:t>
-            </a:r>
+              <a:t>Code Mode</a:t>
+            </a:r>
+          </a:p>
+        </p:txBody>
+      </p:sp>
+      <p:sp>
+        <p:nvSpPr>
+          <p:cNvPr id="4" name="Segnaposto numero diapositiva 3">
+            <a:extLst>
+              <a:ext uri="{FF2B5EF4-FFF2-40B4-BE49-F238E27FC236}">
+                <a16:creationId xmlns:a16="http://schemas.microsoft.com/office/drawing/2014/main" id="{C314C115-6581-47A8-A6E5-7AB7FF040860}"/>
+              </a:ext>
+            </a:extLst>
+          </p:cNvPr>
+          <p:cNvSpPr>
+            <a:spLocks noGrp="1"/>
+          </p:cNvSpPr>
+          <p:nvPr>
+            <p:ph type="sldNum" sz="quarter" idx="12"/>
+          </p:nvPr>
+        </p:nvSpPr>
+        <p:spPr/>
+        <p:txBody>
+          <a:bodyPr/>
+          <a:lstStyle/>
+          <a:p>
+            <a:fld id="{D2040F39-7941-49A4-B48D-F201B18B6351}" type="slidenum">
+              <a:rPr lang="it-IT" smtClean="0"/>
+              <a:pPr/>
+              <a:t>18</a:t>
+            </a:fld>
+            <a:endParaRPr lang="it-IT" dirty="0"/>
           </a:p>
         </p:txBody>
       </p:sp>
       <p:pic>
         <p:nvPicPr>
-          <p:cNvPr id="6" name="Segnaposto contenuto 5">
-            <a:extLst>
-              <a:ext uri="{FF2B5EF4-FFF2-40B4-BE49-F238E27FC236}">
-                <a16:creationId xmlns:a16="http://schemas.microsoft.com/office/drawing/2014/main" id="{44232BFD-CEB8-4111-B9D4-2DFC08F16D84}"/>
+          <p:cNvPr id="9" name="Segnaposto contenuto 5">
+            <a:extLst>
+              <a:ext uri="{FF2B5EF4-FFF2-40B4-BE49-F238E27FC236}">
+                <a16:creationId xmlns:a16="http://schemas.microsoft.com/office/drawing/2014/main" id="{649F5E30-606B-4521-8080-539B1F7EEBA5}"/>
               </a:ext>
             </a:extLst>
           </p:cNvPr>
           <p:cNvPicPr>
-            <a:picLocks noGrp="1" noChangeAspect="1"/>
+            <a:picLocks noChangeAspect="1"/>
           </p:cNvPicPr>
-          <p:nvPr>
-            <p:ph idx="1"/>
-          </p:nvPr>
+          <p:nvPr/>
         </p:nvPicPr>
         <p:blipFill>
           <a:blip r:embed="rId2"/>
@@ -8447,45 +8672,18 @@
         </p:blipFill>
         <p:spPr>
           <a:xfrm>
-            <a:off x="1202499" y="1600200"/>
-            <a:ext cx="9787001" cy="4525963"/>
-          </a:xfrm>
+            <a:off x="1284593" y="1600200"/>
+            <a:ext cx="9622814" cy="4525963"/>
+          </a:xfrm>
+          <a:prstGeom prst="rect">
+            <a:avLst/>
+          </a:prstGeom>
         </p:spPr>
       </p:pic>
-      <p:sp>
-        <p:nvSpPr>
-          <p:cNvPr id="4" name="Segnaposto numero diapositiva 3">
-            <a:extLst>
-              <a:ext uri="{FF2B5EF4-FFF2-40B4-BE49-F238E27FC236}">
-                <a16:creationId xmlns:a16="http://schemas.microsoft.com/office/drawing/2014/main" id="{488A6574-AA9E-43C0-AF88-902D2C34E1BB}"/>
-              </a:ext>
-            </a:extLst>
-          </p:cNvPr>
-          <p:cNvSpPr>
-            <a:spLocks noGrp="1"/>
-          </p:cNvSpPr>
-          <p:nvPr>
-            <p:ph type="sldNum" sz="quarter" idx="12"/>
-          </p:nvPr>
-        </p:nvSpPr>
-        <p:spPr/>
-        <p:txBody>
-          <a:bodyPr/>
-          <a:lstStyle/>
-          <a:p>
-            <a:fld id="{D2040F39-7941-49A4-B48D-F201B18B6351}" type="slidenum">
-              <a:rPr lang="it-IT" smtClean="0"/>
-              <a:pPr/>
-              <a:t>18</a:t>
-            </a:fld>
-            <a:endParaRPr lang="it-IT" dirty="0"/>
-          </a:p>
-        </p:txBody>
-      </p:sp>
     </p:spTree>
     <p:extLst>
       <p:ext uri="{BB962C8B-B14F-4D97-AF65-F5344CB8AC3E}">
-        <p14:creationId xmlns:p14="http://schemas.microsoft.com/office/powerpoint/2010/main" val="3398143378"/>
+        <p14:creationId xmlns:p14="http://schemas.microsoft.com/office/powerpoint/2010/main" val="822980987"/>
       </p:ext>
     </p:extLst>
   </p:cSld>
@@ -8517,7 +8715,7 @@
           <p:cNvPr id="2" name="Titolo 1">
             <a:extLst>
               <a:ext uri="{FF2B5EF4-FFF2-40B4-BE49-F238E27FC236}">
-                <a16:creationId xmlns:a16="http://schemas.microsoft.com/office/drawing/2014/main" id="{097B2E1A-3022-4B3E-887F-5C2404A30221}"/>
+                <a16:creationId xmlns:a16="http://schemas.microsoft.com/office/drawing/2014/main" id="{99B084B2-7AF1-4D51-BE34-884C0B3A1336}"/>
               </a:ext>
             </a:extLst>
           </p:cNvPr>
@@ -8535,7 +8733,7 @@
           <a:p>
             <a:r>
               <a:rPr lang="it-IT" dirty="0"/>
-              <a:t>Design Mode</a:t>
+              <a:t>Split Mode</a:t>
             </a:r>
           </a:p>
         </p:txBody>
@@ -8545,7 +8743,7 @@
           <p:cNvPr id="6" name="Segnaposto contenuto 5">
             <a:extLst>
               <a:ext uri="{FF2B5EF4-FFF2-40B4-BE49-F238E27FC236}">
-                <a16:creationId xmlns:a16="http://schemas.microsoft.com/office/drawing/2014/main" id="{6F2B7F70-A1CC-426D-B349-1BE79A42D9B4}"/>
+                <a16:creationId xmlns:a16="http://schemas.microsoft.com/office/drawing/2014/main" id="{44232BFD-CEB8-4111-B9D4-2DFC08F16D84}"/>
               </a:ext>
             </a:extLst>
           </p:cNvPr>
@@ -8564,8 +8762,8 @@
         </p:blipFill>
         <p:spPr>
           <a:xfrm>
-            <a:off x="1248605" y="1600200"/>
-            <a:ext cx="9694789" cy="4525963"/>
+            <a:off x="1202499" y="1600200"/>
+            <a:ext cx="9787001" cy="4525963"/>
           </a:xfrm>
         </p:spPr>
       </p:pic>
@@ -8574,7 +8772,7 @@
           <p:cNvPr id="4" name="Segnaposto numero diapositiva 3">
             <a:extLst>
               <a:ext uri="{FF2B5EF4-FFF2-40B4-BE49-F238E27FC236}">
-                <a16:creationId xmlns:a16="http://schemas.microsoft.com/office/drawing/2014/main" id="{3A7B6A2A-AAA0-4F0A-B3B6-2C225CB4BFCC}"/>
+                <a16:creationId xmlns:a16="http://schemas.microsoft.com/office/drawing/2014/main" id="{488A6574-AA9E-43C0-AF88-902D2C34E1BB}"/>
               </a:ext>
             </a:extLst>
           </p:cNvPr>
@@ -8602,7 +8800,7 @@
     </p:spTree>
     <p:extLst>
       <p:ext uri="{BB962C8B-B14F-4D97-AF65-F5344CB8AC3E}">
-        <p14:creationId xmlns:p14="http://schemas.microsoft.com/office/powerpoint/2010/main" val="317630163"/>
+        <p14:creationId xmlns:p14="http://schemas.microsoft.com/office/powerpoint/2010/main" val="3398143378"/>
       </p:ext>
     </p:extLst>
   </p:cSld>
@@ -8658,7 +8856,7 @@
             <a:spLocks noGrp="1"/>
           </p:cNvSpPr>
           <p:nvPr>
-            <p:ph idx="1"/>
+            <p:ph sz="half" idx="1"/>
           </p:nvPr>
         </p:nvSpPr>
         <p:spPr/>
@@ -8695,38 +8893,135 @@
             </a:r>
           </a:p>
           <a:p>
-            <a:pPr lvl="1"/>
+            <a:pPr lvl="1">
+              <a:buFont typeface="Arial" panose="020B0604020202020204" pitchFamily="34" charset="0"/>
+              <a:buChar char="•"/>
+            </a:pPr>
             <a:r>
               <a:rPr lang="en-US" dirty="0"/>
-              <a:t>Android SDK</a:t>
-            </a:r>
-          </a:p>
-          <a:p>
-            <a:pPr lvl="1"/>
+              <a:t>Android SDK and JDK (Java Development Kit) </a:t>
+            </a:r>
+          </a:p>
+          <a:p>
+            <a:pPr lvl="1">
+              <a:buFont typeface="Arial" panose="020B0604020202020204" pitchFamily="34" charset="0"/>
+              <a:buChar char="•"/>
+            </a:pPr>
             <a:r>
               <a:rPr lang="en-US" dirty="0"/>
               <a:t>Gradle plugins</a:t>
             </a:r>
           </a:p>
           <a:p>
-            <a:pPr lvl="1"/>
+            <a:pPr lvl="1">
+              <a:buFont typeface="Arial" panose="020B0604020202020204" pitchFamily="34" charset="0"/>
+              <a:buChar char="•"/>
+            </a:pPr>
             <a:r>
               <a:rPr lang="en-US" dirty="0"/>
               <a:t>Android emulator</a:t>
             </a:r>
           </a:p>
           <a:p>
-            <a:pPr lvl="1"/>
+            <a:pPr lvl="1">
+              <a:buFont typeface="Arial" panose="020B0604020202020204" pitchFamily="34" charset="0"/>
+              <a:buChar char="•"/>
+            </a:pPr>
+            <a:r>
+              <a:rPr lang="en-US" dirty="0"/>
+              <a:t>Android profiler</a:t>
+            </a:r>
+          </a:p>
+        </p:txBody>
+      </p:sp>
+      <p:sp>
+        <p:nvSpPr>
+          <p:cNvPr id="4" name="Segnaposto contenuto 3">
+            <a:extLst>
+              <a:ext uri="{FF2B5EF4-FFF2-40B4-BE49-F238E27FC236}">
+                <a16:creationId xmlns:a16="http://schemas.microsoft.com/office/drawing/2014/main" id="{A923E6CB-DDC6-429C-BCC1-E6CAC762076D}"/>
+              </a:ext>
+            </a:extLst>
+          </p:cNvPr>
+          <p:cNvSpPr>
+            <a:spLocks noGrp="1"/>
+          </p:cNvSpPr>
+          <p:nvPr>
+            <p:ph sz="half" idx="2"/>
+          </p:nvPr>
+        </p:nvSpPr>
+        <p:spPr/>
+        <p:txBody>
+          <a:bodyPr/>
+          <a:lstStyle/>
+          <a:p>
+            <a:pPr lvl="1">
+              <a:buFont typeface="Arial" panose="020B0604020202020204" pitchFamily="34" charset="0"/>
+              <a:buChar char="•"/>
+            </a:pPr>
             <a:r>
               <a:rPr lang="en-US" dirty="0"/>
               <a:t>GitHub integration</a:t>
             </a:r>
           </a:p>
           <a:p>
-            <a:pPr lvl="1"/>
+            <a:pPr lvl="1">
+              <a:buFont typeface="Arial" panose="020B0604020202020204" pitchFamily="34" charset="0"/>
+              <a:buChar char="•"/>
+            </a:pPr>
             <a:r>
               <a:rPr lang="en-US" dirty="0"/>
               <a:t>Layout design tool</a:t>
+            </a:r>
+          </a:p>
+          <a:p>
+            <a:pPr lvl="1">
+              <a:buFont typeface="Arial" panose="020B0604020202020204" pitchFamily="34" charset="0"/>
+              <a:buChar char="•"/>
+            </a:pPr>
+            <a:r>
+              <a:rPr lang="en-US" dirty="0"/>
+              <a:t>Debug tools</a:t>
+            </a:r>
+          </a:p>
+          <a:p>
+            <a:pPr lvl="1">
+              <a:buFont typeface="Arial" panose="020B0604020202020204" pitchFamily="34" charset="0"/>
+              <a:buChar char="•"/>
+            </a:pPr>
+            <a:r>
+              <a:rPr lang="en-US" dirty="0"/>
+              <a:t>Testing tools and framework (JUnit)</a:t>
+            </a:r>
+          </a:p>
+          <a:p>
+            <a:pPr lvl="1">
+              <a:buFont typeface="Arial" panose="020B0604020202020204" pitchFamily="34" charset="0"/>
+              <a:buChar char="•"/>
+            </a:pPr>
+            <a:r>
+              <a:rPr lang="en-US" dirty="0"/>
+              <a:t>Access to device’s filesystem</a:t>
+            </a:r>
+          </a:p>
+          <a:p>
+            <a:pPr lvl="1">
+              <a:buFont typeface="Arial" panose="020B0604020202020204" pitchFamily="34" charset="0"/>
+              <a:buChar char="•"/>
+            </a:pPr>
+            <a:r>
+              <a:rPr lang="en-US" dirty="0"/>
+              <a:t>Android logging and output console</a:t>
+            </a:r>
+          </a:p>
+          <a:p>
+            <a:pPr lvl="1">
+              <a:buFont typeface="Arial" panose="020B0604020202020204" pitchFamily="34" charset="0"/>
+              <a:buChar char="•"/>
+            </a:pPr>
+            <a:r>
+              <a:rPr lang="en-US" dirty="0"/>
+              <a:t>Android Project Wizard: simplifies creating new project</a:t>
             </a:r>
           </a:p>
         </p:txBody>
@@ -8766,7 +9061,7 @@
           <p:cNvPr id="2" name="Titolo 1">
             <a:extLst>
               <a:ext uri="{FF2B5EF4-FFF2-40B4-BE49-F238E27FC236}">
-                <a16:creationId xmlns:a16="http://schemas.microsoft.com/office/drawing/2014/main" id="{4366B46B-75A9-46D6-90F9-25C66A9BF085}"/>
+                <a16:creationId xmlns:a16="http://schemas.microsoft.com/office/drawing/2014/main" id="{097B2E1A-3022-4B3E-887F-5C2404A30221}"/>
               </a:ext>
             </a:extLst>
           </p:cNvPr>
@@ -8783,143 +9078,47 @@
           <a:lstStyle/>
           <a:p>
             <a:r>
-              <a:rPr lang="it-IT" dirty="0" err="1"/>
-              <a:t>What</a:t>
-            </a:r>
-            <a:r>
               <a:rPr lang="it-IT" dirty="0"/>
-              <a:t> </a:t>
-            </a:r>
-            <a:r>
-              <a:rPr lang="it-IT" dirty="0" err="1"/>
-              <a:t>is</a:t>
-            </a:r>
-            <a:r>
-              <a:rPr lang="it-IT" dirty="0"/>
-              <a:t> </a:t>
-            </a:r>
-            <a:r>
-              <a:rPr lang="it-IT" dirty="0" err="1"/>
-              <a:t>Gradle</a:t>
-            </a:r>
-            <a:r>
-              <a:rPr lang="it-IT" dirty="0"/>
-              <a:t>?</a:t>
-            </a:r>
-          </a:p>
-        </p:txBody>
-      </p:sp>
-      <p:sp>
-        <p:nvSpPr>
-          <p:cNvPr id="3" name="Segnaposto contenuto 2">
-            <a:extLst>
-              <a:ext uri="{FF2B5EF4-FFF2-40B4-BE49-F238E27FC236}">
-                <a16:creationId xmlns:a16="http://schemas.microsoft.com/office/drawing/2014/main" id="{D153291F-A597-472D-BFC2-593BBB1E0ABD}"/>
-              </a:ext>
-            </a:extLst>
-          </p:cNvPr>
-          <p:cNvSpPr>
-            <a:spLocks noGrp="1"/>
-          </p:cNvSpPr>
+              <a:t>Design Mode</a:t>
+            </a:r>
+          </a:p>
+        </p:txBody>
+      </p:sp>
+      <p:pic>
+        <p:nvPicPr>
+          <p:cNvPr id="6" name="Segnaposto contenuto 5">
+            <a:extLst>
+              <a:ext uri="{FF2B5EF4-FFF2-40B4-BE49-F238E27FC236}">
+                <a16:creationId xmlns:a16="http://schemas.microsoft.com/office/drawing/2014/main" id="{6F2B7F70-A1CC-426D-B349-1BE79A42D9B4}"/>
+              </a:ext>
+            </a:extLst>
+          </p:cNvPr>
+          <p:cNvPicPr>
+            <a:picLocks noGrp="1" noChangeAspect="1"/>
+          </p:cNvPicPr>
           <p:nvPr>
             <p:ph idx="1"/>
           </p:nvPr>
-        </p:nvSpPr>
-        <p:spPr/>
-        <p:txBody>
-          <a:bodyPr>
-            <a:normAutofit fontScale="85000" lnSpcReduction="20000"/>
-          </a:bodyPr>
-          <a:lstStyle/>
-          <a:p>
-            <a:pPr marL="0" indent="0">
-              <a:buNone/>
-            </a:pPr>
-            <a:r>
-              <a:rPr lang="en-US" dirty="0"/>
-              <a:t>Gradle is an open-source and general-purpose build automation tool that is designed to be flexible enough to build almost any type of software.</a:t>
-            </a:r>
-          </a:p>
-          <a:p>
-            <a:pPr marL="0" indent="0">
-              <a:buNone/>
-            </a:pPr>
-            <a:endParaRPr lang="en-US" dirty="0"/>
-          </a:p>
-          <a:p>
-            <a:pPr marL="0" indent="0">
-              <a:buNone/>
-            </a:pPr>
-            <a:r>
-              <a:rPr lang="en-US" dirty="0"/>
-              <a:t>Gradle manage your android project build, dependencies, versions, resources…</a:t>
-            </a:r>
-          </a:p>
-          <a:p>
-            <a:pPr marL="0" indent="0">
-              <a:buNone/>
-            </a:pPr>
-            <a:endParaRPr lang="en-US" dirty="0"/>
-          </a:p>
-          <a:p>
-            <a:pPr marL="0" indent="0">
-              <a:buNone/>
-            </a:pPr>
-            <a:r>
-              <a:rPr lang="en-US" dirty="0"/>
-              <a:t>Is based on Groovy or Kotlin scripts</a:t>
-            </a:r>
-          </a:p>
-          <a:p>
-            <a:pPr marL="0" indent="0">
-              <a:buNone/>
-            </a:pPr>
-            <a:endParaRPr lang="en-US" dirty="0"/>
-          </a:p>
-          <a:p>
-            <a:pPr marL="0" indent="0">
-              <a:buNone/>
-            </a:pPr>
-            <a:r>
-              <a:rPr lang="en-US" dirty="0"/>
-              <a:t>Is available in many IDE</a:t>
-            </a:r>
-          </a:p>
-          <a:p>
-            <a:pPr marL="0" indent="0">
-              <a:buNone/>
-            </a:pPr>
-            <a:endParaRPr lang="en-US" dirty="0"/>
-          </a:p>
-          <a:p>
-            <a:pPr marL="0" indent="0">
-              <a:buNone/>
-            </a:pPr>
-            <a:r>
-              <a:rPr lang="en-US" dirty="0"/>
-              <a:t>Run on JVM (to use it you must install JDK)</a:t>
-            </a:r>
-          </a:p>
-          <a:p>
-            <a:pPr marL="0" indent="0">
-              <a:buNone/>
-            </a:pPr>
-            <a:endParaRPr lang="en-US" dirty="0"/>
-          </a:p>
-          <a:p>
-            <a:pPr marL="0" indent="0">
-              <a:buNone/>
-            </a:pPr>
-            <a:endParaRPr lang="it-IT" dirty="0"/>
-          </a:p>
-        </p:txBody>
-      </p:sp>
+        </p:nvPicPr>
+        <p:blipFill>
+          <a:blip r:embed="rId2"/>
+          <a:stretch>
+            <a:fillRect/>
+          </a:stretch>
+        </p:blipFill>
+        <p:spPr>
+          <a:xfrm>
+            <a:off x="1248605" y="1600200"/>
+            <a:ext cx="9694789" cy="4525963"/>
+          </a:xfrm>
+        </p:spPr>
+      </p:pic>
       <p:sp>
         <p:nvSpPr>
           <p:cNvPr id="4" name="Segnaposto numero diapositiva 3">
             <a:extLst>
               <a:ext uri="{FF2B5EF4-FFF2-40B4-BE49-F238E27FC236}">
-                <a16:creationId xmlns:a16="http://schemas.microsoft.com/office/drawing/2014/main" id="{968FFE9A-039C-417D-8904-521AA37A4D07}"/>
+                <a16:creationId xmlns:a16="http://schemas.microsoft.com/office/drawing/2014/main" id="{3A7B6A2A-AAA0-4F0A-B3B6-2C225CB4BFCC}"/>
               </a:ext>
             </a:extLst>
           </p:cNvPr>
@@ -8939,6 +9138,189 @@
               <a:rPr lang="it-IT" smtClean="0"/>
               <a:pPr/>
               <a:t>20</a:t>
+            </a:fld>
+            <a:endParaRPr lang="it-IT" dirty="0"/>
+          </a:p>
+        </p:txBody>
+      </p:sp>
+    </p:spTree>
+    <p:extLst>
+      <p:ext uri="{BB962C8B-B14F-4D97-AF65-F5344CB8AC3E}">
+        <p14:creationId xmlns:p14="http://schemas.microsoft.com/office/powerpoint/2010/main" val="317630163"/>
+      </p:ext>
+    </p:extLst>
+  </p:cSld>
+  <p:clrMapOvr>
+    <a:masterClrMapping/>
+  </p:clrMapOvr>
+</p:sld>
+</file>
+
+<file path=ppt/slides/slide21.xml><?xml version="1.0" encoding="utf-8"?>
+<p:sld xmlns:a="http://schemas.openxmlformats.org/drawingml/2006/main" xmlns:r="http://schemas.openxmlformats.org/officeDocument/2006/relationships" xmlns:p="http://schemas.openxmlformats.org/presentationml/2006/main">
+  <p:cSld>
+    <p:spTree>
+      <p:nvGrpSpPr>
+        <p:cNvPr id="1" name=""/>
+        <p:cNvGrpSpPr/>
+        <p:nvPr/>
+      </p:nvGrpSpPr>
+      <p:grpSpPr>
+        <a:xfrm>
+          <a:off x="0" y="0"/>
+          <a:ext cx="0" cy="0"/>
+          <a:chOff x="0" y="0"/>
+          <a:chExt cx="0" cy="0"/>
+        </a:xfrm>
+      </p:grpSpPr>
+      <p:sp>
+        <p:nvSpPr>
+          <p:cNvPr id="2" name="Titolo 1">
+            <a:extLst>
+              <a:ext uri="{FF2B5EF4-FFF2-40B4-BE49-F238E27FC236}">
+                <a16:creationId xmlns:a16="http://schemas.microsoft.com/office/drawing/2014/main" id="{4366B46B-75A9-46D6-90F9-25C66A9BF085}"/>
+              </a:ext>
+            </a:extLst>
+          </p:cNvPr>
+          <p:cNvSpPr>
+            <a:spLocks noGrp="1"/>
+          </p:cNvSpPr>
+          <p:nvPr>
+            <p:ph type="title"/>
+          </p:nvPr>
+        </p:nvSpPr>
+        <p:spPr/>
+        <p:txBody>
+          <a:bodyPr/>
+          <a:lstStyle/>
+          <a:p>
+            <a:r>
+              <a:rPr lang="it-IT" dirty="0" err="1"/>
+              <a:t>What</a:t>
+            </a:r>
+            <a:r>
+              <a:rPr lang="it-IT" dirty="0"/>
+              <a:t> </a:t>
+            </a:r>
+            <a:r>
+              <a:rPr lang="it-IT" dirty="0" err="1"/>
+              <a:t>is</a:t>
+            </a:r>
+            <a:r>
+              <a:rPr lang="it-IT" dirty="0"/>
+              <a:t> </a:t>
+            </a:r>
+            <a:r>
+              <a:rPr lang="it-IT" dirty="0" err="1"/>
+              <a:t>Gradle</a:t>
+            </a:r>
+            <a:r>
+              <a:rPr lang="it-IT" dirty="0"/>
+              <a:t>?</a:t>
+            </a:r>
+          </a:p>
+        </p:txBody>
+      </p:sp>
+      <p:sp>
+        <p:nvSpPr>
+          <p:cNvPr id="3" name="Segnaposto contenuto 2">
+            <a:extLst>
+              <a:ext uri="{FF2B5EF4-FFF2-40B4-BE49-F238E27FC236}">
+                <a16:creationId xmlns:a16="http://schemas.microsoft.com/office/drawing/2014/main" id="{D153291F-A597-472D-BFC2-593BBB1E0ABD}"/>
+              </a:ext>
+            </a:extLst>
+          </p:cNvPr>
+          <p:cNvSpPr>
+            <a:spLocks noGrp="1"/>
+          </p:cNvSpPr>
+          <p:nvPr>
+            <p:ph idx="1"/>
+          </p:nvPr>
+        </p:nvSpPr>
+        <p:spPr/>
+        <p:txBody>
+          <a:bodyPr>
+            <a:normAutofit/>
+          </a:bodyPr>
+          <a:lstStyle/>
+          <a:p>
+            <a:pPr marL="0" indent="0">
+              <a:buNone/>
+            </a:pPr>
+            <a:r>
+              <a:rPr lang="en-US" dirty="0"/>
+              <a:t>Gradle is an open-source and general-purpose build automation tool that is designed to be flexible enough to build almost any type of software.</a:t>
+            </a:r>
+          </a:p>
+          <a:p>
+            <a:r>
+              <a:rPr lang="en-US" dirty="0"/>
+              <a:t>Is based on Groovy or Kotlin scripts</a:t>
+            </a:r>
+          </a:p>
+          <a:p>
+            <a:r>
+              <a:rPr lang="en-US" dirty="0"/>
+              <a:t>Run on JVM (to use it you must install JDK)</a:t>
+            </a:r>
+          </a:p>
+          <a:p>
+            <a:r>
+              <a:rPr lang="en-US" dirty="0"/>
+              <a:t>Gradle manage your android project build, dependencies, versions, resources…</a:t>
+            </a:r>
+          </a:p>
+          <a:p>
+            <a:pPr marL="0" indent="0">
+              <a:buNone/>
+            </a:pPr>
+            <a:endParaRPr lang="en-US" dirty="0"/>
+          </a:p>
+          <a:p>
+            <a:pPr marL="0" indent="0">
+              <a:buNone/>
+            </a:pPr>
+            <a:endParaRPr lang="en-US" dirty="0"/>
+          </a:p>
+          <a:p>
+            <a:pPr marL="0" indent="0">
+              <a:buNone/>
+            </a:pPr>
+            <a:endParaRPr lang="en-US" dirty="0"/>
+          </a:p>
+          <a:p>
+            <a:pPr marL="0" indent="0">
+              <a:buNone/>
+            </a:pPr>
+            <a:endParaRPr lang="it-IT" dirty="0"/>
+          </a:p>
+        </p:txBody>
+      </p:sp>
+      <p:sp>
+        <p:nvSpPr>
+          <p:cNvPr id="4" name="Segnaposto numero diapositiva 3">
+            <a:extLst>
+              <a:ext uri="{FF2B5EF4-FFF2-40B4-BE49-F238E27FC236}">
+                <a16:creationId xmlns:a16="http://schemas.microsoft.com/office/drawing/2014/main" id="{968FFE9A-039C-417D-8904-521AA37A4D07}"/>
+              </a:ext>
+            </a:extLst>
+          </p:cNvPr>
+          <p:cNvSpPr>
+            <a:spLocks noGrp="1"/>
+          </p:cNvSpPr>
+          <p:nvPr>
+            <p:ph type="sldNum" sz="quarter" idx="12"/>
+          </p:nvPr>
+        </p:nvSpPr>
+        <p:spPr/>
+        <p:txBody>
+          <a:bodyPr/>
+          <a:lstStyle/>
+          <a:p>
+            <a:fld id="{D2040F39-7941-49A4-B48D-F201B18B6351}" type="slidenum">
+              <a:rPr lang="it-IT" smtClean="0"/>
+              <a:pPr/>
+              <a:t>21</a:t>
             </a:fld>
             <a:endParaRPr lang="it-IT" dirty="0"/>
           </a:p>
@@ -9170,53 +9552,6 @@
           </p:pic>
         </mc:Fallback>
       </mc:AlternateContent>
-      <p:sp>
-        <p:nvSpPr>
-          <p:cNvPr id="18" name="Ovale 17">
-            <a:extLst>
-              <a:ext uri="{FF2B5EF4-FFF2-40B4-BE49-F238E27FC236}">
-                <a16:creationId xmlns:a16="http://schemas.microsoft.com/office/drawing/2014/main" id="{8C71A402-D5E3-488A-BF95-9D257D62073F}"/>
-              </a:ext>
-            </a:extLst>
-          </p:cNvPr>
-          <p:cNvSpPr/>
-          <p:nvPr/>
-        </p:nvSpPr>
-        <p:spPr>
-          <a:xfrm>
-            <a:off x="1787665" y="6210301"/>
-            <a:ext cx="334297" cy="304800"/>
-          </a:xfrm>
-          <a:prstGeom prst="ellipse">
-            <a:avLst/>
-          </a:prstGeom>
-        </p:spPr>
-        <p:style>
-          <a:lnRef idx="1">
-            <a:schemeClr val="accent1"/>
-          </a:lnRef>
-          <a:fillRef idx="3">
-            <a:schemeClr val="accent1"/>
-          </a:fillRef>
-          <a:effectRef idx="2">
-            <a:schemeClr val="accent1"/>
-          </a:effectRef>
-          <a:fontRef idx="minor">
-            <a:schemeClr val="lt1"/>
-          </a:fontRef>
-        </p:style>
-        <p:txBody>
-          <a:bodyPr rtlCol="0" anchor="ctr"/>
-          <a:lstStyle/>
-          <a:p>
-            <a:pPr algn="ctr"/>
-            <a:r>
-              <a:rPr lang="it-IT" dirty="0"/>
-              <a:t>2</a:t>
-            </a:r>
-          </a:p>
-        </p:txBody>
-      </p:sp>
       <p:pic>
         <p:nvPicPr>
           <p:cNvPr id="20" name="Segnaposto contenuto 4">
@@ -11274,7 +11609,7 @@
           <p:cNvPr id="2" name="Titolo 1">
             <a:extLst>
               <a:ext uri="{FF2B5EF4-FFF2-40B4-BE49-F238E27FC236}">
-                <a16:creationId xmlns:a16="http://schemas.microsoft.com/office/drawing/2014/main" id="{90308693-5A5D-44AE-B724-F05FB240EA4E}"/>
+                <a16:creationId xmlns:a16="http://schemas.microsoft.com/office/drawing/2014/main" id="{F7919D87-27CF-4970-A68F-7242C0C72D47}"/>
               </a:ext>
             </a:extLst>
           </p:cNvPr>
@@ -11285,204 +11620,176 @@
             <p:ph type="title"/>
           </p:nvPr>
         </p:nvSpPr>
-        <p:spPr>
-          <a:xfrm>
-            <a:off x="609600" y="274638"/>
-            <a:ext cx="10972800" cy="1143000"/>
-          </a:xfrm>
-        </p:spPr>
-        <p:txBody>
-          <a:bodyPr vert="horz" lIns="91440" tIns="45720" rIns="91440" bIns="45720" rtlCol="0" anchor="ctr">
-            <a:normAutofit/>
-          </a:bodyPr>
+        <p:spPr/>
+        <p:txBody>
+          <a:bodyPr/>
           <a:lstStyle/>
           <a:p>
             <a:r>
               <a:rPr lang="it-IT" dirty="0"/>
-              <a:t>AVD Manager</a:t>
-            </a:r>
-          </a:p>
-        </p:txBody>
-      </p:sp>
-      <p:sp>
-        <p:nvSpPr>
-          <p:cNvPr id="6" name="CasellaDiTesto 5">
-            <a:extLst>
-              <a:ext uri="{FF2B5EF4-FFF2-40B4-BE49-F238E27FC236}">
-                <a16:creationId xmlns:a16="http://schemas.microsoft.com/office/drawing/2014/main" id="{36B6F786-0700-4461-A84D-E93945C5397F}"/>
-              </a:ext>
-            </a:extLst>
-          </p:cNvPr>
-          <p:cNvSpPr txBox="1"/>
-          <p:nvPr/>
-        </p:nvSpPr>
-        <p:spPr>
-          <a:xfrm>
-            <a:off x="609600" y="1600201"/>
-            <a:ext cx="10972800" cy="4525963"/>
-          </a:xfrm>
-          <a:prstGeom prst="rect">
-            <a:avLst/>
-          </a:prstGeom>
-        </p:spPr>
-        <p:txBody>
-          <a:bodyPr vert="horz" lIns="91440" tIns="45720" rIns="91440" bIns="45720" rtlCol="0">
-            <a:normAutofit/>
-          </a:bodyPr>
-          <a:lstStyle/>
-          <a:p>
-            <a:pPr defTabSz="457200">
-              <a:spcBef>
-                <a:spcPct val="20000"/>
-              </a:spcBef>
-              <a:buFont typeface="Arial"/>
+              <a:t>SDK Manager</a:t>
+            </a:r>
+          </a:p>
+        </p:txBody>
+      </p:sp>
+      <p:sp>
+        <p:nvSpPr>
+          <p:cNvPr id="4" name="Segnaposto contenuto 3">
+            <a:extLst>
+              <a:ext uri="{FF2B5EF4-FFF2-40B4-BE49-F238E27FC236}">
+                <a16:creationId xmlns:a16="http://schemas.microsoft.com/office/drawing/2014/main" id="{8421979C-1273-4156-95AD-9628C6149B51}"/>
+              </a:ext>
+            </a:extLst>
+          </p:cNvPr>
+          <p:cNvSpPr>
+            <a:spLocks noGrp="1"/>
+          </p:cNvSpPr>
+          <p:nvPr>
+            <p:ph sz="half" idx="2"/>
+          </p:nvPr>
+        </p:nvSpPr>
+        <p:spPr/>
+        <p:txBody>
+          <a:bodyPr/>
+          <a:lstStyle/>
+          <a:p>
+            <a:pPr marL="0" indent="0">
+              <a:buNone/>
             </a:pPr>
             <a:r>
-              <a:rPr lang="it-IT" sz="3200" dirty="0"/>
-              <a:t>In Android Studio </a:t>
-            </a:r>
-            <a:r>
-              <a:rPr lang="it-IT" sz="3200" dirty="0" err="1"/>
+              <a:rPr lang="it-IT" dirty="0"/>
+              <a:t>Tools </a:t>
+            </a:r>
+            <a:r>
+              <a:rPr lang="it-IT" dirty="0">
+                <a:sym typeface="Wingdings" panose="05000000000000000000" pitchFamily="2" charset="2"/>
+              </a:rPr>
+              <a:t> SDK manager</a:t>
+            </a:r>
+            <a:endParaRPr lang="it-IT" dirty="0"/>
+          </a:p>
+          <a:p>
+            <a:pPr marL="0" indent="0">
+              <a:buNone/>
+            </a:pPr>
+            <a:r>
+              <a:rPr lang="it-IT" dirty="0" err="1"/>
+              <a:t>Manage</a:t>
+            </a:r>
+            <a:r>
+              <a:rPr lang="it-IT" dirty="0"/>
+              <a:t> </a:t>
+            </a:r>
+            <a:r>
+              <a:rPr lang="it-IT" dirty="0" err="1"/>
+              <a:t>Additional</a:t>
+            </a:r>
+            <a:r>
+              <a:rPr lang="it-IT" dirty="0"/>
+              <a:t> SDK Components. </a:t>
+            </a:r>
+          </a:p>
+          <a:p>
+            <a:r>
+              <a:rPr lang="it-IT" dirty="0">
+                <a:solidFill>
+                  <a:srgbClr val="FF0000"/>
+                </a:solidFill>
+              </a:rPr>
+              <a:t>SDK Platform</a:t>
+            </a:r>
+            <a:r>
+              <a:rPr lang="it-IT" dirty="0"/>
+              <a:t>: </a:t>
+            </a:r>
+            <a:r>
+              <a:rPr lang="it-IT" dirty="0" err="1"/>
               <a:t>you</a:t>
             </a:r>
             <a:r>
-              <a:rPr lang="it-IT" sz="3200" dirty="0"/>
-              <a:t> can create a AVD (Android Virtual Device) an emulator </a:t>
-            </a:r>
-            <a:r>
-              <a:rPr lang="it-IT" sz="3200" dirty="0" err="1"/>
-              <a:t>where</a:t>
-            </a:r>
-            <a:r>
-              <a:rPr lang="it-IT" sz="3200" dirty="0"/>
+              <a:rPr lang="it-IT" dirty="0"/>
+              <a:t> can </a:t>
+            </a:r>
+            <a:r>
+              <a:rPr lang="it-IT" dirty="0" err="1"/>
+              <a:t>install</a:t>
+            </a:r>
+            <a:r>
+              <a:rPr lang="it-IT" dirty="0"/>
+              <a:t> SDK </a:t>
+            </a:r>
+            <a:r>
+              <a:rPr lang="it-IT" dirty="0" err="1"/>
+              <a:t>version</a:t>
+            </a:r>
+            <a:r>
+              <a:rPr lang="it-IT" dirty="0"/>
+              <a:t> and </a:t>
+            </a:r>
+            <a:r>
+              <a:rPr lang="it-IT" dirty="0" err="1"/>
+              <a:t>related</a:t>
+            </a:r>
+            <a:r>
+              <a:rPr lang="it-IT" dirty="0"/>
+              <a:t> API</a:t>
+            </a:r>
+          </a:p>
+          <a:p>
+            <a:r>
+              <a:rPr lang="it-IT" dirty="0">
+                <a:solidFill>
+                  <a:srgbClr val="FF0000"/>
+                </a:solidFill>
+              </a:rPr>
+              <a:t>SDK tools</a:t>
+            </a:r>
+            <a:r>
+              <a:rPr lang="it-IT" dirty="0"/>
+              <a:t>: </a:t>
+            </a:r>
+            <a:r>
+              <a:rPr lang="it-IT" dirty="0" err="1"/>
+              <a:t>you</a:t>
+            </a:r>
+            <a:r>
+              <a:rPr lang="it-IT" dirty="0"/>
+              <a:t> can </a:t>
+            </a:r>
+            <a:r>
+              <a:rPr lang="it-IT" dirty="0" err="1"/>
+              <a:t>see</a:t>
+            </a:r>
+            <a:r>
+              <a:rPr lang="it-IT" dirty="0"/>
               <a:t> </a:t>
             </a:r>
             <a:r>
-              <a:rPr lang="it-IT" sz="3200" dirty="0" err="1"/>
-              <a:t>you</a:t>
-            </a:r>
-            <a:r>
-              <a:rPr lang="it-IT" sz="3200" dirty="0"/>
-              <a:t> can </a:t>
-            </a:r>
-            <a:r>
-              <a:rPr lang="it-IT" sz="3200" dirty="0" err="1"/>
-              <a:t>install</a:t>
-            </a:r>
-            <a:r>
-              <a:rPr lang="it-IT" sz="3200" dirty="0"/>
-              <a:t> and  </a:t>
-            </a:r>
-            <a:r>
-              <a:rPr lang="it-IT" sz="3200" dirty="0" err="1"/>
-              <a:t>run</a:t>
-            </a:r>
-            <a:r>
-              <a:rPr lang="it-IT" sz="3200" dirty="0"/>
-              <a:t> </a:t>
-            </a:r>
-            <a:r>
-              <a:rPr lang="it-IT" sz="3200" dirty="0" err="1"/>
-              <a:t>your</a:t>
-            </a:r>
-            <a:r>
-              <a:rPr lang="it-IT" sz="3200" dirty="0"/>
-              <a:t> </a:t>
-            </a:r>
-            <a:r>
-              <a:rPr lang="it-IT" sz="3200" dirty="0" err="1"/>
-              <a:t>application</a:t>
-            </a:r>
-            <a:r>
-              <a:rPr lang="it-IT" sz="3200" dirty="0"/>
-              <a:t>.</a:t>
-            </a:r>
-          </a:p>
-          <a:p>
-            <a:pPr defTabSz="457200">
-              <a:spcBef>
-                <a:spcPct val="20000"/>
-              </a:spcBef>
-              <a:buFont typeface="Arial"/>
+              <a:rPr lang="it-IT" dirty="0" err="1"/>
+              <a:t>available</a:t>
+            </a:r>
+            <a:r>
+              <a:rPr lang="it-IT" dirty="0"/>
+              <a:t> update and new tools</a:t>
+            </a:r>
+          </a:p>
+          <a:p>
+            <a:endParaRPr lang="it-IT" dirty="0"/>
+          </a:p>
+          <a:p>
+            <a:pPr marL="0" indent="0">
+              <a:buNone/>
             </a:pPr>
-            <a:r>
-              <a:rPr lang="it-IT" sz="3200" dirty="0"/>
-              <a:t>AVD Manager </a:t>
-            </a:r>
-            <a:r>
-              <a:rPr lang="it-IT" sz="3200" dirty="0" err="1"/>
-              <a:t>is</a:t>
-            </a:r>
-            <a:r>
-              <a:rPr lang="it-IT" sz="3200" dirty="0"/>
-              <a:t> the tool </a:t>
-            </a:r>
-            <a:r>
-              <a:rPr lang="it-IT" sz="3200" dirty="0" err="1"/>
-              <a:t>that</a:t>
-            </a:r>
-            <a:r>
-              <a:rPr lang="it-IT" sz="3200" dirty="0"/>
-              <a:t> help </a:t>
-            </a:r>
-            <a:r>
-              <a:rPr lang="it-IT" sz="3200" dirty="0" err="1"/>
-              <a:t>you</a:t>
-            </a:r>
-            <a:r>
-              <a:rPr lang="it-IT" sz="3200" dirty="0"/>
-              <a:t> to create and </a:t>
-            </a:r>
-            <a:r>
-              <a:rPr lang="it-IT" sz="3200" dirty="0" err="1"/>
-              <a:t>manage</a:t>
-            </a:r>
-            <a:r>
-              <a:rPr lang="it-IT" sz="3200" dirty="0"/>
-              <a:t> </a:t>
-            </a:r>
-            <a:r>
-              <a:rPr lang="it-IT" sz="3200" dirty="0" err="1"/>
-              <a:t>your</a:t>
-            </a:r>
-            <a:r>
-              <a:rPr lang="it-IT" sz="3200" dirty="0"/>
-              <a:t> AVD.</a:t>
-            </a:r>
-          </a:p>
-          <a:p>
-            <a:pPr defTabSz="457200">
-              <a:spcBef>
-                <a:spcPct val="20000"/>
-              </a:spcBef>
-              <a:buFont typeface="Arial"/>
-            </a:pPr>
-            <a:endParaRPr lang="it-IT" sz="3200" dirty="0"/>
-          </a:p>
-          <a:p>
-            <a:pPr defTabSz="457200">
-              <a:spcBef>
-                <a:spcPct val="20000"/>
-              </a:spcBef>
-              <a:buFont typeface="Arial"/>
-            </a:pPr>
-            <a:r>
-              <a:rPr lang="it-IT" sz="3200" dirty="0" err="1"/>
-              <a:t>You</a:t>
-            </a:r>
-            <a:r>
-              <a:rPr lang="it-IT" sz="3200" dirty="0"/>
-              <a:t> can open AVD Manager from the toolbar.</a:t>
-            </a:r>
-          </a:p>
-        </p:txBody>
-      </p:sp>
-      <p:sp>
-        <p:nvSpPr>
-          <p:cNvPr id="4" name="Segnaposto numero diapositiva 3">
-            <a:extLst>
-              <a:ext uri="{FF2B5EF4-FFF2-40B4-BE49-F238E27FC236}">
-                <a16:creationId xmlns:a16="http://schemas.microsoft.com/office/drawing/2014/main" id="{18ADE28F-C35D-4E6F-9A6D-3A952C3F0099}"/>
+            <a:endParaRPr lang="it-IT" dirty="0"/>
+          </a:p>
+        </p:txBody>
+      </p:sp>
+      <p:sp>
+        <p:nvSpPr>
+          <p:cNvPr id="5" name="Segnaposto numero diapositiva 4">
+            <a:extLst>
+              <a:ext uri="{FF2B5EF4-FFF2-40B4-BE49-F238E27FC236}">
+                <a16:creationId xmlns:a16="http://schemas.microsoft.com/office/drawing/2014/main" id="{2BD54CC3-3F60-4360-80FA-82CB30AF02E1}"/>
               </a:ext>
             </a:extLst>
           </p:cNvPr>
@@ -11493,46 +11800,53 @@
             <p:ph type="sldNum" sz="quarter" idx="12"/>
           </p:nvPr>
         </p:nvSpPr>
-        <p:spPr>
-          <a:xfrm>
-            <a:off x="5115480" y="6362701"/>
-            <a:ext cx="6466921" cy="365125"/>
-          </a:xfrm>
-        </p:spPr>
-        <p:txBody>
-          <a:bodyPr>
-            <a:normAutofit/>
-          </a:bodyPr>
-          <a:lstStyle/>
-          <a:p>
-            <a:pPr>
-              <a:lnSpc>
-                <a:spcPct val="90000"/>
-              </a:lnSpc>
-              <a:spcAft>
-                <a:spcPts val="600"/>
-              </a:spcAft>
-            </a:pPr>
+        <p:spPr/>
+        <p:txBody>
+          <a:bodyPr/>
+          <a:lstStyle/>
+          <a:p>
             <a:fld id="{D2040F39-7941-49A4-B48D-F201B18B6351}" type="slidenum">
               <a:rPr lang="it-IT" smtClean="0"/>
-              <a:pPr>
-                <a:lnSpc>
-                  <a:spcPct val="90000"/>
-                </a:lnSpc>
-                <a:spcAft>
-                  <a:spcPts val="600"/>
-                </a:spcAft>
-              </a:pPr>
+              <a:pPr/>
               <a:t>7</a:t>
             </a:fld>
-            <a:endParaRPr lang="it-IT"/>
-          </a:p>
-        </p:txBody>
-      </p:sp>
+            <a:endParaRPr lang="it-IT" dirty="0"/>
+          </a:p>
+        </p:txBody>
+      </p:sp>
+      <p:pic>
+        <p:nvPicPr>
+          <p:cNvPr id="10" name="Segnaposto contenuto 6">
+            <a:extLst>
+              <a:ext uri="{FF2B5EF4-FFF2-40B4-BE49-F238E27FC236}">
+                <a16:creationId xmlns:a16="http://schemas.microsoft.com/office/drawing/2014/main" id="{236115C9-BFCE-4E32-9B57-0D31786CC1FB}"/>
+              </a:ext>
+            </a:extLst>
+          </p:cNvPr>
+          <p:cNvPicPr>
+            <a:picLocks noGrp="1" noChangeAspect="1"/>
+          </p:cNvPicPr>
+          <p:nvPr>
+            <p:ph sz="half" idx="1"/>
+          </p:nvPr>
+        </p:nvPicPr>
+        <p:blipFill>
+          <a:blip r:embed="rId2"/>
+          <a:stretch>
+            <a:fillRect/>
+          </a:stretch>
+        </p:blipFill>
+        <p:spPr>
+          <a:xfrm>
+            <a:off x="609600" y="1906897"/>
+            <a:ext cx="5384800" cy="3912568"/>
+          </a:xfrm>
+        </p:spPr>
+      </p:pic>
     </p:spTree>
     <p:extLst>
       <p:ext uri="{BB962C8B-B14F-4D97-AF65-F5344CB8AC3E}">
-        <p14:creationId xmlns:p14="http://schemas.microsoft.com/office/powerpoint/2010/main" val="2646957755"/>
+        <p14:creationId xmlns:p14="http://schemas.microsoft.com/office/powerpoint/2010/main" val="3309526166"/>
       </p:ext>
     </p:extLst>
   </p:cSld>
@@ -11561,10 +11875,10 @@
       </p:grpSpPr>
       <p:sp>
         <p:nvSpPr>
-          <p:cNvPr id="10" name="Title 1">
-            <a:extLst>
-              <a:ext uri="{FF2B5EF4-FFF2-40B4-BE49-F238E27FC236}">
-                <a16:creationId xmlns:a16="http://schemas.microsoft.com/office/drawing/2014/main" id="{67FAD29A-C6BA-4353-9A90-B9130B45F71E}"/>
+          <p:cNvPr id="2" name="Titolo 1">
+            <a:extLst>
+              <a:ext uri="{FF2B5EF4-FFF2-40B4-BE49-F238E27FC236}">
+                <a16:creationId xmlns:a16="http://schemas.microsoft.com/office/drawing/2014/main" id="{90308693-5A5D-44AE-B724-F05FB240EA4E}"/>
               </a:ext>
             </a:extLst>
           </p:cNvPr>
@@ -11582,76 +11896,187 @@
           </a:xfrm>
         </p:spPr>
         <p:txBody>
-          <a:bodyPr/>
-          <a:lstStyle/>
-          <a:p>
-            <a:r>
-              <a:rPr lang="en-US" dirty="0"/>
-              <a:t>AVD Initialization (1)</a:t>
-            </a:r>
-          </a:p>
-        </p:txBody>
-      </p:sp>
-      <p:pic>
-        <p:nvPicPr>
-          <p:cNvPr id="5" name="Immagine 4">
-            <a:extLst>
-              <a:ext uri="{FF2B5EF4-FFF2-40B4-BE49-F238E27FC236}">
-                <a16:creationId xmlns:a16="http://schemas.microsoft.com/office/drawing/2014/main" id="{2D5096E9-F824-470F-91AE-B68BD0280445}"/>
-              </a:ext>
-            </a:extLst>
-          </p:cNvPr>
-          <p:cNvPicPr>
-            <a:picLocks noChangeAspect="1"/>
-          </p:cNvPicPr>
+          <a:bodyPr vert="horz" lIns="91440" tIns="45720" rIns="91440" bIns="45720" rtlCol="0" anchor="ctr">
+            <a:normAutofit/>
+          </a:bodyPr>
+          <a:lstStyle/>
+          <a:p>
+            <a:r>
+              <a:rPr lang="it-IT" dirty="0"/>
+              <a:t>AVD Manager</a:t>
+            </a:r>
+          </a:p>
+        </p:txBody>
+      </p:sp>
+      <p:sp>
+        <p:nvSpPr>
+          <p:cNvPr id="6" name="CasellaDiTesto 5">
+            <a:extLst>
+              <a:ext uri="{FF2B5EF4-FFF2-40B4-BE49-F238E27FC236}">
+                <a16:creationId xmlns:a16="http://schemas.microsoft.com/office/drawing/2014/main" id="{36B6F786-0700-4461-A84D-E93945C5397F}"/>
+              </a:ext>
+            </a:extLst>
+          </p:cNvPr>
+          <p:cNvSpPr txBox="1"/>
           <p:nvPr/>
-        </p:nvPicPr>
-        <p:blipFill>
-          <a:blip r:embed="rId2"/>
-          <a:stretch>
-            <a:fillRect/>
-          </a:stretch>
-        </p:blipFill>
+        </p:nvSpPr>
         <p:spPr>
           <a:xfrm>
-            <a:off x="609600" y="2591024"/>
-            <a:ext cx="5384800" cy="2544317"/>
+            <a:off x="609600" y="1600201"/>
+            <a:ext cx="10972800" cy="4525963"/>
           </a:xfrm>
           <a:prstGeom prst="rect">
             <a:avLst/>
           </a:prstGeom>
-          <a:noFill/>
-        </p:spPr>
-      </p:pic>
-      <p:sp>
-        <p:nvSpPr>
-          <p:cNvPr id="12" name="Content Placeholder 3">
-            <a:extLst>
-              <a:ext uri="{FF2B5EF4-FFF2-40B4-BE49-F238E27FC236}">
-                <a16:creationId xmlns:a16="http://schemas.microsoft.com/office/drawing/2014/main" id="{9B9313F3-B1EF-46BA-B168-71D78A528A2B}"/>
-              </a:ext>
-            </a:extLst>
-          </p:cNvPr>
-          <p:cNvSpPr>
-            <a:spLocks noGrp="1"/>
-          </p:cNvSpPr>
-          <p:nvPr>
-            <p:ph sz="half" idx="2"/>
-          </p:nvPr>
-        </p:nvSpPr>
-        <p:spPr>
-          <a:xfrm>
-            <a:off x="6197600" y="1600201"/>
-            <a:ext cx="5384800" cy="4525963"/>
-          </a:xfrm>
-        </p:spPr>
-        <p:txBody>
-          <a:bodyPr/>
-          <a:lstStyle/>
-          <a:p>
-            <a:r>
-              <a:rPr lang="en-US" dirty="0"/>
-              <a:t>In this page you create new AVD and manage AVD already existing</a:t>
+        </p:spPr>
+        <p:txBody>
+          <a:bodyPr vert="horz" lIns="91440" tIns="45720" rIns="91440" bIns="45720" rtlCol="0">
+            <a:normAutofit/>
+          </a:bodyPr>
+          <a:lstStyle/>
+          <a:p>
+            <a:pPr defTabSz="457200">
+              <a:spcBef>
+                <a:spcPct val="20000"/>
+              </a:spcBef>
+              <a:buFont typeface="Arial"/>
+            </a:pPr>
+            <a:r>
+              <a:rPr lang="it-IT" sz="3200" dirty="0"/>
+              <a:t>In Android Studio </a:t>
+            </a:r>
+            <a:r>
+              <a:rPr lang="it-IT" sz="3200" dirty="0" err="1"/>
+              <a:t>you</a:t>
+            </a:r>
+            <a:r>
+              <a:rPr lang="it-IT" sz="3200" dirty="0"/>
+              <a:t> can create a AVD (Android Virtual Device) an emulator </a:t>
+            </a:r>
+            <a:r>
+              <a:rPr lang="it-IT" sz="3200" dirty="0" err="1"/>
+              <a:t>where</a:t>
+            </a:r>
+            <a:r>
+              <a:rPr lang="it-IT" sz="3200" dirty="0"/>
+              <a:t> </a:t>
+            </a:r>
+            <a:r>
+              <a:rPr lang="it-IT" sz="3200" dirty="0" err="1"/>
+              <a:t>you</a:t>
+            </a:r>
+            <a:r>
+              <a:rPr lang="it-IT" sz="3200" dirty="0"/>
+              <a:t> can </a:t>
+            </a:r>
+            <a:r>
+              <a:rPr lang="it-IT" sz="3200" dirty="0" err="1"/>
+              <a:t>install</a:t>
+            </a:r>
+            <a:r>
+              <a:rPr lang="it-IT" sz="3200" dirty="0"/>
+              <a:t> and  </a:t>
+            </a:r>
+            <a:r>
+              <a:rPr lang="it-IT" sz="3200" dirty="0" err="1"/>
+              <a:t>run</a:t>
+            </a:r>
+            <a:r>
+              <a:rPr lang="it-IT" sz="3200" dirty="0"/>
+              <a:t> </a:t>
+            </a:r>
+            <a:r>
+              <a:rPr lang="it-IT" sz="3200" dirty="0" err="1"/>
+              <a:t>your</a:t>
+            </a:r>
+            <a:r>
+              <a:rPr lang="it-IT" sz="3200" dirty="0"/>
+              <a:t> </a:t>
+            </a:r>
+            <a:r>
+              <a:rPr lang="it-IT" sz="3200" dirty="0" err="1"/>
+              <a:t>application</a:t>
+            </a:r>
+            <a:r>
+              <a:rPr lang="it-IT" sz="3200" dirty="0"/>
+              <a:t>.</a:t>
+            </a:r>
+          </a:p>
+          <a:p>
+            <a:pPr defTabSz="457200">
+              <a:spcBef>
+                <a:spcPct val="20000"/>
+              </a:spcBef>
+              <a:buFont typeface="Arial"/>
+            </a:pPr>
+            <a:r>
+              <a:rPr lang="it-IT" sz="3200" dirty="0"/>
+              <a:t>AVD Manager </a:t>
+            </a:r>
+            <a:r>
+              <a:rPr lang="it-IT" sz="3200" dirty="0" err="1"/>
+              <a:t>is</a:t>
+            </a:r>
+            <a:r>
+              <a:rPr lang="it-IT" sz="3200" dirty="0"/>
+              <a:t> the tool </a:t>
+            </a:r>
+            <a:r>
+              <a:rPr lang="it-IT" sz="3200" dirty="0" err="1"/>
+              <a:t>that</a:t>
+            </a:r>
+            <a:r>
+              <a:rPr lang="it-IT" sz="3200" dirty="0"/>
+              <a:t> help </a:t>
+            </a:r>
+            <a:r>
+              <a:rPr lang="it-IT" sz="3200" dirty="0" err="1"/>
+              <a:t>you</a:t>
+            </a:r>
+            <a:r>
+              <a:rPr lang="it-IT" sz="3200" dirty="0"/>
+              <a:t> to create and </a:t>
+            </a:r>
+            <a:r>
+              <a:rPr lang="it-IT" sz="3200" dirty="0" err="1"/>
+              <a:t>manage</a:t>
+            </a:r>
+            <a:r>
+              <a:rPr lang="it-IT" sz="3200" dirty="0"/>
+              <a:t> </a:t>
+            </a:r>
+            <a:r>
+              <a:rPr lang="it-IT" sz="3200" dirty="0" err="1"/>
+              <a:t>your</a:t>
+            </a:r>
+            <a:r>
+              <a:rPr lang="it-IT" sz="3200" dirty="0"/>
+              <a:t> AVD.</a:t>
+            </a:r>
+          </a:p>
+          <a:p>
+            <a:pPr defTabSz="457200">
+              <a:spcBef>
+                <a:spcPct val="20000"/>
+              </a:spcBef>
+              <a:buFont typeface="Arial"/>
+            </a:pPr>
+            <a:endParaRPr lang="it-IT" sz="3200" dirty="0"/>
+          </a:p>
+          <a:p>
+            <a:pPr defTabSz="457200">
+              <a:spcBef>
+                <a:spcPct val="20000"/>
+              </a:spcBef>
+              <a:buFont typeface="Arial"/>
+            </a:pPr>
+            <a:r>
+              <a:rPr lang="it-IT" sz="3200" dirty="0" err="1"/>
+              <a:t>You</a:t>
+            </a:r>
+            <a:r>
+              <a:rPr lang="it-IT" sz="3200" dirty="0"/>
+              <a:t> can open AVD Manager from the toolbar.</a:t>
             </a:r>
           </a:p>
         </p:txBody>
@@ -11661,7 +12086,7 @@
           <p:cNvPr id="4" name="Segnaposto numero diapositiva 3">
             <a:extLst>
               <a:ext uri="{FF2B5EF4-FFF2-40B4-BE49-F238E27FC236}">
-                <a16:creationId xmlns:a16="http://schemas.microsoft.com/office/drawing/2014/main" id="{4333FAA8-2F62-487D-AE61-5446775C389F}"/>
+                <a16:creationId xmlns:a16="http://schemas.microsoft.com/office/drawing/2014/main" id="{18ADE28F-C35D-4E6F-9A6D-3A952C3F0099}"/>
               </a:ext>
             </a:extLst>
           </p:cNvPr>
@@ -11711,7 +12136,7 @@
     </p:spTree>
     <p:extLst>
       <p:ext uri="{BB962C8B-B14F-4D97-AF65-F5344CB8AC3E}">
-        <p14:creationId xmlns:p14="http://schemas.microsoft.com/office/powerpoint/2010/main" val="1148573461"/>
+        <p14:creationId xmlns:p14="http://schemas.microsoft.com/office/powerpoint/2010/main" val="2646957755"/>
       </p:ext>
     </p:extLst>
   </p:cSld>
@@ -11743,7 +12168,7 @@
           <p:cNvPr id="10" name="Title 1">
             <a:extLst>
               <a:ext uri="{FF2B5EF4-FFF2-40B4-BE49-F238E27FC236}">
-                <a16:creationId xmlns:a16="http://schemas.microsoft.com/office/drawing/2014/main" id="{D22F39D5-63AA-47E8-882D-D9C86BB1F7B4}"/>
+                <a16:creationId xmlns:a16="http://schemas.microsoft.com/office/drawing/2014/main" id="{67FAD29A-C6BA-4353-9A90-B9130B45F71E}"/>
               </a:ext>
             </a:extLst>
           </p:cNvPr>
@@ -11766,7 +12191,7 @@
           <a:p>
             <a:r>
               <a:rPr lang="en-US" dirty="0"/>
-              <a:t>AVD Initialization (2)</a:t>
+              <a:t>AVD Initialization (1)</a:t>
             </a:r>
           </a:p>
         </p:txBody>
@@ -11776,7 +12201,7 @@
           <p:cNvPr id="5" name="Immagine 4">
             <a:extLst>
               <a:ext uri="{FF2B5EF4-FFF2-40B4-BE49-F238E27FC236}">
-                <a16:creationId xmlns:a16="http://schemas.microsoft.com/office/drawing/2014/main" id="{65BC8B0A-53ED-4890-85D2-7851A4AA3A6D}"/>
+                <a16:creationId xmlns:a16="http://schemas.microsoft.com/office/drawing/2014/main" id="{2D5096E9-F824-470F-91AE-B68BD0280445}"/>
               </a:ext>
             </a:extLst>
           </p:cNvPr>
@@ -11793,8 +12218,8 @@
         </p:blipFill>
         <p:spPr>
           <a:xfrm>
-            <a:off x="609600" y="1729456"/>
-            <a:ext cx="5384800" cy="4267453"/>
+            <a:off x="609600" y="2591024"/>
+            <a:ext cx="5384800" cy="2544317"/>
           </a:xfrm>
           <a:prstGeom prst="rect">
             <a:avLst/>
@@ -11807,7 +12232,7 @@
           <p:cNvPr id="12" name="Content Placeholder 3">
             <a:extLst>
               <a:ext uri="{FF2B5EF4-FFF2-40B4-BE49-F238E27FC236}">
-                <a16:creationId xmlns:a16="http://schemas.microsoft.com/office/drawing/2014/main" id="{B4B4DB28-9573-449E-977F-BE9445BB6892}"/>
+                <a16:creationId xmlns:a16="http://schemas.microsoft.com/office/drawing/2014/main" id="{9B9313F3-B1EF-46BA-B168-71D78A528A2B}"/>
               </a:ext>
             </a:extLst>
           </p:cNvPr>
@@ -11828,58 +12253,10 @@
           <a:bodyPr/>
           <a:lstStyle/>
           <a:p>
-            <a:pPr marL="0" indent="0">
-              <a:buNone/>
-            </a:pPr>
             <a:r>
               <a:rPr lang="en-US" dirty="0"/>
-              <a:t>You can choose </a:t>
-            </a:r>
-          </a:p>
-          <a:p>
-            <a:r>
-              <a:rPr lang="en-US" dirty="0">
-                <a:solidFill>
-                  <a:srgbClr val="FF0000"/>
-                </a:solidFill>
-              </a:rPr>
-              <a:t>Type of AVD </a:t>
-            </a:r>
-            <a:r>
-              <a:rPr lang="en-US" dirty="0"/>
-              <a:t>(Wear, </a:t>
-            </a:r>
-            <a:r>
-              <a:rPr lang="en-US" dirty="0" err="1"/>
-              <a:t>Smarthphone</a:t>
-            </a:r>
-            <a:r>
-              <a:rPr lang="en-US" dirty="0"/>
-              <a:t>, Tablet, Tv and Automotive)</a:t>
-            </a:r>
-          </a:p>
-          <a:p>
-            <a:r>
-              <a:rPr lang="en-US" dirty="0">
-                <a:solidFill>
-                  <a:srgbClr val="FF0000"/>
-                </a:solidFill>
-              </a:rPr>
-              <a:t>Specific AVD </a:t>
-            </a:r>
-            <a:r>
-              <a:rPr lang="en-US" dirty="0"/>
-              <a:t>(e.g. from Google devices list) (is better choose  Play Store integrated AVD)</a:t>
-            </a:r>
-          </a:p>
-          <a:p>
-            <a:endParaRPr lang="en-US" dirty="0"/>
-          </a:p>
-          <a:p>
-            <a:endParaRPr lang="en-US" dirty="0"/>
-          </a:p>
-          <a:p>
-            <a:endParaRPr lang="en-US" dirty="0"/>
+              <a:t>In this page you create new AVD and manage AVD already existing</a:t>
+            </a:r>
           </a:p>
         </p:txBody>
       </p:sp>
@@ -11888,7 +12265,7 @@
           <p:cNvPr id="4" name="Segnaposto numero diapositiva 3">
             <a:extLst>
               <a:ext uri="{FF2B5EF4-FFF2-40B4-BE49-F238E27FC236}">
-                <a16:creationId xmlns:a16="http://schemas.microsoft.com/office/drawing/2014/main" id="{3AC8F005-BD9B-4079-8221-323247795B72}"/>
+                <a16:creationId xmlns:a16="http://schemas.microsoft.com/office/drawing/2014/main" id="{4333FAA8-2F62-487D-AE61-5446775C389F}"/>
               </a:ext>
             </a:extLst>
           </p:cNvPr>
@@ -11938,7 +12315,7 @@
     </p:spTree>
     <p:extLst>
       <p:ext uri="{BB962C8B-B14F-4D97-AF65-F5344CB8AC3E}">
-        <p14:creationId xmlns:p14="http://schemas.microsoft.com/office/powerpoint/2010/main" val="1555829831"/>
+        <p14:creationId xmlns:p14="http://schemas.microsoft.com/office/powerpoint/2010/main" val="1148573461"/>
       </p:ext>
     </p:extLst>
   </p:cSld>

</xml_diff>

<commit_message>
M2 -> COMPLETE (upgrade run end debug, add sample project)
</commit_message>
<xml_diff>
--- a/slides/02 - Android Studio.pptx
+++ b/slides/02 - Android Studio.pptx
@@ -18,15 +18,18 @@
     <p:sldId id="277" r:id="rId12"/>
     <p:sldId id="278" r:id="rId13"/>
     <p:sldId id="279" r:id="rId14"/>
-    <p:sldId id="268" r:id="rId15"/>
-    <p:sldId id="267" r:id="rId16"/>
-    <p:sldId id="269" r:id="rId17"/>
-    <p:sldId id="270" r:id="rId18"/>
-    <p:sldId id="271" r:id="rId19"/>
-    <p:sldId id="274" r:id="rId20"/>
-    <p:sldId id="272" r:id="rId21"/>
-    <p:sldId id="273" r:id="rId22"/>
-    <p:sldId id="275" r:id="rId23"/>
+    <p:sldId id="281" r:id="rId15"/>
+    <p:sldId id="268" r:id="rId16"/>
+    <p:sldId id="283" r:id="rId17"/>
+    <p:sldId id="267" r:id="rId18"/>
+    <p:sldId id="269" r:id="rId19"/>
+    <p:sldId id="270" r:id="rId20"/>
+    <p:sldId id="271" r:id="rId21"/>
+    <p:sldId id="274" r:id="rId22"/>
+    <p:sldId id="272" r:id="rId23"/>
+    <p:sldId id="273" r:id="rId24"/>
+    <p:sldId id="282" r:id="rId25"/>
+    <p:sldId id="275" r:id="rId26"/>
   </p:sldIdLst>
   <p:sldSz cx="12192000" cy="6858000"/>
   <p:notesSz cx="6858000" cy="9144000"/>
@@ -347,7 +350,7 @@
           <a:p>
             <a:fld id="{E8D60466-74B7-40A2-BA8B-04EDC83C4333}" type="datetimeFigureOut">
               <a:rPr lang="it-IT" smtClean="0"/>
-              <a:t>18/12/2021</a:t>
+              <a:t>19/12/2021</a:t>
             </a:fld>
             <a:endParaRPr lang="it-IT"/>
           </a:p>
@@ -545,7 +548,7 @@
           <a:p>
             <a:fld id="{E8D60466-74B7-40A2-BA8B-04EDC83C4333}" type="datetimeFigureOut">
               <a:rPr lang="it-IT" smtClean="0"/>
-              <a:t>18/12/2021</a:t>
+              <a:t>19/12/2021</a:t>
             </a:fld>
             <a:endParaRPr lang="it-IT"/>
           </a:p>
@@ -753,7 +756,7 @@
           <a:p>
             <a:fld id="{E8D60466-74B7-40A2-BA8B-04EDC83C4333}" type="datetimeFigureOut">
               <a:rPr lang="it-IT" smtClean="0"/>
-              <a:t>18/12/2021</a:t>
+              <a:t>19/12/2021</a:t>
             </a:fld>
             <a:endParaRPr lang="it-IT"/>
           </a:p>
@@ -2818,7 +2821,7 @@
           <a:p>
             <a:fld id="{E8D60466-74B7-40A2-BA8B-04EDC83C4333}" type="datetimeFigureOut">
               <a:rPr lang="it-IT" smtClean="0"/>
-              <a:t>18/12/2021</a:t>
+              <a:t>19/12/2021</a:t>
             </a:fld>
             <a:endParaRPr lang="it-IT"/>
           </a:p>
@@ -3933,7 +3936,7 @@
           <a:p>
             <a:fld id="{E8D60466-74B7-40A2-BA8B-04EDC83C4333}" type="datetimeFigureOut">
               <a:rPr lang="it-IT" smtClean="0"/>
-              <a:t>18/12/2021</a:t>
+              <a:t>19/12/2021</a:t>
             </a:fld>
             <a:endParaRPr lang="it-IT"/>
           </a:p>
@@ -4198,7 +4201,7 @@
           <a:p>
             <a:fld id="{E8D60466-74B7-40A2-BA8B-04EDC83C4333}" type="datetimeFigureOut">
               <a:rPr lang="it-IT" smtClean="0"/>
-              <a:t>18/12/2021</a:t>
+              <a:t>19/12/2021</a:t>
             </a:fld>
             <a:endParaRPr lang="it-IT"/>
           </a:p>
@@ -4610,7 +4613,7 @@
           <a:p>
             <a:fld id="{E8D60466-74B7-40A2-BA8B-04EDC83C4333}" type="datetimeFigureOut">
               <a:rPr lang="it-IT" smtClean="0"/>
-              <a:t>18/12/2021</a:t>
+              <a:t>19/12/2021</a:t>
             </a:fld>
             <a:endParaRPr lang="it-IT"/>
           </a:p>
@@ -4751,7 +4754,7 @@
           <a:p>
             <a:fld id="{E8D60466-74B7-40A2-BA8B-04EDC83C4333}" type="datetimeFigureOut">
               <a:rPr lang="it-IT" smtClean="0"/>
-              <a:t>18/12/2021</a:t>
+              <a:t>19/12/2021</a:t>
             </a:fld>
             <a:endParaRPr lang="it-IT"/>
           </a:p>
@@ -4864,7 +4867,7 @@
           <a:p>
             <a:fld id="{E8D60466-74B7-40A2-BA8B-04EDC83C4333}" type="datetimeFigureOut">
               <a:rPr lang="it-IT" smtClean="0"/>
-              <a:t>18/12/2021</a:t>
+              <a:t>19/12/2021</a:t>
             </a:fld>
             <a:endParaRPr lang="it-IT"/>
           </a:p>
@@ -5175,7 +5178,7 @@
           <a:p>
             <a:fld id="{E8D60466-74B7-40A2-BA8B-04EDC83C4333}" type="datetimeFigureOut">
               <a:rPr lang="it-IT" smtClean="0"/>
-              <a:t>18/12/2021</a:t>
+              <a:t>19/12/2021</a:t>
             </a:fld>
             <a:endParaRPr lang="it-IT"/>
           </a:p>
@@ -5463,7 +5466,7 @@
           <a:p>
             <a:fld id="{E8D60466-74B7-40A2-BA8B-04EDC83C4333}" type="datetimeFigureOut">
               <a:rPr lang="it-IT" smtClean="0"/>
-              <a:t>18/12/2021</a:t>
+              <a:t>19/12/2021</a:t>
             </a:fld>
             <a:endParaRPr lang="it-IT"/>
           </a:p>
@@ -5704,7 +5707,7 @@
           <a:p>
             <a:fld id="{E8D60466-74B7-40A2-BA8B-04EDC83C4333}" type="datetimeFigureOut">
               <a:rPr lang="it-IT" smtClean="0"/>
-              <a:t>18/12/2021</a:t>
+              <a:t>19/12/2021</a:t>
             </a:fld>
             <a:endParaRPr lang="it-IT"/>
           </a:p>
@@ -7292,7 +7295,7 @@
           <p:cNvPr id="2" name="Titolo 1">
             <a:extLst>
               <a:ext uri="{FF2B5EF4-FFF2-40B4-BE49-F238E27FC236}">
-                <a16:creationId xmlns:a16="http://schemas.microsoft.com/office/drawing/2014/main" id="{97DD1A6E-48A6-4A64-9701-0CA9448B1108}"/>
+                <a16:creationId xmlns:a16="http://schemas.microsoft.com/office/drawing/2014/main" id="{1E2938E7-044B-4AF2-B9BC-8189B5BFFB35}"/>
               </a:ext>
             </a:extLst>
           </p:cNvPr>
@@ -7314,164 +7317,206 @@
             </a:r>
             <a:r>
               <a:rPr lang="it-IT" dirty="0"/>
-              <a:t>/Debug in </a:t>
-            </a:r>
+              <a:t> and Debug</a:t>
+            </a:r>
+          </a:p>
+        </p:txBody>
+      </p:sp>
+      <p:sp>
+        <p:nvSpPr>
+          <p:cNvPr id="3" name="Segnaposto contenuto 2">
+            <a:extLst>
+              <a:ext uri="{FF2B5EF4-FFF2-40B4-BE49-F238E27FC236}">
+                <a16:creationId xmlns:a16="http://schemas.microsoft.com/office/drawing/2014/main" id="{2A8FC5FC-F0B8-4FA0-AA57-B68E2956BB35}"/>
+              </a:ext>
+            </a:extLst>
+          </p:cNvPr>
+          <p:cNvSpPr>
+            <a:spLocks noGrp="1"/>
+          </p:cNvSpPr>
+          <p:nvPr>
+            <p:ph idx="1"/>
+          </p:nvPr>
+        </p:nvSpPr>
+        <p:spPr/>
+        <p:txBody>
+          <a:bodyPr/>
+          <a:lstStyle/>
+          <a:p>
+            <a:pPr marL="0" indent="0">
+              <a:buNone/>
+            </a:pPr>
             <a:r>
               <a:rPr lang="it-IT" dirty="0" err="1"/>
-              <a:t>real</a:t>
+              <a:t>Run</a:t>
             </a:r>
             <a:r>
               <a:rPr lang="it-IT" dirty="0"/>
-              <a:t> device</a:t>
-            </a:r>
-          </a:p>
-        </p:txBody>
-      </p:sp>
-      <p:sp>
-        <p:nvSpPr>
-          <p:cNvPr id="3" name="Segnaposto contenuto 2">
-            <a:extLst>
-              <a:ext uri="{FF2B5EF4-FFF2-40B4-BE49-F238E27FC236}">
-                <a16:creationId xmlns:a16="http://schemas.microsoft.com/office/drawing/2014/main" id="{3CE613F0-FD57-4722-90F9-11098F329BD1}"/>
-              </a:ext>
-            </a:extLst>
-          </p:cNvPr>
-          <p:cNvSpPr>
-            <a:spLocks noGrp="1"/>
-          </p:cNvSpPr>
-          <p:nvPr>
-            <p:ph idx="1"/>
-          </p:nvPr>
-        </p:nvSpPr>
-        <p:spPr/>
-        <p:txBody>
-          <a:bodyPr/>
-          <a:lstStyle/>
-          <a:p>
-            <a:r>
-              <a:rPr lang="it-IT" sz="2800" dirty="0" err="1"/>
-              <a:t>Activate</a:t>
-            </a:r>
-            <a:r>
-              <a:rPr lang="it-IT" sz="2800" dirty="0"/>
-              <a:t> ADB (Android Debug Bridge) on target device (</a:t>
-            </a:r>
-            <a:r>
-              <a:rPr lang="it-IT" sz="2800" dirty="0" err="1"/>
-              <a:t>only</a:t>
-            </a:r>
-            <a:r>
-              <a:rPr lang="it-IT" sz="2800" dirty="0"/>
-              <a:t> on Android 6.0 or </a:t>
-            </a:r>
-            <a:r>
-              <a:rPr lang="it-IT" sz="2800" dirty="0" err="1"/>
-              <a:t>higher</a:t>
-            </a:r>
-            <a:r>
-              <a:rPr lang="it-IT" sz="2800" dirty="0"/>
+              <a:t> an </a:t>
+            </a:r>
+            <a:r>
+              <a:rPr lang="it-IT" dirty="0" err="1"/>
+              <a:t>application</a:t>
+            </a:r>
+            <a:r>
+              <a:rPr lang="it-IT" dirty="0"/>
+              <a:t> </a:t>
+            </a:r>
+            <a:r>
+              <a:rPr lang="it-IT" dirty="0" err="1"/>
+              <a:t>means</a:t>
+            </a:r>
+            <a:r>
+              <a:rPr lang="it-IT" dirty="0"/>
+              <a:t>:</a:t>
+            </a:r>
+          </a:p>
+          <a:p>
+            <a:r>
+              <a:rPr lang="it-IT" dirty="0" err="1"/>
+              <a:t>Compiles</a:t>
+            </a:r>
+            <a:r>
+              <a:rPr lang="it-IT" dirty="0"/>
+              <a:t> source code to </a:t>
+            </a:r>
+            <a:r>
+              <a:rPr lang="it-IT" dirty="0" err="1"/>
+              <a:t>bytecode</a:t>
+            </a:r>
+            <a:endParaRPr lang="it-IT" dirty="0"/>
+          </a:p>
+          <a:p>
+            <a:r>
+              <a:rPr lang="it-IT" dirty="0" err="1"/>
+              <a:t>Coverts</a:t>
+            </a:r>
+            <a:r>
+              <a:rPr lang="it-IT" dirty="0"/>
+              <a:t> </a:t>
+            </a:r>
+            <a:r>
+              <a:rPr lang="it-IT" dirty="0" err="1"/>
+              <a:t>bytecode</a:t>
+            </a:r>
+            <a:r>
+              <a:rPr lang="it-IT" dirty="0"/>
+              <a:t> to Android </a:t>
+            </a:r>
+            <a:r>
+              <a:rPr lang="it-IT" dirty="0" err="1"/>
+              <a:t>executable</a:t>
+            </a:r>
+            <a:r>
+              <a:rPr lang="it-IT" dirty="0"/>
+              <a:t> (</a:t>
+            </a:r>
+            <a:r>
+              <a:rPr lang="it-IT" i="1" dirty="0"/>
+              <a:t>.</a:t>
+            </a:r>
+            <a:r>
+              <a:rPr lang="it-IT" i="1" dirty="0" err="1"/>
+              <a:t>dex</a:t>
+            </a:r>
+            <a:r>
+              <a:rPr lang="it-IT" dirty="0"/>
               <a:t>)</a:t>
             </a:r>
           </a:p>
           <a:p>
-            <a:pPr lvl="1"/>
-            <a:r>
-              <a:rPr lang="en-US" sz="2400" i="1" dirty="0"/>
-              <a:t>Settings </a:t>
-            </a:r>
-            <a:r>
-              <a:rPr lang="en-US" sz="2400" i="1" dirty="0">
-                <a:sym typeface="Wingdings" panose="05000000000000000000" pitchFamily="2" charset="2"/>
-              </a:rPr>
-              <a:t></a:t>
-            </a:r>
-            <a:r>
-              <a:rPr lang="en-US" sz="2400" i="1" dirty="0"/>
-              <a:t> About Phone/Tablet </a:t>
-            </a:r>
-            <a:r>
-              <a:rPr lang="en-US" sz="2400" i="1" dirty="0">
-                <a:sym typeface="Wingdings" panose="05000000000000000000" pitchFamily="2" charset="2"/>
-              </a:rPr>
-              <a:t></a:t>
-            </a:r>
-            <a:r>
-              <a:rPr lang="en-US" sz="2400" i="1" dirty="0"/>
-              <a:t> Software Information</a:t>
-            </a:r>
-          </a:p>
-          <a:p>
-            <a:pPr lvl="1"/>
-            <a:r>
-              <a:rPr lang="en-US" sz="2400" dirty="0"/>
-              <a:t>Tap on </a:t>
-            </a:r>
-            <a:r>
-              <a:rPr lang="en-US" sz="2400" i="1" dirty="0"/>
-              <a:t>Build number </a:t>
-            </a:r>
-            <a:r>
-              <a:rPr lang="en-US" sz="2400" dirty="0"/>
-              <a:t>field seven times (a message appears indicating that developer mode has been enabled)</a:t>
-            </a:r>
-          </a:p>
-          <a:p>
-            <a:pPr lvl="1"/>
-            <a:r>
-              <a:rPr lang="en-US" sz="2400" dirty="0"/>
-              <a:t>Go to </a:t>
-            </a:r>
-            <a:r>
-              <a:rPr lang="en-US" sz="2400" i="1" dirty="0"/>
-              <a:t>Settings</a:t>
-            </a:r>
-            <a:r>
-              <a:rPr lang="en-US" sz="2400" dirty="0"/>
-              <a:t> page and now appears </a:t>
-            </a:r>
-            <a:r>
-              <a:rPr lang="en-US" sz="2400" i="1" dirty="0"/>
-              <a:t>Developer options</a:t>
-            </a:r>
-          </a:p>
-          <a:p>
-            <a:pPr lvl="1"/>
-            <a:r>
-              <a:rPr lang="en-US" sz="2400" dirty="0"/>
-              <a:t>Switch on </a:t>
-            </a:r>
-            <a:r>
-              <a:rPr lang="en-US" sz="2400" i="1" dirty="0"/>
-              <a:t>USB debugging </a:t>
-            </a:r>
-            <a:r>
-              <a:rPr lang="en-US" sz="2400" dirty="0"/>
-              <a:t>option</a:t>
-            </a:r>
-            <a:endParaRPr lang="it-IT" sz="2400" dirty="0"/>
-          </a:p>
-          <a:p>
-            <a:r>
-              <a:rPr lang="it-IT" sz="2800" dirty="0"/>
-              <a:t>Connect to PC with USB, device </a:t>
-            </a:r>
-            <a:r>
-              <a:rPr lang="it-IT" sz="2800" dirty="0" err="1"/>
-              <a:t>will</a:t>
-            </a:r>
-            <a:r>
-              <a:rPr lang="it-IT" sz="2800" dirty="0"/>
+            <a:r>
+              <a:rPr lang="it-IT" dirty="0"/>
+              <a:t>Packages the </a:t>
+            </a:r>
+            <a:r>
+              <a:rPr lang="it-IT" dirty="0" err="1"/>
+              <a:t>executable</a:t>
+            </a:r>
+            <a:r>
+              <a:rPr lang="it-IT" dirty="0"/>
+              <a:t> and </a:t>
+            </a:r>
+            <a:r>
+              <a:rPr lang="it-IT" dirty="0" err="1"/>
+              <a:t>project’s</a:t>
+            </a:r>
+            <a:r>
+              <a:rPr lang="it-IT" dirty="0"/>
               <a:t> </a:t>
             </a:r>
             <a:r>
-              <a:rPr lang="it-IT" sz="2800" dirty="0" err="1"/>
-              <a:t>appear</a:t>
-            </a:r>
-            <a:r>
-              <a:rPr lang="it-IT" sz="2800" dirty="0"/>
-              <a:t> in Android Studio devices list</a:t>
-            </a:r>
-            <a:endParaRPr lang="en-US" sz="2800" dirty="0"/>
+              <a:rPr lang="it-IT" dirty="0" err="1"/>
+              <a:t>resources</a:t>
+            </a:r>
+            <a:r>
+              <a:rPr lang="it-IT" dirty="0"/>
+              <a:t> and </a:t>
+            </a:r>
+            <a:r>
+              <a:rPr lang="it-IT" dirty="0" err="1"/>
+              <a:t>manifest</a:t>
+            </a:r>
+            <a:r>
+              <a:rPr lang="it-IT" dirty="0"/>
+              <a:t> in Android package (.</a:t>
+            </a:r>
+            <a:r>
+              <a:rPr lang="it-IT" i="1" dirty="0" err="1"/>
+              <a:t>apk</a:t>
+            </a:r>
+            <a:r>
+              <a:rPr lang="it-IT" dirty="0"/>
+              <a:t>)</a:t>
+            </a:r>
+          </a:p>
+          <a:p>
+            <a:r>
+              <a:rPr lang="it-IT" dirty="0" err="1"/>
+              <a:t>Deploys</a:t>
+            </a:r>
+            <a:r>
+              <a:rPr lang="it-IT" dirty="0"/>
+              <a:t> </a:t>
+            </a:r>
+            <a:r>
+              <a:rPr lang="it-IT" dirty="0" err="1"/>
+              <a:t>your</a:t>
+            </a:r>
+            <a:r>
+              <a:rPr lang="it-IT" dirty="0"/>
+              <a:t> APK in target device and </a:t>
+            </a:r>
+            <a:r>
+              <a:rPr lang="it-IT" dirty="0" err="1"/>
+              <a:t>installs</a:t>
+            </a:r>
+            <a:r>
+              <a:rPr lang="it-IT" dirty="0"/>
+              <a:t> </a:t>
+            </a:r>
+            <a:r>
+              <a:rPr lang="it-IT" dirty="0" err="1"/>
+              <a:t>it</a:t>
+            </a:r>
+            <a:r>
+              <a:rPr lang="it-IT" dirty="0"/>
+              <a:t> </a:t>
+            </a:r>
+          </a:p>
+          <a:p>
+            <a:r>
+              <a:rPr lang="it-IT" dirty="0"/>
+              <a:t>Starts </a:t>
+            </a:r>
+            <a:r>
+              <a:rPr lang="it-IT" dirty="0" err="1"/>
+              <a:t>application</a:t>
+            </a:r>
+            <a:endParaRPr lang="it-IT" dirty="0"/>
+          </a:p>
+          <a:p>
+            <a:endParaRPr lang="it-IT" dirty="0"/>
           </a:p>
         </p:txBody>
       </p:sp>
@@ -7480,7 +7525,7 @@
           <p:cNvPr id="4" name="Segnaposto numero diapositiva 3">
             <a:extLst>
               <a:ext uri="{FF2B5EF4-FFF2-40B4-BE49-F238E27FC236}">
-                <a16:creationId xmlns:a16="http://schemas.microsoft.com/office/drawing/2014/main" id="{D76CDC0E-8C87-4D48-93CC-B2186DF0CC16}"/>
+                <a16:creationId xmlns:a16="http://schemas.microsoft.com/office/drawing/2014/main" id="{9D75AE46-D416-4A87-BCB5-925D12DFD6C1}"/>
               </a:ext>
             </a:extLst>
           </p:cNvPr>
@@ -7508,7 +7553,7 @@
     </p:spTree>
     <p:extLst>
       <p:ext uri="{BB962C8B-B14F-4D97-AF65-F5344CB8AC3E}">
-        <p14:creationId xmlns:p14="http://schemas.microsoft.com/office/powerpoint/2010/main" val="2217072517"/>
+        <p14:creationId xmlns:p14="http://schemas.microsoft.com/office/powerpoint/2010/main" val="3672908030"/>
       </p:ext>
     </p:extLst>
   </p:cSld>
@@ -7540,7 +7585,7 @@
           <p:cNvPr id="2" name="Titolo 1">
             <a:extLst>
               <a:ext uri="{FF2B5EF4-FFF2-40B4-BE49-F238E27FC236}">
-                <a16:creationId xmlns:a16="http://schemas.microsoft.com/office/drawing/2014/main" id="{845908A6-95BF-4881-AB3C-D754E8EAD6EA}"/>
+                <a16:creationId xmlns:a16="http://schemas.microsoft.com/office/drawing/2014/main" id="{97DD1A6E-48A6-4A64-9701-0CA9448B1108}"/>
               </a:ext>
             </a:extLst>
           </p:cNvPr>
@@ -7557,8 +7602,20 @@
           <a:lstStyle/>
           <a:p>
             <a:r>
+              <a:rPr lang="it-IT" dirty="0" err="1"/>
+              <a:t>Run</a:t>
+            </a:r>
+            <a:r>
               <a:rPr lang="it-IT" dirty="0"/>
-              <a:t>Import from VCS</a:t>
+              <a:t>/Debug in </a:t>
+            </a:r>
+            <a:r>
+              <a:rPr lang="it-IT" dirty="0" err="1"/>
+              <a:t>real</a:t>
+            </a:r>
+            <a:r>
+              <a:rPr lang="it-IT" dirty="0"/>
+              <a:t> device</a:t>
             </a:r>
           </a:p>
         </p:txBody>
@@ -7568,7 +7625,7 @@
           <p:cNvPr id="3" name="Segnaposto contenuto 2">
             <a:extLst>
               <a:ext uri="{FF2B5EF4-FFF2-40B4-BE49-F238E27FC236}">
-                <a16:creationId xmlns:a16="http://schemas.microsoft.com/office/drawing/2014/main" id="{17D6AED0-3C26-4E11-A37C-C299F9B4A582}"/>
+                <a16:creationId xmlns:a16="http://schemas.microsoft.com/office/drawing/2014/main" id="{3CE613F0-FD57-4722-90F9-11098F329BD1}"/>
               </a:ext>
             </a:extLst>
           </p:cNvPr>
@@ -7584,64 +7641,203 @@
           <a:bodyPr/>
           <a:lstStyle/>
           <a:p>
-            <a:r>
-              <a:rPr lang="it-IT" dirty="0"/>
+            <a:pPr marL="0" indent="0">
+              <a:buNone/>
+            </a:pPr>
+            <a:r>
+              <a:rPr lang="it-IT" sz="2800" dirty="0"/>
               <a:t>Android Studio </a:t>
             </a:r>
             <a:r>
-              <a:rPr lang="it-IT" dirty="0" err="1"/>
-              <a:t>has</a:t>
-            </a:r>
-            <a:r>
-              <a:rPr lang="it-IT" dirty="0"/>
-              <a:t> GitHub plugin</a:t>
-            </a:r>
-          </a:p>
-          <a:p>
-            <a:r>
-              <a:rPr lang="it-IT" dirty="0"/>
-              <a:t>Clone repository on </a:t>
-            </a:r>
-            <a:r>
-              <a:rPr lang="it-IT" dirty="0" err="1"/>
+              <a:rPr lang="it-IT" sz="2800" dirty="0" err="1"/>
+              <a:t>offers</a:t>
+            </a:r>
+            <a:r>
+              <a:rPr lang="it-IT" sz="2800" dirty="0"/>
+              <a:t> the </a:t>
+            </a:r>
+            <a:r>
+              <a:rPr lang="it-IT" sz="2800" dirty="0" err="1"/>
+              <a:t>possibility</a:t>
+            </a:r>
+            <a:r>
+              <a:rPr lang="it-IT" sz="2800" dirty="0"/>
+              <a:t> to </a:t>
+            </a:r>
+            <a:r>
+              <a:rPr lang="it-IT" sz="2800" dirty="0" err="1"/>
+              <a:t>install</a:t>
+            </a:r>
+            <a:r>
+              <a:rPr lang="it-IT" sz="2800" dirty="0"/>
+              <a:t> </a:t>
+            </a:r>
+            <a:r>
+              <a:rPr lang="it-IT" sz="2800" dirty="0" err="1"/>
               <a:t>your</a:t>
             </a:r>
             <a:r>
-              <a:rPr lang="it-IT" dirty="0"/>
-              <a:t> PC</a:t>
-            </a:r>
-          </a:p>
-          <a:p>
-            <a:r>
-              <a:rPr lang="it-IT" dirty="0"/>
-              <a:t>Open code project directory from Android Studio</a:t>
-            </a:r>
-          </a:p>
-          <a:p>
-            <a:r>
-              <a:rPr lang="it-IT" dirty="0"/>
-              <a:t>GitHub tools </a:t>
-            </a:r>
-            <a:r>
-              <a:rPr lang="it-IT" dirty="0" err="1"/>
+              <a:rPr lang="it-IT" sz="2800" dirty="0"/>
+              <a:t> </a:t>
+            </a:r>
+            <a:r>
+              <a:rPr lang="it-IT" sz="2800" dirty="0" err="1"/>
+              <a:t>application</a:t>
+            </a:r>
+            <a:r>
+              <a:rPr lang="it-IT" sz="2800" dirty="0"/>
+              <a:t> and </a:t>
+            </a:r>
+            <a:r>
+              <a:rPr lang="it-IT" sz="2800" dirty="0" err="1"/>
+              <a:t>run</a:t>
+            </a:r>
+            <a:r>
+              <a:rPr lang="it-IT" sz="2800" dirty="0"/>
+              <a:t> </a:t>
+            </a:r>
+            <a:r>
+              <a:rPr lang="it-IT" sz="2800" dirty="0" err="1"/>
+              <a:t>it</a:t>
+            </a:r>
+            <a:r>
+              <a:rPr lang="it-IT" sz="2800" dirty="0"/>
+              <a:t> in a </a:t>
+            </a:r>
+            <a:r>
+              <a:rPr lang="it-IT" sz="2800" dirty="0" err="1"/>
+              <a:t>real</a:t>
+            </a:r>
+            <a:r>
+              <a:rPr lang="it-IT" sz="2800" dirty="0"/>
+              <a:t> Android device</a:t>
+            </a:r>
+          </a:p>
+          <a:p>
+            <a:r>
+              <a:rPr lang="it-IT" sz="2800" dirty="0" err="1"/>
+              <a:t>Activate</a:t>
+            </a:r>
+            <a:r>
+              <a:rPr lang="it-IT" sz="2800" dirty="0"/>
+              <a:t> ADB (Android Debug Bridge) on target device (</a:t>
+            </a:r>
+            <a:r>
+              <a:rPr lang="it-IT" sz="2800" dirty="0" err="1"/>
+              <a:t>only</a:t>
+            </a:r>
+            <a:r>
+              <a:rPr lang="it-IT" sz="2800" dirty="0"/>
+              <a:t> on Android 6.0 or </a:t>
+            </a:r>
+            <a:r>
+              <a:rPr lang="it-IT" sz="2800" dirty="0" err="1"/>
+              <a:t>higher</a:t>
+            </a:r>
+            <a:r>
+              <a:rPr lang="it-IT" sz="2800" dirty="0"/>
+              <a:t>)</a:t>
+            </a:r>
+          </a:p>
+          <a:p>
+            <a:pPr lvl="1"/>
+            <a:r>
+              <a:rPr lang="en-US" sz="2400" i="1" dirty="0"/>
+              <a:t>Settings </a:t>
+            </a:r>
+            <a:r>
+              <a:rPr lang="en-US" sz="2400" i="1" dirty="0">
+                <a:sym typeface="Wingdings" panose="05000000000000000000" pitchFamily="2" charset="2"/>
+              </a:rPr>
+              <a:t></a:t>
+            </a:r>
+            <a:r>
+              <a:rPr lang="en-US" sz="2400" i="1" dirty="0"/>
+              <a:t> About Phone/Tablet </a:t>
+            </a:r>
+            <a:r>
+              <a:rPr lang="en-US" sz="2400" i="1" dirty="0">
+                <a:sym typeface="Wingdings" panose="05000000000000000000" pitchFamily="2" charset="2"/>
+              </a:rPr>
+              <a:t></a:t>
+            </a:r>
+            <a:r>
+              <a:rPr lang="en-US" sz="2400" i="1" dirty="0"/>
+              <a:t> Software Information</a:t>
+            </a:r>
+          </a:p>
+          <a:p>
+            <a:pPr lvl="1"/>
+            <a:r>
+              <a:rPr lang="en-US" sz="2400" dirty="0"/>
+              <a:t>Tap on </a:t>
+            </a:r>
+            <a:r>
+              <a:rPr lang="en-US" sz="2400" i="1" dirty="0"/>
+              <a:t>Build number </a:t>
+            </a:r>
+            <a:r>
+              <a:rPr lang="en-US" sz="2400" dirty="0"/>
+              <a:t>field seven times (a message appears indicating that developer mode has been enabled)</a:t>
+            </a:r>
+          </a:p>
+          <a:p>
+            <a:pPr lvl="1"/>
+            <a:r>
+              <a:rPr lang="en-US" sz="2400" dirty="0"/>
+              <a:t>Go to </a:t>
+            </a:r>
+            <a:r>
+              <a:rPr lang="en-US" sz="2400" i="1" dirty="0"/>
+              <a:t>Settings</a:t>
+            </a:r>
+            <a:r>
+              <a:rPr lang="en-US" sz="2400" dirty="0"/>
+              <a:t> page and now appears </a:t>
+            </a:r>
+            <a:r>
+              <a:rPr lang="en-US" sz="2400" i="1" dirty="0"/>
+              <a:t>Developer options</a:t>
+            </a:r>
+          </a:p>
+          <a:p>
+            <a:pPr lvl="1"/>
+            <a:r>
+              <a:rPr lang="en-US" sz="2400" dirty="0"/>
+              <a:t>Switch on </a:t>
+            </a:r>
+            <a:r>
+              <a:rPr lang="en-US" sz="2400" i="1" dirty="0"/>
+              <a:t>USB debugging </a:t>
+            </a:r>
+            <a:r>
+              <a:rPr lang="en-US" sz="2400" dirty="0"/>
+              <a:t>option</a:t>
+            </a:r>
+            <a:endParaRPr lang="it-IT" sz="2400" dirty="0"/>
+          </a:p>
+          <a:p>
+            <a:r>
+              <a:rPr lang="it-IT" sz="2800" dirty="0"/>
+              <a:t>Connect to PC with USB, device </a:t>
+            </a:r>
+            <a:r>
+              <a:rPr lang="it-IT" sz="2800" dirty="0" err="1"/>
+              <a:t>will</a:t>
+            </a:r>
+            <a:r>
+              <a:rPr lang="it-IT" sz="2800" dirty="0"/>
+              <a:t> </a:t>
+            </a:r>
+            <a:r>
+              <a:rPr lang="it-IT" sz="2800" dirty="0" err="1"/>
               <a:t>appear</a:t>
             </a:r>
             <a:r>
-              <a:rPr lang="it-IT" dirty="0"/>
-              <a:t> in Android Studio</a:t>
-            </a:r>
-          </a:p>
-          <a:p>
-            <a:pPr marL="0" indent="0">
-              <a:buNone/>
-            </a:pPr>
-            <a:endParaRPr lang="it-IT" dirty="0"/>
-          </a:p>
-          <a:p>
-            <a:pPr marL="0" indent="0">
-              <a:buNone/>
-            </a:pPr>
-            <a:endParaRPr lang="it-IT" dirty="0"/>
+              <a:rPr lang="it-IT" sz="2800" dirty="0"/>
+              <a:t> in Android Studio devices list</a:t>
+            </a:r>
+            <a:endParaRPr lang="en-US" sz="2800" dirty="0"/>
           </a:p>
         </p:txBody>
       </p:sp>
@@ -7650,7 +7846,7 @@
           <p:cNvPr id="4" name="Segnaposto numero diapositiva 3">
             <a:extLst>
               <a:ext uri="{FF2B5EF4-FFF2-40B4-BE49-F238E27FC236}">
-                <a16:creationId xmlns:a16="http://schemas.microsoft.com/office/drawing/2014/main" id="{03697B47-D532-4C3A-837A-D2652252243F}"/>
+                <a16:creationId xmlns:a16="http://schemas.microsoft.com/office/drawing/2014/main" id="{D76CDC0E-8C87-4D48-93CC-B2186DF0CC16}"/>
               </a:ext>
             </a:extLst>
           </p:cNvPr>
@@ -7678,7 +7874,7 @@
     </p:spTree>
     <p:extLst>
       <p:ext uri="{BB962C8B-B14F-4D97-AF65-F5344CB8AC3E}">
-        <p14:creationId xmlns:p14="http://schemas.microsoft.com/office/powerpoint/2010/main" val="2130891845"/>
+        <p14:creationId xmlns:p14="http://schemas.microsoft.com/office/powerpoint/2010/main" val="2217072517"/>
       </p:ext>
     </p:extLst>
   </p:cSld>
@@ -7710,7 +7906,7 @@
           <p:cNvPr id="2" name="Titolo 1">
             <a:extLst>
               <a:ext uri="{FF2B5EF4-FFF2-40B4-BE49-F238E27FC236}">
-                <a16:creationId xmlns:a16="http://schemas.microsoft.com/office/drawing/2014/main" id="{4A8F1979-42A0-45A5-B3FF-E873E2E24620}"/>
+                <a16:creationId xmlns:a16="http://schemas.microsoft.com/office/drawing/2014/main" id="{5641DDCC-92EA-4832-AF18-70EF031721BA}"/>
               </a:ext>
             </a:extLst>
           </p:cNvPr>
@@ -7727,8 +7923,144 @@
           <a:lstStyle/>
           <a:p>
             <a:r>
+              <a:rPr lang="it-IT" dirty="0" err="1"/>
+              <a:t>Other</a:t>
+            </a:r>
+            <a:r>
               <a:rPr lang="it-IT" dirty="0"/>
-              <a:t>GitHub tools</a:t>
+              <a:t> </a:t>
+            </a:r>
+            <a:r>
+              <a:rPr lang="it-IT" dirty="0" err="1"/>
+              <a:t>components</a:t>
+            </a:r>
+            <a:endParaRPr lang="it-IT" dirty="0"/>
+          </a:p>
+        </p:txBody>
+      </p:sp>
+      <p:sp>
+        <p:nvSpPr>
+          <p:cNvPr id="3" name="Segnaposto contenuto 2">
+            <a:extLst>
+              <a:ext uri="{FF2B5EF4-FFF2-40B4-BE49-F238E27FC236}">
+                <a16:creationId xmlns:a16="http://schemas.microsoft.com/office/drawing/2014/main" id="{DF839098-7C55-4E77-9C88-FFC987214CFC}"/>
+              </a:ext>
+            </a:extLst>
+          </p:cNvPr>
+          <p:cNvSpPr>
+            <a:spLocks noGrp="1"/>
+          </p:cNvSpPr>
+          <p:nvPr>
+            <p:ph idx="1"/>
+          </p:nvPr>
+        </p:nvSpPr>
+        <p:spPr/>
+        <p:txBody>
+          <a:bodyPr/>
+          <a:lstStyle/>
+          <a:p>
+            <a:r>
+              <a:rPr lang="it-IT" dirty="0">
+                <a:solidFill>
+                  <a:srgbClr val="FF0000"/>
+                </a:solidFill>
+              </a:rPr>
+              <a:t>Android Profiler: </a:t>
+            </a:r>
+            <a:r>
+              <a:rPr lang="it-IT" dirty="0"/>
+              <a:t>show the </a:t>
+            </a:r>
+            <a:r>
+              <a:rPr lang="it-IT" dirty="0" err="1"/>
+              <a:t>behavior</a:t>
+            </a:r>
+            <a:r>
+              <a:rPr lang="it-IT" dirty="0"/>
+              <a:t> and performance of </a:t>
+            </a:r>
+            <a:r>
+              <a:rPr lang="it-IT" dirty="0" err="1"/>
+              <a:t>your</a:t>
+            </a:r>
+            <a:r>
+              <a:rPr lang="it-IT" dirty="0"/>
+              <a:t> app in </a:t>
+            </a:r>
+            <a:r>
+              <a:rPr lang="it-IT" dirty="0" err="1"/>
+              <a:t>real</a:t>
+            </a:r>
+            <a:r>
+              <a:rPr lang="it-IT" dirty="0"/>
+              <a:t> time (CPU, </a:t>
+            </a:r>
+            <a:r>
+              <a:rPr lang="it-IT" dirty="0" err="1"/>
+              <a:t>memory</a:t>
+            </a:r>
+            <a:r>
+              <a:rPr lang="it-IT" dirty="0"/>
+              <a:t> </a:t>
+            </a:r>
+            <a:r>
+              <a:rPr lang="it-IT" dirty="0" err="1"/>
+              <a:t>managment</a:t>
+            </a:r>
+            <a:r>
+              <a:rPr lang="it-IT" dirty="0"/>
+              <a:t>, network </a:t>
+            </a:r>
+            <a:r>
+              <a:rPr lang="it-IT" dirty="0" err="1"/>
+              <a:t>traffic</a:t>
+            </a:r>
+            <a:r>
+              <a:rPr lang="it-IT" dirty="0"/>
+              <a:t>)</a:t>
+            </a:r>
+          </a:p>
+          <a:p>
+            <a:r>
+              <a:rPr lang="it-IT" dirty="0">
+                <a:solidFill>
+                  <a:srgbClr val="FF0000"/>
+                </a:solidFill>
+              </a:rPr>
+              <a:t>SQLite3: </a:t>
+            </a:r>
+            <a:r>
+              <a:rPr lang="en-US" dirty="0"/>
+              <a:t>From a remote shell to your device or from your host machine, you can use the sqlite3 command-line program to manage SQLite databases created by Android applications. </a:t>
+            </a:r>
+            <a:r>
+              <a:rPr lang="en-US" dirty="0">
+                <a:hlinkClick r:id="rId2"/>
+              </a:rPr>
+              <a:t>https://developer.android.com/studio/command-line/sqlite3</a:t>
+            </a:r>
+            <a:endParaRPr lang="en-US" dirty="0"/>
+          </a:p>
+          <a:p>
+            <a:r>
+              <a:rPr lang="en-US" dirty="0">
+                <a:solidFill>
+                  <a:srgbClr val="FF0000"/>
+                </a:solidFill>
+              </a:rPr>
+              <a:t>Logcat: </a:t>
+            </a:r>
+            <a:r>
+              <a:rPr lang="en-US" dirty="0"/>
+              <a:t>show </a:t>
+            </a:r>
+            <a:r>
+              <a:rPr lang="en-US" dirty="0" err="1"/>
+              <a:t>androd</a:t>
+            </a:r>
+            <a:r>
+              <a:rPr lang="en-US" dirty="0"/>
+              <a:t> logging system (helps you to see what app is doing)</a:t>
             </a:r>
           </a:p>
         </p:txBody>
@@ -7738,7 +8070,7 @@
           <p:cNvPr id="4" name="Segnaposto numero diapositiva 3">
             <a:extLst>
               <a:ext uri="{FF2B5EF4-FFF2-40B4-BE49-F238E27FC236}">
-                <a16:creationId xmlns:a16="http://schemas.microsoft.com/office/drawing/2014/main" id="{4AEB25EF-CB47-4915-89D1-A5845A3D72EB}"/>
+                <a16:creationId xmlns:a16="http://schemas.microsoft.com/office/drawing/2014/main" id="{D95AB588-AB13-402E-8191-52528AA4BC26}"/>
               </a:ext>
             </a:extLst>
           </p:cNvPr>
@@ -7763,225 +8095,10 @@
           </a:p>
         </p:txBody>
       </p:sp>
-      <p:pic>
-        <p:nvPicPr>
-          <p:cNvPr id="5" name="Segnaposto contenuto 4">
-            <a:extLst>
-              <a:ext uri="{FF2B5EF4-FFF2-40B4-BE49-F238E27FC236}">
-                <a16:creationId xmlns:a16="http://schemas.microsoft.com/office/drawing/2014/main" id="{B6D3546A-E625-4B16-9649-1A3A25E15EFF}"/>
-              </a:ext>
-            </a:extLst>
-          </p:cNvPr>
-          <p:cNvPicPr>
-            <a:picLocks noGrp="1" noChangeAspect="1"/>
-          </p:cNvPicPr>
-          <p:nvPr>
-            <p:ph idx="1"/>
-          </p:nvPr>
-        </p:nvPicPr>
-        <p:blipFill rotWithShape="1">
-          <a:blip r:embed="rId2"/>
-          <a:srcRect l="-1" r="-1"/>
-          <a:stretch/>
-        </p:blipFill>
-        <p:spPr>
-          <a:xfrm>
-            <a:off x="1466126" y="1433887"/>
-            <a:ext cx="9259747" cy="4953239"/>
-          </a:xfrm>
-          <a:prstGeom prst="rect">
-            <a:avLst/>
-          </a:prstGeom>
-        </p:spPr>
-      </p:pic>
-      <p:sp>
-        <p:nvSpPr>
-          <p:cNvPr id="8" name="Freccia a destra 7">
-            <a:extLst>
-              <a:ext uri="{FF2B5EF4-FFF2-40B4-BE49-F238E27FC236}">
-                <a16:creationId xmlns:a16="http://schemas.microsoft.com/office/drawing/2014/main" id="{8815035C-7AC3-4546-A16A-FF185C71C239}"/>
-              </a:ext>
-            </a:extLst>
-          </p:cNvPr>
-          <p:cNvSpPr/>
-          <p:nvPr/>
-        </p:nvSpPr>
-        <p:spPr>
-          <a:xfrm rot="16200000">
-            <a:off x="8712845" y="1976456"/>
-            <a:ext cx="636608" cy="549800"/>
-          </a:xfrm>
-          <a:prstGeom prst="rightArrow">
-            <a:avLst/>
-          </a:prstGeom>
-          <a:noFill/>
-          <a:ln w="28575"/>
-        </p:spPr>
-        <p:style>
-          <a:lnRef idx="1">
-            <a:schemeClr val="accent1"/>
-          </a:lnRef>
-          <a:fillRef idx="3">
-            <a:schemeClr val="accent1"/>
-          </a:fillRef>
-          <a:effectRef idx="2">
-            <a:schemeClr val="accent1"/>
-          </a:effectRef>
-          <a:fontRef idx="minor">
-            <a:schemeClr val="lt1"/>
-          </a:fontRef>
-        </p:style>
-        <p:txBody>
-          <a:bodyPr rtlCol="0" anchor="ctr"/>
-          <a:lstStyle/>
-          <a:p>
-            <a:pPr algn="ctr"/>
-            <a:endParaRPr lang="it-IT"/>
-          </a:p>
-        </p:txBody>
-      </p:sp>
-      <p:sp>
-        <p:nvSpPr>
-          <p:cNvPr id="9" name="Freccia a destra 8">
-            <a:extLst>
-              <a:ext uri="{FF2B5EF4-FFF2-40B4-BE49-F238E27FC236}">
-                <a16:creationId xmlns:a16="http://schemas.microsoft.com/office/drawing/2014/main" id="{12E6E2CA-0D2B-4843-926E-88A4BACF3690}"/>
-              </a:ext>
-            </a:extLst>
-          </p:cNvPr>
-          <p:cNvSpPr/>
-          <p:nvPr/>
-        </p:nvSpPr>
-        <p:spPr>
-          <a:xfrm rot="10800000">
-            <a:off x="1694731" y="2367904"/>
-            <a:ext cx="636608" cy="549800"/>
-          </a:xfrm>
-          <a:prstGeom prst="rightArrow">
-            <a:avLst/>
-          </a:prstGeom>
-          <a:noFill/>
-          <a:ln w="28575"/>
-        </p:spPr>
-        <p:style>
-          <a:lnRef idx="1">
-            <a:schemeClr val="accent1"/>
-          </a:lnRef>
-          <a:fillRef idx="3">
-            <a:schemeClr val="accent1"/>
-          </a:fillRef>
-          <a:effectRef idx="2">
-            <a:schemeClr val="accent1"/>
-          </a:effectRef>
-          <a:fontRef idx="minor">
-            <a:schemeClr val="lt1"/>
-          </a:fontRef>
-        </p:style>
-        <p:txBody>
-          <a:bodyPr rtlCol="0" anchor="ctr"/>
-          <a:lstStyle/>
-          <a:p>
-            <a:pPr algn="ctr"/>
-            <a:endParaRPr lang="it-IT"/>
-          </a:p>
-        </p:txBody>
-      </p:sp>
-      <p:sp>
-        <p:nvSpPr>
-          <p:cNvPr id="10" name="Freccia a destra 9">
-            <a:extLst>
-              <a:ext uri="{FF2B5EF4-FFF2-40B4-BE49-F238E27FC236}">
-                <a16:creationId xmlns:a16="http://schemas.microsoft.com/office/drawing/2014/main" id="{BA8054ED-0A22-4074-817A-05180BFE574B}"/>
-              </a:ext>
-            </a:extLst>
-          </p:cNvPr>
-          <p:cNvSpPr/>
-          <p:nvPr/>
-        </p:nvSpPr>
-        <p:spPr>
-          <a:xfrm rot="5400000">
-            <a:off x="2276882" y="5312338"/>
-            <a:ext cx="645207" cy="536293"/>
-          </a:xfrm>
-          <a:prstGeom prst="rightArrow">
-            <a:avLst/>
-          </a:prstGeom>
-          <a:noFill/>
-          <a:ln w="28575"/>
-        </p:spPr>
-        <p:style>
-          <a:lnRef idx="1">
-            <a:schemeClr val="accent1"/>
-          </a:lnRef>
-          <a:fillRef idx="3">
-            <a:schemeClr val="accent1"/>
-          </a:fillRef>
-          <a:effectRef idx="2">
-            <a:schemeClr val="accent1"/>
-          </a:effectRef>
-          <a:fontRef idx="minor">
-            <a:schemeClr val="lt1"/>
-          </a:fontRef>
-        </p:style>
-        <p:txBody>
-          <a:bodyPr rtlCol="0" anchor="ctr"/>
-          <a:lstStyle/>
-          <a:p>
-            <a:pPr algn="ctr"/>
-            <a:endParaRPr lang="it-IT"/>
-          </a:p>
-        </p:txBody>
-      </p:sp>
-      <p:sp>
-        <p:nvSpPr>
-          <p:cNvPr id="11" name="Freccia a destra 10">
-            <a:extLst>
-              <a:ext uri="{FF2B5EF4-FFF2-40B4-BE49-F238E27FC236}">
-                <a16:creationId xmlns:a16="http://schemas.microsoft.com/office/drawing/2014/main" id="{EFBA0B79-7816-4286-AD9D-CE531B455D8F}"/>
-              </a:ext>
-            </a:extLst>
-          </p:cNvPr>
-          <p:cNvSpPr/>
-          <p:nvPr/>
-        </p:nvSpPr>
-        <p:spPr>
-          <a:xfrm rot="16200000">
-            <a:off x="3980728" y="1701559"/>
-            <a:ext cx="636608" cy="549800"/>
-          </a:xfrm>
-          <a:prstGeom prst="rightArrow">
-            <a:avLst/>
-          </a:prstGeom>
-          <a:noFill/>
-          <a:ln w="28575"/>
-        </p:spPr>
-        <p:style>
-          <a:lnRef idx="1">
-            <a:schemeClr val="accent1"/>
-          </a:lnRef>
-          <a:fillRef idx="3">
-            <a:schemeClr val="accent1"/>
-          </a:fillRef>
-          <a:effectRef idx="2">
-            <a:schemeClr val="accent1"/>
-          </a:effectRef>
-          <a:fontRef idx="minor">
-            <a:schemeClr val="lt1"/>
-          </a:fontRef>
-        </p:style>
-        <p:txBody>
-          <a:bodyPr rtlCol="0" anchor="ctr"/>
-          <a:lstStyle/>
-          <a:p>
-            <a:pPr algn="ctr"/>
-            <a:endParaRPr lang="it-IT"/>
-          </a:p>
-        </p:txBody>
-      </p:sp>
     </p:spTree>
     <p:extLst>
       <p:ext uri="{BB962C8B-B14F-4D97-AF65-F5344CB8AC3E}">
-        <p14:creationId xmlns:p14="http://schemas.microsoft.com/office/powerpoint/2010/main" val="4112021029"/>
+        <p14:creationId xmlns:p14="http://schemas.microsoft.com/office/powerpoint/2010/main" val="2320520907"/>
       </p:ext>
     </p:extLst>
   </p:cSld>
@@ -8013,7 +8130,7 @@
           <p:cNvPr id="2" name="Titolo 1">
             <a:extLst>
               <a:ext uri="{FF2B5EF4-FFF2-40B4-BE49-F238E27FC236}">
-                <a16:creationId xmlns:a16="http://schemas.microsoft.com/office/drawing/2014/main" id="{5096FFE2-A2EC-42E3-BF7F-16D855D7DB33}"/>
+                <a16:creationId xmlns:a16="http://schemas.microsoft.com/office/drawing/2014/main" id="{845908A6-95BF-4881-AB3C-D754E8EAD6EA}"/>
               </a:ext>
             </a:extLst>
           </p:cNvPr>
@@ -8024,217 +8141,97 @@
             <p:ph type="title"/>
           </p:nvPr>
         </p:nvSpPr>
-        <p:spPr>
-          <a:xfrm>
-            <a:off x="609600" y="274638"/>
-            <a:ext cx="10972800" cy="1143000"/>
-          </a:xfrm>
-        </p:spPr>
-        <p:txBody>
-          <a:bodyPr anchor="ctr">
-            <a:normAutofit/>
-          </a:bodyPr>
+        <p:spPr/>
+        <p:txBody>
+          <a:bodyPr/>
           <a:lstStyle/>
           <a:p>
             <a:r>
               <a:rPr lang="it-IT" dirty="0"/>
-              <a:t>Device file </a:t>
+              <a:t>Import from VCS</a:t>
+            </a:r>
+          </a:p>
+        </p:txBody>
+      </p:sp>
+      <p:sp>
+        <p:nvSpPr>
+          <p:cNvPr id="3" name="Segnaposto contenuto 2">
+            <a:extLst>
+              <a:ext uri="{FF2B5EF4-FFF2-40B4-BE49-F238E27FC236}">
+                <a16:creationId xmlns:a16="http://schemas.microsoft.com/office/drawing/2014/main" id="{17D6AED0-3C26-4E11-A37C-C299F9B4A582}"/>
+              </a:ext>
+            </a:extLst>
+          </p:cNvPr>
+          <p:cNvSpPr>
+            <a:spLocks noGrp="1"/>
+          </p:cNvSpPr>
+          <p:nvPr>
+            <p:ph idx="1"/>
+          </p:nvPr>
+        </p:nvSpPr>
+        <p:spPr/>
+        <p:txBody>
+          <a:bodyPr/>
+          <a:lstStyle/>
+          <a:p>
+            <a:r>
+              <a:rPr lang="it-IT" dirty="0"/>
+              <a:t>Android Studio </a:t>
             </a:r>
             <a:r>
               <a:rPr lang="it-IT" dirty="0" err="1"/>
-              <a:t>explorer</a:t>
-            </a:r>
+              <a:t>has</a:t>
+            </a:r>
+            <a:r>
+              <a:rPr lang="it-IT" dirty="0"/>
+              <a:t> GitHub plugin</a:t>
+            </a:r>
+          </a:p>
+          <a:p>
+            <a:r>
+              <a:rPr lang="it-IT" dirty="0"/>
+              <a:t>Clone repository on </a:t>
+            </a:r>
+            <a:r>
+              <a:rPr lang="it-IT" dirty="0" err="1"/>
+              <a:t>your</a:t>
+            </a:r>
+            <a:r>
+              <a:rPr lang="it-IT" dirty="0"/>
+              <a:t> PC</a:t>
+            </a:r>
+          </a:p>
+          <a:p>
+            <a:r>
+              <a:rPr lang="it-IT" dirty="0"/>
+              <a:t>Open code project directory from Android Studio</a:t>
+            </a:r>
+          </a:p>
+          <a:p>
+            <a:r>
+              <a:rPr lang="it-IT" dirty="0"/>
+              <a:t>GitHub tools </a:t>
+            </a:r>
+            <a:r>
+              <a:rPr lang="it-IT" dirty="0" err="1"/>
+              <a:t>appear</a:t>
+            </a:r>
+            <a:r>
+              <a:rPr lang="it-IT" dirty="0"/>
+              <a:t> in Android Studio</a:t>
+            </a:r>
+          </a:p>
+          <a:p>
+            <a:pPr marL="0" indent="0">
+              <a:buNone/>
+            </a:pPr>
             <a:endParaRPr lang="it-IT" dirty="0"/>
           </a:p>
-        </p:txBody>
-      </p:sp>
-      <p:sp>
-        <p:nvSpPr>
-          <p:cNvPr id="3" name="Segnaposto contenuto 2">
-            <a:extLst>
-              <a:ext uri="{FF2B5EF4-FFF2-40B4-BE49-F238E27FC236}">
-                <a16:creationId xmlns:a16="http://schemas.microsoft.com/office/drawing/2014/main" id="{6C4A981F-7833-469D-AA38-1E965AB19C81}"/>
-              </a:ext>
-            </a:extLst>
-          </p:cNvPr>
-          <p:cNvSpPr>
-            <a:spLocks noGrp="1"/>
-          </p:cNvSpPr>
-          <p:nvPr>
-            <p:ph sz="half" idx="1"/>
-          </p:nvPr>
-        </p:nvSpPr>
-        <p:spPr>
-          <a:xfrm>
-            <a:off x="609600" y="1600201"/>
-            <a:ext cx="5384800" cy="4525963"/>
-          </a:xfrm>
-        </p:spPr>
-        <p:txBody>
-          <a:bodyPr>
-            <a:normAutofit/>
-          </a:bodyPr>
-          <a:lstStyle/>
-          <a:p>
-            <a:r>
-              <a:rPr lang="it-IT" sz="2600" dirty="0" err="1"/>
-              <a:t>You</a:t>
-            </a:r>
-            <a:r>
-              <a:rPr lang="it-IT" sz="2600" dirty="0"/>
-              <a:t> can </a:t>
-            </a:r>
-            <a:r>
-              <a:rPr lang="it-IT" sz="2600" dirty="0" err="1"/>
-              <a:t>also</a:t>
-            </a:r>
-            <a:r>
-              <a:rPr lang="it-IT" sz="2600" dirty="0"/>
-              <a:t> </a:t>
-            </a:r>
-            <a:r>
-              <a:rPr lang="it-IT" sz="2600" dirty="0" err="1"/>
-              <a:t>explore</a:t>
-            </a:r>
-            <a:r>
-              <a:rPr lang="it-IT" sz="2600" dirty="0"/>
-              <a:t> storage device </a:t>
-            </a:r>
-          </a:p>
-          <a:p>
-            <a:pPr lvl="1"/>
-            <a:r>
-              <a:rPr lang="it-IT" sz="2600" dirty="0" err="1"/>
-              <a:t>If</a:t>
-            </a:r>
-            <a:r>
-              <a:rPr lang="it-IT" sz="2600" dirty="0"/>
-              <a:t> </a:t>
-            </a:r>
-            <a:r>
-              <a:rPr lang="it-IT" sz="2600" dirty="0" err="1"/>
-              <a:t>you</a:t>
-            </a:r>
-            <a:r>
-              <a:rPr lang="it-IT" sz="2600" dirty="0"/>
-              <a:t> use AVD, storage </a:t>
-            </a:r>
-            <a:r>
-              <a:rPr lang="it-IT" sz="2600" dirty="0" err="1"/>
-              <a:t>is</a:t>
-            </a:r>
-            <a:r>
-              <a:rPr lang="it-IT" sz="2600" dirty="0"/>
-              <a:t> a </a:t>
-            </a:r>
-            <a:r>
-              <a:rPr lang="it-IT" sz="2600" dirty="0" err="1"/>
-              <a:t>direactory</a:t>
-            </a:r>
-            <a:r>
-              <a:rPr lang="it-IT" sz="2600" dirty="0"/>
-              <a:t> in </a:t>
-            </a:r>
-            <a:r>
-              <a:rPr lang="it-IT" sz="2600" dirty="0" err="1"/>
-              <a:t>your</a:t>
-            </a:r>
-            <a:r>
-              <a:rPr lang="it-IT" sz="2600" dirty="0"/>
-              <a:t> PC</a:t>
-            </a:r>
-          </a:p>
-          <a:p>
-            <a:pPr lvl="1"/>
-            <a:r>
-              <a:rPr lang="it-IT" sz="2600" dirty="0" err="1"/>
-              <a:t>If</a:t>
-            </a:r>
-            <a:r>
-              <a:rPr lang="it-IT" sz="2600" dirty="0"/>
-              <a:t> </a:t>
-            </a:r>
-            <a:r>
-              <a:rPr lang="it-IT" sz="2600" dirty="0" err="1"/>
-              <a:t>you</a:t>
-            </a:r>
-            <a:r>
-              <a:rPr lang="it-IT" sz="2600" dirty="0"/>
-              <a:t> use Real device </a:t>
-            </a:r>
-            <a:r>
-              <a:rPr lang="it-IT" sz="2600" dirty="0" err="1"/>
-              <a:t>is</a:t>
-            </a:r>
-            <a:r>
-              <a:rPr lang="it-IT" sz="2600" dirty="0"/>
-              <a:t> the </a:t>
-            </a:r>
-            <a:r>
-              <a:rPr lang="it-IT" sz="2600" dirty="0" err="1"/>
-              <a:t>real</a:t>
-            </a:r>
-            <a:r>
-              <a:rPr lang="it-IT" sz="2600" dirty="0"/>
-              <a:t> file system</a:t>
-            </a:r>
-          </a:p>
-          <a:p>
-            <a:r>
-              <a:rPr lang="it-IT" sz="2600" dirty="0"/>
-              <a:t>To </a:t>
-            </a:r>
-            <a:r>
-              <a:rPr lang="it-IT" sz="2600" dirty="0" err="1"/>
-              <a:t>see</a:t>
-            </a:r>
-            <a:r>
-              <a:rPr lang="it-IT" sz="2600" dirty="0"/>
-              <a:t> </a:t>
-            </a:r>
-            <a:r>
-              <a:rPr lang="it-IT" sz="2600" dirty="0" err="1"/>
-              <a:t>your</a:t>
-            </a:r>
-            <a:r>
-              <a:rPr lang="it-IT" sz="2600" dirty="0"/>
-              <a:t> app directory in storage</a:t>
-            </a:r>
-          </a:p>
-          <a:p>
-            <a:pPr lvl="1"/>
-            <a:r>
-              <a:rPr lang="it-IT" sz="2600" i="1" dirty="0"/>
-              <a:t>File </a:t>
-            </a:r>
-            <a:r>
-              <a:rPr lang="it-IT" sz="2600" i="1" dirty="0" err="1"/>
-              <a:t>explorer</a:t>
-            </a:r>
-            <a:r>
-              <a:rPr lang="it-IT" sz="2600" i="1" dirty="0"/>
-              <a:t> -&gt; Data -&gt; Data </a:t>
-            </a:r>
-            <a:r>
-              <a:rPr lang="it-IT" sz="2600" dirty="0"/>
-              <a:t>-&gt; </a:t>
-            </a:r>
-            <a:r>
-              <a:rPr lang="it-IT" sz="2600" dirty="0" err="1"/>
-              <a:t>your</a:t>
-            </a:r>
-            <a:r>
-              <a:rPr lang="it-IT" sz="2600" dirty="0"/>
-              <a:t> app package (e.g. </a:t>
-            </a:r>
-            <a:r>
-              <a:rPr lang="it-IT" sz="2600" dirty="0" err="1"/>
-              <a:t>com.example.MyApplication</a:t>
-            </a:r>
-            <a:r>
-              <a:rPr lang="it-IT" sz="2600" dirty="0"/>
-              <a:t>)</a:t>
-            </a:r>
+          <a:p>
+            <a:pPr marL="0" indent="0">
+              <a:buNone/>
+            </a:pPr>
+            <a:endParaRPr lang="it-IT" dirty="0"/>
           </a:p>
         </p:txBody>
       </p:sp>
@@ -8243,7 +8240,7 @@
           <p:cNvPr id="4" name="Segnaposto numero diapositiva 3">
             <a:extLst>
               <a:ext uri="{FF2B5EF4-FFF2-40B4-BE49-F238E27FC236}">
-                <a16:creationId xmlns:a16="http://schemas.microsoft.com/office/drawing/2014/main" id="{5FC0766B-D598-41BE-8FAF-8FA15D241746}"/>
+                <a16:creationId xmlns:a16="http://schemas.microsoft.com/office/drawing/2014/main" id="{03697B47-D532-4C3A-837A-D2652252243F}"/>
               </a:ext>
             </a:extLst>
           </p:cNvPr>
@@ -8254,77 +8251,24 @@
             <p:ph type="sldNum" sz="quarter" idx="12"/>
           </p:nvPr>
         </p:nvSpPr>
-        <p:spPr>
-          <a:xfrm>
-            <a:off x="5115480" y="6362701"/>
-            <a:ext cx="6466921" cy="365125"/>
-          </a:xfrm>
-        </p:spPr>
-        <p:txBody>
-          <a:bodyPr>
-            <a:normAutofit/>
-          </a:bodyPr>
-          <a:lstStyle/>
-          <a:p>
-            <a:pPr>
-              <a:lnSpc>
-                <a:spcPct val="90000"/>
-              </a:lnSpc>
-              <a:spcAft>
-                <a:spcPts val="600"/>
-              </a:spcAft>
-            </a:pPr>
+        <p:spPr/>
+        <p:txBody>
+          <a:bodyPr/>
+          <a:lstStyle/>
+          <a:p>
             <a:fld id="{D2040F39-7941-49A4-B48D-F201B18B6351}" type="slidenum">
               <a:rPr lang="it-IT" smtClean="0"/>
-              <a:pPr>
-                <a:lnSpc>
-                  <a:spcPct val="90000"/>
-                </a:lnSpc>
-                <a:spcAft>
-                  <a:spcPts val="600"/>
-                </a:spcAft>
-              </a:pPr>
+              <a:pPr/>
               <a:t>16</a:t>
             </a:fld>
-            <a:endParaRPr lang="it-IT"/>
-          </a:p>
-        </p:txBody>
-      </p:sp>
-      <p:pic>
-        <p:nvPicPr>
-          <p:cNvPr id="9" name="Segnaposto contenuto 4">
-            <a:extLst>
-              <a:ext uri="{FF2B5EF4-FFF2-40B4-BE49-F238E27FC236}">
-                <a16:creationId xmlns:a16="http://schemas.microsoft.com/office/drawing/2014/main" id="{D98786AA-EAB5-4FA5-949E-CCC96C50EED7}"/>
-              </a:ext>
-            </a:extLst>
-          </p:cNvPr>
-          <p:cNvPicPr>
-            <a:picLocks noGrp="1" noChangeAspect="1"/>
-          </p:cNvPicPr>
-          <p:nvPr>
-            <p:ph sz="half" idx="2"/>
-          </p:nvPr>
-        </p:nvPicPr>
-        <p:blipFill rotWithShape="1">
-          <a:blip r:embed="rId2"/>
-          <a:srcRect l="69835" t="64543" r="-1"/>
-          <a:stretch/>
-        </p:blipFill>
-        <p:spPr>
-          <a:xfrm>
-            <a:off x="6380977" y="2496351"/>
-            <a:ext cx="5293111" cy="3328106"/>
-          </a:xfrm>
-          <a:prstGeom prst="rect">
-            <a:avLst/>
-          </a:prstGeom>
-        </p:spPr>
-      </p:pic>
+            <a:endParaRPr lang="it-IT" dirty="0"/>
+          </a:p>
+        </p:txBody>
+      </p:sp>
     </p:spTree>
     <p:extLst>
       <p:ext uri="{BB962C8B-B14F-4D97-AF65-F5344CB8AC3E}">
-        <p14:creationId xmlns:p14="http://schemas.microsoft.com/office/powerpoint/2010/main" val="1563645607"/>
+        <p14:creationId xmlns:p14="http://schemas.microsoft.com/office/powerpoint/2010/main" val="2130891845"/>
       </p:ext>
     </p:extLst>
   </p:cSld>
@@ -8356,7 +8300,7 @@
           <p:cNvPr id="2" name="Titolo 1">
             <a:extLst>
               <a:ext uri="{FF2B5EF4-FFF2-40B4-BE49-F238E27FC236}">
-                <a16:creationId xmlns:a16="http://schemas.microsoft.com/office/drawing/2014/main" id="{44DE2770-9318-4303-8FE3-A9A7AF94817E}"/>
+                <a16:creationId xmlns:a16="http://schemas.microsoft.com/office/drawing/2014/main" id="{4A8F1979-42A0-45A5-B3FF-E873E2E24620}"/>
               </a:ext>
             </a:extLst>
           </p:cNvPr>
@@ -8374,7 +8318,7 @@
           <a:p>
             <a:r>
               <a:rPr lang="it-IT" dirty="0"/>
-              <a:t>Layout design tool</a:t>
+              <a:t>GitHub tools</a:t>
             </a:r>
           </a:p>
         </p:txBody>
@@ -8384,7 +8328,7 @@
           <p:cNvPr id="4" name="Segnaposto numero diapositiva 3">
             <a:extLst>
               <a:ext uri="{FF2B5EF4-FFF2-40B4-BE49-F238E27FC236}">
-                <a16:creationId xmlns:a16="http://schemas.microsoft.com/office/drawing/2014/main" id="{9FE6EA8C-7277-41B2-B77B-C309CBD1C996}"/>
+                <a16:creationId xmlns:a16="http://schemas.microsoft.com/office/drawing/2014/main" id="{4AEB25EF-CB47-4915-89D1-A5845A3D72EB}"/>
               </a:ext>
             </a:extLst>
           </p:cNvPr>
@@ -8409,163 +8353,225 @@
           </a:p>
         </p:txBody>
       </p:sp>
-      <p:sp>
-        <p:nvSpPr>
-          <p:cNvPr id="10" name="Segnaposto contenuto 9">
-            <a:extLst>
-              <a:ext uri="{FF2B5EF4-FFF2-40B4-BE49-F238E27FC236}">
-                <a16:creationId xmlns:a16="http://schemas.microsoft.com/office/drawing/2014/main" id="{144596D0-68FC-4242-81F9-2B69BCB9EFB9}"/>
-              </a:ext>
-            </a:extLst>
-          </p:cNvPr>
-          <p:cNvSpPr>
-            <a:spLocks noGrp="1"/>
-          </p:cNvSpPr>
+      <p:pic>
+        <p:nvPicPr>
+          <p:cNvPr id="5" name="Segnaposto contenuto 4">
+            <a:extLst>
+              <a:ext uri="{FF2B5EF4-FFF2-40B4-BE49-F238E27FC236}">
+                <a16:creationId xmlns:a16="http://schemas.microsoft.com/office/drawing/2014/main" id="{B6D3546A-E625-4B16-9649-1A3A25E15EFF}"/>
+              </a:ext>
+            </a:extLst>
+          </p:cNvPr>
+          <p:cNvPicPr>
+            <a:picLocks noGrp="1" noChangeAspect="1"/>
+          </p:cNvPicPr>
           <p:nvPr>
             <p:ph idx="1"/>
           </p:nvPr>
-        </p:nvSpPr>
-        <p:spPr/>
-        <p:txBody>
-          <a:bodyPr/>
-          <a:lstStyle/>
-          <a:p>
-            <a:pPr marL="0" indent="0">
-              <a:buNone/>
-            </a:pPr>
-            <a:r>
-              <a:rPr lang="it-IT" dirty="0"/>
-              <a:t>Android Studio </a:t>
-            </a:r>
-            <a:r>
-              <a:rPr lang="it-IT" dirty="0" err="1"/>
-              <a:t>offers</a:t>
-            </a:r>
-            <a:r>
-              <a:rPr lang="it-IT" dirty="0"/>
-              <a:t> 3 mode to </a:t>
-            </a:r>
-            <a:r>
-              <a:rPr lang="it-IT" dirty="0" err="1"/>
-              <a:t>manipulate</a:t>
-            </a:r>
-            <a:r>
-              <a:rPr lang="it-IT" dirty="0"/>
-              <a:t> graphic </a:t>
-            </a:r>
-            <a:r>
-              <a:rPr lang="it-IT" dirty="0" err="1"/>
-              <a:t>element</a:t>
-            </a:r>
-            <a:r>
-              <a:rPr lang="it-IT" dirty="0"/>
-              <a:t> (Layout, </a:t>
-            </a:r>
-            <a:r>
-              <a:rPr lang="it-IT" dirty="0" err="1"/>
-              <a:t>Drawable</a:t>
-            </a:r>
-            <a:r>
-              <a:rPr lang="it-IT" dirty="0"/>
-              <a:t>, ecc.), </a:t>
-            </a:r>
-            <a:r>
-              <a:rPr lang="it-IT" dirty="0" err="1"/>
-              <a:t>you</a:t>
-            </a:r>
-            <a:r>
-              <a:rPr lang="it-IT" dirty="0"/>
-              <a:t> can </a:t>
-            </a:r>
-            <a:r>
-              <a:rPr lang="it-IT" dirty="0" err="1"/>
-              <a:t>choose</a:t>
-            </a:r>
-            <a:r>
-              <a:rPr lang="it-IT" dirty="0"/>
-              <a:t> </a:t>
-            </a:r>
-            <a:r>
-              <a:rPr lang="it-IT" dirty="0" err="1"/>
-              <a:t>when</a:t>
-            </a:r>
-            <a:r>
-              <a:rPr lang="it-IT" dirty="0"/>
-              <a:t> </a:t>
-            </a:r>
-            <a:r>
-              <a:rPr lang="it-IT" dirty="0" err="1"/>
-              <a:t>you</a:t>
-            </a:r>
-            <a:r>
-              <a:rPr lang="it-IT" dirty="0"/>
-              <a:t> open an xml file</a:t>
-            </a:r>
-          </a:p>
-          <a:p>
-            <a:r>
-              <a:rPr lang="it-IT" dirty="0">
-                <a:solidFill>
-                  <a:srgbClr val="FF0000"/>
-                </a:solidFill>
-              </a:rPr>
-              <a:t>Code mode: </a:t>
-            </a:r>
-            <a:r>
-              <a:rPr lang="it-IT" dirty="0"/>
-              <a:t>use </a:t>
-            </a:r>
-            <a:r>
-              <a:rPr lang="it-IT" dirty="0" err="1"/>
-              <a:t>only</a:t>
-            </a:r>
-            <a:r>
-              <a:rPr lang="it-IT" dirty="0"/>
-              <a:t> xml</a:t>
-            </a:r>
-          </a:p>
-          <a:p>
-            <a:r>
-              <a:rPr lang="it-IT" dirty="0">
-                <a:solidFill>
-                  <a:srgbClr val="FF0000"/>
-                </a:solidFill>
-              </a:rPr>
-              <a:t>Split mode: </a:t>
-            </a:r>
-            <a:r>
-              <a:rPr lang="it-IT" dirty="0"/>
-              <a:t>use xml and graphic tool</a:t>
-            </a:r>
-          </a:p>
-          <a:p>
-            <a:r>
-              <a:rPr lang="it-IT" dirty="0">
-                <a:solidFill>
-                  <a:srgbClr val="FF0000"/>
-                </a:solidFill>
-              </a:rPr>
-              <a:t>Design mode: </a:t>
-            </a:r>
-            <a:r>
-              <a:rPr lang="it-IT" dirty="0"/>
-              <a:t>use </a:t>
-            </a:r>
-            <a:r>
-              <a:rPr lang="it-IT" dirty="0" err="1"/>
-              <a:t>only</a:t>
-            </a:r>
-            <a:r>
-              <a:rPr lang="it-IT" dirty="0"/>
-              <a:t> drag and drop graphic tool</a:t>
-            </a:r>
+        </p:nvPicPr>
+        <p:blipFill rotWithShape="1">
+          <a:blip r:embed="rId2"/>
+          <a:srcRect l="-1" r="-1"/>
+          <a:stretch/>
+        </p:blipFill>
+        <p:spPr>
+          <a:xfrm>
+            <a:off x="1466126" y="1433887"/>
+            <a:ext cx="9259747" cy="4953239"/>
+          </a:xfrm>
+          <a:prstGeom prst="rect">
+            <a:avLst/>
+          </a:prstGeom>
+        </p:spPr>
+      </p:pic>
+      <p:sp>
+        <p:nvSpPr>
+          <p:cNvPr id="8" name="Freccia a destra 7">
+            <a:extLst>
+              <a:ext uri="{FF2B5EF4-FFF2-40B4-BE49-F238E27FC236}">
+                <a16:creationId xmlns:a16="http://schemas.microsoft.com/office/drawing/2014/main" id="{8815035C-7AC3-4546-A16A-FF185C71C239}"/>
+              </a:ext>
+            </a:extLst>
+          </p:cNvPr>
+          <p:cNvSpPr/>
+          <p:nvPr/>
+        </p:nvSpPr>
+        <p:spPr>
+          <a:xfrm rot="16200000">
+            <a:off x="8712845" y="1976456"/>
+            <a:ext cx="636608" cy="549800"/>
+          </a:xfrm>
+          <a:prstGeom prst="rightArrow">
+            <a:avLst/>
+          </a:prstGeom>
+          <a:noFill/>
+          <a:ln w="28575"/>
+        </p:spPr>
+        <p:style>
+          <a:lnRef idx="1">
+            <a:schemeClr val="accent1"/>
+          </a:lnRef>
+          <a:fillRef idx="3">
+            <a:schemeClr val="accent1"/>
+          </a:fillRef>
+          <a:effectRef idx="2">
+            <a:schemeClr val="accent1"/>
+          </a:effectRef>
+          <a:fontRef idx="minor">
+            <a:schemeClr val="lt1"/>
+          </a:fontRef>
+        </p:style>
+        <p:txBody>
+          <a:bodyPr rtlCol="0" anchor="ctr"/>
+          <a:lstStyle/>
+          <a:p>
+            <a:pPr algn="ctr"/>
+            <a:endParaRPr lang="it-IT"/>
+          </a:p>
+        </p:txBody>
+      </p:sp>
+      <p:sp>
+        <p:nvSpPr>
+          <p:cNvPr id="9" name="Freccia a destra 8">
+            <a:extLst>
+              <a:ext uri="{FF2B5EF4-FFF2-40B4-BE49-F238E27FC236}">
+                <a16:creationId xmlns:a16="http://schemas.microsoft.com/office/drawing/2014/main" id="{12E6E2CA-0D2B-4843-926E-88A4BACF3690}"/>
+              </a:ext>
+            </a:extLst>
+          </p:cNvPr>
+          <p:cNvSpPr/>
+          <p:nvPr/>
+        </p:nvSpPr>
+        <p:spPr>
+          <a:xfrm rot="10800000">
+            <a:off x="1694731" y="2367904"/>
+            <a:ext cx="636608" cy="549800"/>
+          </a:xfrm>
+          <a:prstGeom prst="rightArrow">
+            <a:avLst/>
+          </a:prstGeom>
+          <a:noFill/>
+          <a:ln w="28575"/>
+        </p:spPr>
+        <p:style>
+          <a:lnRef idx="1">
+            <a:schemeClr val="accent1"/>
+          </a:lnRef>
+          <a:fillRef idx="3">
+            <a:schemeClr val="accent1"/>
+          </a:fillRef>
+          <a:effectRef idx="2">
+            <a:schemeClr val="accent1"/>
+          </a:effectRef>
+          <a:fontRef idx="minor">
+            <a:schemeClr val="lt1"/>
+          </a:fontRef>
+        </p:style>
+        <p:txBody>
+          <a:bodyPr rtlCol="0" anchor="ctr"/>
+          <a:lstStyle/>
+          <a:p>
+            <a:pPr algn="ctr"/>
+            <a:endParaRPr lang="it-IT"/>
+          </a:p>
+        </p:txBody>
+      </p:sp>
+      <p:sp>
+        <p:nvSpPr>
+          <p:cNvPr id="10" name="Freccia a destra 9">
+            <a:extLst>
+              <a:ext uri="{FF2B5EF4-FFF2-40B4-BE49-F238E27FC236}">
+                <a16:creationId xmlns:a16="http://schemas.microsoft.com/office/drawing/2014/main" id="{BA8054ED-0A22-4074-817A-05180BFE574B}"/>
+              </a:ext>
+            </a:extLst>
+          </p:cNvPr>
+          <p:cNvSpPr/>
+          <p:nvPr/>
+        </p:nvSpPr>
+        <p:spPr>
+          <a:xfrm rot="5400000">
+            <a:off x="2276882" y="5312338"/>
+            <a:ext cx="645207" cy="536293"/>
+          </a:xfrm>
+          <a:prstGeom prst="rightArrow">
+            <a:avLst/>
+          </a:prstGeom>
+          <a:noFill/>
+          <a:ln w="28575"/>
+        </p:spPr>
+        <p:style>
+          <a:lnRef idx="1">
+            <a:schemeClr val="accent1"/>
+          </a:lnRef>
+          <a:fillRef idx="3">
+            <a:schemeClr val="accent1"/>
+          </a:fillRef>
+          <a:effectRef idx="2">
+            <a:schemeClr val="accent1"/>
+          </a:effectRef>
+          <a:fontRef idx="minor">
+            <a:schemeClr val="lt1"/>
+          </a:fontRef>
+        </p:style>
+        <p:txBody>
+          <a:bodyPr rtlCol="0" anchor="ctr"/>
+          <a:lstStyle/>
+          <a:p>
+            <a:pPr algn="ctr"/>
+            <a:endParaRPr lang="it-IT"/>
+          </a:p>
+        </p:txBody>
+      </p:sp>
+      <p:sp>
+        <p:nvSpPr>
+          <p:cNvPr id="11" name="Freccia a destra 10">
+            <a:extLst>
+              <a:ext uri="{FF2B5EF4-FFF2-40B4-BE49-F238E27FC236}">
+                <a16:creationId xmlns:a16="http://schemas.microsoft.com/office/drawing/2014/main" id="{EFBA0B79-7816-4286-AD9D-CE531B455D8F}"/>
+              </a:ext>
+            </a:extLst>
+          </p:cNvPr>
+          <p:cNvSpPr/>
+          <p:nvPr/>
+        </p:nvSpPr>
+        <p:spPr>
+          <a:xfrm rot="16200000">
+            <a:off x="3980728" y="1701559"/>
+            <a:ext cx="636608" cy="549800"/>
+          </a:xfrm>
+          <a:prstGeom prst="rightArrow">
+            <a:avLst/>
+          </a:prstGeom>
+          <a:noFill/>
+          <a:ln w="28575"/>
+        </p:spPr>
+        <p:style>
+          <a:lnRef idx="1">
+            <a:schemeClr val="accent1"/>
+          </a:lnRef>
+          <a:fillRef idx="3">
+            <a:schemeClr val="accent1"/>
+          </a:fillRef>
+          <a:effectRef idx="2">
+            <a:schemeClr val="accent1"/>
+          </a:effectRef>
+          <a:fontRef idx="minor">
+            <a:schemeClr val="lt1"/>
+          </a:fontRef>
+        </p:style>
+        <p:txBody>
+          <a:bodyPr rtlCol="0" anchor="ctr"/>
+          <a:lstStyle/>
+          <a:p>
+            <a:pPr algn="ctr"/>
+            <a:endParaRPr lang="it-IT"/>
           </a:p>
         </p:txBody>
       </p:sp>
     </p:spTree>
     <p:extLst>
       <p:ext uri="{BB962C8B-B14F-4D97-AF65-F5344CB8AC3E}">
-        <p14:creationId xmlns:p14="http://schemas.microsoft.com/office/powerpoint/2010/main" val="4070693851"/>
+        <p14:creationId xmlns:p14="http://schemas.microsoft.com/office/powerpoint/2010/main" val="4112021029"/>
       </p:ext>
     </p:extLst>
   </p:cSld>
@@ -8597,7 +8603,7 @@
           <p:cNvPr id="2" name="Titolo 1">
             <a:extLst>
               <a:ext uri="{FF2B5EF4-FFF2-40B4-BE49-F238E27FC236}">
-                <a16:creationId xmlns:a16="http://schemas.microsoft.com/office/drawing/2014/main" id="{1D4F5280-7690-45DA-B68F-F5D01416A756}"/>
+                <a16:creationId xmlns:a16="http://schemas.microsoft.com/office/drawing/2014/main" id="{5096FFE2-A2EC-42E3-BF7F-16D855D7DB33}"/>
               </a:ext>
             </a:extLst>
           </p:cNvPr>
@@ -8608,14 +8614,216 @@
             <p:ph type="title"/>
           </p:nvPr>
         </p:nvSpPr>
-        <p:spPr/>
-        <p:txBody>
-          <a:bodyPr/>
+        <p:spPr>
+          <a:xfrm>
+            <a:off x="609600" y="274638"/>
+            <a:ext cx="10972800" cy="1143000"/>
+          </a:xfrm>
+        </p:spPr>
+        <p:txBody>
+          <a:bodyPr anchor="ctr">
+            <a:normAutofit/>
+          </a:bodyPr>
           <a:lstStyle/>
           <a:p>
             <a:r>
               <a:rPr lang="it-IT" dirty="0"/>
-              <a:t>Code Mode</a:t>
+              <a:t>Device file </a:t>
+            </a:r>
+            <a:r>
+              <a:rPr lang="it-IT" dirty="0" err="1"/>
+              <a:t>explorer</a:t>
+            </a:r>
+            <a:endParaRPr lang="it-IT" dirty="0"/>
+          </a:p>
+        </p:txBody>
+      </p:sp>
+      <p:sp>
+        <p:nvSpPr>
+          <p:cNvPr id="3" name="Segnaposto contenuto 2">
+            <a:extLst>
+              <a:ext uri="{FF2B5EF4-FFF2-40B4-BE49-F238E27FC236}">
+                <a16:creationId xmlns:a16="http://schemas.microsoft.com/office/drawing/2014/main" id="{6C4A981F-7833-469D-AA38-1E965AB19C81}"/>
+              </a:ext>
+            </a:extLst>
+          </p:cNvPr>
+          <p:cNvSpPr>
+            <a:spLocks noGrp="1"/>
+          </p:cNvSpPr>
+          <p:nvPr>
+            <p:ph sz="half" idx="1"/>
+          </p:nvPr>
+        </p:nvSpPr>
+        <p:spPr>
+          <a:xfrm>
+            <a:off x="609600" y="1600201"/>
+            <a:ext cx="5384800" cy="4525963"/>
+          </a:xfrm>
+        </p:spPr>
+        <p:txBody>
+          <a:bodyPr>
+            <a:normAutofit/>
+          </a:bodyPr>
+          <a:lstStyle/>
+          <a:p>
+            <a:r>
+              <a:rPr lang="it-IT" sz="2600" dirty="0" err="1"/>
+              <a:t>You</a:t>
+            </a:r>
+            <a:r>
+              <a:rPr lang="it-IT" sz="2600" dirty="0"/>
+              <a:t> can </a:t>
+            </a:r>
+            <a:r>
+              <a:rPr lang="it-IT" sz="2600" dirty="0" err="1"/>
+              <a:t>also</a:t>
+            </a:r>
+            <a:r>
+              <a:rPr lang="it-IT" sz="2600" dirty="0"/>
+              <a:t> </a:t>
+            </a:r>
+            <a:r>
+              <a:rPr lang="it-IT" sz="2600" dirty="0" err="1"/>
+              <a:t>explore</a:t>
+            </a:r>
+            <a:r>
+              <a:rPr lang="it-IT" sz="2600" dirty="0"/>
+              <a:t> storage device </a:t>
+            </a:r>
+          </a:p>
+          <a:p>
+            <a:pPr lvl="1"/>
+            <a:r>
+              <a:rPr lang="it-IT" sz="2600" dirty="0" err="1"/>
+              <a:t>If</a:t>
+            </a:r>
+            <a:r>
+              <a:rPr lang="it-IT" sz="2600" dirty="0"/>
+              <a:t> </a:t>
+            </a:r>
+            <a:r>
+              <a:rPr lang="it-IT" sz="2600" dirty="0" err="1"/>
+              <a:t>you</a:t>
+            </a:r>
+            <a:r>
+              <a:rPr lang="it-IT" sz="2600" dirty="0"/>
+              <a:t> use AVD, storage </a:t>
+            </a:r>
+            <a:r>
+              <a:rPr lang="it-IT" sz="2600" dirty="0" err="1"/>
+              <a:t>is</a:t>
+            </a:r>
+            <a:r>
+              <a:rPr lang="it-IT" sz="2600" dirty="0"/>
+              <a:t> a </a:t>
+            </a:r>
+            <a:r>
+              <a:rPr lang="it-IT" sz="2600" dirty="0" err="1"/>
+              <a:t>direactory</a:t>
+            </a:r>
+            <a:r>
+              <a:rPr lang="it-IT" sz="2600" dirty="0"/>
+              <a:t> in </a:t>
+            </a:r>
+            <a:r>
+              <a:rPr lang="it-IT" sz="2600" dirty="0" err="1"/>
+              <a:t>your</a:t>
+            </a:r>
+            <a:r>
+              <a:rPr lang="it-IT" sz="2600" dirty="0"/>
+              <a:t> PC</a:t>
+            </a:r>
+          </a:p>
+          <a:p>
+            <a:pPr lvl="1"/>
+            <a:r>
+              <a:rPr lang="it-IT" sz="2600" dirty="0" err="1"/>
+              <a:t>If</a:t>
+            </a:r>
+            <a:r>
+              <a:rPr lang="it-IT" sz="2600" dirty="0"/>
+              <a:t> </a:t>
+            </a:r>
+            <a:r>
+              <a:rPr lang="it-IT" sz="2600" dirty="0" err="1"/>
+              <a:t>you</a:t>
+            </a:r>
+            <a:r>
+              <a:rPr lang="it-IT" sz="2600" dirty="0"/>
+              <a:t> use Real device </a:t>
+            </a:r>
+            <a:r>
+              <a:rPr lang="it-IT" sz="2600" dirty="0" err="1"/>
+              <a:t>is</a:t>
+            </a:r>
+            <a:r>
+              <a:rPr lang="it-IT" sz="2600" dirty="0"/>
+              <a:t> the </a:t>
+            </a:r>
+            <a:r>
+              <a:rPr lang="it-IT" sz="2600" dirty="0" err="1"/>
+              <a:t>real</a:t>
+            </a:r>
+            <a:r>
+              <a:rPr lang="it-IT" sz="2600" dirty="0"/>
+              <a:t> file system</a:t>
+            </a:r>
+          </a:p>
+          <a:p>
+            <a:r>
+              <a:rPr lang="it-IT" sz="2600" dirty="0"/>
+              <a:t>To </a:t>
+            </a:r>
+            <a:r>
+              <a:rPr lang="it-IT" sz="2600" dirty="0" err="1"/>
+              <a:t>see</a:t>
+            </a:r>
+            <a:r>
+              <a:rPr lang="it-IT" sz="2600" dirty="0"/>
+              <a:t> </a:t>
+            </a:r>
+            <a:r>
+              <a:rPr lang="it-IT" sz="2600" dirty="0" err="1"/>
+              <a:t>your</a:t>
+            </a:r>
+            <a:r>
+              <a:rPr lang="it-IT" sz="2600" dirty="0"/>
+              <a:t> app directory in storage</a:t>
+            </a:r>
+          </a:p>
+          <a:p>
+            <a:pPr lvl="1"/>
+            <a:r>
+              <a:rPr lang="it-IT" sz="2600" i="1" dirty="0"/>
+              <a:t>File </a:t>
+            </a:r>
+            <a:r>
+              <a:rPr lang="it-IT" sz="2600" i="1" dirty="0" err="1"/>
+              <a:t>explorer</a:t>
+            </a:r>
+            <a:r>
+              <a:rPr lang="it-IT" sz="2600" i="1" dirty="0"/>
+              <a:t> -&gt; Data -&gt; Data </a:t>
+            </a:r>
+            <a:r>
+              <a:rPr lang="it-IT" sz="2600" dirty="0"/>
+              <a:t>-&gt; </a:t>
+            </a:r>
+            <a:r>
+              <a:rPr lang="it-IT" sz="2600" dirty="0" err="1"/>
+              <a:t>your</a:t>
+            </a:r>
+            <a:r>
+              <a:rPr lang="it-IT" sz="2600" dirty="0"/>
+              <a:t> app package (e.g. </a:t>
+            </a:r>
+            <a:r>
+              <a:rPr lang="it-IT" sz="2600" dirty="0" err="1"/>
+              <a:t>com.example.MyApplication</a:t>
+            </a:r>
+            <a:r>
+              <a:rPr lang="it-IT" sz="2600" dirty="0"/>
+              <a:t>)</a:t>
             </a:r>
           </a:p>
         </p:txBody>
@@ -8625,7 +8833,7 @@
           <p:cNvPr id="4" name="Segnaposto numero diapositiva 3">
             <a:extLst>
               <a:ext uri="{FF2B5EF4-FFF2-40B4-BE49-F238E27FC236}">
-                <a16:creationId xmlns:a16="http://schemas.microsoft.com/office/drawing/2014/main" id="{C314C115-6581-47A8-A6E5-7AB7FF040860}"/>
+                <a16:creationId xmlns:a16="http://schemas.microsoft.com/office/drawing/2014/main" id="{5FC0766B-D598-41BE-8FAF-8FA15D241746}"/>
               </a:ext>
             </a:extLst>
           </p:cNvPr>
@@ -8636,44 +8844,67 @@
             <p:ph type="sldNum" sz="quarter" idx="12"/>
           </p:nvPr>
         </p:nvSpPr>
-        <p:spPr/>
-        <p:txBody>
-          <a:bodyPr/>
-          <a:lstStyle/>
-          <a:p>
+        <p:spPr>
+          <a:xfrm>
+            <a:off x="5115480" y="6362701"/>
+            <a:ext cx="6466921" cy="365125"/>
+          </a:xfrm>
+        </p:spPr>
+        <p:txBody>
+          <a:bodyPr>
+            <a:normAutofit/>
+          </a:bodyPr>
+          <a:lstStyle/>
+          <a:p>
+            <a:pPr>
+              <a:lnSpc>
+                <a:spcPct val="90000"/>
+              </a:lnSpc>
+              <a:spcAft>
+                <a:spcPts val="600"/>
+              </a:spcAft>
+            </a:pPr>
             <a:fld id="{D2040F39-7941-49A4-B48D-F201B18B6351}" type="slidenum">
               <a:rPr lang="it-IT" smtClean="0"/>
-              <a:pPr/>
+              <a:pPr>
+                <a:lnSpc>
+                  <a:spcPct val="90000"/>
+                </a:lnSpc>
+                <a:spcAft>
+                  <a:spcPts val="600"/>
+                </a:spcAft>
+              </a:pPr>
               <a:t>18</a:t>
             </a:fld>
-            <a:endParaRPr lang="it-IT" dirty="0"/>
+            <a:endParaRPr lang="it-IT"/>
           </a:p>
         </p:txBody>
       </p:sp>
       <p:pic>
         <p:nvPicPr>
-          <p:cNvPr id="9" name="Segnaposto contenuto 5">
-            <a:extLst>
-              <a:ext uri="{FF2B5EF4-FFF2-40B4-BE49-F238E27FC236}">
-                <a16:creationId xmlns:a16="http://schemas.microsoft.com/office/drawing/2014/main" id="{649F5E30-606B-4521-8080-539B1F7EEBA5}"/>
+          <p:cNvPr id="9" name="Segnaposto contenuto 4">
+            <a:extLst>
+              <a:ext uri="{FF2B5EF4-FFF2-40B4-BE49-F238E27FC236}">
+                <a16:creationId xmlns:a16="http://schemas.microsoft.com/office/drawing/2014/main" id="{D98786AA-EAB5-4FA5-949E-CCC96C50EED7}"/>
               </a:ext>
             </a:extLst>
           </p:cNvPr>
           <p:cNvPicPr>
-            <a:picLocks noChangeAspect="1"/>
+            <a:picLocks noGrp="1" noChangeAspect="1"/>
           </p:cNvPicPr>
-          <p:nvPr/>
+          <p:nvPr>
+            <p:ph sz="half" idx="2"/>
+          </p:nvPr>
         </p:nvPicPr>
-        <p:blipFill>
+        <p:blipFill rotWithShape="1">
           <a:blip r:embed="rId2"/>
-          <a:stretch>
-            <a:fillRect/>
-          </a:stretch>
+          <a:srcRect l="69835" t="64543" r="-1"/>
+          <a:stretch/>
         </p:blipFill>
         <p:spPr>
           <a:xfrm>
-            <a:off x="1284593" y="1600200"/>
-            <a:ext cx="9622814" cy="4525963"/>
+            <a:off x="6380977" y="2496351"/>
+            <a:ext cx="5293111" cy="3328106"/>
           </a:xfrm>
           <a:prstGeom prst="rect">
             <a:avLst/>
@@ -8683,7 +8914,7 @@
     </p:spTree>
     <p:extLst>
       <p:ext uri="{BB962C8B-B14F-4D97-AF65-F5344CB8AC3E}">
-        <p14:creationId xmlns:p14="http://schemas.microsoft.com/office/powerpoint/2010/main" val="822980987"/>
+        <p14:creationId xmlns:p14="http://schemas.microsoft.com/office/powerpoint/2010/main" val="1563645607"/>
       </p:ext>
     </p:extLst>
   </p:cSld>
@@ -8715,7 +8946,7 @@
           <p:cNvPr id="2" name="Titolo 1">
             <a:extLst>
               <a:ext uri="{FF2B5EF4-FFF2-40B4-BE49-F238E27FC236}">
-                <a16:creationId xmlns:a16="http://schemas.microsoft.com/office/drawing/2014/main" id="{99B084B2-7AF1-4D51-BE34-884C0B3A1336}"/>
+                <a16:creationId xmlns:a16="http://schemas.microsoft.com/office/drawing/2014/main" id="{44DE2770-9318-4303-8FE3-A9A7AF94817E}"/>
               </a:ext>
             </a:extLst>
           </p:cNvPr>
@@ -8733,46 +8964,17 @@
           <a:p>
             <a:r>
               <a:rPr lang="it-IT" dirty="0"/>
-              <a:t>Split Mode</a:t>
-            </a:r>
-          </a:p>
-        </p:txBody>
-      </p:sp>
-      <p:pic>
-        <p:nvPicPr>
-          <p:cNvPr id="6" name="Segnaposto contenuto 5">
-            <a:extLst>
-              <a:ext uri="{FF2B5EF4-FFF2-40B4-BE49-F238E27FC236}">
-                <a16:creationId xmlns:a16="http://schemas.microsoft.com/office/drawing/2014/main" id="{44232BFD-CEB8-4111-B9D4-2DFC08F16D84}"/>
-              </a:ext>
-            </a:extLst>
-          </p:cNvPr>
-          <p:cNvPicPr>
-            <a:picLocks noGrp="1" noChangeAspect="1"/>
-          </p:cNvPicPr>
-          <p:nvPr>
-            <p:ph idx="1"/>
-          </p:nvPr>
-        </p:nvPicPr>
-        <p:blipFill>
-          <a:blip r:embed="rId2"/>
-          <a:stretch>
-            <a:fillRect/>
-          </a:stretch>
-        </p:blipFill>
-        <p:spPr>
-          <a:xfrm>
-            <a:off x="1202499" y="1600200"/>
-            <a:ext cx="9787001" cy="4525963"/>
-          </a:xfrm>
-        </p:spPr>
-      </p:pic>
+              <a:t>Layout design tool</a:t>
+            </a:r>
+          </a:p>
+        </p:txBody>
+      </p:sp>
       <p:sp>
         <p:nvSpPr>
           <p:cNvPr id="4" name="Segnaposto numero diapositiva 3">
             <a:extLst>
               <a:ext uri="{FF2B5EF4-FFF2-40B4-BE49-F238E27FC236}">
-                <a16:creationId xmlns:a16="http://schemas.microsoft.com/office/drawing/2014/main" id="{488A6574-AA9E-43C0-AF88-902D2C34E1BB}"/>
+                <a16:creationId xmlns:a16="http://schemas.microsoft.com/office/drawing/2014/main" id="{9FE6EA8C-7277-41B2-B77B-C309CBD1C996}"/>
               </a:ext>
             </a:extLst>
           </p:cNvPr>
@@ -8797,10 +8999,163 @@
           </a:p>
         </p:txBody>
       </p:sp>
+      <p:sp>
+        <p:nvSpPr>
+          <p:cNvPr id="10" name="Segnaposto contenuto 9">
+            <a:extLst>
+              <a:ext uri="{FF2B5EF4-FFF2-40B4-BE49-F238E27FC236}">
+                <a16:creationId xmlns:a16="http://schemas.microsoft.com/office/drawing/2014/main" id="{144596D0-68FC-4242-81F9-2B69BCB9EFB9}"/>
+              </a:ext>
+            </a:extLst>
+          </p:cNvPr>
+          <p:cNvSpPr>
+            <a:spLocks noGrp="1"/>
+          </p:cNvSpPr>
+          <p:nvPr>
+            <p:ph idx="1"/>
+          </p:nvPr>
+        </p:nvSpPr>
+        <p:spPr/>
+        <p:txBody>
+          <a:bodyPr/>
+          <a:lstStyle/>
+          <a:p>
+            <a:pPr marL="0" indent="0">
+              <a:buNone/>
+            </a:pPr>
+            <a:r>
+              <a:rPr lang="it-IT" dirty="0"/>
+              <a:t>Android Studio </a:t>
+            </a:r>
+            <a:r>
+              <a:rPr lang="it-IT" dirty="0" err="1"/>
+              <a:t>offers</a:t>
+            </a:r>
+            <a:r>
+              <a:rPr lang="it-IT" dirty="0"/>
+              <a:t> 3 mode to </a:t>
+            </a:r>
+            <a:r>
+              <a:rPr lang="it-IT" dirty="0" err="1"/>
+              <a:t>manipulate</a:t>
+            </a:r>
+            <a:r>
+              <a:rPr lang="it-IT" dirty="0"/>
+              <a:t> graphic </a:t>
+            </a:r>
+            <a:r>
+              <a:rPr lang="it-IT" dirty="0" err="1"/>
+              <a:t>element</a:t>
+            </a:r>
+            <a:r>
+              <a:rPr lang="it-IT" dirty="0"/>
+              <a:t> (Layout, </a:t>
+            </a:r>
+            <a:r>
+              <a:rPr lang="it-IT" dirty="0" err="1"/>
+              <a:t>Drawable</a:t>
+            </a:r>
+            <a:r>
+              <a:rPr lang="it-IT" dirty="0"/>
+              <a:t>, ecc.), </a:t>
+            </a:r>
+            <a:r>
+              <a:rPr lang="it-IT" dirty="0" err="1"/>
+              <a:t>you</a:t>
+            </a:r>
+            <a:r>
+              <a:rPr lang="it-IT" dirty="0"/>
+              <a:t> can </a:t>
+            </a:r>
+            <a:r>
+              <a:rPr lang="it-IT" dirty="0" err="1"/>
+              <a:t>choose</a:t>
+            </a:r>
+            <a:r>
+              <a:rPr lang="it-IT" dirty="0"/>
+              <a:t> </a:t>
+            </a:r>
+            <a:r>
+              <a:rPr lang="it-IT" dirty="0" err="1"/>
+              <a:t>when</a:t>
+            </a:r>
+            <a:r>
+              <a:rPr lang="it-IT" dirty="0"/>
+              <a:t> </a:t>
+            </a:r>
+            <a:r>
+              <a:rPr lang="it-IT" dirty="0" err="1"/>
+              <a:t>you</a:t>
+            </a:r>
+            <a:r>
+              <a:rPr lang="it-IT" dirty="0"/>
+              <a:t> open an xml file</a:t>
+            </a:r>
+          </a:p>
+          <a:p>
+            <a:r>
+              <a:rPr lang="it-IT" dirty="0">
+                <a:solidFill>
+                  <a:srgbClr val="FF0000"/>
+                </a:solidFill>
+              </a:rPr>
+              <a:t>Code mode: </a:t>
+            </a:r>
+            <a:r>
+              <a:rPr lang="it-IT" dirty="0"/>
+              <a:t>use </a:t>
+            </a:r>
+            <a:r>
+              <a:rPr lang="it-IT" dirty="0" err="1"/>
+              <a:t>only</a:t>
+            </a:r>
+            <a:r>
+              <a:rPr lang="it-IT" dirty="0"/>
+              <a:t> xml</a:t>
+            </a:r>
+          </a:p>
+          <a:p>
+            <a:r>
+              <a:rPr lang="it-IT" dirty="0">
+                <a:solidFill>
+                  <a:srgbClr val="FF0000"/>
+                </a:solidFill>
+              </a:rPr>
+              <a:t>Split mode: </a:t>
+            </a:r>
+            <a:r>
+              <a:rPr lang="it-IT" dirty="0"/>
+              <a:t>use xml and graphic tool</a:t>
+            </a:r>
+          </a:p>
+          <a:p>
+            <a:r>
+              <a:rPr lang="it-IT" dirty="0">
+                <a:solidFill>
+                  <a:srgbClr val="FF0000"/>
+                </a:solidFill>
+              </a:rPr>
+              <a:t>Design mode: </a:t>
+            </a:r>
+            <a:r>
+              <a:rPr lang="it-IT" dirty="0"/>
+              <a:t>use </a:t>
+            </a:r>
+            <a:r>
+              <a:rPr lang="it-IT" dirty="0" err="1"/>
+              <a:t>only</a:t>
+            </a:r>
+            <a:r>
+              <a:rPr lang="it-IT" dirty="0"/>
+              <a:t> drag and drop graphic tool</a:t>
+            </a:r>
+          </a:p>
+        </p:txBody>
+      </p:sp>
     </p:spTree>
     <p:extLst>
       <p:ext uri="{BB962C8B-B14F-4D97-AF65-F5344CB8AC3E}">
-        <p14:creationId xmlns:p14="http://schemas.microsoft.com/office/powerpoint/2010/main" val="3398143378"/>
+        <p14:creationId xmlns:p14="http://schemas.microsoft.com/office/powerpoint/2010/main" val="4070693851"/>
       </p:ext>
     </p:extLst>
   </p:cSld>
@@ -9061,7 +9416,7 @@
           <p:cNvPr id="2" name="Titolo 1">
             <a:extLst>
               <a:ext uri="{FF2B5EF4-FFF2-40B4-BE49-F238E27FC236}">
-                <a16:creationId xmlns:a16="http://schemas.microsoft.com/office/drawing/2014/main" id="{097B2E1A-3022-4B3E-887F-5C2404A30221}"/>
+                <a16:creationId xmlns:a16="http://schemas.microsoft.com/office/drawing/2014/main" id="{1D4F5280-7690-45DA-B68F-F5D01416A756}"/>
               </a:ext>
             </a:extLst>
           </p:cNvPr>
@@ -9079,26 +9434,54 @@
           <a:p>
             <a:r>
               <a:rPr lang="it-IT" dirty="0"/>
-              <a:t>Design Mode</a:t>
-            </a:r>
+              <a:t>Code Mode</a:t>
+            </a:r>
+          </a:p>
+        </p:txBody>
+      </p:sp>
+      <p:sp>
+        <p:nvSpPr>
+          <p:cNvPr id="4" name="Segnaposto numero diapositiva 3">
+            <a:extLst>
+              <a:ext uri="{FF2B5EF4-FFF2-40B4-BE49-F238E27FC236}">
+                <a16:creationId xmlns:a16="http://schemas.microsoft.com/office/drawing/2014/main" id="{C314C115-6581-47A8-A6E5-7AB7FF040860}"/>
+              </a:ext>
+            </a:extLst>
+          </p:cNvPr>
+          <p:cNvSpPr>
+            <a:spLocks noGrp="1"/>
+          </p:cNvSpPr>
+          <p:nvPr>
+            <p:ph type="sldNum" sz="quarter" idx="12"/>
+          </p:nvPr>
+        </p:nvSpPr>
+        <p:spPr/>
+        <p:txBody>
+          <a:bodyPr/>
+          <a:lstStyle/>
+          <a:p>
+            <a:fld id="{D2040F39-7941-49A4-B48D-F201B18B6351}" type="slidenum">
+              <a:rPr lang="it-IT" smtClean="0"/>
+              <a:pPr/>
+              <a:t>20</a:t>
+            </a:fld>
+            <a:endParaRPr lang="it-IT" dirty="0"/>
           </a:p>
         </p:txBody>
       </p:sp>
       <p:pic>
         <p:nvPicPr>
-          <p:cNvPr id="6" name="Segnaposto contenuto 5">
-            <a:extLst>
-              <a:ext uri="{FF2B5EF4-FFF2-40B4-BE49-F238E27FC236}">
-                <a16:creationId xmlns:a16="http://schemas.microsoft.com/office/drawing/2014/main" id="{6F2B7F70-A1CC-426D-B349-1BE79A42D9B4}"/>
+          <p:cNvPr id="9" name="Segnaposto contenuto 5">
+            <a:extLst>
+              <a:ext uri="{FF2B5EF4-FFF2-40B4-BE49-F238E27FC236}">
+                <a16:creationId xmlns:a16="http://schemas.microsoft.com/office/drawing/2014/main" id="{649F5E30-606B-4521-8080-539B1F7EEBA5}"/>
               </a:ext>
             </a:extLst>
           </p:cNvPr>
           <p:cNvPicPr>
-            <a:picLocks noGrp="1" noChangeAspect="1"/>
+            <a:picLocks noChangeAspect="1"/>
           </p:cNvPicPr>
-          <p:nvPr>
-            <p:ph idx="1"/>
-          </p:nvPr>
+          <p:nvPr/>
         </p:nvPicPr>
         <p:blipFill>
           <a:blip r:embed="rId2"/>
@@ -9108,45 +9491,18 @@
         </p:blipFill>
         <p:spPr>
           <a:xfrm>
-            <a:off x="1248605" y="1600200"/>
-            <a:ext cx="9694789" cy="4525963"/>
-          </a:xfrm>
+            <a:off x="1284593" y="1600200"/>
+            <a:ext cx="9622814" cy="4525963"/>
+          </a:xfrm>
+          <a:prstGeom prst="rect">
+            <a:avLst/>
+          </a:prstGeom>
         </p:spPr>
       </p:pic>
-      <p:sp>
-        <p:nvSpPr>
-          <p:cNvPr id="4" name="Segnaposto numero diapositiva 3">
-            <a:extLst>
-              <a:ext uri="{FF2B5EF4-FFF2-40B4-BE49-F238E27FC236}">
-                <a16:creationId xmlns:a16="http://schemas.microsoft.com/office/drawing/2014/main" id="{3A7B6A2A-AAA0-4F0A-B3B6-2C225CB4BFCC}"/>
-              </a:ext>
-            </a:extLst>
-          </p:cNvPr>
-          <p:cNvSpPr>
-            <a:spLocks noGrp="1"/>
-          </p:cNvSpPr>
-          <p:nvPr>
-            <p:ph type="sldNum" sz="quarter" idx="12"/>
-          </p:nvPr>
-        </p:nvSpPr>
-        <p:spPr/>
-        <p:txBody>
-          <a:bodyPr/>
-          <a:lstStyle/>
-          <a:p>
-            <a:fld id="{D2040F39-7941-49A4-B48D-F201B18B6351}" type="slidenum">
-              <a:rPr lang="it-IT" smtClean="0"/>
-              <a:pPr/>
-              <a:t>20</a:t>
-            </a:fld>
-            <a:endParaRPr lang="it-IT" dirty="0"/>
-          </a:p>
-        </p:txBody>
-      </p:sp>
     </p:spTree>
     <p:extLst>
       <p:ext uri="{BB962C8B-B14F-4D97-AF65-F5344CB8AC3E}">
-        <p14:creationId xmlns:p14="http://schemas.microsoft.com/office/powerpoint/2010/main" val="317630163"/>
+        <p14:creationId xmlns:p14="http://schemas.microsoft.com/office/powerpoint/2010/main" val="822980987"/>
       </p:ext>
     </p:extLst>
   </p:cSld>
@@ -9178,7 +9534,7 @@
           <p:cNvPr id="2" name="Titolo 1">
             <a:extLst>
               <a:ext uri="{FF2B5EF4-FFF2-40B4-BE49-F238E27FC236}">
-                <a16:creationId xmlns:a16="http://schemas.microsoft.com/office/drawing/2014/main" id="{4366B46B-75A9-46D6-90F9-25C66A9BF085}"/>
+                <a16:creationId xmlns:a16="http://schemas.microsoft.com/office/drawing/2014/main" id="{99B084B2-7AF1-4D51-BE34-884C0B3A1336}"/>
               </a:ext>
             </a:extLst>
           </p:cNvPr>
@@ -9195,113 +9551,47 @@
           <a:lstStyle/>
           <a:p>
             <a:r>
-              <a:rPr lang="it-IT" dirty="0" err="1"/>
-              <a:t>What</a:t>
-            </a:r>
-            <a:r>
               <a:rPr lang="it-IT" dirty="0"/>
-              <a:t> </a:t>
-            </a:r>
-            <a:r>
-              <a:rPr lang="it-IT" dirty="0" err="1"/>
-              <a:t>is</a:t>
-            </a:r>
-            <a:r>
-              <a:rPr lang="it-IT" dirty="0"/>
-              <a:t> </a:t>
-            </a:r>
-            <a:r>
-              <a:rPr lang="it-IT" dirty="0" err="1"/>
-              <a:t>Gradle</a:t>
-            </a:r>
-            <a:r>
-              <a:rPr lang="it-IT" dirty="0"/>
-              <a:t>?</a:t>
-            </a:r>
-          </a:p>
-        </p:txBody>
-      </p:sp>
-      <p:sp>
-        <p:nvSpPr>
-          <p:cNvPr id="3" name="Segnaposto contenuto 2">
-            <a:extLst>
-              <a:ext uri="{FF2B5EF4-FFF2-40B4-BE49-F238E27FC236}">
-                <a16:creationId xmlns:a16="http://schemas.microsoft.com/office/drawing/2014/main" id="{D153291F-A597-472D-BFC2-593BBB1E0ABD}"/>
-              </a:ext>
-            </a:extLst>
-          </p:cNvPr>
-          <p:cNvSpPr>
-            <a:spLocks noGrp="1"/>
-          </p:cNvSpPr>
+              <a:t>Split Mode</a:t>
+            </a:r>
+          </a:p>
+        </p:txBody>
+      </p:sp>
+      <p:pic>
+        <p:nvPicPr>
+          <p:cNvPr id="6" name="Segnaposto contenuto 5">
+            <a:extLst>
+              <a:ext uri="{FF2B5EF4-FFF2-40B4-BE49-F238E27FC236}">
+                <a16:creationId xmlns:a16="http://schemas.microsoft.com/office/drawing/2014/main" id="{44232BFD-CEB8-4111-B9D4-2DFC08F16D84}"/>
+              </a:ext>
+            </a:extLst>
+          </p:cNvPr>
+          <p:cNvPicPr>
+            <a:picLocks noGrp="1" noChangeAspect="1"/>
+          </p:cNvPicPr>
           <p:nvPr>
             <p:ph idx="1"/>
           </p:nvPr>
-        </p:nvSpPr>
-        <p:spPr/>
-        <p:txBody>
-          <a:bodyPr>
-            <a:normAutofit/>
-          </a:bodyPr>
-          <a:lstStyle/>
-          <a:p>
-            <a:pPr marL="0" indent="0">
-              <a:buNone/>
-            </a:pPr>
-            <a:r>
-              <a:rPr lang="en-US" dirty="0"/>
-              <a:t>Gradle is an open-source and general-purpose build automation tool that is designed to be flexible enough to build almost any type of software.</a:t>
-            </a:r>
-          </a:p>
-          <a:p>
-            <a:r>
-              <a:rPr lang="en-US" dirty="0"/>
-              <a:t>Is based on Groovy or Kotlin scripts</a:t>
-            </a:r>
-          </a:p>
-          <a:p>
-            <a:r>
-              <a:rPr lang="en-US" dirty="0"/>
-              <a:t>Run on JVM (to use it you must install JDK)</a:t>
-            </a:r>
-          </a:p>
-          <a:p>
-            <a:r>
-              <a:rPr lang="en-US" dirty="0"/>
-              <a:t>Gradle manage your android project build, dependencies, versions, resources…</a:t>
-            </a:r>
-          </a:p>
-          <a:p>
-            <a:pPr marL="0" indent="0">
-              <a:buNone/>
-            </a:pPr>
-            <a:endParaRPr lang="en-US" dirty="0"/>
-          </a:p>
-          <a:p>
-            <a:pPr marL="0" indent="0">
-              <a:buNone/>
-            </a:pPr>
-            <a:endParaRPr lang="en-US" dirty="0"/>
-          </a:p>
-          <a:p>
-            <a:pPr marL="0" indent="0">
-              <a:buNone/>
-            </a:pPr>
-            <a:endParaRPr lang="en-US" dirty="0"/>
-          </a:p>
-          <a:p>
-            <a:pPr marL="0" indent="0">
-              <a:buNone/>
-            </a:pPr>
-            <a:endParaRPr lang="it-IT" dirty="0"/>
-          </a:p>
-        </p:txBody>
-      </p:sp>
+        </p:nvPicPr>
+        <p:blipFill>
+          <a:blip r:embed="rId2"/>
+          <a:stretch>
+            <a:fillRect/>
+          </a:stretch>
+        </p:blipFill>
+        <p:spPr>
+          <a:xfrm>
+            <a:off x="1202499" y="1600200"/>
+            <a:ext cx="9787001" cy="4525963"/>
+          </a:xfrm>
+        </p:spPr>
+      </p:pic>
       <p:sp>
         <p:nvSpPr>
           <p:cNvPr id="4" name="Segnaposto numero diapositiva 3">
             <a:extLst>
               <a:ext uri="{FF2B5EF4-FFF2-40B4-BE49-F238E27FC236}">
-                <a16:creationId xmlns:a16="http://schemas.microsoft.com/office/drawing/2014/main" id="{968FFE9A-039C-417D-8904-521AA37A4D07}"/>
+                <a16:creationId xmlns:a16="http://schemas.microsoft.com/office/drawing/2014/main" id="{488A6574-AA9E-43C0-AF88-902D2C34E1BB}"/>
               </a:ext>
             </a:extLst>
           </p:cNvPr>
@@ -9321,6 +9611,524 @@
               <a:rPr lang="it-IT" smtClean="0"/>
               <a:pPr/>
               <a:t>21</a:t>
+            </a:fld>
+            <a:endParaRPr lang="it-IT" dirty="0"/>
+          </a:p>
+        </p:txBody>
+      </p:sp>
+    </p:spTree>
+    <p:extLst>
+      <p:ext uri="{BB962C8B-B14F-4D97-AF65-F5344CB8AC3E}">
+        <p14:creationId xmlns:p14="http://schemas.microsoft.com/office/powerpoint/2010/main" val="3398143378"/>
+      </p:ext>
+    </p:extLst>
+  </p:cSld>
+  <p:clrMapOvr>
+    <a:masterClrMapping/>
+  </p:clrMapOvr>
+</p:sld>
+</file>
+
+<file path=ppt/slides/slide22.xml><?xml version="1.0" encoding="utf-8"?>
+<p:sld xmlns:a="http://schemas.openxmlformats.org/drawingml/2006/main" xmlns:r="http://schemas.openxmlformats.org/officeDocument/2006/relationships" xmlns:p="http://schemas.openxmlformats.org/presentationml/2006/main">
+  <p:cSld>
+    <p:spTree>
+      <p:nvGrpSpPr>
+        <p:cNvPr id="1" name=""/>
+        <p:cNvGrpSpPr/>
+        <p:nvPr/>
+      </p:nvGrpSpPr>
+      <p:grpSpPr>
+        <a:xfrm>
+          <a:off x="0" y="0"/>
+          <a:ext cx="0" cy="0"/>
+          <a:chOff x="0" y="0"/>
+          <a:chExt cx="0" cy="0"/>
+        </a:xfrm>
+      </p:grpSpPr>
+      <p:sp>
+        <p:nvSpPr>
+          <p:cNvPr id="2" name="Titolo 1">
+            <a:extLst>
+              <a:ext uri="{FF2B5EF4-FFF2-40B4-BE49-F238E27FC236}">
+                <a16:creationId xmlns:a16="http://schemas.microsoft.com/office/drawing/2014/main" id="{097B2E1A-3022-4B3E-887F-5C2404A30221}"/>
+              </a:ext>
+            </a:extLst>
+          </p:cNvPr>
+          <p:cNvSpPr>
+            <a:spLocks noGrp="1"/>
+          </p:cNvSpPr>
+          <p:nvPr>
+            <p:ph type="title"/>
+          </p:nvPr>
+        </p:nvSpPr>
+        <p:spPr/>
+        <p:txBody>
+          <a:bodyPr/>
+          <a:lstStyle/>
+          <a:p>
+            <a:r>
+              <a:rPr lang="it-IT" dirty="0"/>
+              <a:t>Design Mode</a:t>
+            </a:r>
+          </a:p>
+        </p:txBody>
+      </p:sp>
+      <p:pic>
+        <p:nvPicPr>
+          <p:cNvPr id="6" name="Segnaposto contenuto 5">
+            <a:extLst>
+              <a:ext uri="{FF2B5EF4-FFF2-40B4-BE49-F238E27FC236}">
+                <a16:creationId xmlns:a16="http://schemas.microsoft.com/office/drawing/2014/main" id="{6F2B7F70-A1CC-426D-B349-1BE79A42D9B4}"/>
+              </a:ext>
+            </a:extLst>
+          </p:cNvPr>
+          <p:cNvPicPr>
+            <a:picLocks noGrp="1" noChangeAspect="1"/>
+          </p:cNvPicPr>
+          <p:nvPr>
+            <p:ph idx="1"/>
+          </p:nvPr>
+        </p:nvPicPr>
+        <p:blipFill>
+          <a:blip r:embed="rId2"/>
+          <a:stretch>
+            <a:fillRect/>
+          </a:stretch>
+        </p:blipFill>
+        <p:spPr>
+          <a:xfrm>
+            <a:off x="1248605" y="1600200"/>
+            <a:ext cx="9694789" cy="4525963"/>
+          </a:xfrm>
+        </p:spPr>
+      </p:pic>
+      <p:sp>
+        <p:nvSpPr>
+          <p:cNvPr id="4" name="Segnaposto numero diapositiva 3">
+            <a:extLst>
+              <a:ext uri="{FF2B5EF4-FFF2-40B4-BE49-F238E27FC236}">
+                <a16:creationId xmlns:a16="http://schemas.microsoft.com/office/drawing/2014/main" id="{3A7B6A2A-AAA0-4F0A-B3B6-2C225CB4BFCC}"/>
+              </a:ext>
+            </a:extLst>
+          </p:cNvPr>
+          <p:cNvSpPr>
+            <a:spLocks noGrp="1"/>
+          </p:cNvSpPr>
+          <p:nvPr>
+            <p:ph type="sldNum" sz="quarter" idx="12"/>
+          </p:nvPr>
+        </p:nvSpPr>
+        <p:spPr/>
+        <p:txBody>
+          <a:bodyPr/>
+          <a:lstStyle/>
+          <a:p>
+            <a:fld id="{D2040F39-7941-49A4-B48D-F201B18B6351}" type="slidenum">
+              <a:rPr lang="it-IT" smtClean="0"/>
+              <a:pPr/>
+              <a:t>22</a:t>
+            </a:fld>
+            <a:endParaRPr lang="it-IT" dirty="0"/>
+          </a:p>
+        </p:txBody>
+      </p:sp>
+    </p:spTree>
+    <p:extLst>
+      <p:ext uri="{BB962C8B-B14F-4D97-AF65-F5344CB8AC3E}">
+        <p14:creationId xmlns:p14="http://schemas.microsoft.com/office/powerpoint/2010/main" val="317630163"/>
+      </p:ext>
+    </p:extLst>
+  </p:cSld>
+  <p:clrMapOvr>
+    <a:masterClrMapping/>
+  </p:clrMapOvr>
+</p:sld>
+</file>
+
+<file path=ppt/slides/slide23.xml><?xml version="1.0" encoding="utf-8"?>
+<p:sld xmlns:a="http://schemas.openxmlformats.org/drawingml/2006/main" xmlns:r="http://schemas.openxmlformats.org/officeDocument/2006/relationships" xmlns:p="http://schemas.openxmlformats.org/presentationml/2006/main">
+  <p:cSld>
+    <p:spTree>
+      <p:nvGrpSpPr>
+        <p:cNvPr id="1" name=""/>
+        <p:cNvGrpSpPr/>
+        <p:nvPr/>
+      </p:nvGrpSpPr>
+      <p:grpSpPr>
+        <a:xfrm>
+          <a:off x="0" y="0"/>
+          <a:ext cx="0" cy="0"/>
+          <a:chOff x="0" y="0"/>
+          <a:chExt cx="0" cy="0"/>
+        </a:xfrm>
+      </p:grpSpPr>
+      <p:sp>
+        <p:nvSpPr>
+          <p:cNvPr id="2" name="Titolo 1">
+            <a:extLst>
+              <a:ext uri="{FF2B5EF4-FFF2-40B4-BE49-F238E27FC236}">
+                <a16:creationId xmlns:a16="http://schemas.microsoft.com/office/drawing/2014/main" id="{4D2D92A4-841A-4471-873E-A47EB50F8D1B}"/>
+              </a:ext>
+            </a:extLst>
+          </p:cNvPr>
+          <p:cNvSpPr>
+            <a:spLocks noGrp="1"/>
+          </p:cNvSpPr>
+          <p:nvPr>
+            <p:ph type="title"/>
+          </p:nvPr>
+        </p:nvSpPr>
+        <p:spPr/>
+        <p:txBody>
+          <a:bodyPr/>
+          <a:lstStyle/>
+          <a:p>
+            <a:r>
+              <a:rPr lang="it-IT" dirty="0"/>
+              <a:t>Opening sample project</a:t>
+            </a:r>
+          </a:p>
+        </p:txBody>
+      </p:sp>
+      <p:sp>
+        <p:nvSpPr>
+          <p:cNvPr id="3" name="Segnaposto contenuto 2">
+            <a:extLst>
+              <a:ext uri="{FF2B5EF4-FFF2-40B4-BE49-F238E27FC236}">
+                <a16:creationId xmlns:a16="http://schemas.microsoft.com/office/drawing/2014/main" id="{FE8C581D-5A24-4914-B57A-E393A414917B}"/>
+              </a:ext>
+            </a:extLst>
+          </p:cNvPr>
+          <p:cNvSpPr>
+            <a:spLocks noGrp="1"/>
+          </p:cNvSpPr>
+          <p:nvPr>
+            <p:ph idx="1"/>
+          </p:nvPr>
+        </p:nvSpPr>
+        <p:spPr/>
+        <p:txBody>
+          <a:bodyPr/>
+          <a:lstStyle/>
+          <a:p>
+            <a:r>
+              <a:rPr lang="it-IT" dirty="0"/>
+              <a:t>File </a:t>
+            </a:r>
+            <a:r>
+              <a:rPr lang="it-IT" dirty="0">
+                <a:sym typeface="Wingdings" panose="05000000000000000000" pitchFamily="2" charset="2"/>
+              </a:rPr>
+              <a:t> new  import sample </a:t>
+            </a:r>
+          </a:p>
+          <a:p>
+            <a:pPr marL="0" indent="0">
+              <a:buNone/>
+            </a:pPr>
+            <a:r>
+              <a:rPr lang="it-IT" dirty="0">
+                <a:sym typeface="Wingdings" panose="05000000000000000000" pitchFamily="2" charset="2"/>
+              </a:rPr>
+              <a:t>Android studio </a:t>
+            </a:r>
+            <a:r>
+              <a:rPr lang="it-IT" dirty="0" err="1">
+                <a:sym typeface="Wingdings" panose="05000000000000000000" pitchFamily="2" charset="2"/>
+              </a:rPr>
+              <a:t>offers</a:t>
+            </a:r>
+            <a:r>
+              <a:rPr lang="it-IT" dirty="0">
+                <a:sym typeface="Wingdings" panose="05000000000000000000" pitchFamily="2" charset="2"/>
+              </a:rPr>
+              <a:t> the </a:t>
+            </a:r>
+            <a:r>
+              <a:rPr lang="it-IT" dirty="0" err="1">
+                <a:sym typeface="Wingdings" panose="05000000000000000000" pitchFamily="2" charset="2"/>
+              </a:rPr>
+              <a:t>opportunity</a:t>
+            </a:r>
+            <a:r>
+              <a:rPr lang="it-IT" dirty="0">
+                <a:sym typeface="Wingdings" panose="05000000000000000000" pitchFamily="2" charset="2"/>
+              </a:rPr>
+              <a:t> to import sample project </a:t>
+            </a:r>
+          </a:p>
+          <a:p>
+            <a:pPr marL="0" indent="0">
+              <a:buNone/>
+            </a:pPr>
+            <a:r>
+              <a:rPr lang="it-IT" dirty="0" err="1">
+                <a:sym typeface="Wingdings" panose="05000000000000000000" pitchFamily="2" charset="2"/>
+              </a:rPr>
+              <a:t>All</a:t>
+            </a:r>
+            <a:r>
+              <a:rPr lang="it-IT" dirty="0">
+                <a:sym typeface="Wingdings" panose="05000000000000000000" pitchFamily="2" charset="2"/>
+              </a:rPr>
+              <a:t> sample code in Android Studio are </a:t>
+            </a:r>
+            <a:r>
+              <a:rPr lang="it-IT" dirty="0" err="1">
+                <a:sym typeface="Wingdings" panose="05000000000000000000" pitchFamily="2" charset="2"/>
+              </a:rPr>
+              <a:t>available</a:t>
+            </a:r>
+            <a:r>
+              <a:rPr lang="it-IT" dirty="0">
+                <a:sym typeface="Wingdings" panose="05000000000000000000" pitchFamily="2" charset="2"/>
+              </a:rPr>
+              <a:t> </a:t>
+            </a:r>
+            <a:r>
+              <a:rPr lang="it-IT" dirty="0" err="1">
+                <a:sym typeface="Wingdings" panose="05000000000000000000" pitchFamily="2" charset="2"/>
+              </a:rPr>
+              <a:t>at</a:t>
+            </a:r>
+            <a:r>
+              <a:rPr lang="it-IT" dirty="0">
+                <a:sym typeface="Wingdings" panose="05000000000000000000" pitchFamily="2" charset="2"/>
+              </a:rPr>
+              <a:t> </a:t>
+            </a:r>
+            <a:r>
+              <a:rPr lang="it-IT" dirty="0">
+                <a:sym typeface="Wingdings" panose="05000000000000000000" pitchFamily="2" charset="2"/>
+                <a:hlinkClick r:id="rId2"/>
+              </a:rPr>
+              <a:t>https://github.com/googlesamples/</a:t>
+            </a:r>
+            <a:endParaRPr lang="it-IT" dirty="0"/>
+          </a:p>
+        </p:txBody>
+      </p:sp>
+      <p:sp>
+        <p:nvSpPr>
+          <p:cNvPr id="4" name="Segnaposto numero diapositiva 3">
+            <a:extLst>
+              <a:ext uri="{FF2B5EF4-FFF2-40B4-BE49-F238E27FC236}">
+                <a16:creationId xmlns:a16="http://schemas.microsoft.com/office/drawing/2014/main" id="{01F90ED1-D02F-4EE5-A35A-6A193904B4AD}"/>
+              </a:ext>
+            </a:extLst>
+          </p:cNvPr>
+          <p:cNvSpPr>
+            <a:spLocks noGrp="1"/>
+          </p:cNvSpPr>
+          <p:nvPr>
+            <p:ph type="sldNum" sz="quarter" idx="12"/>
+          </p:nvPr>
+        </p:nvSpPr>
+        <p:spPr/>
+        <p:txBody>
+          <a:bodyPr/>
+          <a:lstStyle/>
+          <a:p>
+            <a:fld id="{D2040F39-7941-49A4-B48D-F201B18B6351}" type="slidenum">
+              <a:rPr lang="it-IT" smtClean="0"/>
+              <a:pPr/>
+              <a:t>23</a:t>
+            </a:fld>
+            <a:endParaRPr lang="it-IT" dirty="0"/>
+          </a:p>
+        </p:txBody>
+      </p:sp>
+    </p:spTree>
+    <p:extLst>
+      <p:ext uri="{BB962C8B-B14F-4D97-AF65-F5344CB8AC3E}">
+        <p14:creationId xmlns:p14="http://schemas.microsoft.com/office/powerpoint/2010/main" val="2412063885"/>
+      </p:ext>
+    </p:extLst>
+  </p:cSld>
+  <p:clrMapOvr>
+    <a:masterClrMapping/>
+  </p:clrMapOvr>
+</p:sld>
+</file>
+
+<file path=ppt/slides/slide24.xml><?xml version="1.0" encoding="utf-8"?>
+<p:sld xmlns:a="http://schemas.openxmlformats.org/drawingml/2006/main" xmlns:r="http://schemas.openxmlformats.org/officeDocument/2006/relationships" xmlns:p="http://schemas.openxmlformats.org/presentationml/2006/main">
+  <p:cSld>
+    <p:spTree>
+      <p:nvGrpSpPr>
+        <p:cNvPr id="1" name=""/>
+        <p:cNvGrpSpPr/>
+        <p:nvPr/>
+      </p:nvGrpSpPr>
+      <p:grpSpPr>
+        <a:xfrm>
+          <a:off x="0" y="0"/>
+          <a:ext cx="0" cy="0"/>
+          <a:chOff x="0" y="0"/>
+          <a:chExt cx="0" cy="0"/>
+        </a:xfrm>
+      </p:grpSpPr>
+      <p:sp>
+        <p:nvSpPr>
+          <p:cNvPr id="2" name="Titolo 1">
+            <a:extLst>
+              <a:ext uri="{FF2B5EF4-FFF2-40B4-BE49-F238E27FC236}">
+                <a16:creationId xmlns:a16="http://schemas.microsoft.com/office/drawing/2014/main" id="{4366B46B-75A9-46D6-90F9-25C66A9BF085}"/>
+              </a:ext>
+            </a:extLst>
+          </p:cNvPr>
+          <p:cNvSpPr>
+            <a:spLocks noGrp="1"/>
+          </p:cNvSpPr>
+          <p:nvPr>
+            <p:ph type="title"/>
+          </p:nvPr>
+        </p:nvSpPr>
+        <p:spPr/>
+        <p:txBody>
+          <a:bodyPr/>
+          <a:lstStyle/>
+          <a:p>
+            <a:r>
+              <a:rPr lang="it-IT" dirty="0" err="1"/>
+              <a:t>What</a:t>
+            </a:r>
+            <a:r>
+              <a:rPr lang="it-IT" dirty="0"/>
+              <a:t> </a:t>
+            </a:r>
+            <a:r>
+              <a:rPr lang="it-IT" dirty="0" err="1"/>
+              <a:t>is</a:t>
+            </a:r>
+            <a:r>
+              <a:rPr lang="it-IT" dirty="0"/>
+              <a:t> </a:t>
+            </a:r>
+            <a:r>
+              <a:rPr lang="it-IT" dirty="0" err="1"/>
+              <a:t>Gradle</a:t>
+            </a:r>
+            <a:r>
+              <a:rPr lang="it-IT" dirty="0"/>
+              <a:t>?</a:t>
+            </a:r>
+          </a:p>
+        </p:txBody>
+      </p:sp>
+      <p:sp>
+        <p:nvSpPr>
+          <p:cNvPr id="3" name="Segnaposto contenuto 2">
+            <a:extLst>
+              <a:ext uri="{FF2B5EF4-FFF2-40B4-BE49-F238E27FC236}">
+                <a16:creationId xmlns:a16="http://schemas.microsoft.com/office/drawing/2014/main" id="{D153291F-A597-472D-BFC2-593BBB1E0ABD}"/>
+              </a:ext>
+            </a:extLst>
+          </p:cNvPr>
+          <p:cNvSpPr>
+            <a:spLocks noGrp="1"/>
+          </p:cNvSpPr>
+          <p:nvPr>
+            <p:ph idx="1"/>
+          </p:nvPr>
+        </p:nvSpPr>
+        <p:spPr/>
+        <p:txBody>
+          <a:bodyPr>
+            <a:normAutofit/>
+          </a:bodyPr>
+          <a:lstStyle/>
+          <a:p>
+            <a:pPr marL="0" indent="0">
+              <a:buNone/>
+            </a:pPr>
+            <a:r>
+              <a:rPr lang="en-US" dirty="0"/>
+              <a:t>Gradle is an open-source and general-purpose build automation tool that is designed to be flexible enough to build almost any type of software.</a:t>
+            </a:r>
+          </a:p>
+          <a:p>
+            <a:r>
+              <a:rPr lang="en-US" dirty="0"/>
+              <a:t>Is based on Groovy or Kotlin scripts</a:t>
+            </a:r>
+          </a:p>
+          <a:p>
+            <a:r>
+              <a:rPr lang="en-US" dirty="0"/>
+              <a:t>Run on JVM (to use it you must install JDK)</a:t>
+            </a:r>
+          </a:p>
+          <a:p>
+            <a:r>
+              <a:rPr lang="en-US" dirty="0"/>
+              <a:t>Gradle manage your android project build, dependencies, versions, resources…</a:t>
+            </a:r>
+          </a:p>
+          <a:p>
+            <a:pPr marL="0" indent="0">
+              <a:buNone/>
+            </a:pPr>
+            <a:r>
+              <a:rPr lang="en-US" dirty="0">
+                <a:hlinkClick r:id="rId2"/>
+              </a:rPr>
+              <a:t>https://developer.android.com/studio/build</a:t>
+            </a:r>
+            <a:endParaRPr lang="en-US" dirty="0"/>
+          </a:p>
+          <a:p>
+            <a:pPr marL="0" indent="0">
+              <a:buNone/>
+            </a:pPr>
+            <a:endParaRPr lang="en-US" dirty="0"/>
+          </a:p>
+          <a:p>
+            <a:pPr marL="0" indent="0">
+              <a:buNone/>
+            </a:pPr>
+            <a:endParaRPr lang="en-US" dirty="0"/>
+          </a:p>
+          <a:p>
+            <a:pPr marL="0" indent="0">
+              <a:buNone/>
+            </a:pPr>
+            <a:endParaRPr lang="en-US" dirty="0"/>
+          </a:p>
+          <a:p>
+            <a:pPr marL="0" indent="0">
+              <a:buNone/>
+            </a:pPr>
+            <a:endParaRPr lang="it-IT" dirty="0"/>
+          </a:p>
+        </p:txBody>
+      </p:sp>
+      <p:sp>
+        <p:nvSpPr>
+          <p:cNvPr id="4" name="Segnaposto numero diapositiva 3">
+            <a:extLst>
+              <a:ext uri="{FF2B5EF4-FFF2-40B4-BE49-F238E27FC236}">
+                <a16:creationId xmlns:a16="http://schemas.microsoft.com/office/drawing/2014/main" id="{968FFE9A-039C-417D-8904-521AA37A4D07}"/>
+              </a:ext>
+            </a:extLst>
+          </p:cNvPr>
+          <p:cNvSpPr>
+            <a:spLocks noGrp="1"/>
+          </p:cNvSpPr>
+          <p:nvPr>
+            <p:ph type="sldNum" sz="quarter" idx="12"/>
+          </p:nvPr>
+        </p:nvSpPr>
+        <p:spPr/>
+        <p:txBody>
+          <a:bodyPr/>
+          <a:lstStyle/>
+          <a:p>
+            <a:fld id="{D2040F39-7941-49A4-B48D-F201B18B6351}" type="slidenum">
+              <a:rPr lang="it-IT" smtClean="0"/>
+              <a:pPr/>
+              <a:t>24</a:t>
             </a:fld>
             <a:endParaRPr lang="it-IT" dirty="0"/>
           </a:p>
@@ -12062,22 +12870,6 @@
               <a:buFont typeface="Arial"/>
             </a:pPr>
             <a:endParaRPr lang="it-IT" sz="3200" dirty="0"/>
-          </a:p>
-          <a:p>
-            <a:pPr defTabSz="457200">
-              <a:spcBef>
-                <a:spcPct val="20000"/>
-              </a:spcBef>
-              <a:buFont typeface="Arial"/>
-            </a:pPr>
-            <a:r>
-              <a:rPr lang="it-IT" sz="3200" dirty="0" err="1"/>
-              <a:t>You</a:t>
-            </a:r>
-            <a:r>
-              <a:rPr lang="it-IT" sz="3200" dirty="0"/>
-              <a:t> can open AVD Manager from the toolbar.</a:t>
-            </a:r>
           </a:p>
         </p:txBody>
       </p:sp>

</xml_diff>

<commit_message>
M2 -> COMPLETE (Add link debug in real device)
</commit_message>
<xml_diff>
--- a/slides/02 - Android Studio.pptx
+++ b/slides/02 - Android Studio.pptx
@@ -165,7 +165,7 @@
   <pc:docChgLst>
     <pc:chgData name="KEVIN MALAGOLI" userId="4753276f-5182-4cb6-86cf-6602de7c63db" providerId="ADAL" clId="{A3F69C49-7DC3-428C-81F0-BD22182C3BF6}"/>
     <pc:docChg chg="undo redo custSel addSld delSld modSld sldOrd delMainMaster">
-      <pc:chgData name="KEVIN MALAGOLI" userId="4753276f-5182-4cb6-86cf-6602de7c63db" providerId="ADAL" clId="{A3F69C49-7DC3-428C-81F0-BD22182C3BF6}" dt="2021-12-30T13:27:49.556" v="9681" actId="47"/>
+      <pc:chgData name="KEVIN MALAGOLI" userId="4753276f-5182-4cb6-86cf-6602de7c63db" providerId="ADAL" clId="{A3F69C49-7DC3-428C-81F0-BD22182C3BF6}" dt="2022-01-07T12:40:56.709" v="9685" actId="5793"/>
       <pc:docMkLst>
         <pc:docMk/>
       </pc:docMkLst>
@@ -764,12 +764,20 @@
           <pc:sldMk cId="2130891845" sldId="267"/>
         </pc:sldMkLst>
       </pc:sldChg>
-      <pc:sldChg chg="addSp delSp mod">
-        <pc:chgData name="KEVIN MALAGOLI" userId="4753276f-5182-4cb6-86cf-6602de7c63db" providerId="ADAL" clId="{A3F69C49-7DC3-428C-81F0-BD22182C3BF6}" dt="2021-12-20T16:02:22.513" v="2459" actId="22"/>
+      <pc:sldChg chg="addSp delSp modSp mod">
+        <pc:chgData name="KEVIN MALAGOLI" userId="4753276f-5182-4cb6-86cf-6602de7c63db" providerId="ADAL" clId="{A3F69C49-7DC3-428C-81F0-BD22182C3BF6}" dt="2022-01-07T12:40:56.709" v="9685" actId="5793"/>
         <pc:sldMkLst>
           <pc:docMk/>
           <pc:sldMk cId="2217072517" sldId="268"/>
         </pc:sldMkLst>
+        <pc:spChg chg="mod">
+          <ac:chgData name="KEVIN MALAGOLI" userId="4753276f-5182-4cb6-86cf-6602de7c63db" providerId="ADAL" clId="{A3F69C49-7DC3-428C-81F0-BD22182C3BF6}" dt="2022-01-07T12:40:56.709" v="9685" actId="5793"/>
+          <ac:spMkLst>
+            <pc:docMk/>
+            <pc:sldMk cId="2217072517" sldId="268"/>
+            <ac:spMk id="3" creationId="{3CE613F0-FD57-4722-90F9-11098F329BD1}"/>
+          </ac:spMkLst>
+        </pc:spChg>
         <pc:spChg chg="add del">
           <ac:chgData name="KEVIN MALAGOLI" userId="4753276f-5182-4cb6-86cf-6602de7c63db" providerId="ADAL" clId="{A3F69C49-7DC3-428C-81F0-BD22182C3BF6}" dt="2021-12-20T16:02:22.513" v="2459" actId="22"/>
           <ac:spMkLst>
@@ -3414,7 +3422,7 @@
             <a:fld id="{D2040F39-7941-49A4-B48D-F201B18B6351}" type="slidenum">
               <a:rPr lang="it-IT" smtClean="0"/>
               <a:pPr/>
-              <a:t>‹N›</a:t>
+              <a:t>‹#›</a:t>
             </a:fld>
             <a:endParaRPr lang="it-IT" dirty="0"/>
           </a:p>
@@ -3595,7 +3603,7 @@
             <a:fld id="{D2040F39-7941-49A4-B48D-F201B18B6351}" type="slidenum">
               <a:rPr lang="it-IT" smtClean="0"/>
               <a:pPr/>
-              <a:t>‹N›</a:t>
+              <a:t>‹#›</a:t>
             </a:fld>
             <a:endParaRPr lang="it-IT" dirty="0"/>
           </a:p>
@@ -3786,7 +3794,7 @@
             <a:fld id="{D2040F39-7941-49A4-B48D-F201B18B6351}" type="slidenum">
               <a:rPr lang="it-IT" smtClean="0"/>
               <a:pPr/>
-              <a:t>‹N›</a:t>
+              <a:t>‹#›</a:t>
             </a:fld>
             <a:endParaRPr lang="it-IT" dirty="0"/>
           </a:p>
@@ -3923,7 +3931,7 @@
             <a:fld id="{D2040F39-7941-49A4-B48D-F201B18B6351}" type="slidenum">
               <a:rPr lang="it-IT" smtClean="0"/>
               <a:pPr/>
-              <a:t>‹N›</a:t>
+              <a:t>‹#›</a:t>
             </a:fld>
             <a:endParaRPr lang="it-IT" dirty="0"/>
           </a:p>
@@ -4180,7 +4188,7 @@
             <a:fld id="{D2040F39-7941-49A4-B48D-F201B18B6351}" type="slidenum">
               <a:rPr lang="it-IT" smtClean="0"/>
               <a:pPr/>
-              <a:t>‹N›</a:t>
+              <a:t>‹#›</a:t>
             </a:fld>
             <a:endParaRPr lang="it-IT" dirty="0"/>
           </a:p>
@@ -4479,7 +4487,7 @@
             <a:fld id="{D2040F39-7941-49A4-B48D-F201B18B6351}" type="slidenum">
               <a:rPr lang="it-IT" smtClean="0"/>
               <a:pPr/>
-              <a:t>‹N›</a:t>
+              <a:t>‹#›</a:t>
             </a:fld>
             <a:endParaRPr lang="it-IT" dirty="0"/>
           </a:p>
@@ -4912,7 +4920,7 @@
             <a:fld id="{D2040F39-7941-49A4-B48D-F201B18B6351}" type="slidenum">
               <a:rPr lang="it-IT" smtClean="0"/>
               <a:pPr/>
-              <a:t>‹N›</a:t>
+              <a:t>‹#›</a:t>
             </a:fld>
             <a:endParaRPr lang="it-IT" dirty="0"/>
           </a:p>
@@ -5041,7 +5049,7 @@
             <a:fld id="{D2040F39-7941-49A4-B48D-F201B18B6351}" type="slidenum">
               <a:rPr lang="it-IT" smtClean="0"/>
               <a:pPr/>
-              <a:t>‹N›</a:t>
+              <a:t>‹#›</a:t>
             </a:fld>
             <a:endParaRPr lang="it-IT" dirty="0"/>
           </a:p>
@@ -5147,7 +5155,7 @@
             <a:fld id="{D2040F39-7941-49A4-B48D-F201B18B6351}" type="slidenum">
               <a:rPr lang="it-IT" smtClean="0"/>
               <a:pPr/>
-              <a:t>‹N›</a:t>
+              <a:t>‹#›</a:t>
             </a:fld>
             <a:endParaRPr lang="it-IT" dirty="0"/>
           </a:p>
@@ -5391,7 +5399,7 @@
             <a:fld id="{D2040F39-7941-49A4-B48D-F201B18B6351}" type="slidenum">
               <a:rPr lang="it-IT" smtClean="0"/>
               <a:pPr/>
-              <a:t>‹N›</a:t>
+              <a:t>‹#›</a:t>
             </a:fld>
             <a:endParaRPr lang="it-IT" dirty="0"/>
           </a:p>
@@ -5615,7 +5623,7 @@
             <a:fld id="{D2040F39-7941-49A4-B48D-F201B18B6351}" type="slidenum">
               <a:rPr lang="it-IT" smtClean="0"/>
               <a:pPr/>
-              <a:t>‹N›</a:t>
+              <a:t>‹#›</a:t>
             </a:fld>
             <a:endParaRPr lang="it-IT" dirty="0"/>
           </a:p>
@@ -5851,7 +5859,7 @@
             <a:fld id="{D2040F39-7941-49A4-B48D-F201B18B6351}" type="slidenum">
               <a:rPr lang="it-IT" smtClean="0"/>
               <a:pPr/>
-              <a:t>‹N›</a:t>
+              <a:t>‹#›</a:t>
             </a:fld>
             <a:endParaRPr lang="it-IT" dirty="0"/>
           </a:p>
@@ -7105,7 +7113,9 @@
         </p:nvSpPr>
         <p:spPr/>
         <p:txBody>
-          <a:bodyPr/>
+          <a:bodyPr>
+            <a:normAutofit fontScale="92500" lnSpcReduction="10000"/>
+          </a:bodyPr>
           <a:lstStyle/>
           <a:p>
             <a:pPr marL="0" indent="0">
@@ -7303,6 +7313,17 @@
             <a:r>
               <a:rPr lang="it-IT" sz="2800" dirty="0"/>
               <a:t> in Android Studio devices list</a:t>
+            </a:r>
+          </a:p>
+          <a:p>
+            <a:pPr marL="0" indent="0">
+              <a:buNone/>
+            </a:pPr>
+            <a:r>
+              <a:rPr lang="en-US" sz="2800" dirty="0">
+                <a:hlinkClick r:id="rId2"/>
+              </a:rPr>
+              <a:t>https://developer.android.com/studio/debug/dev-options</a:t>
             </a:r>
             <a:endParaRPr lang="en-US" sz="2800" dirty="0"/>
           </a:p>

</xml_diff>